<commit_message>
Added DeepskyLog 5.0 information.
</commit_message>
<xml_diff>
--- a/Meeting20150425/DeepskyLog 5.0.pptx
+++ b/Meeting20150425/DeepskyLog 5.0.pptx
@@ -16,6 +16,14 @@
     <p:sldId id="261" r:id="rId11"/>
     <p:sldId id="262" r:id="rId12"/>
     <p:sldId id="263" r:id="rId13"/>
+    <p:sldId id="264" r:id="rId14"/>
+    <p:sldId id="265" r:id="rId15"/>
+    <p:sldId id="266" r:id="rId16"/>
+    <p:sldId id="267" r:id="rId17"/>
+    <p:sldId id="268" r:id="rId18"/>
+    <p:sldId id="269" r:id="rId19"/>
+    <p:sldId id="270" r:id="rId20"/>
+    <p:sldId id="271" r:id="rId21"/>
   </p:sldIdLst>
   <p:sldSz cy="5143500" cx="9144000"/>
   <p:notesSz cx="6858000" cy="9144000"/>
@@ -487,6 +495,741 @@
 </p:notes>
 </file>
 
+<file path=ppt/notesSlides/notesSlide10.xml><?xml version="1.0" encoding="utf-8"?>
+<p:notes xmlns:a="http://schemas.openxmlformats.org/drawingml/2006/main" xmlns:r="http://schemas.openxmlformats.org/officeDocument/2006/relationships" xmlns:mc="http://schemas.openxmlformats.org/markup-compatibility/2006" xmlns:mv="urn:schemas-microsoft-com:mac:vml" xmlns:p="http://schemas.openxmlformats.org/presentationml/2006/main" xmlns:c="http://schemas.openxmlformats.org/drawingml/2006/chart" xmlns:dgm="http://schemas.openxmlformats.org/drawingml/2006/diagram" xmlns:o="urn:schemas-microsoft-com:office:office" xmlns:v="urn:schemas-microsoft-com:vml" xmlns:pvml="urn:schemas-microsoft-com:office:powerpoint" xmlns:com="http://schemas.openxmlformats.org/drawingml/2006/compatibility" xmlns:p14="http://schemas.microsoft.com/office/powerpoint/2010/main" showMasterPhAnim="0" showMasterSp="0">
+  <p:cSld>
+    <p:spTree>
+      <p:nvGrpSpPr>
+        <p:cNvPr id="160" name="Shape 160"/>
+        <p:cNvGrpSpPr/>
+        <p:nvPr/>
+      </p:nvGrpSpPr>
+      <p:grpSpPr>
+        <a:xfrm>
+          <a:off x="0" y="0"/>
+          <a:ext cx="0" cy="0"/>
+          <a:chOff x="0" y="0"/>
+          <a:chExt cx="0" cy="0"/>
+        </a:xfrm>
+      </p:grpSpPr>
+      <p:sp>
+        <p:nvSpPr>
+          <p:cNvPr id="161" name="Shape 161"/>
+          <p:cNvSpPr/>
+          <p:nvPr>
+            <p:ph idx="2" type="sldImg"/>
+          </p:nvPr>
+        </p:nvSpPr>
+        <p:spPr>
+          <a:xfrm>
+            <a:off x="381187" y="685800"/>
+            <a:ext cx="6096299" cy="3429000"/>
+          </a:xfrm>
+          <a:custGeom>
+            <a:pathLst>
+              <a:path extrusionOk="0" h="120000" w="120000">
+                <a:moveTo>
+                  <a:pt x="0" y="0"/>
+                </a:moveTo>
+                <a:lnTo>
+                  <a:pt x="120000" y="0"/>
+                </a:lnTo>
+                <a:lnTo>
+                  <a:pt x="120000" y="120000"/>
+                </a:lnTo>
+                <a:lnTo>
+                  <a:pt x="0" y="120000"/>
+                </a:lnTo>
+                <a:close/>
+              </a:path>
+            </a:pathLst>
+          </a:custGeom>
+          <a:noFill/>
+          <a:ln cap="flat" w="9525">
+            <a:solidFill>
+              <a:srgbClr val="000000"/>
+            </a:solidFill>
+            <a:prstDash val="solid"/>
+            <a:round/>
+            <a:headEnd len="med" w="med" type="none"/>
+            <a:tailEnd len="med" w="med" type="none"/>
+          </a:ln>
+        </p:spPr>
+      </p:sp>
+      <p:sp>
+        <p:nvSpPr>
+          <p:cNvPr id="162" name="Shape 162"/>
+          <p:cNvSpPr txBox="1"/>
+          <p:nvPr>
+            <p:ph idx="1" type="body"/>
+          </p:nvPr>
+        </p:nvSpPr>
+        <p:spPr>
+          <a:xfrm>
+            <a:off x="685800" y="4343400"/>
+            <a:ext cx="5486399" cy="4114800"/>
+          </a:xfrm>
+          <a:prstGeom prst="rect">
+            <a:avLst/>
+          </a:prstGeom>
+        </p:spPr>
+        <p:txBody>
+          <a:bodyPr anchorCtr="0" anchor="t" bIns="91425" lIns="91425" rIns="91425" tIns="91425">
+            <a:noAutofit/>
+          </a:bodyPr>
+          <a:lstStyle/>
+          <a:p>
+            <a:pPr>
+              <a:spcBef>
+                <a:spcPts val="0"/>
+              </a:spcBef>
+              <a:buNone/>
+            </a:pPr>
+            <a:r>
+              <a:t/>
+            </a:r>
+            <a:endParaRPr/>
+          </a:p>
+        </p:txBody>
+      </p:sp>
+    </p:spTree>
+  </p:cSld>
+  <p:clrMapOvr>
+    <a:masterClrMapping/>
+  </p:clrMapOvr>
+</p:notes>
+</file>
+
+<file path=ppt/notesSlides/notesSlide11.xml><?xml version="1.0" encoding="utf-8"?>
+<p:notes xmlns:a="http://schemas.openxmlformats.org/drawingml/2006/main" xmlns:r="http://schemas.openxmlformats.org/officeDocument/2006/relationships" xmlns:mc="http://schemas.openxmlformats.org/markup-compatibility/2006" xmlns:mv="urn:schemas-microsoft-com:mac:vml" xmlns:p="http://schemas.openxmlformats.org/presentationml/2006/main" xmlns:c="http://schemas.openxmlformats.org/drawingml/2006/chart" xmlns:dgm="http://schemas.openxmlformats.org/drawingml/2006/diagram" xmlns:o="urn:schemas-microsoft-com:office:office" xmlns:v="urn:schemas-microsoft-com:vml" xmlns:pvml="urn:schemas-microsoft-com:office:powerpoint" xmlns:com="http://schemas.openxmlformats.org/drawingml/2006/compatibility" xmlns:p14="http://schemas.microsoft.com/office/powerpoint/2010/main" showMasterPhAnim="0" showMasterSp="0">
+  <p:cSld>
+    <p:spTree>
+      <p:nvGrpSpPr>
+        <p:cNvPr id="166" name="Shape 166"/>
+        <p:cNvGrpSpPr/>
+        <p:nvPr/>
+      </p:nvGrpSpPr>
+      <p:grpSpPr>
+        <a:xfrm>
+          <a:off x="0" y="0"/>
+          <a:ext cx="0" cy="0"/>
+          <a:chOff x="0" y="0"/>
+          <a:chExt cx="0" cy="0"/>
+        </a:xfrm>
+      </p:grpSpPr>
+      <p:sp>
+        <p:nvSpPr>
+          <p:cNvPr id="167" name="Shape 167"/>
+          <p:cNvSpPr/>
+          <p:nvPr>
+            <p:ph idx="2" type="sldImg"/>
+          </p:nvPr>
+        </p:nvSpPr>
+        <p:spPr>
+          <a:xfrm>
+            <a:off x="381187" y="685800"/>
+            <a:ext cx="6096299" cy="3429000"/>
+          </a:xfrm>
+          <a:custGeom>
+            <a:pathLst>
+              <a:path extrusionOk="0" h="120000" w="120000">
+                <a:moveTo>
+                  <a:pt x="0" y="0"/>
+                </a:moveTo>
+                <a:lnTo>
+                  <a:pt x="120000" y="0"/>
+                </a:lnTo>
+                <a:lnTo>
+                  <a:pt x="120000" y="120000"/>
+                </a:lnTo>
+                <a:lnTo>
+                  <a:pt x="0" y="120000"/>
+                </a:lnTo>
+                <a:close/>
+              </a:path>
+            </a:pathLst>
+          </a:custGeom>
+          <a:noFill/>
+          <a:ln cap="flat" w="9525">
+            <a:solidFill>
+              <a:srgbClr val="000000"/>
+            </a:solidFill>
+            <a:prstDash val="solid"/>
+            <a:round/>
+            <a:headEnd len="med" w="med" type="none"/>
+            <a:tailEnd len="med" w="med" type="none"/>
+          </a:ln>
+        </p:spPr>
+      </p:sp>
+      <p:sp>
+        <p:nvSpPr>
+          <p:cNvPr id="168" name="Shape 168"/>
+          <p:cNvSpPr txBox="1"/>
+          <p:nvPr>
+            <p:ph idx="1" type="body"/>
+          </p:nvPr>
+        </p:nvSpPr>
+        <p:spPr>
+          <a:xfrm>
+            <a:off x="685800" y="4343400"/>
+            <a:ext cx="5486399" cy="4114800"/>
+          </a:xfrm>
+          <a:prstGeom prst="rect">
+            <a:avLst/>
+          </a:prstGeom>
+        </p:spPr>
+        <p:txBody>
+          <a:bodyPr anchorCtr="0" anchor="t" bIns="91425" lIns="91425" rIns="91425" tIns="91425">
+            <a:noAutofit/>
+          </a:bodyPr>
+          <a:lstStyle/>
+          <a:p>
+            <a:pPr>
+              <a:spcBef>
+                <a:spcPts val="0"/>
+              </a:spcBef>
+              <a:buNone/>
+            </a:pPr>
+            <a:r>
+              <a:t/>
+            </a:r>
+            <a:endParaRPr/>
+          </a:p>
+        </p:txBody>
+      </p:sp>
+    </p:spTree>
+  </p:cSld>
+  <p:clrMapOvr>
+    <a:masterClrMapping/>
+  </p:clrMapOvr>
+</p:notes>
+</file>
+
+<file path=ppt/notesSlides/notesSlide12.xml><?xml version="1.0" encoding="utf-8"?>
+<p:notes xmlns:a="http://schemas.openxmlformats.org/drawingml/2006/main" xmlns:r="http://schemas.openxmlformats.org/officeDocument/2006/relationships" xmlns:mc="http://schemas.openxmlformats.org/markup-compatibility/2006" xmlns:mv="urn:schemas-microsoft-com:mac:vml" xmlns:p="http://schemas.openxmlformats.org/presentationml/2006/main" xmlns:c="http://schemas.openxmlformats.org/drawingml/2006/chart" xmlns:dgm="http://schemas.openxmlformats.org/drawingml/2006/diagram" xmlns:o="urn:schemas-microsoft-com:office:office" xmlns:v="urn:schemas-microsoft-com:vml" xmlns:pvml="urn:schemas-microsoft-com:office:powerpoint" xmlns:com="http://schemas.openxmlformats.org/drawingml/2006/compatibility" xmlns:p14="http://schemas.microsoft.com/office/powerpoint/2010/main" showMasterPhAnim="0" showMasterSp="0">
+  <p:cSld>
+    <p:spTree>
+      <p:nvGrpSpPr>
+        <p:cNvPr id="172" name="Shape 172"/>
+        <p:cNvGrpSpPr/>
+        <p:nvPr/>
+      </p:nvGrpSpPr>
+      <p:grpSpPr>
+        <a:xfrm>
+          <a:off x="0" y="0"/>
+          <a:ext cx="0" cy="0"/>
+          <a:chOff x="0" y="0"/>
+          <a:chExt cx="0" cy="0"/>
+        </a:xfrm>
+      </p:grpSpPr>
+      <p:sp>
+        <p:nvSpPr>
+          <p:cNvPr id="173" name="Shape 173"/>
+          <p:cNvSpPr/>
+          <p:nvPr>
+            <p:ph idx="2" type="sldImg"/>
+          </p:nvPr>
+        </p:nvSpPr>
+        <p:spPr>
+          <a:xfrm>
+            <a:off x="381187" y="685800"/>
+            <a:ext cx="6096299" cy="3429000"/>
+          </a:xfrm>
+          <a:custGeom>
+            <a:pathLst>
+              <a:path extrusionOk="0" h="120000" w="120000">
+                <a:moveTo>
+                  <a:pt x="0" y="0"/>
+                </a:moveTo>
+                <a:lnTo>
+                  <a:pt x="120000" y="0"/>
+                </a:lnTo>
+                <a:lnTo>
+                  <a:pt x="120000" y="120000"/>
+                </a:lnTo>
+                <a:lnTo>
+                  <a:pt x="0" y="120000"/>
+                </a:lnTo>
+                <a:close/>
+              </a:path>
+            </a:pathLst>
+          </a:custGeom>
+          <a:noFill/>
+          <a:ln cap="flat" w="9525">
+            <a:solidFill>
+              <a:srgbClr val="000000"/>
+            </a:solidFill>
+            <a:prstDash val="solid"/>
+            <a:round/>
+            <a:headEnd len="med" w="med" type="none"/>
+            <a:tailEnd len="med" w="med" type="none"/>
+          </a:ln>
+        </p:spPr>
+      </p:sp>
+      <p:sp>
+        <p:nvSpPr>
+          <p:cNvPr id="174" name="Shape 174"/>
+          <p:cNvSpPr txBox="1"/>
+          <p:nvPr>
+            <p:ph idx="1" type="body"/>
+          </p:nvPr>
+        </p:nvSpPr>
+        <p:spPr>
+          <a:xfrm>
+            <a:off x="685800" y="4343400"/>
+            <a:ext cx="5486399" cy="4114800"/>
+          </a:xfrm>
+          <a:prstGeom prst="rect">
+            <a:avLst/>
+          </a:prstGeom>
+        </p:spPr>
+        <p:txBody>
+          <a:bodyPr anchorCtr="0" anchor="t" bIns="91425" lIns="91425" rIns="91425" tIns="91425">
+            <a:noAutofit/>
+          </a:bodyPr>
+          <a:lstStyle/>
+          <a:p>
+            <a:pPr>
+              <a:spcBef>
+                <a:spcPts val="0"/>
+              </a:spcBef>
+              <a:buNone/>
+            </a:pPr>
+            <a:r>
+              <a:t/>
+            </a:r>
+            <a:endParaRPr/>
+          </a:p>
+        </p:txBody>
+      </p:sp>
+    </p:spTree>
+  </p:cSld>
+  <p:clrMapOvr>
+    <a:masterClrMapping/>
+  </p:clrMapOvr>
+</p:notes>
+</file>
+
+<file path=ppt/notesSlides/notesSlide13.xml><?xml version="1.0" encoding="utf-8"?>
+<p:notes xmlns:a="http://schemas.openxmlformats.org/drawingml/2006/main" xmlns:r="http://schemas.openxmlformats.org/officeDocument/2006/relationships" xmlns:mc="http://schemas.openxmlformats.org/markup-compatibility/2006" xmlns:mv="urn:schemas-microsoft-com:mac:vml" xmlns:p="http://schemas.openxmlformats.org/presentationml/2006/main" xmlns:c="http://schemas.openxmlformats.org/drawingml/2006/chart" xmlns:dgm="http://schemas.openxmlformats.org/drawingml/2006/diagram" xmlns:o="urn:schemas-microsoft-com:office:office" xmlns:v="urn:schemas-microsoft-com:vml" xmlns:pvml="urn:schemas-microsoft-com:office:powerpoint" xmlns:com="http://schemas.openxmlformats.org/drawingml/2006/compatibility" xmlns:p14="http://schemas.microsoft.com/office/powerpoint/2010/main" showMasterPhAnim="0" showMasterSp="0">
+  <p:cSld>
+    <p:spTree>
+      <p:nvGrpSpPr>
+        <p:cNvPr id="178" name="Shape 178"/>
+        <p:cNvGrpSpPr/>
+        <p:nvPr/>
+      </p:nvGrpSpPr>
+      <p:grpSpPr>
+        <a:xfrm>
+          <a:off x="0" y="0"/>
+          <a:ext cx="0" cy="0"/>
+          <a:chOff x="0" y="0"/>
+          <a:chExt cx="0" cy="0"/>
+        </a:xfrm>
+      </p:grpSpPr>
+      <p:sp>
+        <p:nvSpPr>
+          <p:cNvPr id="179" name="Shape 179"/>
+          <p:cNvSpPr/>
+          <p:nvPr>
+            <p:ph idx="2" type="sldImg"/>
+          </p:nvPr>
+        </p:nvSpPr>
+        <p:spPr>
+          <a:xfrm>
+            <a:off x="381187" y="685800"/>
+            <a:ext cx="6096299" cy="3429000"/>
+          </a:xfrm>
+          <a:custGeom>
+            <a:pathLst>
+              <a:path extrusionOk="0" h="120000" w="120000">
+                <a:moveTo>
+                  <a:pt x="0" y="0"/>
+                </a:moveTo>
+                <a:lnTo>
+                  <a:pt x="120000" y="0"/>
+                </a:lnTo>
+                <a:lnTo>
+                  <a:pt x="120000" y="120000"/>
+                </a:lnTo>
+                <a:lnTo>
+                  <a:pt x="0" y="120000"/>
+                </a:lnTo>
+                <a:close/>
+              </a:path>
+            </a:pathLst>
+          </a:custGeom>
+          <a:noFill/>
+          <a:ln cap="flat" w="9525">
+            <a:solidFill>
+              <a:srgbClr val="000000"/>
+            </a:solidFill>
+            <a:prstDash val="solid"/>
+            <a:round/>
+            <a:headEnd len="med" w="med" type="none"/>
+            <a:tailEnd len="med" w="med" type="none"/>
+          </a:ln>
+        </p:spPr>
+      </p:sp>
+      <p:sp>
+        <p:nvSpPr>
+          <p:cNvPr id="180" name="Shape 180"/>
+          <p:cNvSpPr txBox="1"/>
+          <p:nvPr>
+            <p:ph idx="1" type="body"/>
+          </p:nvPr>
+        </p:nvSpPr>
+        <p:spPr>
+          <a:xfrm>
+            <a:off x="685800" y="4343400"/>
+            <a:ext cx="5486399" cy="4114800"/>
+          </a:xfrm>
+          <a:prstGeom prst="rect">
+            <a:avLst/>
+          </a:prstGeom>
+        </p:spPr>
+        <p:txBody>
+          <a:bodyPr anchorCtr="0" anchor="t" bIns="91425" lIns="91425" rIns="91425" tIns="91425">
+            <a:noAutofit/>
+          </a:bodyPr>
+          <a:lstStyle/>
+          <a:p>
+            <a:pPr>
+              <a:spcBef>
+                <a:spcPts val="0"/>
+              </a:spcBef>
+              <a:buNone/>
+            </a:pPr>
+            <a:r>
+              <a:t/>
+            </a:r>
+            <a:endParaRPr/>
+          </a:p>
+        </p:txBody>
+      </p:sp>
+    </p:spTree>
+  </p:cSld>
+  <p:clrMapOvr>
+    <a:masterClrMapping/>
+  </p:clrMapOvr>
+</p:notes>
+</file>
+
+<file path=ppt/notesSlides/notesSlide14.xml><?xml version="1.0" encoding="utf-8"?>
+<p:notes xmlns:a="http://schemas.openxmlformats.org/drawingml/2006/main" xmlns:r="http://schemas.openxmlformats.org/officeDocument/2006/relationships" xmlns:mc="http://schemas.openxmlformats.org/markup-compatibility/2006" xmlns:mv="urn:schemas-microsoft-com:mac:vml" xmlns:p="http://schemas.openxmlformats.org/presentationml/2006/main" xmlns:c="http://schemas.openxmlformats.org/drawingml/2006/chart" xmlns:dgm="http://schemas.openxmlformats.org/drawingml/2006/diagram" xmlns:o="urn:schemas-microsoft-com:office:office" xmlns:v="urn:schemas-microsoft-com:vml" xmlns:pvml="urn:schemas-microsoft-com:office:powerpoint" xmlns:com="http://schemas.openxmlformats.org/drawingml/2006/compatibility" xmlns:p14="http://schemas.microsoft.com/office/powerpoint/2010/main" showMasterPhAnim="0" showMasterSp="0">
+  <p:cSld>
+    <p:spTree>
+      <p:nvGrpSpPr>
+        <p:cNvPr id="184" name="Shape 184"/>
+        <p:cNvGrpSpPr/>
+        <p:nvPr/>
+      </p:nvGrpSpPr>
+      <p:grpSpPr>
+        <a:xfrm>
+          <a:off x="0" y="0"/>
+          <a:ext cx="0" cy="0"/>
+          <a:chOff x="0" y="0"/>
+          <a:chExt cx="0" cy="0"/>
+        </a:xfrm>
+      </p:grpSpPr>
+      <p:sp>
+        <p:nvSpPr>
+          <p:cNvPr id="185" name="Shape 185"/>
+          <p:cNvSpPr/>
+          <p:nvPr>
+            <p:ph idx="2" type="sldImg"/>
+          </p:nvPr>
+        </p:nvSpPr>
+        <p:spPr>
+          <a:xfrm>
+            <a:off x="381187" y="685800"/>
+            <a:ext cx="6096299" cy="3429000"/>
+          </a:xfrm>
+          <a:custGeom>
+            <a:pathLst>
+              <a:path extrusionOk="0" h="120000" w="120000">
+                <a:moveTo>
+                  <a:pt x="0" y="0"/>
+                </a:moveTo>
+                <a:lnTo>
+                  <a:pt x="120000" y="0"/>
+                </a:lnTo>
+                <a:lnTo>
+                  <a:pt x="120000" y="120000"/>
+                </a:lnTo>
+                <a:lnTo>
+                  <a:pt x="0" y="120000"/>
+                </a:lnTo>
+                <a:close/>
+              </a:path>
+            </a:pathLst>
+          </a:custGeom>
+          <a:noFill/>
+          <a:ln cap="flat" w="9525">
+            <a:solidFill>
+              <a:srgbClr val="000000"/>
+            </a:solidFill>
+            <a:prstDash val="solid"/>
+            <a:round/>
+            <a:headEnd len="med" w="med" type="none"/>
+            <a:tailEnd len="med" w="med" type="none"/>
+          </a:ln>
+        </p:spPr>
+      </p:sp>
+      <p:sp>
+        <p:nvSpPr>
+          <p:cNvPr id="186" name="Shape 186"/>
+          <p:cNvSpPr txBox="1"/>
+          <p:nvPr>
+            <p:ph idx="1" type="body"/>
+          </p:nvPr>
+        </p:nvSpPr>
+        <p:spPr>
+          <a:xfrm>
+            <a:off x="685800" y="4343400"/>
+            <a:ext cx="5486399" cy="4114800"/>
+          </a:xfrm>
+          <a:prstGeom prst="rect">
+            <a:avLst/>
+          </a:prstGeom>
+        </p:spPr>
+        <p:txBody>
+          <a:bodyPr anchorCtr="0" anchor="t" bIns="91425" lIns="91425" rIns="91425" tIns="91425">
+            <a:noAutofit/>
+          </a:bodyPr>
+          <a:lstStyle/>
+          <a:p>
+            <a:pPr>
+              <a:spcBef>
+                <a:spcPts val="0"/>
+              </a:spcBef>
+              <a:buNone/>
+            </a:pPr>
+            <a:r>
+              <a:t/>
+            </a:r>
+            <a:endParaRPr/>
+          </a:p>
+        </p:txBody>
+      </p:sp>
+    </p:spTree>
+  </p:cSld>
+  <p:clrMapOvr>
+    <a:masterClrMapping/>
+  </p:clrMapOvr>
+</p:notes>
+</file>
+
+<file path=ppt/notesSlides/notesSlide15.xml><?xml version="1.0" encoding="utf-8"?>
+<p:notes xmlns:a="http://schemas.openxmlformats.org/drawingml/2006/main" xmlns:r="http://schemas.openxmlformats.org/officeDocument/2006/relationships" xmlns:mc="http://schemas.openxmlformats.org/markup-compatibility/2006" xmlns:mv="urn:schemas-microsoft-com:mac:vml" xmlns:p="http://schemas.openxmlformats.org/presentationml/2006/main" xmlns:c="http://schemas.openxmlformats.org/drawingml/2006/chart" xmlns:dgm="http://schemas.openxmlformats.org/drawingml/2006/diagram" xmlns:o="urn:schemas-microsoft-com:office:office" xmlns:v="urn:schemas-microsoft-com:vml" xmlns:pvml="urn:schemas-microsoft-com:office:powerpoint" xmlns:com="http://schemas.openxmlformats.org/drawingml/2006/compatibility" xmlns:p14="http://schemas.microsoft.com/office/powerpoint/2010/main" showMasterPhAnim="0" showMasterSp="0">
+  <p:cSld>
+    <p:spTree>
+      <p:nvGrpSpPr>
+        <p:cNvPr id="190" name="Shape 190"/>
+        <p:cNvGrpSpPr/>
+        <p:nvPr/>
+      </p:nvGrpSpPr>
+      <p:grpSpPr>
+        <a:xfrm>
+          <a:off x="0" y="0"/>
+          <a:ext cx="0" cy="0"/>
+          <a:chOff x="0" y="0"/>
+          <a:chExt cx="0" cy="0"/>
+        </a:xfrm>
+      </p:grpSpPr>
+      <p:sp>
+        <p:nvSpPr>
+          <p:cNvPr id="191" name="Shape 191"/>
+          <p:cNvSpPr/>
+          <p:nvPr>
+            <p:ph idx="2" type="sldImg"/>
+          </p:nvPr>
+        </p:nvSpPr>
+        <p:spPr>
+          <a:xfrm>
+            <a:off x="381187" y="685800"/>
+            <a:ext cx="6096299" cy="3429000"/>
+          </a:xfrm>
+          <a:custGeom>
+            <a:pathLst>
+              <a:path extrusionOk="0" h="120000" w="120000">
+                <a:moveTo>
+                  <a:pt x="0" y="0"/>
+                </a:moveTo>
+                <a:lnTo>
+                  <a:pt x="120000" y="0"/>
+                </a:lnTo>
+                <a:lnTo>
+                  <a:pt x="120000" y="120000"/>
+                </a:lnTo>
+                <a:lnTo>
+                  <a:pt x="0" y="120000"/>
+                </a:lnTo>
+                <a:close/>
+              </a:path>
+            </a:pathLst>
+          </a:custGeom>
+          <a:noFill/>
+          <a:ln cap="flat" w="9525">
+            <a:solidFill>
+              <a:srgbClr val="000000"/>
+            </a:solidFill>
+            <a:prstDash val="solid"/>
+            <a:round/>
+            <a:headEnd len="med" w="med" type="none"/>
+            <a:tailEnd len="med" w="med" type="none"/>
+          </a:ln>
+        </p:spPr>
+      </p:sp>
+      <p:sp>
+        <p:nvSpPr>
+          <p:cNvPr id="192" name="Shape 192"/>
+          <p:cNvSpPr txBox="1"/>
+          <p:nvPr>
+            <p:ph idx="1" type="body"/>
+          </p:nvPr>
+        </p:nvSpPr>
+        <p:spPr>
+          <a:xfrm>
+            <a:off x="685800" y="4343400"/>
+            <a:ext cx="5486399" cy="4114800"/>
+          </a:xfrm>
+          <a:prstGeom prst="rect">
+            <a:avLst/>
+          </a:prstGeom>
+        </p:spPr>
+        <p:txBody>
+          <a:bodyPr anchorCtr="0" anchor="t" bIns="91425" lIns="91425" rIns="91425" tIns="91425">
+            <a:noAutofit/>
+          </a:bodyPr>
+          <a:lstStyle/>
+          <a:p>
+            <a:pPr>
+              <a:spcBef>
+                <a:spcPts val="0"/>
+              </a:spcBef>
+              <a:buNone/>
+            </a:pPr>
+            <a:r>
+              <a:t/>
+            </a:r>
+            <a:endParaRPr/>
+          </a:p>
+        </p:txBody>
+      </p:sp>
+    </p:spTree>
+  </p:cSld>
+  <p:clrMapOvr>
+    <a:masterClrMapping/>
+  </p:clrMapOvr>
+</p:notes>
+</file>
+
+<file path=ppt/notesSlides/notesSlide16.xml><?xml version="1.0" encoding="utf-8"?>
+<p:notes xmlns:a="http://schemas.openxmlformats.org/drawingml/2006/main" xmlns:r="http://schemas.openxmlformats.org/officeDocument/2006/relationships" xmlns:mc="http://schemas.openxmlformats.org/markup-compatibility/2006" xmlns:mv="urn:schemas-microsoft-com:mac:vml" xmlns:p="http://schemas.openxmlformats.org/presentationml/2006/main" xmlns:c="http://schemas.openxmlformats.org/drawingml/2006/chart" xmlns:dgm="http://schemas.openxmlformats.org/drawingml/2006/diagram" xmlns:o="urn:schemas-microsoft-com:office:office" xmlns:v="urn:schemas-microsoft-com:vml" xmlns:pvml="urn:schemas-microsoft-com:office:powerpoint" xmlns:com="http://schemas.openxmlformats.org/drawingml/2006/compatibility" xmlns:p14="http://schemas.microsoft.com/office/powerpoint/2010/main" showMasterPhAnim="0" showMasterSp="0">
+  <p:cSld>
+    <p:spTree>
+      <p:nvGrpSpPr>
+        <p:cNvPr id="196" name="Shape 196"/>
+        <p:cNvGrpSpPr/>
+        <p:nvPr/>
+      </p:nvGrpSpPr>
+      <p:grpSpPr>
+        <a:xfrm>
+          <a:off x="0" y="0"/>
+          <a:ext cx="0" cy="0"/>
+          <a:chOff x="0" y="0"/>
+          <a:chExt cx="0" cy="0"/>
+        </a:xfrm>
+      </p:grpSpPr>
+      <p:sp>
+        <p:nvSpPr>
+          <p:cNvPr id="197" name="Shape 197"/>
+          <p:cNvSpPr/>
+          <p:nvPr>
+            <p:ph idx="2" type="sldImg"/>
+          </p:nvPr>
+        </p:nvSpPr>
+        <p:spPr>
+          <a:xfrm>
+            <a:off x="381187" y="685800"/>
+            <a:ext cx="6096299" cy="3429000"/>
+          </a:xfrm>
+          <a:custGeom>
+            <a:pathLst>
+              <a:path extrusionOk="0" h="120000" w="120000">
+                <a:moveTo>
+                  <a:pt x="0" y="0"/>
+                </a:moveTo>
+                <a:lnTo>
+                  <a:pt x="120000" y="0"/>
+                </a:lnTo>
+                <a:lnTo>
+                  <a:pt x="120000" y="120000"/>
+                </a:lnTo>
+                <a:lnTo>
+                  <a:pt x="0" y="120000"/>
+                </a:lnTo>
+                <a:close/>
+              </a:path>
+            </a:pathLst>
+          </a:custGeom>
+          <a:noFill/>
+          <a:ln cap="flat" w="9525">
+            <a:solidFill>
+              <a:srgbClr val="000000"/>
+            </a:solidFill>
+            <a:prstDash val="solid"/>
+            <a:round/>
+            <a:headEnd len="med" w="med" type="none"/>
+            <a:tailEnd len="med" w="med" type="none"/>
+          </a:ln>
+        </p:spPr>
+      </p:sp>
+      <p:sp>
+        <p:nvSpPr>
+          <p:cNvPr id="198" name="Shape 198"/>
+          <p:cNvSpPr txBox="1"/>
+          <p:nvPr>
+            <p:ph idx="1" type="body"/>
+          </p:nvPr>
+        </p:nvSpPr>
+        <p:spPr>
+          <a:xfrm>
+            <a:off x="685800" y="4343400"/>
+            <a:ext cx="5486399" cy="4114800"/>
+          </a:xfrm>
+          <a:prstGeom prst="rect">
+            <a:avLst/>
+          </a:prstGeom>
+        </p:spPr>
+        <p:txBody>
+          <a:bodyPr anchorCtr="0" anchor="t" bIns="91425" lIns="91425" rIns="91425" tIns="91425">
+            <a:noAutofit/>
+          </a:bodyPr>
+          <a:lstStyle/>
+          <a:p>
+            <a:pPr>
+              <a:spcBef>
+                <a:spcPts val="0"/>
+              </a:spcBef>
+              <a:buNone/>
+            </a:pPr>
+            <a:r>
+              <a:t/>
+            </a:r>
+            <a:endParaRPr/>
+          </a:p>
+        </p:txBody>
+      </p:sp>
+    </p:spTree>
+  </p:cSld>
+  <p:clrMapOvr>
+    <a:masterClrMapping/>
+  </p:clrMapOvr>
+</p:notes>
+</file>
+
 <file path=ppt/notesSlides/notesSlide2.xml><?xml version="1.0" encoding="utf-8"?>
 <p:notes xmlns:a="http://schemas.openxmlformats.org/drawingml/2006/main" xmlns:r="http://schemas.openxmlformats.org/officeDocument/2006/relationships" xmlns:mc="http://schemas.openxmlformats.org/markup-compatibility/2006" xmlns:mv="urn:schemas-microsoft-com:mac:vml" xmlns:p="http://schemas.openxmlformats.org/presentationml/2006/main" xmlns:c="http://schemas.openxmlformats.org/drawingml/2006/chart" xmlns:dgm="http://schemas.openxmlformats.org/drawingml/2006/diagram" xmlns:o="urn:schemas-microsoft-com:office:office" xmlns:v="urn:schemas-microsoft-com:vml" xmlns:pvml="urn:schemas-microsoft-com:office:powerpoint" xmlns:com="http://schemas.openxmlformats.org/drawingml/2006/compatibility" xmlns:p14="http://schemas.microsoft.com/office/powerpoint/2010/main" showMasterPhAnim="0" showMasterSp="0">
   <p:cSld>
@@ -597,7 +1340,7 @@
   <p:cSld>
     <p:spTree>
       <p:nvGrpSpPr>
-        <p:cNvPr id="125" name="Shape 125"/>
+        <p:cNvPr id="124" name="Shape 124"/>
         <p:cNvGrpSpPr/>
         <p:nvPr/>
       </p:nvGrpSpPr>
@@ -611,7 +1354,7 @@
       </p:grpSpPr>
       <p:sp>
         <p:nvSpPr>
-          <p:cNvPr id="126" name="Shape 126"/>
+          <p:cNvPr id="125" name="Shape 125"/>
           <p:cNvSpPr/>
           <p:nvPr>
             <p:ph idx="2" type="sldImg"/>
@@ -655,7 +1398,7 @@
       </p:sp>
       <p:sp>
         <p:nvSpPr>
-          <p:cNvPr id="127" name="Shape 127"/>
+          <p:cNvPr id="126" name="Shape 126"/>
           <p:cNvSpPr txBox="1"/>
           <p:nvPr>
             <p:ph idx="1" type="body"/>
@@ -702,7 +1445,7 @@
   <p:cSld>
     <p:spTree>
       <p:nvGrpSpPr>
-        <p:cNvPr id="131" name="Shape 131"/>
+        <p:cNvPr id="130" name="Shape 130"/>
         <p:cNvGrpSpPr/>
         <p:nvPr/>
       </p:nvGrpSpPr>
@@ -716,7 +1459,7 @@
       </p:grpSpPr>
       <p:sp>
         <p:nvSpPr>
-          <p:cNvPr id="132" name="Shape 132"/>
+          <p:cNvPr id="131" name="Shape 131"/>
           <p:cNvSpPr/>
           <p:nvPr>
             <p:ph idx="2" type="sldImg"/>
@@ -760,7 +1503,7 @@
       </p:sp>
       <p:sp>
         <p:nvSpPr>
-          <p:cNvPr id="133" name="Shape 133"/>
+          <p:cNvPr id="132" name="Shape 132"/>
           <p:cNvSpPr txBox="1"/>
           <p:nvPr>
             <p:ph idx="1" type="body"/>
@@ -807,7 +1550,7 @@
   <p:cSld>
     <p:spTree>
       <p:nvGrpSpPr>
-        <p:cNvPr id="137" name="Shape 137"/>
+        <p:cNvPr id="135" name="Shape 135"/>
         <p:cNvGrpSpPr/>
         <p:nvPr/>
       </p:nvGrpSpPr>
@@ -821,7 +1564,7 @@
       </p:grpSpPr>
       <p:sp>
         <p:nvSpPr>
-          <p:cNvPr id="138" name="Shape 138"/>
+          <p:cNvPr id="136" name="Shape 136"/>
           <p:cNvSpPr/>
           <p:nvPr>
             <p:ph idx="2" type="sldImg"/>
@@ -865,7 +1608,7 @@
       </p:sp>
       <p:sp>
         <p:nvSpPr>
-          <p:cNvPr id="139" name="Shape 139"/>
+          <p:cNvPr id="137" name="Shape 137"/>
           <p:cNvSpPr txBox="1"/>
           <p:nvPr>
             <p:ph idx="1" type="body"/>
@@ -912,7 +1655,7 @@
   <p:cSld>
     <p:spTree>
       <p:nvGrpSpPr>
-        <p:cNvPr id="143" name="Shape 143"/>
+        <p:cNvPr id="140" name="Shape 140"/>
         <p:cNvGrpSpPr/>
         <p:nvPr/>
       </p:nvGrpSpPr>
@@ -926,7 +1669,7 @@
       </p:grpSpPr>
       <p:sp>
         <p:nvSpPr>
-          <p:cNvPr id="144" name="Shape 144"/>
+          <p:cNvPr id="141" name="Shape 141"/>
           <p:cNvSpPr/>
           <p:nvPr>
             <p:ph idx="2" type="sldImg"/>
@@ -970,7 +1713,7 @@
       </p:sp>
       <p:sp>
         <p:nvSpPr>
-          <p:cNvPr id="145" name="Shape 145"/>
+          <p:cNvPr id="142" name="Shape 142"/>
           <p:cNvSpPr txBox="1"/>
           <p:nvPr>
             <p:ph idx="1" type="body"/>
@@ -1017,7 +1760,7 @@
   <p:cSld>
     <p:spTree>
       <p:nvGrpSpPr>
-        <p:cNvPr id="149" name="Shape 149"/>
+        <p:cNvPr id="145" name="Shape 145"/>
         <p:cNvGrpSpPr/>
         <p:nvPr/>
       </p:nvGrpSpPr>
@@ -1031,7 +1774,7 @@
       </p:grpSpPr>
       <p:sp>
         <p:nvSpPr>
-          <p:cNvPr id="150" name="Shape 150"/>
+          <p:cNvPr id="146" name="Shape 146"/>
           <p:cNvSpPr/>
           <p:nvPr>
             <p:ph idx="2" type="sldImg"/>
@@ -1075,7 +1818,7 @@
       </p:sp>
       <p:sp>
         <p:nvSpPr>
-          <p:cNvPr id="151" name="Shape 151"/>
+          <p:cNvPr id="147" name="Shape 147"/>
           <p:cNvSpPr txBox="1"/>
           <p:nvPr>
             <p:ph idx="1" type="body"/>
@@ -1118,6 +1861,111 @@
 </file>
 
 <file path=ppt/notesSlides/notesSlide8.xml><?xml version="1.0" encoding="utf-8"?>
+<p:notes xmlns:a="http://schemas.openxmlformats.org/drawingml/2006/main" xmlns:r="http://schemas.openxmlformats.org/officeDocument/2006/relationships" xmlns:mc="http://schemas.openxmlformats.org/markup-compatibility/2006" xmlns:mv="urn:schemas-microsoft-com:mac:vml" xmlns:p="http://schemas.openxmlformats.org/presentationml/2006/main" xmlns:c="http://schemas.openxmlformats.org/drawingml/2006/chart" xmlns:dgm="http://schemas.openxmlformats.org/drawingml/2006/diagram" xmlns:o="urn:schemas-microsoft-com:office:office" xmlns:v="urn:schemas-microsoft-com:vml" xmlns:pvml="urn:schemas-microsoft-com:office:powerpoint" xmlns:com="http://schemas.openxmlformats.org/drawingml/2006/compatibility" xmlns:p14="http://schemas.microsoft.com/office/powerpoint/2010/main" showMasterPhAnim="0" showMasterSp="0">
+  <p:cSld>
+    <p:spTree>
+      <p:nvGrpSpPr>
+        <p:cNvPr id="150" name="Shape 150"/>
+        <p:cNvGrpSpPr/>
+        <p:nvPr/>
+      </p:nvGrpSpPr>
+      <p:grpSpPr>
+        <a:xfrm>
+          <a:off x="0" y="0"/>
+          <a:ext cx="0" cy="0"/>
+          <a:chOff x="0" y="0"/>
+          <a:chExt cx="0" cy="0"/>
+        </a:xfrm>
+      </p:grpSpPr>
+      <p:sp>
+        <p:nvSpPr>
+          <p:cNvPr id="151" name="Shape 151"/>
+          <p:cNvSpPr/>
+          <p:nvPr>
+            <p:ph idx="2" type="sldImg"/>
+          </p:nvPr>
+        </p:nvSpPr>
+        <p:spPr>
+          <a:xfrm>
+            <a:off x="381187" y="685800"/>
+            <a:ext cx="6096299" cy="3429000"/>
+          </a:xfrm>
+          <a:custGeom>
+            <a:pathLst>
+              <a:path extrusionOk="0" h="120000" w="120000">
+                <a:moveTo>
+                  <a:pt x="0" y="0"/>
+                </a:moveTo>
+                <a:lnTo>
+                  <a:pt x="120000" y="0"/>
+                </a:lnTo>
+                <a:lnTo>
+                  <a:pt x="120000" y="120000"/>
+                </a:lnTo>
+                <a:lnTo>
+                  <a:pt x="0" y="120000"/>
+                </a:lnTo>
+                <a:close/>
+              </a:path>
+            </a:pathLst>
+          </a:custGeom>
+          <a:noFill/>
+          <a:ln cap="flat" w="9525">
+            <a:solidFill>
+              <a:srgbClr val="000000"/>
+            </a:solidFill>
+            <a:prstDash val="solid"/>
+            <a:round/>
+            <a:headEnd len="med" w="med" type="none"/>
+            <a:tailEnd len="med" w="med" type="none"/>
+          </a:ln>
+        </p:spPr>
+      </p:sp>
+      <p:sp>
+        <p:nvSpPr>
+          <p:cNvPr id="152" name="Shape 152"/>
+          <p:cNvSpPr txBox="1"/>
+          <p:nvPr>
+            <p:ph idx="1" type="body"/>
+          </p:nvPr>
+        </p:nvSpPr>
+        <p:spPr>
+          <a:xfrm>
+            <a:off x="685800" y="4343400"/>
+            <a:ext cx="5486399" cy="4114800"/>
+          </a:xfrm>
+          <a:prstGeom prst="rect">
+            <a:avLst/>
+          </a:prstGeom>
+        </p:spPr>
+        <p:txBody>
+          <a:bodyPr anchorCtr="0" anchor="t" bIns="91425" lIns="91425" rIns="91425" tIns="91425">
+            <a:noAutofit/>
+          </a:bodyPr>
+          <a:lstStyle/>
+          <a:p>
+            <a:pPr>
+              <a:spcBef>
+                <a:spcPts val="0"/>
+              </a:spcBef>
+              <a:buNone/>
+            </a:pPr>
+            <a:r>
+              <a:t/>
+            </a:r>
+            <a:endParaRPr/>
+          </a:p>
+        </p:txBody>
+      </p:sp>
+    </p:spTree>
+  </p:cSld>
+  <p:clrMapOvr>
+    <a:masterClrMapping/>
+  </p:clrMapOvr>
+</p:notes>
+</file>
+
+<file path=ppt/notesSlides/notesSlide9.xml><?xml version="1.0" encoding="utf-8"?>
 <p:notes xmlns:a="http://schemas.openxmlformats.org/drawingml/2006/main" xmlns:r="http://schemas.openxmlformats.org/officeDocument/2006/relationships" xmlns:mc="http://schemas.openxmlformats.org/markup-compatibility/2006" xmlns:mv="urn:schemas-microsoft-com:mac:vml" xmlns:p="http://schemas.openxmlformats.org/presentationml/2006/main" xmlns:c="http://schemas.openxmlformats.org/drawingml/2006/chart" xmlns:dgm="http://schemas.openxmlformats.org/drawingml/2006/diagram" xmlns:o="urn:schemas-microsoft-com:office:office" xmlns:v="urn:schemas-microsoft-com:vml" xmlns:pvml="urn:schemas-microsoft-com:office:powerpoint" xmlns:com="http://schemas.openxmlformats.org/drawingml/2006/compatibility" xmlns:p14="http://schemas.microsoft.com/office/powerpoint/2010/main" showMasterPhAnim="0" showMasterSp="0">
   <p:cSld>
     <p:spTree>
@@ -30133,6 +30981,667 @@
 </p:sld>
 </file>
 
+<file path=ppt/slides/slide10.xml><?xml version="1.0" encoding="utf-8"?>
+<p:sld xmlns:a="http://schemas.openxmlformats.org/drawingml/2006/main" xmlns:r="http://schemas.openxmlformats.org/officeDocument/2006/relationships" xmlns:mc="http://schemas.openxmlformats.org/markup-compatibility/2006" xmlns:mv="urn:schemas-microsoft-com:mac:vml" xmlns:p="http://schemas.openxmlformats.org/presentationml/2006/main" xmlns:c="http://schemas.openxmlformats.org/drawingml/2006/chart" xmlns:dgm="http://schemas.openxmlformats.org/drawingml/2006/diagram" xmlns:o="urn:schemas-microsoft-com:office:office" xmlns:v="urn:schemas-microsoft-com:vml" xmlns:pvml="urn:schemas-microsoft-com:office:powerpoint" xmlns:com="http://schemas.openxmlformats.org/drawingml/2006/compatibility" xmlns:p14="http://schemas.microsoft.com/office/powerpoint/2010/main">
+  <p:cSld>
+    <p:spTree>
+      <p:nvGrpSpPr>
+        <p:cNvPr id="158" name="Shape 158"/>
+        <p:cNvGrpSpPr/>
+        <p:nvPr/>
+      </p:nvGrpSpPr>
+      <p:grpSpPr>
+        <a:xfrm>
+          <a:off x="0" y="0"/>
+          <a:ext cx="0" cy="0"/>
+          <a:chOff x="0" y="0"/>
+          <a:chExt cx="0" cy="0"/>
+        </a:xfrm>
+      </p:grpSpPr>
+      <p:pic>
+        <p:nvPicPr>
+          <p:cNvPr id="159" name="Shape 159"/>
+          <p:cNvPicPr preferRelativeResize="0"/>
+          <p:nvPr/>
+        </p:nvPicPr>
+        <p:blipFill>
+          <a:blip r:embed="rId3">
+            <a:alphaModFix/>
+          </a:blip>
+          <a:stretch>
+            <a:fillRect/>
+          </a:stretch>
+        </p:blipFill>
+        <p:spPr>
+          <a:xfrm>
+            <a:off x="0" y="0"/>
+            <a:ext cx="9144000" cy="5143500"/>
+          </a:xfrm>
+          <a:prstGeom prst="rect">
+            <a:avLst/>
+          </a:prstGeom>
+          <a:noFill/>
+          <a:ln>
+            <a:noFill/>
+          </a:ln>
+        </p:spPr>
+      </p:pic>
+    </p:spTree>
+  </p:cSld>
+  <p:clrMapOvr>
+    <a:masterClrMapping/>
+  </p:clrMapOvr>
+  <p:transition spd="slow">
+    <p:cut/>
+  </p:transition>
+</p:sld>
+</file>
+
+<file path=ppt/slides/slide11.xml><?xml version="1.0" encoding="utf-8"?>
+<p:sld xmlns:a="http://schemas.openxmlformats.org/drawingml/2006/main" xmlns:r="http://schemas.openxmlformats.org/officeDocument/2006/relationships" xmlns:mc="http://schemas.openxmlformats.org/markup-compatibility/2006" xmlns:mv="urn:schemas-microsoft-com:mac:vml" xmlns:p="http://schemas.openxmlformats.org/presentationml/2006/main" xmlns:c="http://schemas.openxmlformats.org/drawingml/2006/chart" xmlns:dgm="http://schemas.openxmlformats.org/drawingml/2006/diagram" xmlns:o="urn:schemas-microsoft-com:office:office" xmlns:v="urn:schemas-microsoft-com:vml" xmlns:pvml="urn:schemas-microsoft-com:office:powerpoint" xmlns:com="http://schemas.openxmlformats.org/drawingml/2006/compatibility" xmlns:p14="http://schemas.microsoft.com/office/powerpoint/2010/main">
+  <p:cSld>
+    <p:spTree>
+      <p:nvGrpSpPr>
+        <p:cNvPr id="163" name="Shape 163"/>
+        <p:cNvGrpSpPr/>
+        <p:nvPr/>
+      </p:nvGrpSpPr>
+      <p:grpSpPr>
+        <a:xfrm>
+          <a:off x="0" y="0"/>
+          <a:ext cx="0" cy="0"/>
+          <a:chOff x="0" y="0"/>
+          <a:chExt cx="0" cy="0"/>
+        </a:xfrm>
+      </p:grpSpPr>
+      <p:sp>
+        <p:nvSpPr>
+          <p:cNvPr id="164" name="Shape 164"/>
+          <p:cNvSpPr txBox="1"/>
+          <p:nvPr>
+            <p:ph type="title"/>
+          </p:nvPr>
+        </p:nvSpPr>
+        <p:spPr>
+          <a:xfrm>
+            <a:off x="457200" y="155628"/>
+            <a:ext cx="8229600" cy="1044599"/>
+          </a:xfrm>
+          <a:prstGeom prst="rect">
+            <a:avLst/>
+          </a:prstGeom>
+        </p:spPr>
+        <p:txBody>
+          <a:bodyPr anchorCtr="0" anchor="b" bIns="91425" lIns="91425" rIns="91425" tIns="91425">
+            <a:noAutofit/>
+          </a:bodyPr>
+          <a:lstStyle/>
+          <a:p>
+            <a:pPr>
+              <a:spcBef>
+                <a:spcPts val="0"/>
+              </a:spcBef>
+              <a:buNone/>
+            </a:pPr>
+            <a:r>
+              <a:rPr lang="nl"/>
+              <a:t>DeepskyLog Stars</a:t>
+            </a:r>
+          </a:p>
+        </p:txBody>
+      </p:sp>
+      <p:sp>
+        <p:nvSpPr>
+          <p:cNvPr id="165" name="Shape 165"/>
+          <p:cNvSpPr txBox="1"/>
+          <p:nvPr>
+            <p:ph idx="1" type="body"/>
+          </p:nvPr>
+        </p:nvSpPr>
+        <p:spPr>
+          <a:xfrm>
+            <a:off x="457200" y="1297780"/>
+            <a:ext cx="8229600" cy="3627900"/>
+          </a:xfrm>
+          <a:prstGeom prst="rect">
+            <a:avLst/>
+          </a:prstGeom>
+        </p:spPr>
+        <p:txBody>
+          <a:bodyPr anchorCtr="0" anchor="t" bIns="91425" lIns="91425" rIns="91425" tIns="91425">
+            <a:noAutofit/>
+          </a:bodyPr>
+          <a:lstStyle/>
+          <a:p>
+            <a:pPr indent="-419100" lvl="0" marL="457200">
+              <a:spcBef>
+                <a:spcPts val="0"/>
+              </a:spcBef>
+              <a:buClr>
+                <a:schemeClr val="dk2"/>
+              </a:buClr>
+              <a:buSzPct val="100000"/>
+              <a:buFont typeface="Arial"/>
+              <a:buChar char="●"/>
+            </a:pPr>
+            <a:r>
+              <a:rPr lang="nl"/>
+              <a:t>Gamification</a:t>
+            </a:r>
+          </a:p>
+        </p:txBody>
+      </p:sp>
+    </p:spTree>
+  </p:cSld>
+  <p:clrMapOvr>
+    <a:masterClrMapping/>
+  </p:clrMapOvr>
+  <p:transition spd="slow">
+    <p:cut/>
+  </p:transition>
+</p:sld>
+</file>
+
+<file path=ppt/slides/slide12.xml><?xml version="1.0" encoding="utf-8"?>
+<p:sld xmlns:a="http://schemas.openxmlformats.org/drawingml/2006/main" xmlns:r="http://schemas.openxmlformats.org/officeDocument/2006/relationships" xmlns:mc="http://schemas.openxmlformats.org/markup-compatibility/2006" xmlns:mv="urn:schemas-microsoft-com:mac:vml" xmlns:p="http://schemas.openxmlformats.org/presentationml/2006/main" xmlns:c="http://schemas.openxmlformats.org/drawingml/2006/chart" xmlns:dgm="http://schemas.openxmlformats.org/drawingml/2006/diagram" xmlns:o="urn:schemas-microsoft-com:office:office" xmlns:v="urn:schemas-microsoft-com:vml" xmlns:pvml="urn:schemas-microsoft-com:office:powerpoint" xmlns:com="http://schemas.openxmlformats.org/drawingml/2006/compatibility" xmlns:p14="http://schemas.microsoft.com/office/powerpoint/2010/main">
+  <p:cSld>
+    <p:spTree>
+      <p:nvGrpSpPr>
+        <p:cNvPr id="169" name="Shape 169"/>
+        <p:cNvGrpSpPr/>
+        <p:nvPr/>
+      </p:nvGrpSpPr>
+      <p:grpSpPr>
+        <a:xfrm>
+          <a:off x="0" y="0"/>
+          <a:ext cx="0" cy="0"/>
+          <a:chOff x="0" y="0"/>
+          <a:chExt cx="0" cy="0"/>
+        </a:xfrm>
+      </p:grpSpPr>
+      <p:sp>
+        <p:nvSpPr>
+          <p:cNvPr id="170" name="Shape 170"/>
+          <p:cNvSpPr txBox="1"/>
+          <p:nvPr>
+            <p:ph type="title"/>
+          </p:nvPr>
+        </p:nvSpPr>
+        <p:spPr>
+          <a:xfrm>
+            <a:off x="457200" y="155628"/>
+            <a:ext cx="8229600" cy="1044599"/>
+          </a:xfrm>
+          <a:prstGeom prst="rect">
+            <a:avLst/>
+          </a:prstGeom>
+        </p:spPr>
+        <p:txBody>
+          <a:bodyPr anchorCtr="0" anchor="b" bIns="91425" lIns="91425" rIns="91425" tIns="91425">
+            <a:noAutofit/>
+          </a:bodyPr>
+          <a:lstStyle/>
+          <a:p>
+            <a:pPr>
+              <a:spcBef>
+                <a:spcPts val="0"/>
+              </a:spcBef>
+              <a:buNone/>
+            </a:pPr>
+            <a:r>
+              <a:rPr lang="nl"/>
+              <a:t>Use real emailaddress</a:t>
+            </a:r>
+          </a:p>
+        </p:txBody>
+      </p:sp>
+      <p:sp>
+        <p:nvSpPr>
+          <p:cNvPr id="171" name="Shape 171"/>
+          <p:cNvSpPr txBox="1"/>
+          <p:nvPr>
+            <p:ph idx="1" type="body"/>
+          </p:nvPr>
+        </p:nvSpPr>
+        <p:spPr>
+          <a:xfrm>
+            <a:off x="457200" y="1297780"/>
+            <a:ext cx="8229600" cy="3627900"/>
+          </a:xfrm>
+          <a:prstGeom prst="rect">
+            <a:avLst/>
+          </a:prstGeom>
+        </p:spPr>
+        <p:txBody>
+          <a:bodyPr anchorCtr="0" anchor="t" bIns="91425" lIns="91425" rIns="91425" tIns="91425">
+            <a:noAutofit/>
+          </a:bodyPr>
+          <a:lstStyle/>
+          <a:p>
+            <a:pPr>
+              <a:spcBef>
+                <a:spcPts val="0"/>
+              </a:spcBef>
+              <a:buNone/>
+            </a:pPr>
+            <a:r>
+              <a:rPr lang="nl"/>
+              <a:t>Send message to real emailaddress</a:t>
+            </a:r>
+          </a:p>
+        </p:txBody>
+      </p:sp>
+    </p:spTree>
+  </p:cSld>
+  <p:clrMapOvr>
+    <a:masterClrMapping/>
+  </p:clrMapOvr>
+  <p:transition spd="slow">
+    <p:cut/>
+  </p:transition>
+</p:sld>
+</file>
+
+<file path=ppt/slides/slide13.xml><?xml version="1.0" encoding="utf-8"?>
+<p:sld xmlns:a="http://schemas.openxmlformats.org/drawingml/2006/main" xmlns:r="http://schemas.openxmlformats.org/officeDocument/2006/relationships" xmlns:mc="http://schemas.openxmlformats.org/markup-compatibility/2006" xmlns:mv="urn:schemas-microsoft-com:mac:vml" xmlns:p="http://schemas.openxmlformats.org/presentationml/2006/main" xmlns:c="http://schemas.openxmlformats.org/drawingml/2006/chart" xmlns:dgm="http://schemas.openxmlformats.org/drawingml/2006/diagram" xmlns:o="urn:schemas-microsoft-com:office:office" xmlns:v="urn:schemas-microsoft-com:vml" xmlns:pvml="urn:schemas-microsoft-com:office:powerpoint" xmlns:com="http://schemas.openxmlformats.org/drawingml/2006/compatibility" xmlns:p14="http://schemas.microsoft.com/office/powerpoint/2010/main">
+  <p:cSld>
+    <p:spTree>
+      <p:nvGrpSpPr>
+        <p:cNvPr id="175" name="Shape 175"/>
+        <p:cNvGrpSpPr/>
+        <p:nvPr/>
+      </p:nvGrpSpPr>
+      <p:grpSpPr>
+        <a:xfrm>
+          <a:off x="0" y="0"/>
+          <a:ext cx="0" cy="0"/>
+          <a:chOff x="0" y="0"/>
+          <a:chExt cx="0" cy="0"/>
+        </a:xfrm>
+      </p:grpSpPr>
+      <p:sp>
+        <p:nvSpPr>
+          <p:cNvPr id="176" name="Shape 176"/>
+          <p:cNvSpPr txBox="1"/>
+          <p:nvPr>
+            <p:ph type="title"/>
+          </p:nvPr>
+        </p:nvSpPr>
+        <p:spPr>
+          <a:xfrm>
+            <a:off x="457200" y="155628"/>
+            <a:ext cx="8229600" cy="1044599"/>
+          </a:xfrm>
+          <a:prstGeom prst="rect">
+            <a:avLst/>
+          </a:prstGeom>
+        </p:spPr>
+        <p:txBody>
+          <a:bodyPr anchorCtr="0" anchor="b" bIns="91425" lIns="91425" rIns="91425" tIns="91425">
+            <a:noAutofit/>
+          </a:bodyPr>
+          <a:lstStyle/>
+          <a:p>
+            <a:pPr>
+              <a:spcBef>
+                <a:spcPts val="0"/>
+              </a:spcBef>
+              <a:buNone/>
+            </a:pPr>
+            <a:r>
+              <a:rPr lang="nl"/>
+              <a:t>Picture of observers</a:t>
+            </a:r>
+          </a:p>
+        </p:txBody>
+      </p:sp>
+      <p:sp>
+        <p:nvSpPr>
+          <p:cNvPr id="177" name="Shape 177"/>
+          <p:cNvSpPr txBox="1"/>
+          <p:nvPr>
+            <p:ph idx="1" type="body"/>
+          </p:nvPr>
+        </p:nvSpPr>
+        <p:spPr>
+          <a:xfrm>
+            <a:off x="457200" y="1297780"/>
+            <a:ext cx="8229600" cy="3627900"/>
+          </a:xfrm>
+          <a:prstGeom prst="rect">
+            <a:avLst/>
+          </a:prstGeom>
+        </p:spPr>
+        <p:txBody>
+          <a:bodyPr anchorCtr="0" anchor="t" bIns="91425" lIns="91425" rIns="91425" tIns="91425">
+            <a:noAutofit/>
+          </a:bodyPr>
+          <a:lstStyle/>
+          <a:p>
+            <a:pPr>
+              <a:spcBef>
+                <a:spcPts val="0"/>
+              </a:spcBef>
+              <a:buNone/>
+            </a:pPr>
+            <a:r>
+              <a:rPr lang="nl"/>
+              <a:t>in detail of observation and in messages.</a:t>
+            </a:r>
+          </a:p>
+        </p:txBody>
+      </p:sp>
+    </p:spTree>
+  </p:cSld>
+  <p:clrMapOvr>
+    <a:masterClrMapping/>
+  </p:clrMapOvr>
+  <p:transition spd="slow">
+    <p:cut/>
+  </p:transition>
+</p:sld>
+</file>
+
+<file path=ppt/slides/slide14.xml><?xml version="1.0" encoding="utf-8"?>
+<p:sld xmlns:a="http://schemas.openxmlformats.org/drawingml/2006/main" xmlns:r="http://schemas.openxmlformats.org/officeDocument/2006/relationships" xmlns:mc="http://schemas.openxmlformats.org/markup-compatibility/2006" xmlns:mv="urn:schemas-microsoft-com:mac:vml" xmlns:p="http://schemas.openxmlformats.org/presentationml/2006/main" xmlns:c="http://schemas.openxmlformats.org/drawingml/2006/chart" xmlns:dgm="http://schemas.openxmlformats.org/drawingml/2006/diagram" xmlns:o="urn:schemas-microsoft-com:office:office" xmlns:v="urn:schemas-microsoft-com:vml" xmlns:pvml="urn:schemas-microsoft-com:office:powerpoint" xmlns:com="http://schemas.openxmlformats.org/drawingml/2006/compatibility" xmlns:p14="http://schemas.microsoft.com/office/powerpoint/2010/main">
+  <p:cSld>
+    <p:spTree>
+      <p:nvGrpSpPr>
+        <p:cNvPr id="181" name="Shape 181"/>
+        <p:cNvGrpSpPr/>
+        <p:nvPr/>
+      </p:nvGrpSpPr>
+      <p:grpSpPr>
+        <a:xfrm>
+          <a:off x="0" y="0"/>
+          <a:ext cx="0" cy="0"/>
+          <a:chOff x="0" y="0"/>
+          <a:chExt cx="0" cy="0"/>
+        </a:xfrm>
+      </p:grpSpPr>
+      <p:sp>
+        <p:nvSpPr>
+          <p:cNvPr id="182" name="Shape 182"/>
+          <p:cNvSpPr txBox="1"/>
+          <p:nvPr>
+            <p:ph type="title"/>
+          </p:nvPr>
+        </p:nvSpPr>
+        <p:spPr>
+          <a:xfrm>
+            <a:off x="457200" y="155628"/>
+            <a:ext cx="8229600" cy="1044599"/>
+          </a:xfrm>
+          <a:prstGeom prst="rect">
+            <a:avLst/>
+          </a:prstGeom>
+        </p:spPr>
+        <p:txBody>
+          <a:bodyPr anchorCtr="0" anchor="b" bIns="91425" lIns="91425" rIns="91425" tIns="91425">
+            <a:noAutofit/>
+          </a:bodyPr>
+          <a:lstStyle/>
+          <a:p>
+            <a:pPr>
+              <a:spcBef>
+                <a:spcPts val="0"/>
+              </a:spcBef>
+              <a:buNone/>
+            </a:pPr>
+            <a:r>
+              <a:rPr lang="nl"/>
+              <a:t>New Logo</a:t>
+            </a:r>
+          </a:p>
+        </p:txBody>
+      </p:sp>
+      <p:sp>
+        <p:nvSpPr>
+          <p:cNvPr id="183" name="Shape 183"/>
+          <p:cNvSpPr txBox="1"/>
+          <p:nvPr>
+            <p:ph idx="1" type="body"/>
+          </p:nvPr>
+        </p:nvSpPr>
+        <p:spPr>
+          <a:xfrm>
+            <a:off x="457200" y="1297780"/>
+            <a:ext cx="8229600" cy="3627900"/>
+          </a:xfrm>
+          <a:prstGeom prst="rect">
+            <a:avLst/>
+          </a:prstGeom>
+        </p:spPr>
+        <p:txBody>
+          <a:bodyPr anchorCtr="0" anchor="t" bIns="91425" lIns="91425" rIns="91425" tIns="91425">
+            <a:noAutofit/>
+          </a:bodyPr>
+          <a:lstStyle/>
+          <a:p>
+            <a:pPr>
+              <a:spcBef>
+                <a:spcPts val="0"/>
+              </a:spcBef>
+              <a:buNone/>
+            </a:pPr>
+            <a:r>
+              <a:t/>
+            </a:r>
+            <a:endParaRPr/>
+          </a:p>
+        </p:txBody>
+      </p:sp>
+    </p:spTree>
+  </p:cSld>
+  <p:clrMapOvr>
+    <a:masterClrMapping/>
+  </p:clrMapOvr>
+  <p:transition spd="slow">
+    <p:cut/>
+  </p:transition>
+</p:sld>
+</file>
+
+<file path=ppt/slides/slide15.xml><?xml version="1.0" encoding="utf-8"?>
+<p:sld xmlns:a="http://schemas.openxmlformats.org/drawingml/2006/main" xmlns:r="http://schemas.openxmlformats.org/officeDocument/2006/relationships" xmlns:mc="http://schemas.openxmlformats.org/markup-compatibility/2006" xmlns:mv="urn:schemas-microsoft-com:mac:vml" xmlns:p="http://schemas.openxmlformats.org/presentationml/2006/main" xmlns:c="http://schemas.openxmlformats.org/drawingml/2006/chart" xmlns:dgm="http://schemas.openxmlformats.org/drawingml/2006/diagram" xmlns:o="urn:schemas-microsoft-com:office:office" xmlns:v="urn:schemas-microsoft-com:vml" xmlns:pvml="urn:schemas-microsoft-com:office:powerpoint" xmlns:com="http://schemas.openxmlformats.org/drawingml/2006/compatibility" xmlns:p14="http://schemas.microsoft.com/office/powerpoint/2010/main">
+  <p:cSld>
+    <p:spTree>
+      <p:nvGrpSpPr>
+        <p:cNvPr id="187" name="Shape 187"/>
+        <p:cNvGrpSpPr/>
+        <p:nvPr/>
+      </p:nvGrpSpPr>
+      <p:grpSpPr>
+        <a:xfrm>
+          <a:off x="0" y="0"/>
+          <a:ext cx="0" cy="0"/>
+          <a:chOff x="0" y="0"/>
+          <a:chExt cx="0" cy="0"/>
+        </a:xfrm>
+      </p:grpSpPr>
+      <p:sp>
+        <p:nvSpPr>
+          <p:cNvPr id="188" name="Shape 188"/>
+          <p:cNvSpPr txBox="1"/>
+          <p:nvPr>
+            <p:ph type="title"/>
+          </p:nvPr>
+        </p:nvSpPr>
+        <p:spPr>
+          <a:xfrm>
+            <a:off x="457200" y="155628"/>
+            <a:ext cx="8229600" cy="1044599"/>
+          </a:xfrm>
+          <a:prstGeom prst="rect">
+            <a:avLst/>
+          </a:prstGeom>
+        </p:spPr>
+        <p:txBody>
+          <a:bodyPr anchorCtr="0" anchor="b" bIns="91425" lIns="91425" rIns="91425" tIns="91425">
+            <a:noAutofit/>
+          </a:bodyPr>
+          <a:lstStyle/>
+          <a:p>
+            <a:pPr>
+              <a:spcBef>
+                <a:spcPts val="0"/>
+              </a:spcBef>
+              <a:buNone/>
+            </a:pPr>
+            <a:r>
+              <a:rPr lang="nl"/>
+              <a:t>New entry page</a:t>
+            </a:r>
+          </a:p>
+        </p:txBody>
+      </p:sp>
+      <p:sp>
+        <p:nvSpPr>
+          <p:cNvPr id="189" name="Shape 189"/>
+          <p:cNvSpPr txBox="1"/>
+          <p:nvPr>
+            <p:ph idx="1" type="body"/>
+          </p:nvPr>
+        </p:nvSpPr>
+        <p:spPr>
+          <a:xfrm>
+            <a:off x="457200" y="1297780"/>
+            <a:ext cx="8229600" cy="3627900"/>
+          </a:xfrm>
+          <a:prstGeom prst="rect">
+            <a:avLst/>
+          </a:prstGeom>
+        </p:spPr>
+        <p:txBody>
+          <a:bodyPr anchorCtr="0" anchor="t" bIns="91425" lIns="91425" rIns="91425" tIns="91425">
+            <a:noAutofit/>
+          </a:bodyPr>
+          <a:lstStyle/>
+          <a:p>
+            <a:pPr>
+              <a:spcBef>
+                <a:spcPts val="0"/>
+              </a:spcBef>
+              <a:buNone/>
+            </a:pPr>
+            <a:r>
+              <a:t/>
+            </a:r>
+            <a:endParaRPr/>
+          </a:p>
+        </p:txBody>
+      </p:sp>
+    </p:spTree>
+  </p:cSld>
+  <p:clrMapOvr>
+    <a:masterClrMapping/>
+  </p:clrMapOvr>
+  <p:transition spd="slow">
+    <p:cut/>
+  </p:transition>
+</p:sld>
+</file>
+
+<file path=ppt/slides/slide16.xml><?xml version="1.0" encoding="utf-8"?>
+<p:sld xmlns:a="http://schemas.openxmlformats.org/drawingml/2006/main" xmlns:r="http://schemas.openxmlformats.org/officeDocument/2006/relationships" xmlns:mc="http://schemas.openxmlformats.org/markup-compatibility/2006" xmlns:mv="urn:schemas-microsoft-com:mac:vml" xmlns:p="http://schemas.openxmlformats.org/presentationml/2006/main" xmlns:c="http://schemas.openxmlformats.org/drawingml/2006/chart" xmlns:dgm="http://schemas.openxmlformats.org/drawingml/2006/diagram" xmlns:o="urn:schemas-microsoft-com:office:office" xmlns:v="urn:schemas-microsoft-com:vml" xmlns:pvml="urn:schemas-microsoft-com:office:powerpoint" xmlns:com="http://schemas.openxmlformats.org/drawingml/2006/compatibility" xmlns:p14="http://schemas.microsoft.com/office/powerpoint/2010/main">
+  <p:cSld>
+    <p:spTree>
+      <p:nvGrpSpPr>
+        <p:cNvPr id="193" name="Shape 193"/>
+        <p:cNvGrpSpPr/>
+        <p:nvPr/>
+      </p:nvGrpSpPr>
+      <p:grpSpPr>
+        <a:xfrm>
+          <a:off x="0" y="0"/>
+          <a:ext cx="0" cy="0"/>
+          <a:chOff x="0" y="0"/>
+          <a:chExt cx="0" cy="0"/>
+        </a:xfrm>
+      </p:grpSpPr>
+      <p:sp>
+        <p:nvSpPr>
+          <p:cNvPr id="194" name="Shape 194"/>
+          <p:cNvSpPr txBox="1"/>
+          <p:nvPr>
+            <p:ph type="title"/>
+          </p:nvPr>
+        </p:nvSpPr>
+        <p:spPr>
+          <a:xfrm>
+            <a:off x="457200" y="155628"/>
+            <a:ext cx="8229600" cy="1044599"/>
+          </a:xfrm>
+          <a:prstGeom prst="rect">
+            <a:avLst/>
+          </a:prstGeom>
+        </p:spPr>
+        <p:txBody>
+          <a:bodyPr anchorCtr="0" anchor="b" bIns="91425" lIns="91425" rIns="91425" tIns="91425">
+            <a:noAutofit/>
+          </a:bodyPr>
+          <a:lstStyle/>
+          <a:p>
+            <a:pPr>
+              <a:spcBef>
+                <a:spcPts val="0"/>
+              </a:spcBef>
+              <a:buNone/>
+            </a:pPr>
+            <a:r>
+              <a:rPr lang="nl"/>
+              <a:t>Add locations</a:t>
+            </a:r>
+          </a:p>
+        </p:txBody>
+      </p:sp>
+      <p:sp>
+        <p:nvSpPr>
+          <p:cNvPr id="195" name="Shape 195"/>
+          <p:cNvSpPr txBox="1"/>
+          <p:nvPr>
+            <p:ph idx="1" type="body"/>
+          </p:nvPr>
+        </p:nvSpPr>
+        <p:spPr>
+          <a:xfrm>
+            <a:off x="457200" y="1297780"/>
+            <a:ext cx="8229600" cy="3627900"/>
+          </a:xfrm>
+          <a:prstGeom prst="rect">
+            <a:avLst/>
+          </a:prstGeom>
+        </p:spPr>
+        <p:txBody>
+          <a:bodyPr anchorCtr="0" anchor="t" bIns="91425" lIns="91425" rIns="91425" tIns="91425">
+            <a:noAutofit/>
+          </a:bodyPr>
+          <a:lstStyle/>
+          <a:p>
+            <a:pPr>
+              <a:spcBef>
+                <a:spcPts val="0"/>
+              </a:spcBef>
+              <a:buNone/>
+            </a:pPr>
+            <a:r>
+              <a:t/>
+            </a:r>
+            <a:endParaRPr/>
+          </a:p>
+        </p:txBody>
+      </p:sp>
+    </p:spTree>
+  </p:cSld>
+  <p:clrMapOvr>
+    <a:masterClrMapping/>
+  </p:clrMapOvr>
+  <p:transition spd="slow">
+    <p:cut/>
+  </p:transition>
+</p:sld>
+</file>
+
 <file path=ppt/slides/slide2.xml><?xml version="1.0" encoding="utf-8"?>
 <p:sld xmlns:a="http://schemas.openxmlformats.org/drawingml/2006/main" xmlns:r="http://schemas.openxmlformats.org/officeDocument/2006/relationships" xmlns:mc="http://schemas.openxmlformats.org/markup-compatibility/2006" xmlns:mv="urn:schemas-microsoft-com:mac:vml" xmlns:p="http://schemas.openxmlformats.org/presentationml/2006/main" xmlns:c="http://schemas.openxmlformats.org/drawingml/2006/chart" xmlns:dgm="http://schemas.openxmlformats.org/drawingml/2006/diagram" xmlns:o="urn:schemas-microsoft-com:office:office" xmlns:v="urn:schemas-microsoft-com:vml" xmlns:pvml="urn:schemas-microsoft-com:office:powerpoint" xmlns:com="http://schemas.openxmlformats.org/drawingml/2006/compatibility" xmlns:p14="http://schemas.microsoft.com/office/powerpoint/2010/main">
   <p:cSld>
@@ -30226,6 +31735,40 @@
             </a:r>
           </a:p>
           <a:p>
+            <a:pPr indent="-381000" lvl="1" marL="914400" rtl="0">
+              <a:spcBef>
+                <a:spcPts val="0"/>
+              </a:spcBef>
+              <a:buClr>
+                <a:schemeClr val="dk2"/>
+              </a:buClr>
+              <a:buSzPct val="80000"/>
+              <a:buFont typeface="Courier New"/>
+              <a:buChar char="o"/>
+            </a:pPr>
+            <a:r>
+              <a:rPr lang="nl"/>
+              <a:t>Responsive</a:t>
+            </a:r>
+          </a:p>
+          <a:p>
+            <a:pPr indent="-381000" lvl="1" marL="914400" rtl="0">
+              <a:spcBef>
+                <a:spcPts val="0"/>
+              </a:spcBef>
+              <a:buClr>
+                <a:schemeClr val="dk2"/>
+              </a:buClr>
+              <a:buSzPct val="80000"/>
+              <a:buFont typeface="Courier New"/>
+              <a:buChar char="o"/>
+            </a:pPr>
+            <a:r>
+              <a:rPr lang="nl"/>
+              <a:t>Easy to use framework</a:t>
+            </a:r>
+          </a:p>
+          <a:p>
             <a:pPr indent="-419100" lvl="0" marL="457200" rtl="0">
               <a:spcBef>
                 <a:spcPts val="0"/>
@@ -30240,6 +31783,40 @@
             <a:r>
               <a:rPr lang="nl"/>
               <a:t>TableSorter</a:t>
+            </a:r>
+          </a:p>
+          <a:p>
+            <a:pPr indent="-381000" lvl="1" marL="914400" rtl="0">
+              <a:spcBef>
+                <a:spcPts val="0"/>
+              </a:spcBef>
+              <a:buClr>
+                <a:schemeClr val="dk2"/>
+              </a:buClr>
+              <a:buSzPct val="80000"/>
+              <a:buFont typeface="Courier New"/>
+              <a:buChar char="o"/>
+            </a:pPr>
+            <a:r>
+              <a:rPr lang="nl"/>
+              <a:t>Sorting</a:t>
+            </a:r>
+          </a:p>
+          <a:p>
+            <a:pPr indent="-381000" lvl="1" marL="914400" rtl="0">
+              <a:spcBef>
+                <a:spcPts val="0"/>
+              </a:spcBef>
+              <a:buClr>
+                <a:schemeClr val="dk2"/>
+              </a:buClr>
+              <a:buSzPct val="80000"/>
+              <a:buFont typeface="Courier New"/>
+              <a:buChar char="o"/>
+            </a:pPr>
+            <a:r>
+              <a:rPr lang="nl"/>
+              <a:t>Movable columns</a:t>
             </a:r>
           </a:p>
           <a:p>
@@ -30284,45 +31861,65 @@
           <a:chExt cx="0" cy="0"/>
         </a:xfrm>
       </p:grpSpPr>
-      <p:sp>
-        <p:nvSpPr>
+      <p:pic>
+        <p:nvPicPr>
           <p:cNvPr id="123" name="Shape 123"/>
-          <p:cNvSpPr txBox="1"/>
-          <p:nvPr>
-            <p:ph type="title"/>
-          </p:nvPr>
-        </p:nvSpPr>
+          <p:cNvPicPr preferRelativeResize="0"/>
+          <p:nvPr/>
+        </p:nvPicPr>
+        <p:blipFill>
+          <a:blip r:embed="rId3">
+            <a:alphaModFix/>
+          </a:blip>
+          <a:stretch>
+            <a:fillRect/>
+          </a:stretch>
+        </p:blipFill>
         <p:spPr>
           <a:xfrm>
-            <a:off x="457200" y="155628"/>
-            <a:ext cx="8229600" cy="1044599"/>
+            <a:off x="0" y="77152"/>
+            <a:ext cx="9144000" cy="4989195"/>
           </a:xfrm>
           <a:prstGeom prst="rect">
             <a:avLst/>
           </a:prstGeom>
+          <a:noFill/>
+          <a:ln>
+            <a:noFill/>
+          </a:ln>
         </p:spPr>
-        <p:txBody>
-          <a:bodyPr anchorCtr="0" anchor="b" bIns="91425" lIns="91425" rIns="91425" tIns="91425">
-            <a:noAutofit/>
-          </a:bodyPr>
-          <a:lstStyle/>
-          <a:p>
-            <a:pPr>
-              <a:spcBef>
-                <a:spcPts val="0"/>
-              </a:spcBef>
-              <a:buNone/>
-            </a:pPr>
-            <a:r>
-              <a:rPr lang="nl"/>
-              <a:t>DeepskyLog Stars</a:t>
-            </a:r>
-          </a:p>
-        </p:txBody>
-      </p:sp>
+      </p:pic>
+    </p:spTree>
+  </p:cSld>
+  <p:clrMapOvr>
+    <a:masterClrMapping/>
+  </p:clrMapOvr>
+  <p:transition spd="slow">
+    <p:cut/>
+  </p:transition>
+</p:sld>
+</file>
+
+<file path=ppt/slides/slide4.xml><?xml version="1.0" encoding="utf-8"?>
+<p:sld xmlns:a="http://schemas.openxmlformats.org/drawingml/2006/main" xmlns:r="http://schemas.openxmlformats.org/officeDocument/2006/relationships" xmlns:mc="http://schemas.openxmlformats.org/markup-compatibility/2006" xmlns:mv="urn:schemas-microsoft-com:mac:vml" xmlns:p="http://schemas.openxmlformats.org/presentationml/2006/main" xmlns:c="http://schemas.openxmlformats.org/drawingml/2006/chart" xmlns:dgm="http://schemas.openxmlformats.org/drawingml/2006/diagram" xmlns:o="urn:schemas-microsoft-com:office:office" xmlns:v="urn:schemas-microsoft-com:vml" xmlns:pvml="urn:schemas-microsoft-com:office:powerpoint" xmlns:com="http://schemas.openxmlformats.org/drawingml/2006/compatibility" xmlns:p14="http://schemas.microsoft.com/office/powerpoint/2010/main">
+  <p:cSld>
+    <p:spTree>
+      <p:nvGrpSpPr>
+        <p:cNvPr id="127" name="Shape 127"/>
+        <p:cNvGrpSpPr/>
+        <p:nvPr/>
+      </p:nvGrpSpPr>
+      <p:grpSpPr>
+        <a:xfrm>
+          <a:off x="0" y="0"/>
+          <a:ext cx="0" cy="0"/>
+          <a:chOff x="0" y="0"/>
+          <a:chExt cx="0" cy="0"/>
+        </a:xfrm>
+      </p:grpSpPr>
       <p:sp>
         <p:nvSpPr>
-          <p:cNvPr id="124" name="Shape 124"/>
+          <p:cNvPr id="128" name="Shape 128"/>
           <p:cNvSpPr txBox="1"/>
           <p:nvPr>
             <p:ph idx="1" type="body"/>
@@ -30356,106 +31953,34 @@
           </a:p>
         </p:txBody>
       </p:sp>
-    </p:spTree>
-  </p:cSld>
-  <p:clrMapOvr>
-    <a:masterClrMapping/>
-  </p:clrMapOvr>
-  <p:transition spd="slow">
-    <p:cut/>
-  </p:transition>
-</p:sld>
-</file>
-
-<file path=ppt/slides/slide4.xml><?xml version="1.0" encoding="utf-8"?>
-<p:sld xmlns:a="http://schemas.openxmlformats.org/drawingml/2006/main" xmlns:r="http://schemas.openxmlformats.org/officeDocument/2006/relationships" xmlns:mc="http://schemas.openxmlformats.org/markup-compatibility/2006" xmlns:mv="urn:schemas-microsoft-com:mac:vml" xmlns:p="http://schemas.openxmlformats.org/presentationml/2006/main" xmlns:c="http://schemas.openxmlformats.org/drawingml/2006/chart" xmlns:dgm="http://schemas.openxmlformats.org/drawingml/2006/diagram" xmlns:o="urn:schemas-microsoft-com:office:office" xmlns:v="urn:schemas-microsoft-com:vml" xmlns:pvml="urn:schemas-microsoft-com:office:powerpoint" xmlns:com="http://schemas.openxmlformats.org/drawingml/2006/compatibility" xmlns:p14="http://schemas.microsoft.com/office/powerpoint/2010/main">
-  <p:cSld>
-    <p:spTree>
-      <p:nvGrpSpPr>
-        <p:cNvPr id="128" name="Shape 128"/>
-        <p:cNvGrpSpPr/>
-        <p:nvPr/>
-      </p:nvGrpSpPr>
-      <p:grpSpPr>
-        <a:xfrm>
-          <a:off x="0" y="0"/>
-          <a:ext cx="0" cy="0"/>
-          <a:chOff x="0" y="0"/>
-          <a:chExt cx="0" cy="0"/>
-        </a:xfrm>
-      </p:grpSpPr>
-      <p:sp>
-        <p:nvSpPr>
+      <p:pic>
+        <p:nvPicPr>
           <p:cNvPr id="129" name="Shape 129"/>
-          <p:cNvSpPr txBox="1"/>
-          <p:nvPr>
-            <p:ph type="title"/>
-          </p:nvPr>
-        </p:nvSpPr>
+          <p:cNvPicPr preferRelativeResize="0"/>
+          <p:nvPr/>
+        </p:nvPicPr>
+        <p:blipFill>
+          <a:blip r:embed="rId3">
+            <a:alphaModFix/>
+          </a:blip>
+          <a:stretch>
+            <a:fillRect/>
+          </a:stretch>
+        </p:blipFill>
         <p:spPr>
           <a:xfrm>
-            <a:off x="457200" y="155628"/>
-            <a:ext cx="8229600" cy="1044599"/>
+            <a:off x="-83250" y="0"/>
+            <a:ext cx="9144000" cy="5143500"/>
           </a:xfrm>
           <a:prstGeom prst="rect">
             <a:avLst/>
           </a:prstGeom>
+          <a:noFill/>
+          <a:ln>
+            <a:noFill/>
+          </a:ln>
         </p:spPr>
-        <p:txBody>
-          <a:bodyPr anchorCtr="0" anchor="b" bIns="91425" lIns="91425" rIns="91425" tIns="91425">
-            <a:noAutofit/>
-          </a:bodyPr>
-          <a:lstStyle/>
-          <a:p>
-            <a:pPr>
-              <a:spcBef>
-                <a:spcPts val="0"/>
-              </a:spcBef>
-              <a:buNone/>
-            </a:pPr>
-            <a:r>
-              <a:rPr lang="nl"/>
-              <a:t>Use real emailaddress</a:t>
-            </a:r>
-          </a:p>
-        </p:txBody>
-      </p:sp>
-      <p:sp>
-        <p:nvSpPr>
-          <p:cNvPr id="130" name="Shape 130"/>
-          <p:cNvSpPr txBox="1"/>
-          <p:nvPr>
-            <p:ph idx="1" type="body"/>
-          </p:nvPr>
-        </p:nvSpPr>
-        <p:spPr>
-          <a:xfrm>
-            <a:off x="457200" y="1297780"/>
-            <a:ext cx="8229600" cy="3627900"/>
-          </a:xfrm>
-          <a:prstGeom prst="rect">
-            <a:avLst/>
-          </a:prstGeom>
-        </p:spPr>
-        <p:txBody>
-          <a:bodyPr anchorCtr="0" anchor="t" bIns="91425" lIns="91425" rIns="91425" tIns="91425">
-            <a:noAutofit/>
-          </a:bodyPr>
-          <a:lstStyle/>
-          <a:p>
-            <a:pPr>
-              <a:spcBef>
-                <a:spcPts val="0"/>
-              </a:spcBef>
-              <a:buNone/>
-            </a:pPr>
-            <a:r>
-              <a:rPr lang="nl"/>
-              <a:t>Send message to real emailaddress</a:t>
-            </a:r>
-          </a:p>
-        </p:txBody>
-      </p:sp>
+      </p:pic>
     </p:spTree>
   </p:cSld>
   <p:clrMapOvr>
@@ -30472,7 +31997,7 @@
   <p:cSld>
     <p:spTree>
       <p:nvGrpSpPr>
-        <p:cNvPr id="134" name="Shape 134"/>
+        <p:cNvPr id="133" name="Shape 133"/>
         <p:cNvGrpSpPr/>
         <p:nvPr/>
       </p:nvGrpSpPr>
@@ -30484,78 +32009,34 @@
           <a:chExt cx="0" cy="0"/>
         </a:xfrm>
       </p:grpSpPr>
-      <p:sp>
-        <p:nvSpPr>
-          <p:cNvPr id="135" name="Shape 135"/>
-          <p:cNvSpPr txBox="1"/>
-          <p:nvPr>
-            <p:ph type="title"/>
-          </p:nvPr>
-        </p:nvSpPr>
+      <p:pic>
+        <p:nvPicPr>
+          <p:cNvPr id="134" name="Shape 134"/>
+          <p:cNvPicPr preferRelativeResize="0"/>
+          <p:nvPr/>
+        </p:nvPicPr>
+        <p:blipFill>
+          <a:blip r:embed="rId3">
+            <a:alphaModFix/>
+          </a:blip>
+          <a:stretch>
+            <a:fillRect/>
+          </a:stretch>
+        </p:blipFill>
         <p:spPr>
           <a:xfrm>
-            <a:off x="457200" y="155628"/>
-            <a:ext cx="8229600" cy="1044599"/>
+            <a:off x="0" y="0"/>
+            <a:ext cx="9144000" cy="5143500"/>
           </a:xfrm>
           <a:prstGeom prst="rect">
             <a:avLst/>
           </a:prstGeom>
+          <a:noFill/>
+          <a:ln>
+            <a:noFill/>
+          </a:ln>
         </p:spPr>
-        <p:txBody>
-          <a:bodyPr anchorCtr="0" anchor="b" bIns="91425" lIns="91425" rIns="91425" tIns="91425">
-            <a:noAutofit/>
-          </a:bodyPr>
-          <a:lstStyle/>
-          <a:p>
-            <a:pPr>
-              <a:spcBef>
-                <a:spcPts val="0"/>
-              </a:spcBef>
-              <a:buNone/>
-            </a:pPr>
-            <a:r>
-              <a:rPr lang="nl"/>
-              <a:t>Picture of observers</a:t>
-            </a:r>
-          </a:p>
-        </p:txBody>
-      </p:sp>
-      <p:sp>
-        <p:nvSpPr>
-          <p:cNvPr id="136" name="Shape 136"/>
-          <p:cNvSpPr txBox="1"/>
-          <p:nvPr>
-            <p:ph idx="1" type="body"/>
-          </p:nvPr>
-        </p:nvSpPr>
-        <p:spPr>
-          <a:xfrm>
-            <a:off x="457200" y="1297780"/>
-            <a:ext cx="8229600" cy="3627900"/>
-          </a:xfrm>
-          <a:prstGeom prst="rect">
-            <a:avLst/>
-          </a:prstGeom>
-        </p:spPr>
-        <p:txBody>
-          <a:bodyPr anchorCtr="0" anchor="t" bIns="91425" lIns="91425" rIns="91425" tIns="91425">
-            <a:noAutofit/>
-          </a:bodyPr>
-          <a:lstStyle/>
-          <a:p>
-            <a:pPr>
-              <a:spcBef>
-                <a:spcPts val="0"/>
-              </a:spcBef>
-              <a:buNone/>
-            </a:pPr>
-            <a:r>
-              <a:rPr lang="nl"/>
-              <a:t>in detail of observation and in messages.</a:t>
-            </a:r>
-          </a:p>
-        </p:txBody>
-      </p:sp>
+      </p:pic>
     </p:spTree>
   </p:cSld>
   <p:clrMapOvr>
@@ -30572,7 +32053,7 @@
   <p:cSld>
     <p:spTree>
       <p:nvGrpSpPr>
-        <p:cNvPr id="140" name="Shape 140"/>
+        <p:cNvPr id="138" name="Shape 138"/>
         <p:cNvGrpSpPr/>
         <p:nvPr/>
       </p:nvGrpSpPr>
@@ -30584,78 +32065,34 @@
           <a:chExt cx="0" cy="0"/>
         </a:xfrm>
       </p:grpSpPr>
-      <p:sp>
-        <p:nvSpPr>
-          <p:cNvPr id="141" name="Shape 141"/>
-          <p:cNvSpPr txBox="1"/>
-          <p:nvPr>
-            <p:ph type="title"/>
-          </p:nvPr>
-        </p:nvSpPr>
+      <p:pic>
+        <p:nvPicPr>
+          <p:cNvPr id="139" name="Shape 139"/>
+          <p:cNvPicPr preferRelativeResize="0"/>
+          <p:nvPr/>
+        </p:nvPicPr>
+        <p:blipFill>
+          <a:blip r:embed="rId3">
+            <a:alphaModFix/>
+          </a:blip>
+          <a:stretch>
+            <a:fillRect/>
+          </a:stretch>
+        </p:blipFill>
         <p:spPr>
           <a:xfrm>
-            <a:off x="457200" y="155628"/>
-            <a:ext cx="8229600" cy="1044599"/>
+            <a:off x="0" y="0"/>
+            <a:ext cx="9144000" cy="5143500"/>
           </a:xfrm>
           <a:prstGeom prst="rect">
             <a:avLst/>
           </a:prstGeom>
+          <a:noFill/>
+          <a:ln>
+            <a:noFill/>
+          </a:ln>
         </p:spPr>
-        <p:txBody>
-          <a:bodyPr anchorCtr="0" anchor="b" bIns="91425" lIns="91425" rIns="91425" tIns="91425">
-            <a:noAutofit/>
-          </a:bodyPr>
-          <a:lstStyle/>
-          <a:p>
-            <a:pPr>
-              <a:spcBef>
-                <a:spcPts val="0"/>
-              </a:spcBef>
-              <a:buNone/>
-            </a:pPr>
-            <a:r>
-              <a:rPr lang="nl"/>
-              <a:t>New entry page</a:t>
-            </a:r>
-          </a:p>
-        </p:txBody>
-      </p:sp>
-      <p:sp>
-        <p:nvSpPr>
-          <p:cNvPr id="142" name="Shape 142"/>
-          <p:cNvSpPr txBox="1"/>
-          <p:nvPr>
-            <p:ph idx="1" type="body"/>
-          </p:nvPr>
-        </p:nvSpPr>
-        <p:spPr>
-          <a:xfrm>
-            <a:off x="457200" y="1297780"/>
-            <a:ext cx="8229600" cy="3627900"/>
-          </a:xfrm>
-          <a:prstGeom prst="rect">
-            <a:avLst/>
-          </a:prstGeom>
-        </p:spPr>
-        <p:txBody>
-          <a:bodyPr anchorCtr="0" anchor="t" bIns="91425" lIns="91425" rIns="91425" tIns="91425">
-            <a:noAutofit/>
-          </a:bodyPr>
-          <a:lstStyle/>
-          <a:p>
-            <a:pPr>
-              <a:spcBef>
-                <a:spcPts val="0"/>
-              </a:spcBef>
-              <a:buNone/>
-            </a:pPr>
-            <a:r>
-              <a:t/>
-            </a:r>
-            <a:endParaRPr/>
-          </a:p>
-        </p:txBody>
-      </p:sp>
+      </p:pic>
     </p:spTree>
   </p:cSld>
   <p:clrMapOvr>
@@ -30672,7 +32109,7 @@
   <p:cSld>
     <p:spTree>
       <p:nvGrpSpPr>
-        <p:cNvPr id="146" name="Shape 146"/>
+        <p:cNvPr id="143" name="Shape 143"/>
         <p:cNvGrpSpPr/>
         <p:nvPr/>
       </p:nvGrpSpPr>
@@ -30684,78 +32121,34 @@
           <a:chExt cx="0" cy="0"/>
         </a:xfrm>
       </p:grpSpPr>
-      <p:sp>
-        <p:nvSpPr>
-          <p:cNvPr id="147" name="Shape 147"/>
-          <p:cNvSpPr txBox="1"/>
-          <p:nvPr>
-            <p:ph type="title"/>
-          </p:nvPr>
-        </p:nvSpPr>
+      <p:pic>
+        <p:nvPicPr>
+          <p:cNvPr id="144" name="Shape 144"/>
+          <p:cNvPicPr preferRelativeResize="0"/>
+          <p:nvPr/>
+        </p:nvPicPr>
+        <p:blipFill>
+          <a:blip r:embed="rId3">
+            <a:alphaModFix/>
+          </a:blip>
+          <a:stretch>
+            <a:fillRect/>
+          </a:stretch>
+        </p:blipFill>
         <p:spPr>
           <a:xfrm>
-            <a:off x="457200" y="155628"/>
-            <a:ext cx="8229600" cy="1044599"/>
+            <a:off x="0" y="0"/>
+            <a:ext cx="9144000" cy="5143500"/>
           </a:xfrm>
           <a:prstGeom prst="rect">
             <a:avLst/>
           </a:prstGeom>
+          <a:noFill/>
+          <a:ln>
+            <a:noFill/>
+          </a:ln>
         </p:spPr>
-        <p:txBody>
-          <a:bodyPr anchorCtr="0" anchor="b" bIns="91425" lIns="91425" rIns="91425" tIns="91425">
-            <a:noAutofit/>
-          </a:bodyPr>
-          <a:lstStyle/>
-          <a:p>
-            <a:pPr>
-              <a:spcBef>
-                <a:spcPts val="0"/>
-              </a:spcBef>
-              <a:buNone/>
-            </a:pPr>
-            <a:r>
-              <a:rPr lang="nl"/>
-              <a:t>Add locations</a:t>
-            </a:r>
-          </a:p>
-        </p:txBody>
-      </p:sp>
-      <p:sp>
-        <p:nvSpPr>
-          <p:cNvPr id="148" name="Shape 148"/>
-          <p:cNvSpPr txBox="1"/>
-          <p:nvPr>
-            <p:ph idx="1" type="body"/>
-          </p:nvPr>
-        </p:nvSpPr>
-        <p:spPr>
-          <a:xfrm>
-            <a:off x="457200" y="1297780"/>
-            <a:ext cx="8229600" cy="3627900"/>
-          </a:xfrm>
-          <a:prstGeom prst="rect">
-            <a:avLst/>
-          </a:prstGeom>
-        </p:spPr>
-        <p:txBody>
-          <a:bodyPr anchorCtr="0" anchor="t" bIns="91425" lIns="91425" rIns="91425" tIns="91425">
-            <a:noAutofit/>
-          </a:bodyPr>
-          <a:lstStyle/>
-          <a:p>
-            <a:pPr>
-              <a:spcBef>
-                <a:spcPts val="0"/>
-              </a:spcBef>
-              <a:buNone/>
-            </a:pPr>
-            <a:r>
-              <a:t/>
-            </a:r>
-            <a:endParaRPr/>
-          </a:p>
-        </p:txBody>
-      </p:sp>
+      </p:pic>
     </p:spTree>
   </p:cSld>
   <p:clrMapOvr>
@@ -30772,7 +32165,7 @@
   <p:cSld>
     <p:spTree>
       <p:nvGrpSpPr>
-        <p:cNvPr id="152" name="Shape 152"/>
+        <p:cNvPr id="148" name="Shape 148"/>
         <p:cNvGrpSpPr/>
         <p:nvPr/>
       </p:nvGrpSpPr>
@@ -30784,78 +32177,90 @@
           <a:chExt cx="0" cy="0"/>
         </a:xfrm>
       </p:grpSpPr>
-      <p:sp>
-        <p:nvSpPr>
-          <p:cNvPr id="153" name="Shape 153"/>
-          <p:cNvSpPr txBox="1"/>
-          <p:nvPr>
-            <p:ph type="title"/>
-          </p:nvPr>
-        </p:nvSpPr>
+      <p:pic>
+        <p:nvPicPr>
+          <p:cNvPr id="149" name="Shape 149"/>
+          <p:cNvPicPr preferRelativeResize="0"/>
+          <p:nvPr/>
+        </p:nvPicPr>
+        <p:blipFill>
+          <a:blip r:embed="rId3">
+            <a:alphaModFix/>
+          </a:blip>
+          <a:stretch>
+            <a:fillRect/>
+          </a:stretch>
+        </p:blipFill>
         <p:spPr>
           <a:xfrm>
-            <a:off x="457200" y="155628"/>
-            <a:ext cx="8229600" cy="1044599"/>
+            <a:off x="0" y="0"/>
+            <a:ext cx="9144000" cy="5143500"/>
           </a:xfrm>
           <a:prstGeom prst="rect">
             <a:avLst/>
           </a:prstGeom>
+          <a:noFill/>
+          <a:ln>
+            <a:noFill/>
+          </a:ln>
         </p:spPr>
-        <p:txBody>
-          <a:bodyPr anchorCtr="0" anchor="b" bIns="91425" lIns="91425" rIns="91425" tIns="91425">
-            <a:noAutofit/>
-          </a:bodyPr>
-          <a:lstStyle/>
-          <a:p>
-            <a:pPr>
-              <a:spcBef>
-                <a:spcPts val="0"/>
-              </a:spcBef>
-              <a:buNone/>
-            </a:pPr>
-            <a:r>
-              <a:rPr lang="nl"/>
-              <a:t>New Logo</a:t>
-            </a:r>
-          </a:p>
-        </p:txBody>
-      </p:sp>
-      <p:sp>
-        <p:nvSpPr>
+      </p:pic>
+    </p:spTree>
+  </p:cSld>
+  <p:clrMapOvr>
+    <a:masterClrMapping/>
+  </p:clrMapOvr>
+  <p:transition spd="slow">
+    <p:cut/>
+  </p:transition>
+</p:sld>
+</file>
+
+<file path=ppt/slides/slide9.xml><?xml version="1.0" encoding="utf-8"?>
+<p:sld xmlns:a="http://schemas.openxmlformats.org/drawingml/2006/main" xmlns:r="http://schemas.openxmlformats.org/officeDocument/2006/relationships" xmlns:mc="http://schemas.openxmlformats.org/markup-compatibility/2006" xmlns:mv="urn:schemas-microsoft-com:mac:vml" xmlns:p="http://schemas.openxmlformats.org/presentationml/2006/main" xmlns:c="http://schemas.openxmlformats.org/drawingml/2006/chart" xmlns:dgm="http://schemas.openxmlformats.org/drawingml/2006/diagram" xmlns:o="urn:schemas-microsoft-com:office:office" xmlns:v="urn:schemas-microsoft-com:vml" xmlns:pvml="urn:schemas-microsoft-com:office:powerpoint" xmlns:com="http://schemas.openxmlformats.org/drawingml/2006/compatibility" xmlns:p14="http://schemas.microsoft.com/office/powerpoint/2010/main">
+  <p:cSld>
+    <p:spTree>
+      <p:nvGrpSpPr>
+        <p:cNvPr id="153" name="Shape 153"/>
+        <p:cNvGrpSpPr/>
+        <p:nvPr/>
+      </p:nvGrpSpPr>
+      <p:grpSpPr>
+        <a:xfrm>
+          <a:off x="0" y="0"/>
+          <a:ext cx="0" cy="0"/>
+          <a:chOff x="0" y="0"/>
+          <a:chExt cx="0" cy="0"/>
+        </a:xfrm>
+      </p:grpSpPr>
+      <p:pic>
+        <p:nvPicPr>
           <p:cNvPr id="154" name="Shape 154"/>
-          <p:cNvSpPr txBox="1"/>
-          <p:nvPr>
-            <p:ph idx="1" type="body"/>
-          </p:nvPr>
-        </p:nvSpPr>
+          <p:cNvPicPr preferRelativeResize="0"/>
+          <p:nvPr/>
+        </p:nvPicPr>
+        <p:blipFill>
+          <a:blip r:embed="rId3">
+            <a:alphaModFix/>
+          </a:blip>
+          <a:stretch>
+            <a:fillRect/>
+          </a:stretch>
+        </p:blipFill>
         <p:spPr>
           <a:xfrm>
-            <a:off x="457200" y="1297780"/>
-            <a:ext cx="8229600" cy="3627900"/>
+            <a:off x="0" y="0"/>
+            <a:ext cx="9144000" cy="5143500"/>
           </a:xfrm>
           <a:prstGeom prst="rect">
             <a:avLst/>
           </a:prstGeom>
+          <a:noFill/>
+          <a:ln>
+            <a:noFill/>
+          </a:ln>
         </p:spPr>
-        <p:txBody>
-          <a:bodyPr anchorCtr="0" anchor="t" bIns="91425" lIns="91425" rIns="91425" tIns="91425">
-            <a:noAutofit/>
-          </a:bodyPr>
-          <a:lstStyle/>
-          <a:p>
-            <a:pPr>
-              <a:spcBef>
-                <a:spcPts val="0"/>
-              </a:spcBef>
-              <a:buNone/>
-            </a:pPr>
-            <a:r>
-              <a:t/>
-            </a:r>
-            <a:endParaRPr/>
-          </a:p>
-        </p:txBody>
-      </p:sp>
+      </p:pic>
     </p:spTree>
   </p:cSld>
   <p:clrMapOvr>
@@ -30868,9 +32273,9 @@
 </file>
 
 <file path=ppt/theme/theme1.xml><?xml version="1.0" encoding="utf-8"?>
-<a:theme xmlns:a="http://schemas.openxmlformats.org/drawingml/2006/main" xmlns:r="http://schemas.openxmlformats.org/officeDocument/2006/relationships" name="sketched">
+<a:theme xmlns:a="http://schemas.openxmlformats.org/drawingml/2006/main" xmlns:r="http://schemas.openxmlformats.org/officeDocument/2006/relationships" name="Custom Theme">
   <a:themeElements>
-    <a:clrScheme name="Custom 398">
+    <a:clrScheme name="Default">
       <a:dk1>
         <a:srgbClr val="000000"/>
       </a:dk1>
@@ -30878,34 +32283,34 @@
         <a:srgbClr val="FFFFFF"/>
       </a:lt1>
       <a:dk2>
-        <a:srgbClr val="51535D"/>
+        <a:srgbClr val="158158"/>
       </a:dk2>
       <a:lt2>
-        <a:srgbClr val="EDEDED"/>
+        <a:srgbClr val="F3F3F3"/>
       </a:lt2>
       <a:accent1>
-        <a:srgbClr val="676871"/>
+        <a:srgbClr val="058DC7"/>
       </a:accent1>
       <a:accent2>
-        <a:srgbClr val="988489"/>
+        <a:srgbClr val="50B432"/>
       </a:accent2>
       <a:accent3>
-        <a:srgbClr val="6B7B67"/>
+        <a:srgbClr val="ED561B"/>
       </a:accent3>
       <a:accent4>
-        <a:srgbClr val="747B85"/>
+        <a:srgbClr val="EDEF00"/>
       </a:accent4>
       <a:accent5>
-        <a:srgbClr val="A5A9AF"/>
+        <a:srgbClr val="24CBE5"/>
       </a:accent5>
       <a:accent6>
-        <a:srgbClr val="85716D"/>
+        <a:srgbClr val="64E572"/>
       </a:accent6>
       <a:hlink>
-        <a:srgbClr val="676871"/>
+        <a:srgbClr val="2200CC"/>
       </a:hlink>
       <a:folHlink>
-        <a:srgbClr val="3F414A"/>
+        <a:srgbClr val="551A8B"/>
       </a:folHlink>
     </a:clrScheme>
     <a:fontScheme name="Office">
@@ -31145,9 +32550,9 @@
 </file>
 
 <file path=ppt/theme/theme2.xml><?xml version="1.0" encoding="utf-8"?>
-<a:theme xmlns:a="http://schemas.openxmlformats.org/drawingml/2006/main" xmlns:r="http://schemas.openxmlformats.org/officeDocument/2006/relationships" name="Custom Theme">
+<a:theme xmlns:a="http://schemas.openxmlformats.org/drawingml/2006/main" xmlns:r="http://schemas.openxmlformats.org/officeDocument/2006/relationships" name="sketched">
   <a:themeElements>
-    <a:clrScheme name="Default">
+    <a:clrScheme name="Custom 398">
       <a:dk1>
         <a:srgbClr val="000000"/>
       </a:dk1>
@@ -31155,34 +32560,34 @@
         <a:srgbClr val="FFFFFF"/>
       </a:lt1>
       <a:dk2>
-        <a:srgbClr val="158158"/>
+        <a:srgbClr val="51535D"/>
       </a:dk2>
       <a:lt2>
-        <a:srgbClr val="F3F3F3"/>
+        <a:srgbClr val="EDEDED"/>
       </a:lt2>
       <a:accent1>
-        <a:srgbClr val="058DC7"/>
+        <a:srgbClr val="676871"/>
       </a:accent1>
       <a:accent2>
-        <a:srgbClr val="50B432"/>
+        <a:srgbClr val="988489"/>
       </a:accent2>
       <a:accent3>
-        <a:srgbClr val="ED561B"/>
+        <a:srgbClr val="6B7B67"/>
       </a:accent3>
       <a:accent4>
-        <a:srgbClr val="EDEF00"/>
+        <a:srgbClr val="747B85"/>
       </a:accent4>
       <a:accent5>
-        <a:srgbClr val="24CBE5"/>
+        <a:srgbClr val="A5A9AF"/>
       </a:accent5>
       <a:accent6>
-        <a:srgbClr val="64E572"/>
+        <a:srgbClr val="85716D"/>
       </a:accent6>
       <a:hlink>
-        <a:srgbClr val="2200CC"/>
+        <a:srgbClr val="676871"/>
       </a:hlink>
       <a:folHlink>
-        <a:srgbClr val="551A8B"/>
+        <a:srgbClr val="3F414A"/>
       </a:folHlink>
     </a:clrScheme>
     <a:fontScheme name="Office">

</xml_diff>

<commit_message>
Added DeepskyLog stars section.
</commit_message>
<xml_diff>
--- a/Meeting20150425/DeepskyLog 5.0.pptx
+++ b/Meeting20150425/DeepskyLog 5.0.pptx
@@ -24,6 +24,8 @@
     <p:sldId id="269" r:id="rId19"/>
     <p:sldId id="270" r:id="rId20"/>
     <p:sldId id="271" r:id="rId21"/>
+    <p:sldId id="272" r:id="rId22"/>
+    <p:sldId id="273" r:id="rId23"/>
   </p:sldIdLst>
   <p:sldSz cy="5143500" cx="9144000"/>
   <p:notesSz cx="6858000" cy="9144000"/>
@@ -710,7 +712,7 @@
   <p:cSld>
     <p:spTree>
       <p:nvGrpSpPr>
-        <p:cNvPr id="172" name="Shape 172"/>
+        <p:cNvPr id="171" name="Shape 171"/>
         <p:cNvGrpSpPr/>
         <p:nvPr/>
       </p:nvGrpSpPr>
@@ -724,7 +726,7 @@
       </p:grpSpPr>
       <p:sp>
         <p:nvSpPr>
-          <p:cNvPr id="173" name="Shape 173"/>
+          <p:cNvPr id="172" name="Shape 172"/>
           <p:cNvSpPr/>
           <p:nvPr>
             <p:ph idx="2" type="sldImg"/>
@@ -768,7 +770,7 @@
       </p:sp>
       <p:sp>
         <p:nvSpPr>
-          <p:cNvPr id="174" name="Shape 174"/>
+          <p:cNvPr id="173" name="Shape 173"/>
           <p:cNvSpPr txBox="1"/>
           <p:nvPr>
             <p:ph idx="1" type="body"/>
@@ -815,7 +817,7 @@
   <p:cSld>
     <p:spTree>
       <p:nvGrpSpPr>
-        <p:cNvPr id="178" name="Shape 178"/>
+        <p:cNvPr id="176" name="Shape 176"/>
         <p:cNvGrpSpPr/>
         <p:nvPr/>
       </p:nvGrpSpPr>
@@ -829,7 +831,7 @@
       </p:grpSpPr>
       <p:sp>
         <p:nvSpPr>
-          <p:cNvPr id="179" name="Shape 179"/>
+          <p:cNvPr id="177" name="Shape 177"/>
           <p:cNvSpPr/>
           <p:nvPr>
             <p:ph idx="2" type="sldImg"/>
@@ -873,7 +875,7 @@
       </p:sp>
       <p:sp>
         <p:nvSpPr>
-          <p:cNvPr id="180" name="Shape 180"/>
+          <p:cNvPr id="178" name="Shape 178"/>
           <p:cNvSpPr txBox="1"/>
           <p:nvPr>
             <p:ph idx="1" type="body"/>
@@ -920,7 +922,7 @@
   <p:cSld>
     <p:spTree>
       <p:nvGrpSpPr>
-        <p:cNvPr id="184" name="Shape 184"/>
+        <p:cNvPr id="182" name="Shape 182"/>
         <p:cNvGrpSpPr/>
         <p:nvPr/>
       </p:nvGrpSpPr>
@@ -934,7 +936,7 @@
       </p:grpSpPr>
       <p:sp>
         <p:nvSpPr>
-          <p:cNvPr id="185" name="Shape 185"/>
+          <p:cNvPr id="183" name="Shape 183"/>
           <p:cNvSpPr/>
           <p:nvPr>
             <p:ph idx="2" type="sldImg"/>
@@ -978,7 +980,7 @@
       </p:sp>
       <p:sp>
         <p:nvSpPr>
-          <p:cNvPr id="186" name="Shape 186"/>
+          <p:cNvPr id="184" name="Shape 184"/>
           <p:cNvSpPr txBox="1"/>
           <p:nvPr>
             <p:ph idx="1" type="body"/>
@@ -1025,7 +1027,7 @@
   <p:cSld>
     <p:spTree>
       <p:nvGrpSpPr>
-        <p:cNvPr id="190" name="Shape 190"/>
+        <p:cNvPr id="188" name="Shape 188"/>
         <p:cNvGrpSpPr/>
         <p:nvPr/>
       </p:nvGrpSpPr>
@@ -1039,7 +1041,7 @@
       </p:grpSpPr>
       <p:sp>
         <p:nvSpPr>
-          <p:cNvPr id="191" name="Shape 191"/>
+          <p:cNvPr id="189" name="Shape 189"/>
           <p:cNvSpPr/>
           <p:nvPr>
             <p:ph idx="2" type="sldImg"/>
@@ -1083,7 +1085,7 @@
       </p:sp>
       <p:sp>
         <p:nvSpPr>
-          <p:cNvPr id="192" name="Shape 192"/>
+          <p:cNvPr id="190" name="Shape 190"/>
           <p:cNvSpPr txBox="1"/>
           <p:nvPr>
             <p:ph idx="1" type="body"/>
@@ -1130,7 +1132,7 @@
   <p:cSld>
     <p:spTree>
       <p:nvGrpSpPr>
-        <p:cNvPr id="196" name="Shape 196"/>
+        <p:cNvPr id="194" name="Shape 194"/>
         <p:cNvGrpSpPr/>
         <p:nvPr/>
       </p:nvGrpSpPr>
@@ -1144,7 +1146,7 @@
       </p:grpSpPr>
       <p:sp>
         <p:nvSpPr>
-          <p:cNvPr id="197" name="Shape 197"/>
+          <p:cNvPr id="195" name="Shape 195"/>
           <p:cNvSpPr/>
           <p:nvPr>
             <p:ph idx="2" type="sldImg"/>
@@ -1188,7 +1190,217 @@
       </p:sp>
       <p:sp>
         <p:nvSpPr>
-          <p:cNvPr id="198" name="Shape 198"/>
+          <p:cNvPr id="196" name="Shape 196"/>
+          <p:cNvSpPr txBox="1"/>
+          <p:nvPr>
+            <p:ph idx="1" type="body"/>
+          </p:nvPr>
+        </p:nvSpPr>
+        <p:spPr>
+          <a:xfrm>
+            <a:off x="685800" y="4343400"/>
+            <a:ext cx="5486399" cy="4114800"/>
+          </a:xfrm>
+          <a:prstGeom prst="rect">
+            <a:avLst/>
+          </a:prstGeom>
+        </p:spPr>
+        <p:txBody>
+          <a:bodyPr anchorCtr="0" anchor="t" bIns="91425" lIns="91425" rIns="91425" tIns="91425">
+            <a:noAutofit/>
+          </a:bodyPr>
+          <a:lstStyle/>
+          <a:p>
+            <a:pPr>
+              <a:spcBef>
+                <a:spcPts val="0"/>
+              </a:spcBef>
+              <a:buNone/>
+            </a:pPr>
+            <a:r>
+              <a:t/>
+            </a:r>
+            <a:endParaRPr/>
+          </a:p>
+        </p:txBody>
+      </p:sp>
+    </p:spTree>
+  </p:cSld>
+  <p:clrMapOvr>
+    <a:masterClrMapping/>
+  </p:clrMapOvr>
+</p:notes>
+</file>
+
+<file path=ppt/notesSlides/notesSlide17.xml><?xml version="1.0" encoding="utf-8"?>
+<p:notes xmlns:a="http://schemas.openxmlformats.org/drawingml/2006/main" xmlns:r="http://schemas.openxmlformats.org/officeDocument/2006/relationships" xmlns:mc="http://schemas.openxmlformats.org/markup-compatibility/2006" xmlns:mv="urn:schemas-microsoft-com:mac:vml" xmlns:p="http://schemas.openxmlformats.org/presentationml/2006/main" xmlns:c="http://schemas.openxmlformats.org/drawingml/2006/chart" xmlns:dgm="http://schemas.openxmlformats.org/drawingml/2006/diagram" xmlns:o="urn:schemas-microsoft-com:office:office" xmlns:v="urn:schemas-microsoft-com:vml" xmlns:pvml="urn:schemas-microsoft-com:office:powerpoint" xmlns:com="http://schemas.openxmlformats.org/drawingml/2006/compatibility" xmlns:p14="http://schemas.microsoft.com/office/powerpoint/2010/main" showMasterPhAnim="0" showMasterSp="0">
+  <p:cSld>
+    <p:spTree>
+      <p:nvGrpSpPr>
+        <p:cNvPr id="200" name="Shape 200"/>
+        <p:cNvGrpSpPr/>
+        <p:nvPr/>
+      </p:nvGrpSpPr>
+      <p:grpSpPr>
+        <a:xfrm>
+          <a:off x="0" y="0"/>
+          <a:ext cx="0" cy="0"/>
+          <a:chOff x="0" y="0"/>
+          <a:chExt cx="0" cy="0"/>
+        </a:xfrm>
+      </p:grpSpPr>
+      <p:sp>
+        <p:nvSpPr>
+          <p:cNvPr id="201" name="Shape 201"/>
+          <p:cNvSpPr/>
+          <p:nvPr>
+            <p:ph idx="2" type="sldImg"/>
+          </p:nvPr>
+        </p:nvSpPr>
+        <p:spPr>
+          <a:xfrm>
+            <a:off x="381187" y="685800"/>
+            <a:ext cx="6096299" cy="3429000"/>
+          </a:xfrm>
+          <a:custGeom>
+            <a:pathLst>
+              <a:path extrusionOk="0" h="120000" w="120000">
+                <a:moveTo>
+                  <a:pt x="0" y="0"/>
+                </a:moveTo>
+                <a:lnTo>
+                  <a:pt x="120000" y="0"/>
+                </a:lnTo>
+                <a:lnTo>
+                  <a:pt x="120000" y="120000"/>
+                </a:lnTo>
+                <a:lnTo>
+                  <a:pt x="0" y="120000"/>
+                </a:lnTo>
+                <a:close/>
+              </a:path>
+            </a:pathLst>
+          </a:custGeom>
+          <a:noFill/>
+          <a:ln cap="flat" w="9525">
+            <a:solidFill>
+              <a:srgbClr val="000000"/>
+            </a:solidFill>
+            <a:prstDash val="solid"/>
+            <a:round/>
+            <a:headEnd len="med" w="med" type="none"/>
+            <a:tailEnd len="med" w="med" type="none"/>
+          </a:ln>
+        </p:spPr>
+      </p:sp>
+      <p:sp>
+        <p:nvSpPr>
+          <p:cNvPr id="202" name="Shape 202"/>
+          <p:cNvSpPr txBox="1"/>
+          <p:nvPr>
+            <p:ph idx="1" type="body"/>
+          </p:nvPr>
+        </p:nvSpPr>
+        <p:spPr>
+          <a:xfrm>
+            <a:off x="685800" y="4343400"/>
+            <a:ext cx="5486399" cy="4114800"/>
+          </a:xfrm>
+          <a:prstGeom prst="rect">
+            <a:avLst/>
+          </a:prstGeom>
+        </p:spPr>
+        <p:txBody>
+          <a:bodyPr anchorCtr="0" anchor="t" bIns="91425" lIns="91425" rIns="91425" tIns="91425">
+            <a:noAutofit/>
+          </a:bodyPr>
+          <a:lstStyle/>
+          <a:p>
+            <a:pPr>
+              <a:spcBef>
+                <a:spcPts val="0"/>
+              </a:spcBef>
+              <a:buNone/>
+            </a:pPr>
+            <a:r>
+              <a:t/>
+            </a:r>
+            <a:endParaRPr/>
+          </a:p>
+        </p:txBody>
+      </p:sp>
+    </p:spTree>
+  </p:cSld>
+  <p:clrMapOvr>
+    <a:masterClrMapping/>
+  </p:clrMapOvr>
+</p:notes>
+</file>
+
+<file path=ppt/notesSlides/notesSlide18.xml><?xml version="1.0" encoding="utf-8"?>
+<p:notes xmlns:a="http://schemas.openxmlformats.org/drawingml/2006/main" xmlns:r="http://schemas.openxmlformats.org/officeDocument/2006/relationships" xmlns:mc="http://schemas.openxmlformats.org/markup-compatibility/2006" xmlns:mv="urn:schemas-microsoft-com:mac:vml" xmlns:p="http://schemas.openxmlformats.org/presentationml/2006/main" xmlns:c="http://schemas.openxmlformats.org/drawingml/2006/chart" xmlns:dgm="http://schemas.openxmlformats.org/drawingml/2006/diagram" xmlns:o="urn:schemas-microsoft-com:office:office" xmlns:v="urn:schemas-microsoft-com:vml" xmlns:pvml="urn:schemas-microsoft-com:office:powerpoint" xmlns:com="http://schemas.openxmlformats.org/drawingml/2006/compatibility" xmlns:p14="http://schemas.microsoft.com/office/powerpoint/2010/main" showMasterPhAnim="0" showMasterSp="0">
+  <p:cSld>
+    <p:spTree>
+      <p:nvGrpSpPr>
+        <p:cNvPr id="206" name="Shape 206"/>
+        <p:cNvGrpSpPr/>
+        <p:nvPr/>
+      </p:nvGrpSpPr>
+      <p:grpSpPr>
+        <a:xfrm>
+          <a:off x="0" y="0"/>
+          <a:ext cx="0" cy="0"/>
+          <a:chOff x="0" y="0"/>
+          <a:chExt cx="0" cy="0"/>
+        </a:xfrm>
+      </p:grpSpPr>
+      <p:sp>
+        <p:nvSpPr>
+          <p:cNvPr id="207" name="Shape 207"/>
+          <p:cNvSpPr/>
+          <p:nvPr>
+            <p:ph idx="2" type="sldImg"/>
+          </p:nvPr>
+        </p:nvSpPr>
+        <p:spPr>
+          <a:xfrm>
+            <a:off x="381187" y="685800"/>
+            <a:ext cx="6096299" cy="3429000"/>
+          </a:xfrm>
+          <a:custGeom>
+            <a:pathLst>
+              <a:path extrusionOk="0" h="120000" w="120000">
+                <a:moveTo>
+                  <a:pt x="0" y="0"/>
+                </a:moveTo>
+                <a:lnTo>
+                  <a:pt x="120000" y="0"/>
+                </a:lnTo>
+                <a:lnTo>
+                  <a:pt x="120000" y="120000"/>
+                </a:lnTo>
+                <a:lnTo>
+                  <a:pt x="0" y="120000"/>
+                </a:lnTo>
+                <a:close/>
+              </a:path>
+            </a:pathLst>
+          </a:custGeom>
+          <a:noFill/>
+          <a:ln cap="flat" w="9525">
+            <a:solidFill>
+              <a:srgbClr val="000000"/>
+            </a:solidFill>
+            <a:prstDash val="solid"/>
+            <a:round/>
+            <a:headEnd len="med" w="med" type="none"/>
+            <a:tailEnd len="med" w="med" type="none"/>
+          </a:ln>
+        </p:spPr>
+      </p:sp>
+      <p:sp>
+        <p:nvSpPr>
+          <p:cNvPr id="208" name="Shape 208"/>
           <p:cNvSpPr txBox="1"/>
           <p:nvPr>
             <p:ph idx="1" type="body"/>
@@ -31113,6 +31325,57 @@
           </a:bodyPr>
           <a:lstStyle/>
           <a:p>
+            <a:pPr indent="-419100" lvl="0" marL="457200" rtl="0">
+              <a:spcBef>
+                <a:spcPts val="0"/>
+              </a:spcBef>
+              <a:buClr>
+                <a:schemeClr val="dk2"/>
+              </a:buClr>
+              <a:buSzPct val="100000"/>
+              <a:buFont typeface="Arial"/>
+              <a:buChar char="●"/>
+            </a:pPr>
+            <a:r>
+              <a:rPr lang="nl"/>
+              <a:t>Gamification</a:t>
+            </a:r>
+          </a:p>
+          <a:p>
+            <a:pPr indent="-419100" lvl="0" marL="457200" rtl="0">
+              <a:spcBef>
+                <a:spcPts val="0"/>
+              </a:spcBef>
+              <a:buClr>
+                <a:schemeClr val="dk2"/>
+              </a:buClr>
+              <a:buSzPct val="100000"/>
+              <a:buFont typeface="Arial"/>
+              <a:buChar char="●"/>
+            </a:pPr>
+            <a:r>
+              <a:rPr lang="nl"/>
+              <a:t>Automatic message</a:t>
+            </a:r>
+          </a:p>
+          <a:p>
+            <a:pPr indent="-419100" lvl="0" marL="457200" rtl="0">
+              <a:spcBef>
+                <a:spcPts val="0"/>
+              </a:spcBef>
+              <a:buClr>
+                <a:schemeClr val="dk2"/>
+              </a:buClr>
+              <a:buSzPct val="100000"/>
+              <a:buFont typeface="Arial"/>
+              <a:buChar char="●"/>
+            </a:pPr>
+            <a:r>
+              <a:rPr lang="nl"/>
+              <a:t>Deepsky and comets</a:t>
+            </a:r>
+          </a:p>
+          <a:p>
             <a:pPr indent="-419100" lvl="0" marL="457200">
               <a:spcBef>
                 <a:spcPts val="0"/>
@@ -31126,7 +31389,7 @@
             </a:pPr>
             <a:r>
               <a:rPr lang="nl"/>
-              <a:t>Gamification</a:t>
+              <a:t>Descriptions and drawings</a:t>
             </a:r>
           </a:p>
         </p:txBody>
@@ -31159,9 +31422,121 @@
           <a:chExt cx="0" cy="0"/>
         </a:xfrm>
       </p:grpSpPr>
+      <p:pic>
+        <p:nvPicPr>
+          <p:cNvPr id="170" name="Shape 170"/>
+          <p:cNvPicPr preferRelativeResize="0"/>
+          <p:nvPr/>
+        </p:nvPicPr>
+        <p:blipFill>
+          <a:blip r:embed="rId3">
+            <a:alphaModFix/>
+          </a:blip>
+          <a:stretch>
+            <a:fillRect/>
+          </a:stretch>
+        </p:blipFill>
+        <p:spPr>
+          <a:xfrm>
+            <a:off x="0" y="0"/>
+            <a:ext cx="9144000" cy="5143500"/>
+          </a:xfrm>
+          <a:prstGeom prst="rect">
+            <a:avLst/>
+          </a:prstGeom>
+          <a:noFill/>
+          <a:ln>
+            <a:noFill/>
+          </a:ln>
+        </p:spPr>
+      </p:pic>
+    </p:spTree>
+  </p:cSld>
+  <p:clrMapOvr>
+    <a:masterClrMapping/>
+  </p:clrMapOvr>
+  <p:transition spd="slow">
+    <p:cut/>
+  </p:transition>
+</p:sld>
+</file>
+
+<file path=ppt/slides/slide13.xml><?xml version="1.0" encoding="utf-8"?>
+<p:sld xmlns:a="http://schemas.openxmlformats.org/drawingml/2006/main" xmlns:r="http://schemas.openxmlformats.org/officeDocument/2006/relationships" xmlns:mc="http://schemas.openxmlformats.org/markup-compatibility/2006" xmlns:mv="urn:schemas-microsoft-com:mac:vml" xmlns:p="http://schemas.openxmlformats.org/presentationml/2006/main" xmlns:c="http://schemas.openxmlformats.org/drawingml/2006/chart" xmlns:dgm="http://schemas.openxmlformats.org/drawingml/2006/diagram" xmlns:o="urn:schemas-microsoft-com:office:office" xmlns:v="urn:schemas-microsoft-com:vml" xmlns:pvml="urn:schemas-microsoft-com:office:powerpoint" xmlns:com="http://schemas.openxmlformats.org/drawingml/2006/compatibility" xmlns:p14="http://schemas.microsoft.com/office/powerpoint/2010/main">
+  <p:cSld>
+    <p:spTree>
+      <p:nvGrpSpPr>
+        <p:cNvPr id="174" name="Shape 174"/>
+        <p:cNvGrpSpPr/>
+        <p:nvPr/>
+      </p:nvGrpSpPr>
+      <p:grpSpPr>
+        <a:xfrm>
+          <a:off x="0" y="0"/>
+          <a:ext cx="0" cy="0"/>
+          <a:chOff x="0" y="0"/>
+          <a:chExt cx="0" cy="0"/>
+        </a:xfrm>
+      </p:grpSpPr>
+      <p:pic>
+        <p:nvPicPr>
+          <p:cNvPr id="175" name="Shape 175"/>
+          <p:cNvPicPr preferRelativeResize="0"/>
+          <p:nvPr/>
+        </p:nvPicPr>
+        <p:blipFill>
+          <a:blip r:embed="rId3">
+            <a:alphaModFix/>
+          </a:blip>
+          <a:stretch>
+            <a:fillRect/>
+          </a:stretch>
+        </p:blipFill>
+        <p:spPr>
+          <a:xfrm>
+            <a:off x="0" y="0"/>
+            <a:ext cx="9144000" cy="5143500"/>
+          </a:xfrm>
+          <a:prstGeom prst="rect">
+            <a:avLst/>
+          </a:prstGeom>
+          <a:noFill/>
+          <a:ln>
+            <a:noFill/>
+          </a:ln>
+        </p:spPr>
+      </p:pic>
+    </p:spTree>
+  </p:cSld>
+  <p:clrMapOvr>
+    <a:masterClrMapping/>
+  </p:clrMapOvr>
+  <p:transition spd="slow">
+    <p:cut/>
+  </p:transition>
+</p:sld>
+</file>
+
+<file path=ppt/slides/slide14.xml><?xml version="1.0" encoding="utf-8"?>
+<p:sld xmlns:a="http://schemas.openxmlformats.org/drawingml/2006/main" xmlns:r="http://schemas.openxmlformats.org/officeDocument/2006/relationships" xmlns:mc="http://schemas.openxmlformats.org/markup-compatibility/2006" xmlns:mv="urn:schemas-microsoft-com:mac:vml" xmlns:p="http://schemas.openxmlformats.org/presentationml/2006/main" xmlns:c="http://schemas.openxmlformats.org/drawingml/2006/chart" xmlns:dgm="http://schemas.openxmlformats.org/drawingml/2006/diagram" xmlns:o="urn:schemas-microsoft-com:office:office" xmlns:v="urn:schemas-microsoft-com:vml" xmlns:pvml="urn:schemas-microsoft-com:office:powerpoint" xmlns:com="http://schemas.openxmlformats.org/drawingml/2006/compatibility" xmlns:p14="http://schemas.microsoft.com/office/powerpoint/2010/main">
+  <p:cSld>
+    <p:spTree>
+      <p:nvGrpSpPr>
+        <p:cNvPr id="179" name="Shape 179"/>
+        <p:cNvGrpSpPr/>
+        <p:nvPr/>
+      </p:nvGrpSpPr>
+      <p:grpSpPr>
+        <a:xfrm>
+          <a:off x="0" y="0"/>
+          <a:ext cx="0" cy="0"/>
+          <a:chOff x="0" y="0"/>
+          <a:chExt cx="0" cy="0"/>
+        </a:xfrm>
+      </p:grpSpPr>
       <p:sp>
         <p:nvSpPr>
-          <p:cNvPr id="170" name="Shape 170"/>
+          <p:cNvPr id="180" name="Shape 180"/>
           <p:cNvSpPr txBox="1"/>
           <p:nvPr>
             <p:ph type="title"/>
@@ -31197,7 +31572,7 @@
       </p:sp>
       <p:sp>
         <p:nvSpPr>
-          <p:cNvPr id="171" name="Shape 171"/>
+          <p:cNvPr id="181" name="Shape 181"/>
           <p:cNvSpPr txBox="1"/>
           <p:nvPr>
             <p:ph idx="1" type="body"/>
@@ -31226,7 +31601,7 @@
             </a:pPr>
             <a:r>
               <a:rPr lang="nl"/>
-              <a:t>Send message to real emailaddress</a:t>
+              <a:t>Send message to real email address</a:t>
             </a:r>
           </a:p>
         </p:txBody>
@@ -31242,12 +31617,12 @@
 </p:sld>
 </file>
 
-<file path=ppt/slides/slide13.xml><?xml version="1.0" encoding="utf-8"?>
+<file path=ppt/slides/slide15.xml><?xml version="1.0" encoding="utf-8"?>
 <p:sld xmlns:a="http://schemas.openxmlformats.org/drawingml/2006/main" xmlns:r="http://schemas.openxmlformats.org/officeDocument/2006/relationships" xmlns:mc="http://schemas.openxmlformats.org/markup-compatibility/2006" xmlns:mv="urn:schemas-microsoft-com:mac:vml" xmlns:p="http://schemas.openxmlformats.org/presentationml/2006/main" xmlns:c="http://schemas.openxmlformats.org/drawingml/2006/chart" xmlns:dgm="http://schemas.openxmlformats.org/drawingml/2006/diagram" xmlns:o="urn:schemas-microsoft-com:office:office" xmlns:v="urn:schemas-microsoft-com:vml" xmlns:pvml="urn:schemas-microsoft-com:office:powerpoint" xmlns:com="http://schemas.openxmlformats.org/drawingml/2006/compatibility" xmlns:p14="http://schemas.microsoft.com/office/powerpoint/2010/main">
   <p:cSld>
     <p:spTree>
       <p:nvGrpSpPr>
-        <p:cNvPr id="175" name="Shape 175"/>
+        <p:cNvPr id="185" name="Shape 185"/>
         <p:cNvGrpSpPr/>
         <p:nvPr/>
       </p:nvGrpSpPr>
@@ -31261,7 +31636,7 @@
       </p:grpSpPr>
       <p:sp>
         <p:nvSpPr>
-          <p:cNvPr id="176" name="Shape 176"/>
+          <p:cNvPr id="186" name="Shape 186"/>
           <p:cNvSpPr txBox="1"/>
           <p:nvPr>
             <p:ph type="title"/>
@@ -31297,7 +31672,7 @@
       </p:sp>
       <p:sp>
         <p:nvSpPr>
-          <p:cNvPr id="177" name="Shape 177"/>
+          <p:cNvPr id="187" name="Shape 187"/>
           <p:cNvSpPr txBox="1"/>
           <p:nvPr>
             <p:ph idx="1" type="body"/>
@@ -31342,12 +31717,12 @@
 </p:sld>
 </file>
 
-<file path=ppt/slides/slide14.xml><?xml version="1.0" encoding="utf-8"?>
+<file path=ppt/slides/slide16.xml><?xml version="1.0" encoding="utf-8"?>
 <p:sld xmlns:a="http://schemas.openxmlformats.org/drawingml/2006/main" xmlns:r="http://schemas.openxmlformats.org/officeDocument/2006/relationships" xmlns:mc="http://schemas.openxmlformats.org/markup-compatibility/2006" xmlns:mv="urn:schemas-microsoft-com:mac:vml" xmlns:p="http://schemas.openxmlformats.org/presentationml/2006/main" xmlns:c="http://schemas.openxmlformats.org/drawingml/2006/chart" xmlns:dgm="http://schemas.openxmlformats.org/drawingml/2006/diagram" xmlns:o="urn:schemas-microsoft-com:office:office" xmlns:v="urn:schemas-microsoft-com:vml" xmlns:pvml="urn:schemas-microsoft-com:office:powerpoint" xmlns:com="http://schemas.openxmlformats.org/drawingml/2006/compatibility" xmlns:p14="http://schemas.microsoft.com/office/powerpoint/2010/main">
   <p:cSld>
     <p:spTree>
       <p:nvGrpSpPr>
-        <p:cNvPr id="181" name="Shape 181"/>
+        <p:cNvPr id="191" name="Shape 191"/>
         <p:cNvGrpSpPr/>
         <p:nvPr/>
       </p:nvGrpSpPr>
@@ -31361,7 +31736,7 @@
       </p:grpSpPr>
       <p:sp>
         <p:nvSpPr>
-          <p:cNvPr id="182" name="Shape 182"/>
+          <p:cNvPr id="192" name="Shape 192"/>
           <p:cNvSpPr txBox="1"/>
           <p:nvPr>
             <p:ph type="title"/>
@@ -31397,7 +31772,7 @@
       </p:sp>
       <p:sp>
         <p:nvSpPr>
-          <p:cNvPr id="183" name="Shape 183"/>
+          <p:cNvPr id="193" name="Shape 193"/>
           <p:cNvSpPr txBox="1"/>
           <p:nvPr>
             <p:ph idx="1" type="body"/>
@@ -31442,12 +31817,12 @@
 </p:sld>
 </file>
 
-<file path=ppt/slides/slide15.xml><?xml version="1.0" encoding="utf-8"?>
+<file path=ppt/slides/slide17.xml><?xml version="1.0" encoding="utf-8"?>
 <p:sld xmlns:a="http://schemas.openxmlformats.org/drawingml/2006/main" xmlns:r="http://schemas.openxmlformats.org/officeDocument/2006/relationships" xmlns:mc="http://schemas.openxmlformats.org/markup-compatibility/2006" xmlns:mv="urn:schemas-microsoft-com:mac:vml" xmlns:p="http://schemas.openxmlformats.org/presentationml/2006/main" xmlns:c="http://schemas.openxmlformats.org/drawingml/2006/chart" xmlns:dgm="http://schemas.openxmlformats.org/drawingml/2006/diagram" xmlns:o="urn:schemas-microsoft-com:office:office" xmlns:v="urn:schemas-microsoft-com:vml" xmlns:pvml="urn:schemas-microsoft-com:office:powerpoint" xmlns:com="http://schemas.openxmlformats.org/drawingml/2006/compatibility" xmlns:p14="http://schemas.microsoft.com/office/powerpoint/2010/main">
   <p:cSld>
     <p:spTree>
       <p:nvGrpSpPr>
-        <p:cNvPr id="187" name="Shape 187"/>
+        <p:cNvPr id="197" name="Shape 197"/>
         <p:cNvGrpSpPr/>
         <p:nvPr/>
       </p:nvGrpSpPr>
@@ -31461,7 +31836,7 @@
       </p:grpSpPr>
       <p:sp>
         <p:nvSpPr>
-          <p:cNvPr id="188" name="Shape 188"/>
+          <p:cNvPr id="198" name="Shape 198"/>
           <p:cNvSpPr txBox="1"/>
           <p:nvPr>
             <p:ph type="title"/>
@@ -31497,7 +31872,7 @@
       </p:sp>
       <p:sp>
         <p:nvSpPr>
-          <p:cNvPr id="189" name="Shape 189"/>
+          <p:cNvPr id="199" name="Shape 199"/>
           <p:cNvSpPr txBox="1"/>
           <p:nvPr>
             <p:ph idx="1" type="body"/>
@@ -31542,12 +31917,12 @@
 </p:sld>
 </file>
 
-<file path=ppt/slides/slide16.xml><?xml version="1.0" encoding="utf-8"?>
+<file path=ppt/slides/slide18.xml><?xml version="1.0" encoding="utf-8"?>
 <p:sld xmlns:a="http://schemas.openxmlformats.org/drawingml/2006/main" xmlns:r="http://schemas.openxmlformats.org/officeDocument/2006/relationships" xmlns:mc="http://schemas.openxmlformats.org/markup-compatibility/2006" xmlns:mv="urn:schemas-microsoft-com:mac:vml" xmlns:p="http://schemas.openxmlformats.org/presentationml/2006/main" xmlns:c="http://schemas.openxmlformats.org/drawingml/2006/chart" xmlns:dgm="http://schemas.openxmlformats.org/drawingml/2006/diagram" xmlns:o="urn:schemas-microsoft-com:office:office" xmlns:v="urn:schemas-microsoft-com:vml" xmlns:pvml="urn:schemas-microsoft-com:office:powerpoint" xmlns:com="http://schemas.openxmlformats.org/drawingml/2006/compatibility" xmlns:p14="http://schemas.microsoft.com/office/powerpoint/2010/main">
   <p:cSld>
     <p:spTree>
       <p:nvGrpSpPr>
-        <p:cNvPr id="193" name="Shape 193"/>
+        <p:cNvPr id="203" name="Shape 203"/>
         <p:cNvGrpSpPr/>
         <p:nvPr/>
       </p:nvGrpSpPr>
@@ -31561,7 +31936,7 @@
       </p:grpSpPr>
       <p:sp>
         <p:nvSpPr>
-          <p:cNvPr id="194" name="Shape 194"/>
+          <p:cNvPr id="204" name="Shape 204"/>
           <p:cNvSpPr txBox="1"/>
           <p:nvPr>
             <p:ph type="title"/>
@@ -31597,7 +31972,7 @@
       </p:sp>
       <p:sp>
         <p:nvSpPr>
-          <p:cNvPr id="195" name="Shape 195"/>
+          <p:cNvPr id="205" name="Shape 205"/>
           <p:cNvSpPr txBox="1"/>
           <p:nvPr>
             <p:ph idx="1" type="body"/>
@@ -32550,283 +32925,6 @@
 </file>
 
 <file path=ppt/theme/theme2.xml><?xml version="1.0" encoding="utf-8"?>
-<a:theme xmlns:a="http://schemas.openxmlformats.org/drawingml/2006/main" xmlns:r="http://schemas.openxmlformats.org/officeDocument/2006/relationships" name="sketched">
-  <a:themeElements>
-    <a:clrScheme name="Custom 398">
-      <a:dk1>
-        <a:srgbClr val="000000"/>
-      </a:dk1>
-      <a:lt1>
-        <a:srgbClr val="FFFFFF"/>
-      </a:lt1>
-      <a:dk2>
-        <a:srgbClr val="51535D"/>
-      </a:dk2>
-      <a:lt2>
-        <a:srgbClr val="EDEDED"/>
-      </a:lt2>
-      <a:accent1>
-        <a:srgbClr val="676871"/>
-      </a:accent1>
-      <a:accent2>
-        <a:srgbClr val="988489"/>
-      </a:accent2>
-      <a:accent3>
-        <a:srgbClr val="6B7B67"/>
-      </a:accent3>
-      <a:accent4>
-        <a:srgbClr val="747B85"/>
-      </a:accent4>
-      <a:accent5>
-        <a:srgbClr val="A5A9AF"/>
-      </a:accent5>
-      <a:accent6>
-        <a:srgbClr val="85716D"/>
-      </a:accent6>
-      <a:hlink>
-        <a:srgbClr val="676871"/>
-      </a:hlink>
-      <a:folHlink>
-        <a:srgbClr val="3F414A"/>
-      </a:folHlink>
-    </a:clrScheme>
-    <a:fontScheme name="Office">
-      <a:majorFont>
-        <a:latin typeface="Arial"/>
-        <a:ea typeface=""/>
-        <a:cs typeface=""/>
-        <a:font script="Jpan" typeface="ＭＳ Ｐゴシック"/>
-        <a:font script="Hang" typeface="맑은 고딕"/>
-        <a:font script="Hans" typeface="宋体"/>
-        <a:font script="Hant" typeface="新細明體"/>
-        <a:font script="Arab" typeface="Times New Roman"/>
-        <a:font script="Hebr" typeface="Times New Roman"/>
-        <a:font script="Thai" typeface="Angsana New"/>
-        <a:font script="Ethi" typeface="Nyala"/>
-        <a:font script="Beng" typeface="Vrinda"/>
-        <a:font script="Gujr" typeface="Shruti"/>
-        <a:font script="Khmr" typeface="MoolBoran"/>
-        <a:font script="Knda" typeface="Tunga"/>
-        <a:font script="Guru" typeface="Raavi"/>
-        <a:font script="Cans" typeface="Euphemia"/>
-        <a:font script="Cher" typeface="Plantagenet Cherokee"/>
-        <a:font script="Yiii" typeface="Microsoft Yi Baiti"/>
-        <a:font script="Tibt" typeface="Microsoft Himalaya"/>
-        <a:font script="Thaa" typeface="MV Boli"/>
-        <a:font script="Deva" typeface="Mangal"/>
-        <a:font script="Telu" typeface="Gautami"/>
-        <a:font script="Taml" typeface="Latha"/>
-        <a:font script="Syrc" typeface="Estrangelo Edessa"/>
-        <a:font script="Orya" typeface="Kalinga"/>
-        <a:font script="Mlym" typeface="Kartika"/>
-        <a:font script="Laoo" typeface="DokChampa"/>
-        <a:font script="Sinh" typeface="Iskoola Pota"/>
-        <a:font script="Mong" typeface="Mongolian Baiti"/>
-        <a:font script="Viet" typeface="Times New Roman"/>
-        <a:font script="Uigh" typeface="Microsoft Uighur"/>
-      </a:majorFont>
-      <a:minorFont>
-        <a:latin typeface="Arial"/>
-        <a:ea typeface=""/>
-        <a:cs typeface=""/>
-        <a:font script="Jpan" typeface="ＭＳ Ｐゴシック"/>
-        <a:font script="Hang" typeface="맑은 고딕"/>
-        <a:font script="Hans" typeface="宋体"/>
-        <a:font script="Hant" typeface="新細明體"/>
-        <a:font script="Arab" typeface="Times New Roman"/>
-        <a:font script="Hebr" typeface="Times New Roman"/>
-        <a:font script="Thai" typeface="Angsana New"/>
-        <a:font script="Ethi" typeface="Nyala"/>
-        <a:font script="Beng" typeface="Vrinda"/>
-        <a:font script="Gujr" typeface="Shruti"/>
-        <a:font script="Khmr" typeface="MoolBoran"/>
-        <a:font script="Knda" typeface="Tunga"/>
-        <a:font script="Guru" typeface="Raavi"/>
-        <a:font script="Cans" typeface="Euphemia"/>
-        <a:font script="Cher" typeface="Plantagenet Cherokee"/>
-        <a:font script="Yiii" typeface="Microsoft Yi Baiti"/>
-        <a:font script="Tibt" typeface="Microsoft Himalaya"/>
-        <a:font script="Thaa" typeface="MV Boli"/>
-        <a:font script="Deva" typeface="Mangal"/>
-        <a:font script="Telu" typeface="Gautami"/>
-        <a:font script="Taml" typeface="Latha"/>
-        <a:font script="Syrc" typeface="Estrangelo Edessa"/>
-        <a:font script="Orya" typeface="Kalinga"/>
-        <a:font script="Mlym" typeface="Kartika"/>
-        <a:font script="Laoo" typeface="DokChampa"/>
-        <a:font script="Sinh" typeface="Iskoola Pota"/>
-        <a:font script="Mong" typeface="Mongolian Baiti"/>
-        <a:font script="Viet" typeface="Times New Roman"/>
-        <a:font script="Uigh" typeface="Microsoft Uighur"/>
-      </a:minorFont>
-    </a:fontScheme>
-    <a:fmtScheme name="Office">
-      <a:fillStyleLst>
-        <a:solidFill>
-          <a:schemeClr val="phClr"/>
-        </a:solidFill>
-        <a:gradFill rotWithShape="1">
-          <a:gsLst>
-            <a:gs pos="0">
-              <a:schemeClr val="phClr">
-                <a:tint val="50000"/>
-                <a:satMod val="300000"/>
-              </a:schemeClr>
-            </a:gs>
-            <a:gs pos="35000">
-              <a:schemeClr val="phClr">
-                <a:tint val="37000"/>
-                <a:satMod val="300000"/>
-              </a:schemeClr>
-            </a:gs>
-            <a:gs pos="100000">
-              <a:schemeClr val="phClr">
-                <a:tint val="15000"/>
-                <a:satMod val="350000"/>
-              </a:schemeClr>
-            </a:gs>
-          </a:gsLst>
-          <a:lin ang="16200000" scaled="1"/>
-        </a:gradFill>
-        <a:gradFill rotWithShape="1">
-          <a:gsLst>
-            <a:gs pos="0">
-              <a:schemeClr val="phClr">
-                <a:tint val="100000"/>
-                <a:shade val="100000"/>
-                <a:satMod val="130000"/>
-              </a:schemeClr>
-            </a:gs>
-            <a:gs pos="100000">
-              <a:schemeClr val="phClr">
-                <a:tint val="50000"/>
-                <a:shade val="100000"/>
-                <a:satMod val="350000"/>
-              </a:schemeClr>
-            </a:gs>
-          </a:gsLst>
-          <a:lin ang="16200000" scaled="0"/>
-        </a:gradFill>
-      </a:fillStyleLst>
-      <a:lnStyleLst>
-        <a:ln cap="flat" cmpd="sng" w="9525" algn="ctr">
-          <a:solidFill>
-            <a:schemeClr val="phClr">
-              <a:shade val="95000"/>
-              <a:satMod val="105000"/>
-            </a:schemeClr>
-          </a:solidFill>
-          <a:prstDash val="solid"/>
-        </a:ln>
-        <a:ln cap="flat" cmpd="sng" w="25400" algn="ctr">
-          <a:solidFill>
-            <a:schemeClr val="phClr"/>
-          </a:solidFill>
-          <a:prstDash val="solid"/>
-        </a:ln>
-        <a:ln cap="flat" cmpd="sng" w="38100" algn="ctr">
-          <a:solidFill>
-            <a:schemeClr val="phClr"/>
-          </a:solidFill>
-          <a:prstDash val="solid"/>
-        </a:ln>
-      </a:lnStyleLst>
-      <a:effectStyleLst>
-        <a:effectStyle>
-          <a:effectLst>
-            <a:outerShdw blurRad="40000" rotWithShape="0" dir="5400000" dist="20000">
-              <a:srgbClr val="000000">
-                <a:alpha val="38000"/>
-              </a:srgbClr>
-            </a:outerShdw>
-          </a:effectLst>
-        </a:effectStyle>
-        <a:effectStyle>
-          <a:effectLst>
-            <a:outerShdw blurRad="40000" rotWithShape="0" dir="5400000" dist="23000">
-              <a:srgbClr val="000000">
-                <a:alpha val="35000"/>
-              </a:srgbClr>
-            </a:outerShdw>
-          </a:effectLst>
-        </a:effectStyle>
-        <a:effectStyle>
-          <a:effectLst>
-            <a:outerShdw blurRad="40000" rotWithShape="0" dir="5400000" dist="23000">
-              <a:srgbClr val="000000">
-                <a:alpha val="35000"/>
-              </a:srgbClr>
-            </a:outerShdw>
-          </a:effectLst>
-          <a:scene3d>
-            <a:camera prst="orthographicFront">
-              <a:rot lat="0" lon="0" rev="0"/>
-            </a:camera>
-            <a:lightRig dir="t" rig="threePt">
-              <a:rot lat="0" lon="0" rev="1200000"/>
-            </a:lightRig>
-          </a:scene3d>
-          <a:sp3d>
-            <a:bevelT h="25400" w="63500"/>
-          </a:sp3d>
-        </a:effectStyle>
-      </a:effectStyleLst>
-      <a:bgFillStyleLst>
-        <a:solidFill>
-          <a:schemeClr val="phClr"/>
-        </a:solidFill>
-        <a:gradFill rotWithShape="1">
-          <a:gsLst>
-            <a:gs pos="0">
-              <a:schemeClr val="phClr">
-                <a:tint val="40000"/>
-                <a:satMod val="350000"/>
-              </a:schemeClr>
-            </a:gs>
-            <a:gs pos="40000">
-              <a:schemeClr val="phClr">
-                <a:tint val="45000"/>
-                <a:shade val="99000"/>
-                <a:satMod val="350000"/>
-              </a:schemeClr>
-            </a:gs>
-            <a:gs pos="100000">
-              <a:schemeClr val="phClr">
-                <a:shade val="20000"/>
-                <a:satMod val="255000"/>
-              </a:schemeClr>
-            </a:gs>
-          </a:gsLst>
-          <a:path path="circle">
-            <a:fillToRect b="180000" l="50000" r="50000" t="-80000"/>
-          </a:path>
-        </a:gradFill>
-        <a:gradFill rotWithShape="1">
-          <a:gsLst>
-            <a:gs pos="0">
-              <a:schemeClr val="phClr">
-                <a:tint val="80000"/>
-                <a:satMod val="300000"/>
-              </a:schemeClr>
-            </a:gs>
-            <a:gs pos="100000">
-              <a:schemeClr val="phClr">
-                <a:shade val="30000"/>
-                <a:satMod val="200000"/>
-              </a:schemeClr>
-            </a:gs>
-          </a:gsLst>
-          <a:path path="circle">
-            <a:fillToRect b="50000" l="50000" r="50000" t="50000"/>
-          </a:path>
-        </a:gradFill>
-      </a:bgFillStyleLst>
-    </a:fmtScheme>
-  </a:themeElements>
-</a:theme>
-</file>
-
-<file path=ppt/theme/theme3.xml><?xml version="1.0" encoding="utf-8"?>
 <a:theme xmlns:a="http://schemas.openxmlformats.org/drawingml/2006/main" xmlns:r="http://schemas.openxmlformats.org/officeDocument/2006/relationships" name="Office Theme">
   <a:themeElements>
     <a:clrScheme name="Office">
@@ -33141,4 +33239,281 @@
     </a:lnDef>
   </a:objectDefaults>
 </a:theme>
+</file>
+
+<file path=ppt/theme/theme3.xml><?xml version="1.0" encoding="utf-8"?>
+<a:theme xmlns:a="http://schemas.openxmlformats.org/drawingml/2006/main" xmlns:r="http://schemas.openxmlformats.org/officeDocument/2006/relationships" name="sketched">
+  <a:themeElements>
+    <a:clrScheme name="Custom 398">
+      <a:dk1>
+        <a:srgbClr val="000000"/>
+      </a:dk1>
+      <a:lt1>
+        <a:srgbClr val="FFFFFF"/>
+      </a:lt1>
+      <a:dk2>
+        <a:srgbClr val="51535D"/>
+      </a:dk2>
+      <a:lt2>
+        <a:srgbClr val="EDEDED"/>
+      </a:lt2>
+      <a:accent1>
+        <a:srgbClr val="676871"/>
+      </a:accent1>
+      <a:accent2>
+        <a:srgbClr val="988489"/>
+      </a:accent2>
+      <a:accent3>
+        <a:srgbClr val="6B7B67"/>
+      </a:accent3>
+      <a:accent4>
+        <a:srgbClr val="747B85"/>
+      </a:accent4>
+      <a:accent5>
+        <a:srgbClr val="A5A9AF"/>
+      </a:accent5>
+      <a:accent6>
+        <a:srgbClr val="85716D"/>
+      </a:accent6>
+      <a:hlink>
+        <a:srgbClr val="676871"/>
+      </a:hlink>
+      <a:folHlink>
+        <a:srgbClr val="3F414A"/>
+      </a:folHlink>
+    </a:clrScheme>
+    <a:fontScheme name="Office">
+      <a:majorFont>
+        <a:latin typeface="Arial"/>
+        <a:ea typeface=""/>
+        <a:cs typeface=""/>
+        <a:font script="Jpan" typeface="ＭＳ Ｐゴシック"/>
+        <a:font script="Hang" typeface="맑은 고딕"/>
+        <a:font script="Hans" typeface="宋体"/>
+        <a:font script="Hant" typeface="新細明體"/>
+        <a:font script="Arab" typeface="Times New Roman"/>
+        <a:font script="Hebr" typeface="Times New Roman"/>
+        <a:font script="Thai" typeface="Angsana New"/>
+        <a:font script="Ethi" typeface="Nyala"/>
+        <a:font script="Beng" typeface="Vrinda"/>
+        <a:font script="Gujr" typeface="Shruti"/>
+        <a:font script="Khmr" typeface="MoolBoran"/>
+        <a:font script="Knda" typeface="Tunga"/>
+        <a:font script="Guru" typeface="Raavi"/>
+        <a:font script="Cans" typeface="Euphemia"/>
+        <a:font script="Cher" typeface="Plantagenet Cherokee"/>
+        <a:font script="Yiii" typeface="Microsoft Yi Baiti"/>
+        <a:font script="Tibt" typeface="Microsoft Himalaya"/>
+        <a:font script="Thaa" typeface="MV Boli"/>
+        <a:font script="Deva" typeface="Mangal"/>
+        <a:font script="Telu" typeface="Gautami"/>
+        <a:font script="Taml" typeface="Latha"/>
+        <a:font script="Syrc" typeface="Estrangelo Edessa"/>
+        <a:font script="Orya" typeface="Kalinga"/>
+        <a:font script="Mlym" typeface="Kartika"/>
+        <a:font script="Laoo" typeface="DokChampa"/>
+        <a:font script="Sinh" typeface="Iskoola Pota"/>
+        <a:font script="Mong" typeface="Mongolian Baiti"/>
+        <a:font script="Viet" typeface="Times New Roman"/>
+        <a:font script="Uigh" typeface="Microsoft Uighur"/>
+      </a:majorFont>
+      <a:minorFont>
+        <a:latin typeface="Arial"/>
+        <a:ea typeface=""/>
+        <a:cs typeface=""/>
+        <a:font script="Jpan" typeface="ＭＳ Ｐゴシック"/>
+        <a:font script="Hang" typeface="맑은 고딕"/>
+        <a:font script="Hans" typeface="宋体"/>
+        <a:font script="Hant" typeface="新細明體"/>
+        <a:font script="Arab" typeface="Times New Roman"/>
+        <a:font script="Hebr" typeface="Times New Roman"/>
+        <a:font script="Thai" typeface="Angsana New"/>
+        <a:font script="Ethi" typeface="Nyala"/>
+        <a:font script="Beng" typeface="Vrinda"/>
+        <a:font script="Gujr" typeface="Shruti"/>
+        <a:font script="Khmr" typeface="MoolBoran"/>
+        <a:font script="Knda" typeface="Tunga"/>
+        <a:font script="Guru" typeface="Raavi"/>
+        <a:font script="Cans" typeface="Euphemia"/>
+        <a:font script="Cher" typeface="Plantagenet Cherokee"/>
+        <a:font script="Yiii" typeface="Microsoft Yi Baiti"/>
+        <a:font script="Tibt" typeface="Microsoft Himalaya"/>
+        <a:font script="Thaa" typeface="MV Boli"/>
+        <a:font script="Deva" typeface="Mangal"/>
+        <a:font script="Telu" typeface="Gautami"/>
+        <a:font script="Taml" typeface="Latha"/>
+        <a:font script="Syrc" typeface="Estrangelo Edessa"/>
+        <a:font script="Orya" typeface="Kalinga"/>
+        <a:font script="Mlym" typeface="Kartika"/>
+        <a:font script="Laoo" typeface="DokChampa"/>
+        <a:font script="Sinh" typeface="Iskoola Pota"/>
+        <a:font script="Mong" typeface="Mongolian Baiti"/>
+        <a:font script="Viet" typeface="Times New Roman"/>
+        <a:font script="Uigh" typeface="Microsoft Uighur"/>
+      </a:minorFont>
+    </a:fontScheme>
+    <a:fmtScheme name="Office">
+      <a:fillStyleLst>
+        <a:solidFill>
+          <a:schemeClr val="phClr"/>
+        </a:solidFill>
+        <a:gradFill rotWithShape="1">
+          <a:gsLst>
+            <a:gs pos="0">
+              <a:schemeClr val="phClr">
+                <a:tint val="50000"/>
+                <a:satMod val="300000"/>
+              </a:schemeClr>
+            </a:gs>
+            <a:gs pos="35000">
+              <a:schemeClr val="phClr">
+                <a:tint val="37000"/>
+                <a:satMod val="300000"/>
+              </a:schemeClr>
+            </a:gs>
+            <a:gs pos="100000">
+              <a:schemeClr val="phClr">
+                <a:tint val="15000"/>
+                <a:satMod val="350000"/>
+              </a:schemeClr>
+            </a:gs>
+          </a:gsLst>
+          <a:lin ang="16200000" scaled="1"/>
+        </a:gradFill>
+        <a:gradFill rotWithShape="1">
+          <a:gsLst>
+            <a:gs pos="0">
+              <a:schemeClr val="phClr">
+                <a:tint val="100000"/>
+                <a:shade val="100000"/>
+                <a:satMod val="130000"/>
+              </a:schemeClr>
+            </a:gs>
+            <a:gs pos="100000">
+              <a:schemeClr val="phClr">
+                <a:tint val="50000"/>
+                <a:shade val="100000"/>
+                <a:satMod val="350000"/>
+              </a:schemeClr>
+            </a:gs>
+          </a:gsLst>
+          <a:lin ang="16200000" scaled="0"/>
+        </a:gradFill>
+      </a:fillStyleLst>
+      <a:lnStyleLst>
+        <a:ln cap="flat" cmpd="sng" w="9525" algn="ctr">
+          <a:solidFill>
+            <a:schemeClr val="phClr">
+              <a:shade val="95000"/>
+              <a:satMod val="105000"/>
+            </a:schemeClr>
+          </a:solidFill>
+          <a:prstDash val="solid"/>
+        </a:ln>
+        <a:ln cap="flat" cmpd="sng" w="25400" algn="ctr">
+          <a:solidFill>
+            <a:schemeClr val="phClr"/>
+          </a:solidFill>
+          <a:prstDash val="solid"/>
+        </a:ln>
+        <a:ln cap="flat" cmpd="sng" w="38100" algn="ctr">
+          <a:solidFill>
+            <a:schemeClr val="phClr"/>
+          </a:solidFill>
+          <a:prstDash val="solid"/>
+        </a:ln>
+      </a:lnStyleLst>
+      <a:effectStyleLst>
+        <a:effectStyle>
+          <a:effectLst>
+            <a:outerShdw blurRad="40000" rotWithShape="0" dir="5400000" dist="20000">
+              <a:srgbClr val="000000">
+                <a:alpha val="38000"/>
+              </a:srgbClr>
+            </a:outerShdw>
+          </a:effectLst>
+        </a:effectStyle>
+        <a:effectStyle>
+          <a:effectLst>
+            <a:outerShdw blurRad="40000" rotWithShape="0" dir="5400000" dist="23000">
+              <a:srgbClr val="000000">
+                <a:alpha val="35000"/>
+              </a:srgbClr>
+            </a:outerShdw>
+          </a:effectLst>
+        </a:effectStyle>
+        <a:effectStyle>
+          <a:effectLst>
+            <a:outerShdw blurRad="40000" rotWithShape="0" dir="5400000" dist="23000">
+              <a:srgbClr val="000000">
+                <a:alpha val="35000"/>
+              </a:srgbClr>
+            </a:outerShdw>
+          </a:effectLst>
+          <a:scene3d>
+            <a:camera prst="orthographicFront">
+              <a:rot lat="0" lon="0" rev="0"/>
+            </a:camera>
+            <a:lightRig dir="t" rig="threePt">
+              <a:rot lat="0" lon="0" rev="1200000"/>
+            </a:lightRig>
+          </a:scene3d>
+          <a:sp3d>
+            <a:bevelT h="25400" w="63500"/>
+          </a:sp3d>
+        </a:effectStyle>
+      </a:effectStyleLst>
+      <a:bgFillStyleLst>
+        <a:solidFill>
+          <a:schemeClr val="phClr"/>
+        </a:solidFill>
+        <a:gradFill rotWithShape="1">
+          <a:gsLst>
+            <a:gs pos="0">
+              <a:schemeClr val="phClr">
+                <a:tint val="40000"/>
+                <a:satMod val="350000"/>
+              </a:schemeClr>
+            </a:gs>
+            <a:gs pos="40000">
+              <a:schemeClr val="phClr">
+                <a:tint val="45000"/>
+                <a:shade val="99000"/>
+                <a:satMod val="350000"/>
+              </a:schemeClr>
+            </a:gs>
+            <a:gs pos="100000">
+              <a:schemeClr val="phClr">
+                <a:shade val="20000"/>
+                <a:satMod val="255000"/>
+              </a:schemeClr>
+            </a:gs>
+          </a:gsLst>
+          <a:path path="circle">
+            <a:fillToRect b="180000" l="50000" r="50000" t="-80000"/>
+          </a:path>
+        </a:gradFill>
+        <a:gradFill rotWithShape="1">
+          <a:gsLst>
+            <a:gs pos="0">
+              <a:schemeClr val="phClr">
+                <a:tint val="80000"/>
+                <a:satMod val="300000"/>
+              </a:schemeClr>
+            </a:gs>
+            <a:gs pos="100000">
+              <a:schemeClr val="phClr">
+                <a:shade val="30000"/>
+                <a:satMod val="200000"/>
+              </a:schemeClr>
+            </a:gs>
+          </a:gsLst>
+          <a:path path="circle">
+            <a:fillToRect b="50000" l="50000" r="50000" t="50000"/>
+          </a:path>
+        </a:gradFill>
+      </a:bgFillStyleLst>
+    </a:fmtScheme>
+  </a:themeElements>
+</a:theme>
 </file>
</xml_diff>

<commit_message>
Add section on using real mail address for messages.
</commit_message>
<xml_diff>
--- a/Meeting20150425/DeepskyLog 5.0.pptx
+++ b/Meeting20150425/DeepskyLog 5.0.pptx
@@ -26,6 +26,7 @@
     <p:sldId id="271" r:id="rId21"/>
     <p:sldId id="272" r:id="rId22"/>
     <p:sldId id="273" r:id="rId23"/>
+    <p:sldId id="274" r:id="rId24"/>
   </p:sldIdLst>
   <p:sldSz cy="5143500" cx="9144000"/>
   <p:notesSz cx="6858000" cy="9144000"/>
@@ -1027,7 +1028,7 @@
   <p:cSld>
     <p:spTree>
       <p:nvGrpSpPr>
-        <p:cNvPr id="188" name="Shape 188"/>
+        <p:cNvPr id="187" name="Shape 187"/>
         <p:cNvGrpSpPr/>
         <p:nvPr/>
       </p:nvGrpSpPr>
@@ -1041,7 +1042,7 @@
       </p:grpSpPr>
       <p:sp>
         <p:nvSpPr>
-          <p:cNvPr id="189" name="Shape 189"/>
+          <p:cNvPr id="188" name="Shape 188"/>
           <p:cNvSpPr/>
           <p:nvPr>
             <p:ph idx="2" type="sldImg"/>
@@ -1085,7 +1086,7 @@
       </p:sp>
       <p:sp>
         <p:nvSpPr>
-          <p:cNvPr id="190" name="Shape 190"/>
+          <p:cNvPr id="189" name="Shape 189"/>
           <p:cNvSpPr txBox="1"/>
           <p:nvPr>
             <p:ph idx="1" type="body"/>
@@ -1132,7 +1133,7 @@
   <p:cSld>
     <p:spTree>
       <p:nvGrpSpPr>
-        <p:cNvPr id="194" name="Shape 194"/>
+        <p:cNvPr id="193" name="Shape 193"/>
         <p:cNvGrpSpPr/>
         <p:nvPr/>
       </p:nvGrpSpPr>
@@ -1146,7 +1147,7 @@
       </p:grpSpPr>
       <p:sp>
         <p:nvSpPr>
-          <p:cNvPr id="195" name="Shape 195"/>
+          <p:cNvPr id="194" name="Shape 194"/>
           <p:cNvSpPr/>
           <p:nvPr>
             <p:ph idx="2" type="sldImg"/>
@@ -1190,7 +1191,7 @@
       </p:sp>
       <p:sp>
         <p:nvSpPr>
-          <p:cNvPr id="196" name="Shape 196"/>
+          <p:cNvPr id="195" name="Shape 195"/>
           <p:cNvSpPr txBox="1"/>
           <p:nvPr>
             <p:ph idx="1" type="body"/>
@@ -1237,7 +1238,7 @@
   <p:cSld>
     <p:spTree>
       <p:nvGrpSpPr>
-        <p:cNvPr id="200" name="Shape 200"/>
+        <p:cNvPr id="199" name="Shape 199"/>
         <p:cNvGrpSpPr/>
         <p:nvPr/>
       </p:nvGrpSpPr>
@@ -1251,7 +1252,7 @@
       </p:grpSpPr>
       <p:sp>
         <p:nvSpPr>
-          <p:cNvPr id="201" name="Shape 201"/>
+          <p:cNvPr id="200" name="Shape 200"/>
           <p:cNvSpPr/>
           <p:nvPr>
             <p:ph idx="2" type="sldImg"/>
@@ -1295,7 +1296,7 @@
       </p:sp>
       <p:sp>
         <p:nvSpPr>
-          <p:cNvPr id="202" name="Shape 202"/>
+          <p:cNvPr id="201" name="Shape 201"/>
           <p:cNvSpPr txBox="1"/>
           <p:nvPr>
             <p:ph idx="1" type="body"/>
@@ -1342,7 +1343,7 @@
   <p:cSld>
     <p:spTree>
       <p:nvGrpSpPr>
-        <p:cNvPr id="206" name="Shape 206"/>
+        <p:cNvPr id="205" name="Shape 205"/>
         <p:cNvGrpSpPr/>
         <p:nvPr/>
       </p:nvGrpSpPr>
@@ -1356,7 +1357,7 @@
       </p:grpSpPr>
       <p:sp>
         <p:nvSpPr>
-          <p:cNvPr id="207" name="Shape 207"/>
+          <p:cNvPr id="206" name="Shape 206"/>
           <p:cNvSpPr/>
           <p:nvPr>
             <p:ph idx="2" type="sldImg"/>
@@ -1400,7 +1401,112 @@
       </p:sp>
       <p:sp>
         <p:nvSpPr>
-          <p:cNvPr id="208" name="Shape 208"/>
+          <p:cNvPr id="207" name="Shape 207"/>
+          <p:cNvSpPr txBox="1"/>
+          <p:nvPr>
+            <p:ph idx="1" type="body"/>
+          </p:nvPr>
+        </p:nvSpPr>
+        <p:spPr>
+          <a:xfrm>
+            <a:off x="685800" y="4343400"/>
+            <a:ext cx="5486399" cy="4114800"/>
+          </a:xfrm>
+          <a:prstGeom prst="rect">
+            <a:avLst/>
+          </a:prstGeom>
+        </p:spPr>
+        <p:txBody>
+          <a:bodyPr anchorCtr="0" anchor="t" bIns="91425" lIns="91425" rIns="91425" tIns="91425">
+            <a:noAutofit/>
+          </a:bodyPr>
+          <a:lstStyle/>
+          <a:p>
+            <a:pPr>
+              <a:spcBef>
+                <a:spcPts val="0"/>
+              </a:spcBef>
+              <a:buNone/>
+            </a:pPr>
+            <a:r>
+              <a:t/>
+            </a:r>
+            <a:endParaRPr/>
+          </a:p>
+        </p:txBody>
+      </p:sp>
+    </p:spTree>
+  </p:cSld>
+  <p:clrMapOvr>
+    <a:masterClrMapping/>
+  </p:clrMapOvr>
+</p:notes>
+</file>
+
+<file path=ppt/notesSlides/notesSlide19.xml><?xml version="1.0" encoding="utf-8"?>
+<p:notes xmlns:a="http://schemas.openxmlformats.org/drawingml/2006/main" xmlns:r="http://schemas.openxmlformats.org/officeDocument/2006/relationships" xmlns:mc="http://schemas.openxmlformats.org/markup-compatibility/2006" xmlns:mv="urn:schemas-microsoft-com:mac:vml" xmlns:p="http://schemas.openxmlformats.org/presentationml/2006/main" xmlns:c="http://schemas.openxmlformats.org/drawingml/2006/chart" xmlns:dgm="http://schemas.openxmlformats.org/drawingml/2006/diagram" xmlns:o="urn:schemas-microsoft-com:office:office" xmlns:v="urn:schemas-microsoft-com:vml" xmlns:pvml="urn:schemas-microsoft-com:office:powerpoint" xmlns:com="http://schemas.openxmlformats.org/drawingml/2006/compatibility" xmlns:p14="http://schemas.microsoft.com/office/powerpoint/2010/main" showMasterPhAnim="0" showMasterSp="0">
+  <p:cSld>
+    <p:spTree>
+      <p:nvGrpSpPr>
+        <p:cNvPr id="211" name="Shape 211"/>
+        <p:cNvGrpSpPr/>
+        <p:nvPr/>
+      </p:nvGrpSpPr>
+      <p:grpSpPr>
+        <a:xfrm>
+          <a:off x="0" y="0"/>
+          <a:ext cx="0" cy="0"/>
+          <a:chOff x="0" y="0"/>
+          <a:chExt cx="0" cy="0"/>
+        </a:xfrm>
+      </p:grpSpPr>
+      <p:sp>
+        <p:nvSpPr>
+          <p:cNvPr id="212" name="Shape 212"/>
+          <p:cNvSpPr/>
+          <p:nvPr>
+            <p:ph idx="2" type="sldImg"/>
+          </p:nvPr>
+        </p:nvSpPr>
+        <p:spPr>
+          <a:xfrm>
+            <a:off x="381187" y="685800"/>
+            <a:ext cx="6096299" cy="3429000"/>
+          </a:xfrm>
+          <a:custGeom>
+            <a:pathLst>
+              <a:path extrusionOk="0" h="120000" w="120000">
+                <a:moveTo>
+                  <a:pt x="0" y="0"/>
+                </a:moveTo>
+                <a:lnTo>
+                  <a:pt x="120000" y="0"/>
+                </a:lnTo>
+                <a:lnTo>
+                  <a:pt x="120000" y="120000"/>
+                </a:lnTo>
+                <a:lnTo>
+                  <a:pt x="0" y="120000"/>
+                </a:lnTo>
+                <a:close/>
+              </a:path>
+            </a:pathLst>
+          </a:custGeom>
+          <a:noFill/>
+          <a:ln cap="flat" w="9525">
+            <a:solidFill>
+              <a:srgbClr val="000000"/>
+            </a:solidFill>
+            <a:prstDash val="solid"/>
+            <a:round/>
+            <a:headEnd len="med" w="med" type="none"/>
+            <a:tailEnd len="med" w="med" type="none"/>
+          </a:ln>
+        </p:spPr>
+      </p:sp>
+      <p:sp>
+        <p:nvSpPr>
+          <p:cNvPr id="213" name="Shape 213"/>
           <p:cNvSpPr txBox="1"/>
           <p:nvPr>
             <p:ph idx="1" type="body"/>
@@ -31634,9 +31740,65 @@
           <a:chExt cx="0" cy="0"/>
         </a:xfrm>
       </p:grpSpPr>
+      <p:pic>
+        <p:nvPicPr>
+          <p:cNvPr id="186" name="Shape 186"/>
+          <p:cNvPicPr preferRelativeResize="0"/>
+          <p:nvPr/>
+        </p:nvPicPr>
+        <p:blipFill>
+          <a:blip r:embed="rId3">
+            <a:alphaModFix/>
+          </a:blip>
+          <a:stretch>
+            <a:fillRect/>
+          </a:stretch>
+        </p:blipFill>
+        <p:spPr>
+          <a:xfrm>
+            <a:off x="0" y="0"/>
+            <a:ext cx="9144000" cy="5143500"/>
+          </a:xfrm>
+          <a:prstGeom prst="rect">
+            <a:avLst/>
+          </a:prstGeom>
+          <a:noFill/>
+          <a:ln>
+            <a:noFill/>
+          </a:ln>
+        </p:spPr>
+      </p:pic>
+    </p:spTree>
+  </p:cSld>
+  <p:clrMapOvr>
+    <a:masterClrMapping/>
+  </p:clrMapOvr>
+  <p:transition spd="slow">
+    <p:cut/>
+  </p:transition>
+</p:sld>
+</file>
+
+<file path=ppt/slides/slide16.xml><?xml version="1.0" encoding="utf-8"?>
+<p:sld xmlns:a="http://schemas.openxmlformats.org/drawingml/2006/main" xmlns:r="http://schemas.openxmlformats.org/officeDocument/2006/relationships" xmlns:mc="http://schemas.openxmlformats.org/markup-compatibility/2006" xmlns:mv="urn:schemas-microsoft-com:mac:vml" xmlns:p="http://schemas.openxmlformats.org/presentationml/2006/main" xmlns:c="http://schemas.openxmlformats.org/drawingml/2006/chart" xmlns:dgm="http://schemas.openxmlformats.org/drawingml/2006/diagram" xmlns:o="urn:schemas-microsoft-com:office:office" xmlns:v="urn:schemas-microsoft-com:vml" xmlns:pvml="urn:schemas-microsoft-com:office:powerpoint" xmlns:com="http://schemas.openxmlformats.org/drawingml/2006/compatibility" xmlns:p14="http://schemas.microsoft.com/office/powerpoint/2010/main">
+  <p:cSld>
+    <p:spTree>
+      <p:nvGrpSpPr>
+        <p:cNvPr id="190" name="Shape 190"/>
+        <p:cNvGrpSpPr/>
+        <p:nvPr/>
+      </p:nvGrpSpPr>
+      <p:grpSpPr>
+        <a:xfrm>
+          <a:off x="0" y="0"/>
+          <a:ext cx="0" cy="0"/>
+          <a:chOff x="0" y="0"/>
+          <a:chExt cx="0" cy="0"/>
+        </a:xfrm>
+      </p:grpSpPr>
       <p:sp>
         <p:nvSpPr>
-          <p:cNvPr id="186" name="Shape 186"/>
+          <p:cNvPr id="191" name="Shape 191"/>
           <p:cNvSpPr txBox="1"/>
           <p:nvPr>
             <p:ph type="title"/>
@@ -31672,7 +31834,7 @@
       </p:sp>
       <p:sp>
         <p:nvSpPr>
-          <p:cNvPr id="187" name="Shape 187"/>
+          <p:cNvPr id="192" name="Shape 192"/>
           <p:cNvSpPr txBox="1"/>
           <p:nvPr>
             <p:ph idx="1" type="body"/>
@@ -31693,15 +31855,20 @@
           </a:bodyPr>
           <a:lstStyle/>
           <a:p>
-            <a:pPr>
+            <a:pPr indent="-419100" lvl="0" marL="457200">
               <a:spcBef>
                 <a:spcPts val="0"/>
               </a:spcBef>
-              <a:buNone/>
+              <a:buClr>
+                <a:schemeClr val="dk2"/>
+              </a:buClr>
+              <a:buSzPct val="100000"/>
+              <a:buFont typeface="Arial"/>
+              <a:buChar char="●"/>
             </a:pPr>
             <a:r>
               <a:rPr lang="nl"/>
-              <a:t>in detail of observation and in messages.</a:t>
+              <a:t>In detail of observation and in messages.</a:t>
             </a:r>
           </a:p>
         </p:txBody>
@@ -31717,12 +31884,12 @@
 </p:sld>
 </file>
 
-<file path=ppt/slides/slide16.xml><?xml version="1.0" encoding="utf-8"?>
+<file path=ppt/slides/slide17.xml><?xml version="1.0" encoding="utf-8"?>
 <p:sld xmlns:a="http://schemas.openxmlformats.org/drawingml/2006/main" xmlns:r="http://schemas.openxmlformats.org/officeDocument/2006/relationships" xmlns:mc="http://schemas.openxmlformats.org/markup-compatibility/2006" xmlns:mv="urn:schemas-microsoft-com:mac:vml" xmlns:p="http://schemas.openxmlformats.org/presentationml/2006/main" xmlns:c="http://schemas.openxmlformats.org/drawingml/2006/chart" xmlns:dgm="http://schemas.openxmlformats.org/drawingml/2006/diagram" xmlns:o="urn:schemas-microsoft-com:office:office" xmlns:v="urn:schemas-microsoft-com:vml" xmlns:pvml="urn:schemas-microsoft-com:office:powerpoint" xmlns:com="http://schemas.openxmlformats.org/drawingml/2006/compatibility" xmlns:p14="http://schemas.microsoft.com/office/powerpoint/2010/main">
   <p:cSld>
     <p:spTree>
       <p:nvGrpSpPr>
-        <p:cNvPr id="191" name="Shape 191"/>
+        <p:cNvPr id="196" name="Shape 196"/>
         <p:cNvGrpSpPr/>
         <p:nvPr/>
       </p:nvGrpSpPr>
@@ -31736,7 +31903,7 @@
       </p:grpSpPr>
       <p:sp>
         <p:nvSpPr>
-          <p:cNvPr id="192" name="Shape 192"/>
+          <p:cNvPr id="197" name="Shape 197"/>
           <p:cNvSpPr txBox="1"/>
           <p:nvPr>
             <p:ph type="title"/>
@@ -31772,107 +31939,7 @@
       </p:sp>
       <p:sp>
         <p:nvSpPr>
-          <p:cNvPr id="193" name="Shape 193"/>
-          <p:cNvSpPr txBox="1"/>
-          <p:nvPr>
-            <p:ph idx="1" type="body"/>
-          </p:nvPr>
-        </p:nvSpPr>
-        <p:spPr>
-          <a:xfrm>
-            <a:off x="457200" y="1297780"/>
-            <a:ext cx="8229600" cy="3627900"/>
-          </a:xfrm>
-          <a:prstGeom prst="rect">
-            <a:avLst/>
-          </a:prstGeom>
-        </p:spPr>
-        <p:txBody>
-          <a:bodyPr anchorCtr="0" anchor="t" bIns="91425" lIns="91425" rIns="91425" tIns="91425">
-            <a:noAutofit/>
-          </a:bodyPr>
-          <a:lstStyle/>
-          <a:p>
-            <a:pPr>
-              <a:spcBef>
-                <a:spcPts val="0"/>
-              </a:spcBef>
-              <a:buNone/>
-            </a:pPr>
-            <a:r>
-              <a:t/>
-            </a:r>
-            <a:endParaRPr/>
-          </a:p>
-        </p:txBody>
-      </p:sp>
-    </p:spTree>
-  </p:cSld>
-  <p:clrMapOvr>
-    <a:masterClrMapping/>
-  </p:clrMapOvr>
-  <p:transition spd="slow">
-    <p:cut/>
-  </p:transition>
-</p:sld>
-</file>
-
-<file path=ppt/slides/slide17.xml><?xml version="1.0" encoding="utf-8"?>
-<p:sld xmlns:a="http://schemas.openxmlformats.org/drawingml/2006/main" xmlns:r="http://schemas.openxmlformats.org/officeDocument/2006/relationships" xmlns:mc="http://schemas.openxmlformats.org/markup-compatibility/2006" xmlns:mv="urn:schemas-microsoft-com:mac:vml" xmlns:p="http://schemas.openxmlformats.org/presentationml/2006/main" xmlns:c="http://schemas.openxmlformats.org/drawingml/2006/chart" xmlns:dgm="http://schemas.openxmlformats.org/drawingml/2006/diagram" xmlns:o="urn:schemas-microsoft-com:office:office" xmlns:v="urn:schemas-microsoft-com:vml" xmlns:pvml="urn:schemas-microsoft-com:office:powerpoint" xmlns:com="http://schemas.openxmlformats.org/drawingml/2006/compatibility" xmlns:p14="http://schemas.microsoft.com/office/powerpoint/2010/main">
-  <p:cSld>
-    <p:spTree>
-      <p:nvGrpSpPr>
-        <p:cNvPr id="197" name="Shape 197"/>
-        <p:cNvGrpSpPr/>
-        <p:nvPr/>
-      </p:nvGrpSpPr>
-      <p:grpSpPr>
-        <a:xfrm>
-          <a:off x="0" y="0"/>
-          <a:ext cx="0" cy="0"/>
-          <a:chOff x="0" y="0"/>
-          <a:chExt cx="0" cy="0"/>
-        </a:xfrm>
-      </p:grpSpPr>
-      <p:sp>
-        <p:nvSpPr>
           <p:cNvPr id="198" name="Shape 198"/>
-          <p:cNvSpPr txBox="1"/>
-          <p:nvPr>
-            <p:ph type="title"/>
-          </p:nvPr>
-        </p:nvSpPr>
-        <p:spPr>
-          <a:xfrm>
-            <a:off x="457200" y="155628"/>
-            <a:ext cx="8229600" cy="1044599"/>
-          </a:xfrm>
-          <a:prstGeom prst="rect">
-            <a:avLst/>
-          </a:prstGeom>
-        </p:spPr>
-        <p:txBody>
-          <a:bodyPr anchorCtr="0" anchor="b" bIns="91425" lIns="91425" rIns="91425" tIns="91425">
-            <a:noAutofit/>
-          </a:bodyPr>
-          <a:lstStyle/>
-          <a:p>
-            <a:pPr>
-              <a:spcBef>
-                <a:spcPts val="0"/>
-              </a:spcBef>
-              <a:buNone/>
-            </a:pPr>
-            <a:r>
-              <a:rPr lang="nl"/>
-              <a:t>New entry page</a:t>
-            </a:r>
-          </a:p>
-        </p:txBody>
-      </p:sp>
-      <p:sp>
-        <p:nvSpPr>
-          <p:cNvPr id="199" name="Shape 199"/>
           <p:cNvSpPr txBox="1"/>
           <p:nvPr>
             <p:ph idx="1" type="body"/>
@@ -31922,7 +31989,7 @@
   <p:cSld>
     <p:spTree>
       <p:nvGrpSpPr>
-        <p:cNvPr id="203" name="Shape 203"/>
+        <p:cNvPr id="202" name="Shape 202"/>
         <p:cNvGrpSpPr/>
         <p:nvPr/>
       </p:nvGrpSpPr>
@@ -31936,7 +32003,107 @@
       </p:grpSpPr>
       <p:sp>
         <p:nvSpPr>
+          <p:cNvPr id="203" name="Shape 203"/>
+          <p:cNvSpPr txBox="1"/>
+          <p:nvPr>
+            <p:ph type="title"/>
+          </p:nvPr>
+        </p:nvSpPr>
+        <p:spPr>
+          <a:xfrm>
+            <a:off x="457200" y="155628"/>
+            <a:ext cx="8229600" cy="1044599"/>
+          </a:xfrm>
+          <a:prstGeom prst="rect">
+            <a:avLst/>
+          </a:prstGeom>
+        </p:spPr>
+        <p:txBody>
+          <a:bodyPr anchorCtr="0" anchor="b" bIns="91425" lIns="91425" rIns="91425" tIns="91425">
+            <a:noAutofit/>
+          </a:bodyPr>
+          <a:lstStyle/>
+          <a:p>
+            <a:pPr>
+              <a:spcBef>
+                <a:spcPts val="0"/>
+              </a:spcBef>
+              <a:buNone/>
+            </a:pPr>
+            <a:r>
+              <a:rPr lang="nl"/>
+              <a:t>New entry page</a:t>
+            </a:r>
+          </a:p>
+        </p:txBody>
+      </p:sp>
+      <p:sp>
+        <p:nvSpPr>
           <p:cNvPr id="204" name="Shape 204"/>
+          <p:cNvSpPr txBox="1"/>
+          <p:nvPr>
+            <p:ph idx="1" type="body"/>
+          </p:nvPr>
+        </p:nvSpPr>
+        <p:spPr>
+          <a:xfrm>
+            <a:off x="457200" y="1297780"/>
+            <a:ext cx="8229600" cy="3627900"/>
+          </a:xfrm>
+          <a:prstGeom prst="rect">
+            <a:avLst/>
+          </a:prstGeom>
+        </p:spPr>
+        <p:txBody>
+          <a:bodyPr anchorCtr="0" anchor="t" bIns="91425" lIns="91425" rIns="91425" tIns="91425">
+            <a:noAutofit/>
+          </a:bodyPr>
+          <a:lstStyle/>
+          <a:p>
+            <a:pPr>
+              <a:spcBef>
+                <a:spcPts val="0"/>
+              </a:spcBef>
+              <a:buNone/>
+            </a:pPr>
+            <a:r>
+              <a:t/>
+            </a:r>
+            <a:endParaRPr/>
+          </a:p>
+        </p:txBody>
+      </p:sp>
+    </p:spTree>
+  </p:cSld>
+  <p:clrMapOvr>
+    <a:masterClrMapping/>
+  </p:clrMapOvr>
+  <p:transition spd="slow">
+    <p:cut/>
+  </p:transition>
+</p:sld>
+</file>
+
+<file path=ppt/slides/slide19.xml><?xml version="1.0" encoding="utf-8"?>
+<p:sld xmlns:a="http://schemas.openxmlformats.org/drawingml/2006/main" xmlns:r="http://schemas.openxmlformats.org/officeDocument/2006/relationships" xmlns:mc="http://schemas.openxmlformats.org/markup-compatibility/2006" xmlns:mv="urn:schemas-microsoft-com:mac:vml" xmlns:p="http://schemas.openxmlformats.org/presentationml/2006/main" xmlns:c="http://schemas.openxmlformats.org/drawingml/2006/chart" xmlns:dgm="http://schemas.openxmlformats.org/drawingml/2006/diagram" xmlns:o="urn:schemas-microsoft-com:office:office" xmlns:v="urn:schemas-microsoft-com:vml" xmlns:pvml="urn:schemas-microsoft-com:office:powerpoint" xmlns:com="http://schemas.openxmlformats.org/drawingml/2006/compatibility" xmlns:p14="http://schemas.microsoft.com/office/powerpoint/2010/main">
+  <p:cSld>
+    <p:spTree>
+      <p:nvGrpSpPr>
+        <p:cNvPr id="208" name="Shape 208"/>
+        <p:cNvGrpSpPr/>
+        <p:nvPr/>
+      </p:nvGrpSpPr>
+      <p:grpSpPr>
+        <a:xfrm>
+          <a:off x="0" y="0"/>
+          <a:ext cx="0" cy="0"/>
+          <a:chOff x="0" y="0"/>
+          <a:chExt cx="0" cy="0"/>
+        </a:xfrm>
+      </p:grpSpPr>
+      <p:sp>
+        <p:nvSpPr>
+          <p:cNvPr id="209" name="Shape 209"/>
           <p:cNvSpPr txBox="1"/>
           <p:nvPr>
             <p:ph type="title"/>
@@ -31972,7 +32139,7 @@
       </p:sp>
       <p:sp>
         <p:nvSpPr>
-          <p:cNvPr id="205" name="Shape 205"/>
+          <p:cNvPr id="210" name="Shape 210"/>
           <p:cNvSpPr txBox="1"/>
           <p:nvPr>
             <p:ph idx="1" type="body"/>
@@ -32925,6 +33092,283 @@
 </file>
 
 <file path=ppt/theme/theme2.xml><?xml version="1.0" encoding="utf-8"?>
+<a:theme xmlns:a="http://schemas.openxmlformats.org/drawingml/2006/main" xmlns:r="http://schemas.openxmlformats.org/officeDocument/2006/relationships" name="sketched">
+  <a:themeElements>
+    <a:clrScheme name="Custom 398">
+      <a:dk1>
+        <a:srgbClr val="000000"/>
+      </a:dk1>
+      <a:lt1>
+        <a:srgbClr val="FFFFFF"/>
+      </a:lt1>
+      <a:dk2>
+        <a:srgbClr val="51535D"/>
+      </a:dk2>
+      <a:lt2>
+        <a:srgbClr val="EDEDED"/>
+      </a:lt2>
+      <a:accent1>
+        <a:srgbClr val="676871"/>
+      </a:accent1>
+      <a:accent2>
+        <a:srgbClr val="988489"/>
+      </a:accent2>
+      <a:accent3>
+        <a:srgbClr val="6B7B67"/>
+      </a:accent3>
+      <a:accent4>
+        <a:srgbClr val="747B85"/>
+      </a:accent4>
+      <a:accent5>
+        <a:srgbClr val="A5A9AF"/>
+      </a:accent5>
+      <a:accent6>
+        <a:srgbClr val="85716D"/>
+      </a:accent6>
+      <a:hlink>
+        <a:srgbClr val="676871"/>
+      </a:hlink>
+      <a:folHlink>
+        <a:srgbClr val="3F414A"/>
+      </a:folHlink>
+    </a:clrScheme>
+    <a:fontScheme name="Office">
+      <a:majorFont>
+        <a:latin typeface="Arial"/>
+        <a:ea typeface=""/>
+        <a:cs typeface=""/>
+        <a:font script="Jpan" typeface="ＭＳ Ｐゴシック"/>
+        <a:font script="Hang" typeface="맑은 고딕"/>
+        <a:font script="Hans" typeface="宋体"/>
+        <a:font script="Hant" typeface="新細明體"/>
+        <a:font script="Arab" typeface="Times New Roman"/>
+        <a:font script="Hebr" typeface="Times New Roman"/>
+        <a:font script="Thai" typeface="Angsana New"/>
+        <a:font script="Ethi" typeface="Nyala"/>
+        <a:font script="Beng" typeface="Vrinda"/>
+        <a:font script="Gujr" typeface="Shruti"/>
+        <a:font script="Khmr" typeface="MoolBoran"/>
+        <a:font script="Knda" typeface="Tunga"/>
+        <a:font script="Guru" typeface="Raavi"/>
+        <a:font script="Cans" typeface="Euphemia"/>
+        <a:font script="Cher" typeface="Plantagenet Cherokee"/>
+        <a:font script="Yiii" typeface="Microsoft Yi Baiti"/>
+        <a:font script="Tibt" typeface="Microsoft Himalaya"/>
+        <a:font script="Thaa" typeface="MV Boli"/>
+        <a:font script="Deva" typeface="Mangal"/>
+        <a:font script="Telu" typeface="Gautami"/>
+        <a:font script="Taml" typeface="Latha"/>
+        <a:font script="Syrc" typeface="Estrangelo Edessa"/>
+        <a:font script="Orya" typeface="Kalinga"/>
+        <a:font script="Mlym" typeface="Kartika"/>
+        <a:font script="Laoo" typeface="DokChampa"/>
+        <a:font script="Sinh" typeface="Iskoola Pota"/>
+        <a:font script="Mong" typeface="Mongolian Baiti"/>
+        <a:font script="Viet" typeface="Times New Roman"/>
+        <a:font script="Uigh" typeface="Microsoft Uighur"/>
+      </a:majorFont>
+      <a:minorFont>
+        <a:latin typeface="Arial"/>
+        <a:ea typeface=""/>
+        <a:cs typeface=""/>
+        <a:font script="Jpan" typeface="ＭＳ Ｐゴシック"/>
+        <a:font script="Hang" typeface="맑은 고딕"/>
+        <a:font script="Hans" typeface="宋体"/>
+        <a:font script="Hant" typeface="新細明體"/>
+        <a:font script="Arab" typeface="Times New Roman"/>
+        <a:font script="Hebr" typeface="Times New Roman"/>
+        <a:font script="Thai" typeface="Angsana New"/>
+        <a:font script="Ethi" typeface="Nyala"/>
+        <a:font script="Beng" typeface="Vrinda"/>
+        <a:font script="Gujr" typeface="Shruti"/>
+        <a:font script="Khmr" typeface="MoolBoran"/>
+        <a:font script="Knda" typeface="Tunga"/>
+        <a:font script="Guru" typeface="Raavi"/>
+        <a:font script="Cans" typeface="Euphemia"/>
+        <a:font script="Cher" typeface="Plantagenet Cherokee"/>
+        <a:font script="Yiii" typeface="Microsoft Yi Baiti"/>
+        <a:font script="Tibt" typeface="Microsoft Himalaya"/>
+        <a:font script="Thaa" typeface="MV Boli"/>
+        <a:font script="Deva" typeface="Mangal"/>
+        <a:font script="Telu" typeface="Gautami"/>
+        <a:font script="Taml" typeface="Latha"/>
+        <a:font script="Syrc" typeface="Estrangelo Edessa"/>
+        <a:font script="Orya" typeface="Kalinga"/>
+        <a:font script="Mlym" typeface="Kartika"/>
+        <a:font script="Laoo" typeface="DokChampa"/>
+        <a:font script="Sinh" typeface="Iskoola Pota"/>
+        <a:font script="Mong" typeface="Mongolian Baiti"/>
+        <a:font script="Viet" typeface="Times New Roman"/>
+        <a:font script="Uigh" typeface="Microsoft Uighur"/>
+      </a:minorFont>
+    </a:fontScheme>
+    <a:fmtScheme name="Office">
+      <a:fillStyleLst>
+        <a:solidFill>
+          <a:schemeClr val="phClr"/>
+        </a:solidFill>
+        <a:gradFill rotWithShape="1">
+          <a:gsLst>
+            <a:gs pos="0">
+              <a:schemeClr val="phClr">
+                <a:tint val="50000"/>
+                <a:satMod val="300000"/>
+              </a:schemeClr>
+            </a:gs>
+            <a:gs pos="35000">
+              <a:schemeClr val="phClr">
+                <a:tint val="37000"/>
+                <a:satMod val="300000"/>
+              </a:schemeClr>
+            </a:gs>
+            <a:gs pos="100000">
+              <a:schemeClr val="phClr">
+                <a:tint val="15000"/>
+                <a:satMod val="350000"/>
+              </a:schemeClr>
+            </a:gs>
+          </a:gsLst>
+          <a:lin ang="16200000" scaled="1"/>
+        </a:gradFill>
+        <a:gradFill rotWithShape="1">
+          <a:gsLst>
+            <a:gs pos="0">
+              <a:schemeClr val="phClr">
+                <a:tint val="100000"/>
+                <a:shade val="100000"/>
+                <a:satMod val="130000"/>
+              </a:schemeClr>
+            </a:gs>
+            <a:gs pos="100000">
+              <a:schemeClr val="phClr">
+                <a:tint val="50000"/>
+                <a:shade val="100000"/>
+                <a:satMod val="350000"/>
+              </a:schemeClr>
+            </a:gs>
+          </a:gsLst>
+          <a:lin ang="16200000" scaled="0"/>
+        </a:gradFill>
+      </a:fillStyleLst>
+      <a:lnStyleLst>
+        <a:ln cap="flat" cmpd="sng" w="9525" algn="ctr">
+          <a:solidFill>
+            <a:schemeClr val="phClr">
+              <a:shade val="95000"/>
+              <a:satMod val="105000"/>
+            </a:schemeClr>
+          </a:solidFill>
+          <a:prstDash val="solid"/>
+        </a:ln>
+        <a:ln cap="flat" cmpd="sng" w="25400" algn="ctr">
+          <a:solidFill>
+            <a:schemeClr val="phClr"/>
+          </a:solidFill>
+          <a:prstDash val="solid"/>
+        </a:ln>
+        <a:ln cap="flat" cmpd="sng" w="38100" algn="ctr">
+          <a:solidFill>
+            <a:schemeClr val="phClr"/>
+          </a:solidFill>
+          <a:prstDash val="solid"/>
+        </a:ln>
+      </a:lnStyleLst>
+      <a:effectStyleLst>
+        <a:effectStyle>
+          <a:effectLst>
+            <a:outerShdw blurRad="40000" rotWithShape="0" dir="5400000" dist="20000">
+              <a:srgbClr val="000000">
+                <a:alpha val="38000"/>
+              </a:srgbClr>
+            </a:outerShdw>
+          </a:effectLst>
+        </a:effectStyle>
+        <a:effectStyle>
+          <a:effectLst>
+            <a:outerShdw blurRad="40000" rotWithShape="0" dir="5400000" dist="23000">
+              <a:srgbClr val="000000">
+                <a:alpha val="35000"/>
+              </a:srgbClr>
+            </a:outerShdw>
+          </a:effectLst>
+        </a:effectStyle>
+        <a:effectStyle>
+          <a:effectLst>
+            <a:outerShdw blurRad="40000" rotWithShape="0" dir="5400000" dist="23000">
+              <a:srgbClr val="000000">
+                <a:alpha val="35000"/>
+              </a:srgbClr>
+            </a:outerShdw>
+          </a:effectLst>
+          <a:scene3d>
+            <a:camera prst="orthographicFront">
+              <a:rot lat="0" lon="0" rev="0"/>
+            </a:camera>
+            <a:lightRig dir="t" rig="threePt">
+              <a:rot lat="0" lon="0" rev="1200000"/>
+            </a:lightRig>
+          </a:scene3d>
+          <a:sp3d>
+            <a:bevelT h="25400" w="63500"/>
+          </a:sp3d>
+        </a:effectStyle>
+      </a:effectStyleLst>
+      <a:bgFillStyleLst>
+        <a:solidFill>
+          <a:schemeClr val="phClr"/>
+        </a:solidFill>
+        <a:gradFill rotWithShape="1">
+          <a:gsLst>
+            <a:gs pos="0">
+              <a:schemeClr val="phClr">
+                <a:tint val="40000"/>
+                <a:satMod val="350000"/>
+              </a:schemeClr>
+            </a:gs>
+            <a:gs pos="40000">
+              <a:schemeClr val="phClr">
+                <a:tint val="45000"/>
+                <a:shade val="99000"/>
+                <a:satMod val="350000"/>
+              </a:schemeClr>
+            </a:gs>
+            <a:gs pos="100000">
+              <a:schemeClr val="phClr">
+                <a:shade val="20000"/>
+                <a:satMod val="255000"/>
+              </a:schemeClr>
+            </a:gs>
+          </a:gsLst>
+          <a:path path="circle">
+            <a:fillToRect b="180000" l="50000" r="50000" t="-80000"/>
+          </a:path>
+        </a:gradFill>
+        <a:gradFill rotWithShape="1">
+          <a:gsLst>
+            <a:gs pos="0">
+              <a:schemeClr val="phClr">
+                <a:tint val="80000"/>
+                <a:satMod val="300000"/>
+              </a:schemeClr>
+            </a:gs>
+            <a:gs pos="100000">
+              <a:schemeClr val="phClr">
+                <a:shade val="30000"/>
+                <a:satMod val="200000"/>
+              </a:schemeClr>
+            </a:gs>
+          </a:gsLst>
+          <a:path path="circle">
+            <a:fillToRect b="50000" l="50000" r="50000" t="50000"/>
+          </a:path>
+        </a:gradFill>
+      </a:bgFillStyleLst>
+    </a:fmtScheme>
+  </a:themeElements>
+</a:theme>
+</file>
+
+<file path=ppt/theme/theme3.xml><?xml version="1.0" encoding="utf-8"?>
 <a:theme xmlns:a="http://schemas.openxmlformats.org/drawingml/2006/main" xmlns:r="http://schemas.openxmlformats.org/officeDocument/2006/relationships" name="Office Theme">
   <a:themeElements>
     <a:clrScheme name="Office">
@@ -33239,281 +33683,4 @@
     </a:lnDef>
   </a:objectDefaults>
 </a:theme>
-</file>
-
-<file path=ppt/theme/theme3.xml><?xml version="1.0" encoding="utf-8"?>
-<a:theme xmlns:a="http://schemas.openxmlformats.org/drawingml/2006/main" xmlns:r="http://schemas.openxmlformats.org/officeDocument/2006/relationships" name="sketched">
-  <a:themeElements>
-    <a:clrScheme name="Custom 398">
-      <a:dk1>
-        <a:srgbClr val="000000"/>
-      </a:dk1>
-      <a:lt1>
-        <a:srgbClr val="FFFFFF"/>
-      </a:lt1>
-      <a:dk2>
-        <a:srgbClr val="51535D"/>
-      </a:dk2>
-      <a:lt2>
-        <a:srgbClr val="EDEDED"/>
-      </a:lt2>
-      <a:accent1>
-        <a:srgbClr val="676871"/>
-      </a:accent1>
-      <a:accent2>
-        <a:srgbClr val="988489"/>
-      </a:accent2>
-      <a:accent3>
-        <a:srgbClr val="6B7B67"/>
-      </a:accent3>
-      <a:accent4>
-        <a:srgbClr val="747B85"/>
-      </a:accent4>
-      <a:accent5>
-        <a:srgbClr val="A5A9AF"/>
-      </a:accent5>
-      <a:accent6>
-        <a:srgbClr val="85716D"/>
-      </a:accent6>
-      <a:hlink>
-        <a:srgbClr val="676871"/>
-      </a:hlink>
-      <a:folHlink>
-        <a:srgbClr val="3F414A"/>
-      </a:folHlink>
-    </a:clrScheme>
-    <a:fontScheme name="Office">
-      <a:majorFont>
-        <a:latin typeface="Arial"/>
-        <a:ea typeface=""/>
-        <a:cs typeface=""/>
-        <a:font script="Jpan" typeface="ＭＳ Ｐゴシック"/>
-        <a:font script="Hang" typeface="맑은 고딕"/>
-        <a:font script="Hans" typeface="宋体"/>
-        <a:font script="Hant" typeface="新細明體"/>
-        <a:font script="Arab" typeface="Times New Roman"/>
-        <a:font script="Hebr" typeface="Times New Roman"/>
-        <a:font script="Thai" typeface="Angsana New"/>
-        <a:font script="Ethi" typeface="Nyala"/>
-        <a:font script="Beng" typeface="Vrinda"/>
-        <a:font script="Gujr" typeface="Shruti"/>
-        <a:font script="Khmr" typeface="MoolBoran"/>
-        <a:font script="Knda" typeface="Tunga"/>
-        <a:font script="Guru" typeface="Raavi"/>
-        <a:font script="Cans" typeface="Euphemia"/>
-        <a:font script="Cher" typeface="Plantagenet Cherokee"/>
-        <a:font script="Yiii" typeface="Microsoft Yi Baiti"/>
-        <a:font script="Tibt" typeface="Microsoft Himalaya"/>
-        <a:font script="Thaa" typeface="MV Boli"/>
-        <a:font script="Deva" typeface="Mangal"/>
-        <a:font script="Telu" typeface="Gautami"/>
-        <a:font script="Taml" typeface="Latha"/>
-        <a:font script="Syrc" typeface="Estrangelo Edessa"/>
-        <a:font script="Orya" typeface="Kalinga"/>
-        <a:font script="Mlym" typeface="Kartika"/>
-        <a:font script="Laoo" typeface="DokChampa"/>
-        <a:font script="Sinh" typeface="Iskoola Pota"/>
-        <a:font script="Mong" typeface="Mongolian Baiti"/>
-        <a:font script="Viet" typeface="Times New Roman"/>
-        <a:font script="Uigh" typeface="Microsoft Uighur"/>
-      </a:majorFont>
-      <a:minorFont>
-        <a:latin typeface="Arial"/>
-        <a:ea typeface=""/>
-        <a:cs typeface=""/>
-        <a:font script="Jpan" typeface="ＭＳ Ｐゴシック"/>
-        <a:font script="Hang" typeface="맑은 고딕"/>
-        <a:font script="Hans" typeface="宋体"/>
-        <a:font script="Hant" typeface="新細明體"/>
-        <a:font script="Arab" typeface="Times New Roman"/>
-        <a:font script="Hebr" typeface="Times New Roman"/>
-        <a:font script="Thai" typeface="Angsana New"/>
-        <a:font script="Ethi" typeface="Nyala"/>
-        <a:font script="Beng" typeface="Vrinda"/>
-        <a:font script="Gujr" typeface="Shruti"/>
-        <a:font script="Khmr" typeface="MoolBoran"/>
-        <a:font script="Knda" typeface="Tunga"/>
-        <a:font script="Guru" typeface="Raavi"/>
-        <a:font script="Cans" typeface="Euphemia"/>
-        <a:font script="Cher" typeface="Plantagenet Cherokee"/>
-        <a:font script="Yiii" typeface="Microsoft Yi Baiti"/>
-        <a:font script="Tibt" typeface="Microsoft Himalaya"/>
-        <a:font script="Thaa" typeface="MV Boli"/>
-        <a:font script="Deva" typeface="Mangal"/>
-        <a:font script="Telu" typeface="Gautami"/>
-        <a:font script="Taml" typeface="Latha"/>
-        <a:font script="Syrc" typeface="Estrangelo Edessa"/>
-        <a:font script="Orya" typeface="Kalinga"/>
-        <a:font script="Mlym" typeface="Kartika"/>
-        <a:font script="Laoo" typeface="DokChampa"/>
-        <a:font script="Sinh" typeface="Iskoola Pota"/>
-        <a:font script="Mong" typeface="Mongolian Baiti"/>
-        <a:font script="Viet" typeface="Times New Roman"/>
-        <a:font script="Uigh" typeface="Microsoft Uighur"/>
-      </a:minorFont>
-    </a:fontScheme>
-    <a:fmtScheme name="Office">
-      <a:fillStyleLst>
-        <a:solidFill>
-          <a:schemeClr val="phClr"/>
-        </a:solidFill>
-        <a:gradFill rotWithShape="1">
-          <a:gsLst>
-            <a:gs pos="0">
-              <a:schemeClr val="phClr">
-                <a:tint val="50000"/>
-                <a:satMod val="300000"/>
-              </a:schemeClr>
-            </a:gs>
-            <a:gs pos="35000">
-              <a:schemeClr val="phClr">
-                <a:tint val="37000"/>
-                <a:satMod val="300000"/>
-              </a:schemeClr>
-            </a:gs>
-            <a:gs pos="100000">
-              <a:schemeClr val="phClr">
-                <a:tint val="15000"/>
-                <a:satMod val="350000"/>
-              </a:schemeClr>
-            </a:gs>
-          </a:gsLst>
-          <a:lin ang="16200000" scaled="1"/>
-        </a:gradFill>
-        <a:gradFill rotWithShape="1">
-          <a:gsLst>
-            <a:gs pos="0">
-              <a:schemeClr val="phClr">
-                <a:tint val="100000"/>
-                <a:shade val="100000"/>
-                <a:satMod val="130000"/>
-              </a:schemeClr>
-            </a:gs>
-            <a:gs pos="100000">
-              <a:schemeClr val="phClr">
-                <a:tint val="50000"/>
-                <a:shade val="100000"/>
-                <a:satMod val="350000"/>
-              </a:schemeClr>
-            </a:gs>
-          </a:gsLst>
-          <a:lin ang="16200000" scaled="0"/>
-        </a:gradFill>
-      </a:fillStyleLst>
-      <a:lnStyleLst>
-        <a:ln cap="flat" cmpd="sng" w="9525" algn="ctr">
-          <a:solidFill>
-            <a:schemeClr val="phClr">
-              <a:shade val="95000"/>
-              <a:satMod val="105000"/>
-            </a:schemeClr>
-          </a:solidFill>
-          <a:prstDash val="solid"/>
-        </a:ln>
-        <a:ln cap="flat" cmpd="sng" w="25400" algn="ctr">
-          <a:solidFill>
-            <a:schemeClr val="phClr"/>
-          </a:solidFill>
-          <a:prstDash val="solid"/>
-        </a:ln>
-        <a:ln cap="flat" cmpd="sng" w="38100" algn="ctr">
-          <a:solidFill>
-            <a:schemeClr val="phClr"/>
-          </a:solidFill>
-          <a:prstDash val="solid"/>
-        </a:ln>
-      </a:lnStyleLst>
-      <a:effectStyleLst>
-        <a:effectStyle>
-          <a:effectLst>
-            <a:outerShdw blurRad="40000" rotWithShape="0" dir="5400000" dist="20000">
-              <a:srgbClr val="000000">
-                <a:alpha val="38000"/>
-              </a:srgbClr>
-            </a:outerShdw>
-          </a:effectLst>
-        </a:effectStyle>
-        <a:effectStyle>
-          <a:effectLst>
-            <a:outerShdw blurRad="40000" rotWithShape="0" dir="5400000" dist="23000">
-              <a:srgbClr val="000000">
-                <a:alpha val="35000"/>
-              </a:srgbClr>
-            </a:outerShdw>
-          </a:effectLst>
-        </a:effectStyle>
-        <a:effectStyle>
-          <a:effectLst>
-            <a:outerShdw blurRad="40000" rotWithShape="0" dir="5400000" dist="23000">
-              <a:srgbClr val="000000">
-                <a:alpha val="35000"/>
-              </a:srgbClr>
-            </a:outerShdw>
-          </a:effectLst>
-          <a:scene3d>
-            <a:camera prst="orthographicFront">
-              <a:rot lat="0" lon="0" rev="0"/>
-            </a:camera>
-            <a:lightRig dir="t" rig="threePt">
-              <a:rot lat="0" lon="0" rev="1200000"/>
-            </a:lightRig>
-          </a:scene3d>
-          <a:sp3d>
-            <a:bevelT h="25400" w="63500"/>
-          </a:sp3d>
-        </a:effectStyle>
-      </a:effectStyleLst>
-      <a:bgFillStyleLst>
-        <a:solidFill>
-          <a:schemeClr val="phClr"/>
-        </a:solidFill>
-        <a:gradFill rotWithShape="1">
-          <a:gsLst>
-            <a:gs pos="0">
-              <a:schemeClr val="phClr">
-                <a:tint val="40000"/>
-                <a:satMod val="350000"/>
-              </a:schemeClr>
-            </a:gs>
-            <a:gs pos="40000">
-              <a:schemeClr val="phClr">
-                <a:tint val="45000"/>
-                <a:shade val="99000"/>
-                <a:satMod val="350000"/>
-              </a:schemeClr>
-            </a:gs>
-            <a:gs pos="100000">
-              <a:schemeClr val="phClr">
-                <a:shade val="20000"/>
-                <a:satMod val="255000"/>
-              </a:schemeClr>
-            </a:gs>
-          </a:gsLst>
-          <a:path path="circle">
-            <a:fillToRect b="180000" l="50000" r="50000" t="-80000"/>
-          </a:path>
-        </a:gradFill>
-        <a:gradFill rotWithShape="1">
-          <a:gsLst>
-            <a:gs pos="0">
-              <a:schemeClr val="phClr">
-                <a:tint val="80000"/>
-                <a:satMod val="300000"/>
-              </a:schemeClr>
-            </a:gs>
-            <a:gs pos="100000">
-              <a:schemeClr val="phClr">
-                <a:shade val="30000"/>
-                <a:satMod val="200000"/>
-              </a:schemeClr>
-            </a:gs>
-          </a:gsLst>
-          <a:path path="circle">
-            <a:fillToRect b="50000" l="50000" r="50000" t="50000"/>
-          </a:path>
-        </a:gradFill>
-      </a:bgFillStyleLst>
-    </a:fmtScheme>
-  </a:themeElements>
-</a:theme>
 </file>
</xml_diff>

<commit_message>
Add section on mysql interface.
</commit_message>
<xml_diff>
--- a/Meeting20150425/DeepskyLog 5.0.pptx
+++ b/Meeting20150425/DeepskyLog 5.0.pptx
@@ -27,6 +27,7 @@
     <p:sldId id="272" r:id="rId22"/>
     <p:sldId id="273" r:id="rId23"/>
     <p:sldId id="274" r:id="rId24"/>
+    <p:sldId id="275" r:id="rId25"/>
   </p:sldIdLst>
   <p:sldSz cy="5143500" cx="9144000"/>
   <p:notesSz cx="6858000" cy="9144000"/>
@@ -1653,6 +1654,111 @@
 </p:notes>
 </file>
 
+<file path=ppt/notesSlides/notesSlide20.xml><?xml version="1.0" encoding="utf-8"?>
+<p:notes xmlns:a="http://schemas.openxmlformats.org/drawingml/2006/main" xmlns:r="http://schemas.openxmlformats.org/officeDocument/2006/relationships" xmlns:mc="http://schemas.openxmlformats.org/markup-compatibility/2006" xmlns:mv="urn:schemas-microsoft-com:mac:vml" xmlns:p="http://schemas.openxmlformats.org/presentationml/2006/main" xmlns:c="http://schemas.openxmlformats.org/drawingml/2006/chart" xmlns:dgm="http://schemas.openxmlformats.org/drawingml/2006/diagram" xmlns:o="urn:schemas-microsoft-com:office:office" xmlns:v="urn:schemas-microsoft-com:vml" xmlns:pvml="urn:schemas-microsoft-com:office:powerpoint" xmlns:com="http://schemas.openxmlformats.org/drawingml/2006/compatibility" xmlns:p14="http://schemas.microsoft.com/office/powerpoint/2010/main" showMasterPhAnim="0" showMasterSp="0">
+  <p:cSld>
+    <p:spTree>
+      <p:nvGrpSpPr>
+        <p:cNvPr id="217" name="Shape 217"/>
+        <p:cNvGrpSpPr/>
+        <p:nvPr/>
+      </p:nvGrpSpPr>
+      <p:grpSpPr>
+        <a:xfrm>
+          <a:off x="0" y="0"/>
+          <a:ext cx="0" cy="0"/>
+          <a:chOff x="0" y="0"/>
+          <a:chExt cx="0" cy="0"/>
+        </a:xfrm>
+      </p:grpSpPr>
+      <p:sp>
+        <p:nvSpPr>
+          <p:cNvPr id="218" name="Shape 218"/>
+          <p:cNvSpPr/>
+          <p:nvPr>
+            <p:ph idx="2" type="sldImg"/>
+          </p:nvPr>
+        </p:nvSpPr>
+        <p:spPr>
+          <a:xfrm>
+            <a:off x="381187" y="685800"/>
+            <a:ext cx="6096299" cy="3429000"/>
+          </a:xfrm>
+          <a:custGeom>
+            <a:pathLst>
+              <a:path extrusionOk="0" h="120000" w="120000">
+                <a:moveTo>
+                  <a:pt x="0" y="0"/>
+                </a:moveTo>
+                <a:lnTo>
+                  <a:pt x="120000" y="0"/>
+                </a:lnTo>
+                <a:lnTo>
+                  <a:pt x="120000" y="120000"/>
+                </a:lnTo>
+                <a:lnTo>
+                  <a:pt x="0" y="120000"/>
+                </a:lnTo>
+                <a:close/>
+              </a:path>
+            </a:pathLst>
+          </a:custGeom>
+          <a:noFill/>
+          <a:ln cap="flat" w="9525">
+            <a:solidFill>
+              <a:srgbClr val="000000"/>
+            </a:solidFill>
+            <a:prstDash val="solid"/>
+            <a:round/>
+            <a:headEnd len="med" w="med" type="none"/>
+            <a:tailEnd len="med" w="med" type="none"/>
+          </a:ln>
+        </p:spPr>
+      </p:sp>
+      <p:sp>
+        <p:nvSpPr>
+          <p:cNvPr id="219" name="Shape 219"/>
+          <p:cNvSpPr txBox="1"/>
+          <p:nvPr>
+            <p:ph idx="1" type="body"/>
+          </p:nvPr>
+        </p:nvSpPr>
+        <p:spPr>
+          <a:xfrm>
+            <a:off x="685800" y="4343400"/>
+            <a:ext cx="5486399" cy="4114800"/>
+          </a:xfrm>
+          <a:prstGeom prst="rect">
+            <a:avLst/>
+          </a:prstGeom>
+        </p:spPr>
+        <p:txBody>
+          <a:bodyPr anchorCtr="0" anchor="t" bIns="91425" lIns="91425" rIns="91425" tIns="91425">
+            <a:noAutofit/>
+          </a:bodyPr>
+          <a:lstStyle/>
+          <a:p>
+            <a:pPr>
+              <a:spcBef>
+                <a:spcPts val="0"/>
+              </a:spcBef>
+              <a:buNone/>
+            </a:pPr>
+            <a:r>
+              <a:t/>
+            </a:r>
+            <a:endParaRPr/>
+          </a:p>
+        </p:txBody>
+      </p:sp>
+    </p:spTree>
+  </p:cSld>
+  <p:clrMapOvr>
+    <a:masterClrMapping/>
+  </p:clrMapOvr>
+</p:notes>
+</file>
+
 <file path=ppt/notesSlides/notesSlide3.xml><?xml version="1.0" encoding="utf-8"?>
 <p:notes xmlns:a="http://schemas.openxmlformats.org/drawingml/2006/main" xmlns:r="http://schemas.openxmlformats.org/officeDocument/2006/relationships" xmlns:mc="http://schemas.openxmlformats.org/markup-compatibility/2006" xmlns:mv="urn:schemas-microsoft-com:mac:vml" xmlns:p="http://schemas.openxmlformats.org/presentationml/2006/main" xmlns:c="http://schemas.openxmlformats.org/drawingml/2006/chart" xmlns:dgm="http://schemas.openxmlformats.org/drawingml/2006/diagram" xmlns:o="urn:schemas-microsoft-com:office:office" xmlns:v="urn:schemas-microsoft-com:vml" xmlns:pvml="urn:schemas-microsoft-com:office:powerpoint" xmlns:com="http://schemas.openxmlformats.org/drawingml/2006/compatibility" xmlns:p14="http://schemas.microsoft.com/office/powerpoint/2010/main" showMasterPhAnim="0" showMasterSp="0">
   <p:cSld>
@@ -31827,7 +31933,7 @@
             </a:pPr>
             <a:r>
               <a:rPr lang="nl"/>
-              <a:t>Picture of observers</a:t>
+              <a:t>Database access</a:t>
             </a:r>
           </a:p>
         </p:txBody>
@@ -31855,6 +31961,57 @@
           </a:bodyPr>
           <a:lstStyle/>
           <a:p>
+            <a:pPr indent="-419100" lvl="0" marL="457200" rtl="0">
+              <a:spcBef>
+                <a:spcPts val="0"/>
+              </a:spcBef>
+              <a:buClr>
+                <a:schemeClr val="dk2"/>
+              </a:buClr>
+              <a:buSzPct val="100000"/>
+              <a:buFont typeface="Arial"/>
+              <a:buChar char="●"/>
+            </a:pPr>
+            <a:r>
+              <a:rPr lang="nl"/>
+              <a:t>Old mysql methods:</a:t>
+            </a:r>
+          </a:p>
+          <a:p>
+            <a:pPr indent="-381000" lvl="1" marL="914400" rtl="0">
+              <a:spcBef>
+                <a:spcPts val="0"/>
+              </a:spcBef>
+              <a:buClr>
+                <a:schemeClr val="dk2"/>
+              </a:buClr>
+              <a:buSzPct val="80000"/>
+              <a:buFont typeface="Courier New"/>
+              <a:buChar char="o"/>
+            </a:pPr>
+            <a:r>
+              <a:rPr lang="nl"/>
+              <a:t>deprecated since php 5.5.</a:t>
+            </a:r>
+          </a:p>
+          <a:p>
+            <a:pPr indent="-381000" lvl="1" marL="914400" rtl="0">
+              <a:spcBef>
+                <a:spcPts val="0"/>
+              </a:spcBef>
+              <a:buClr>
+                <a:schemeClr val="dk2"/>
+              </a:buClr>
+              <a:buSzPct val="80000"/>
+              <a:buFont typeface="Courier New"/>
+              <a:buChar char="o"/>
+            </a:pPr>
+            <a:r>
+              <a:rPr lang="nl"/>
+              <a:t>no longer developed since 2006</a:t>
+            </a:r>
+          </a:p>
+          <a:p>
             <a:pPr indent="-419100" lvl="0" marL="457200">
               <a:spcBef>
                 <a:spcPts val="0"/>
@@ -31868,7 +32025,7 @@
             </a:pPr>
             <a:r>
               <a:rPr lang="nl"/>
-              <a:t>In detail of observation and in messages.</a:t>
+              <a:t>Migration to PDO_mysql</a:t>
             </a:r>
           </a:p>
         </p:txBody>
@@ -31932,7 +32089,7 @@
             </a:pPr>
             <a:r>
               <a:rPr lang="nl"/>
-              <a:t>New Logo</a:t>
+              <a:t>Picture of observers</a:t>
             </a:r>
           </a:p>
         </p:txBody>
@@ -31960,16 +32117,21 @@
           </a:bodyPr>
           <a:lstStyle/>
           <a:p>
-            <a:pPr>
+            <a:pPr indent="-419100" lvl="0" marL="457200">
               <a:spcBef>
                 <a:spcPts val="0"/>
               </a:spcBef>
-              <a:buNone/>
+              <a:buClr>
+                <a:schemeClr val="dk2"/>
+              </a:buClr>
+              <a:buSzPct val="100000"/>
+              <a:buFont typeface="Arial"/>
+              <a:buChar char="●"/>
             </a:pPr>
             <a:r>
-              <a:t/>
+              <a:rPr lang="nl"/>
+              <a:t>In detail of observation and in messages.</a:t>
             </a:r>
-            <a:endParaRPr/>
           </a:p>
         </p:txBody>
       </p:sp>
@@ -32032,7 +32194,7 @@
             </a:pPr>
             <a:r>
               <a:rPr lang="nl"/>
-              <a:t>New entry page</a:t>
+              <a:t>New Logo</a:t>
             </a:r>
           </a:p>
         </p:txBody>
@@ -32132,7 +32294,7 @@
             </a:pPr>
             <a:r>
               <a:rPr lang="nl"/>
-              <a:t>Add locations</a:t>
+              <a:t>New entry page</a:t>
             </a:r>
           </a:p>
         </p:txBody>
@@ -32363,6 +32525,106 @@
           </a:p>
           <a:p>
             <a:pPr lvl="0">
+              <a:spcBef>
+                <a:spcPts val="0"/>
+              </a:spcBef>
+              <a:buNone/>
+            </a:pPr>
+            <a:r>
+              <a:t/>
+            </a:r>
+            <a:endParaRPr/>
+          </a:p>
+        </p:txBody>
+      </p:sp>
+    </p:spTree>
+  </p:cSld>
+  <p:clrMapOvr>
+    <a:masterClrMapping/>
+  </p:clrMapOvr>
+  <p:transition spd="slow">
+    <p:cut/>
+  </p:transition>
+</p:sld>
+</file>
+
+<file path=ppt/slides/slide20.xml><?xml version="1.0" encoding="utf-8"?>
+<p:sld xmlns:a="http://schemas.openxmlformats.org/drawingml/2006/main" xmlns:r="http://schemas.openxmlformats.org/officeDocument/2006/relationships" xmlns:mc="http://schemas.openxmlformats.org/markup-compatibility/2006" xmlns:mv="urn:schemas-microsoft-com:mac:vml" xmlns:p="http://schemas.openxmlformats.org/presentationml/2006/main" xmlns:c="http://schemas.openxmlformats.org/drawingml/2006/chart" xmlns:dgm="http://schemas.openxmlformats.org/drawingml/2006/diagram" xmlns:o="urn:schemas-microsoft-com:office:office" xmlns:v="urn:schemas-microsoft-com:vml" xmlns:pvml="urn:schemas-microsoft-com:office:powerpoint" xmlns:com="http://schemas.openxmlformats.org/drawingml/2006/compatibility" xmlns:p14="http://schemas.microsoft.com/office/powerpoint/2010/main">
+  <p:cSld>
+    <p:spTree>
+      <p:nvGrpSpPr>
+        <p:cNvPr id="214" name="Shape 214"/>
+        <p:cNvGrpSpPr/>
+        <p:nvPr/>
+      </p:nvGrpSpPr>
+      <p:grpSpPr>
+        <a:xfrm>
+          <a:off x="0" y="0"/>
+          <a:ext cx="0" cy="0"/>
+          <a:chOff x="0" y="0"/>
+          <a:chExt cx="0" cy="0"/>
+        </a:xfrm>
+      </p:grpSpPr>
+      <p:sp>
+        <p:nvSpPr>
+          <p:cNvPr id="215" name="Shape 215"/>
+          <p:cNvSpPr txBox="1"/>
+          <p:nvPr>
+            <p:ph type="title"/>
+          </p:nvPr>
+        </p:nvSpPr>
+        <p:spPr>
+          <a:xfrm>
+            <a:off x="457200" y="155628"/>
+            <a:ext cx="8229600" cy="1044599"/>
+          </a:xfrm>
+          <a:prstGeom prst="rect">
+            <a:avLst/>
+          </a:prstGeom>
+        </p:spPr>
+        <p:txBody>
+          <a:bodyPr anchorCtr="0" anchor="b" bIns="91425" lIns="91425" rIns="91425" tIns="91425">
+            <a:noAutofit/>
+          </a:bodyPr>
+          <a:lstStyle/>
+          <a:p>
+            <a:pPr>
+              <a:spcBef>
+                <a:spcPts val="0"/>
+              </a:spcBef>
+              <a:buNone/>
+            </a:pPr>
+            <a:r>
+              <a:rPr lang="nl"/>
+              <a:t>Add locations</a:t>
+            </a:r>
+          </a:p>
+        </p:txBody>
+      </p:sp>
+      <p:sp>
+        <p:nvSpPr>
+          <p:cNvPr id="216" name="Shape 216"/>
+          <p:cNvSpPr txBox="1"/>
+          <p:nvPr>
+            <p:ph idx="1" type="body"/>
+          </p:nvPr>
+        </p:nvSpPr>
+        <p:spPr>
+          <a:xfrm>
+            <a:off x="457200" y="1297780"/>
+            <a:ext cx="8229600" cy="3627900"/>
+          </a:xfrm>
+          <a:prstGeom prst="rect">
+            <a:avLst/>
+          </a:prstGeom>
+        </p:spPr>
+        <p:txBody>
+          <a:bodyPr anchorCtr="0" anchor="t" bIns="91425" lIns="91425" rIns="91425" tIns="91425">
+            <a:noAutofit/>
+          </a:bodyPr>
+          <a:lstStyle/>
+          <a:p>
+            <a:pPr>
               <a:spcBef>
                 <a:spcPts val="0"/>
               </a:spcBef>
@@ -32815,283 +33077,6 @@
 </file>
 
 <file path=ppt/theme/theme1.xml><?xml version="1.0" encoding="utf-8"?>
-<a:theme xmlns:a="http://schemas.openxmlformats.org/drawingml/2006/main" xmlns:r="http://schemas.openxmlformats.org/officeDocument/2006/relationships" name="Custom Theme">
-  <a:themeElements>
-    <a:clrScheme name="Default">
-      <a:dk1>
-        <a:srgbClr val="000000"/>
-      </a:dk1>
-      <a:lt1>
-        <a:srgbClr val="FFFFFF"/>
-      </a:lt1>
-      <a:dk2>
-        <a:srgbClr val="158158"/>
-      </a:dk2>
-      <a:lt2>
-        <a:srgbClr val="F3F3F3"/>
-      </a:lt2>
-      <a:accent1>
-        <a:srgbClr val="058DC7"/>
-      </a:accent1>
-      <a:accent2>
-        <a:srgbClr val="50B432"/>
-      </a:accent2>
-      <a:accent3>
-        <a:srgbClr val="ED561B"/>
-      </a:accent3>
-      <a:accent4>
-        <a:srgbClr val="EDEF00"/>
-      </a:accent4>
-      <a:accent5>
-        <a:srgbClr val="24CBE5"/>
-      </a:accent5>
-      <a:accent6>
-        <a:srgbClr val="64E572"/>
-      </a:accent6>
-      <a:hlink>
-        <a:srgbClr val="2200CC"/>
-      </a:hlink>
-      <a:folHlink>
-        <a:srgbClr val="551A8B"/>
-      </a:folHlink>
-    </a:clrScheme>
-    <a:fontScheme name="Office">
-      <a:majorFont>
-        <a:latin typeface="Arial"/>
-        <a:ea typeface=""/>
-        <a:cs typeface=""/>
-        <a:font script="Jpan" typeface="ＭＳ Ｐゴシック"/>
-        <a:font script="Hang" typeface="맑은 고딕"/>
-        <a:font script="Hans" typeface="宋体"/>
-        <a:font script="Hant" typeface="新細明體"/>
-        <a:font script="Arab" typeface="Times New Roman"/>
-        <a:font script="Hebr" typeface="Times New Roman"/>
-        <a:font script="Thai" typeface="Angsana New"/>
-        <a:font script="Ethi" typeface="Nyala"/>
-        <a:font script="Beng" typeface="Vrinda"/>
-        <a:font script="Gujr" typeface="Shruti"/>
-        <a:font script="Khmr" typeface="MoolBoran"/>
-        <a:font script="Knda" typeface="Tunga"/>
-        <a:font script="Guru" typeface="Raavi"/>
-        <a:font script="Cans" typeface="Euphemia"/>
-        <a:font script="Cher" typeface="Plantagenet Cherokee"/>
-        <a:font script="Yiii" typeface="Microsoft Yi Baiti"/>
-        <a:font script="Tibt" typeface="Microsoft Himalaya"/>
-        <a:font script="Thaa" typeface="MV Boli"/>
-        <a:font script="Deva" typeface="Mangal"/>
-        <a:font script="Telu" typeface="Gautami"/>
-        <a:font script="Taml" typeface="Latha"/>
-        <a:font script="Syrc" typeface="Estrangelo Edessa"/>
-        <a:font script="Orya" typeface="Kalinga"/>
-        <a:font script="Mlym" typeface="Kartika"/>
-        <a:font script="Laoo" typeface="DokChampa"/>
-        <a:font script="Sinh" typeface="Iskoola Pota"/>
-        <a:font script="Mong" typeface="Mongolian Baiti"/>
-        <a:font script="Viet" typeface="Times New Roman"/>
-        <a:font script="Uigh" typeface="Microsoft Uighur"/>
-      </a:majorFont>
-      <a:minorFont>
-        <a:latin typeface="Arial"/>
-        <a:ea typeface=""/>
-        <a:cs typeface=""/>
-        <a:font script="Jpan" typeface="ＭＳ Ｐゴシック"/>
-        <a:font script="Hang" typeface="맑은 고딕"/>
-        <a:font script="Hans" typeface="宋体"/>
-        <a:font script="Hant" typeface="新細明體"/>
-        <a:font script="Arab" typeface="Times New Roman"/>
-        <a:font script="Hebr" typeface="Times New Roman"/>
-        <a:font script="Thai" typeface="Angsana New"/>
-        <a:font script="Ethi" typeface="Nyala"/>
-        <a:font script="Beng" typeface="Vrinda"/>
-        <a:font script="Gujr" typeface="Shruti"/>
-        <a:font script="Khmr" typeface="MoolBoran"/>
-        <a:font script="Knda" typeface="Tunga"/>
-        <a:font script="Guru" typeface="Raavi"/>
-        <a:font script="Cans" typeface="Euphemia"/>
-        <a:font script="Cher" typeface="Plantagenet Cherokee"/>
-        <a:font script="Yiii" typeface="Microsoft Yi Baiti"/>
-        <a:font script="Tibt" typeface="Microsoft Himalaya"/>
-        <a:font script="Thaa" typeface="MV Boli"/>
-        <a:font script="Deva" typeface="Mangal"/>
-        <a:font script="Telu" typeface="Gautami"/>
-        <a:font script="Taml" typeface="Latha"/>
-        <a:font script="Syrc" typeface="Estrangelo Edessa"/>
-        <a:font script="Orya" typeface="Kalinga"/>
-        <a:font script="Mlym" typeface="Kartika"/>
-        <a:font script="Laoo" typeface="DokChampa"/>
-        <a:font script="Sinh" typeface="Iskoola Pota"/>
-        <a:font script="Mong" typeface="Mongolian Baiti"/>
-        <a:font script="Viet" typeface="Times New Roman"/>
-        <a:font script="Uigh" typeface="Microsoft Uighur"/>
-      </a:minorFont>
-    </a:fontScheme>
-    <a:fmtScheme name="Office">
-      <a:fillStyleLst>
-        <a:solidFill>
-          <a:schemeClr val="phClr"/>
-        </a:solidFill>
-        <a:gradFill rotWithShape="1">
-          <a:gsLst>
-            <a:gs pos="0">
-              <a:schemeClr val="phClr">
-                <a:tint val="50000"/>
-                <a:satMod val="300000"/>
-              </a:schemeClr>
-            </a:gs>
-            <a:gs pos="35000">
-              <a:schemeClr val="phClr">
-                <a:tint val="37000"/>
-                <a:satMod val="300000"/>
-              </a:schemeClr>
-            </a:gs>
-            <a:gs pos="100000">
-              <a:schemeClr val="phClr">
-                <a:tint val="15000"/>
-                <a:satMod val="350000"/>
-              </a:schemeClr>
-            </a:gs>
-          </a:gsLst>
-          <a:lin ang="16200000" scaled="1"/>
-        </a:gradFill>
-        <a:gradFill rotWithShape="1">
-          <a:gsLst>
-            <a:gs pos="0">
-              <a:schemeClr val="phClr">
-                <a:tint val="100000"/>
-                <a:shade val="100000"/>
-                <a:satMod val="130000"/>
-              </a:schemeClr>
-            </a:gs>
-            <a:gs pos="100000">
-              <a:schemeClr val="phClr">
-                <a:tint val="50000"/>
-                <a:shade val="100000"/>
-                <a:satMod val="350000"/>
-              </a:schemeClr>
-            </a:gs>
-          </a:gsLst>
-          <a:lin ang="16200000" scaled="0"/>
-        </a:gradFill>
-      </a:fillStyleLst>
-      <a:lnStyleLst>
-        <a:ln cap="flat" cmpd="sng" w="9525" algn="ctr">
-          <a:solidFill>
-            <a:schemeClr val="phClr">
-              <a:shade val="95000"/>
-              <a:satMod val="105000"/>
-            </a:schemeClr>
-          </a:solidFill>
-          <a:prstDash val="solid"/>
-        </a:ln>
-        <a:ln cap="flat" cmpd="sng" w="25400" algn="ctr">
-          <a:solidFill>
-            <a:schemeClr val="phClr"/>
-          </a:solidFill>
-          <a:prstDash val="solid"/>
-        </a:ln>
-        <a:ln cap="flat" cmpd="sng" w="38100" algn="ctr">
-          <a:solidFill>
-            <a:schemeClr val="phClr"/>
-          </a:solidFill>
-          <a:prstDash val="solid"/>
-        </a:ln>
-      </a:lnStyleLst>
-      <a:effectStyleLst>
-        <a:effectStyle>
-          <a:effectLst>
-            <a:outerShdw blurRad="40000" rotWithShape="0" dir="5400000" dist="20000">
-              <a:srgbClr val="000000">
-                <a:alpha val="38000"/>
-              </a:srgbClr>
-            </a:outerShdw>
-          </a:effectLst>
-        </a:effectStyle>
-        <a:effectStyle>
-          <a:effectLst>
-            <a:outerShdw blurRad="40000" rotWithShape="0" dir="5400000" dist="23000">
-              <a:srgbClr val="000000">
-                <a:alpha val="35000"/>
-              </a:srgbClr>
-            </a:outerShdw>
-          </a:effectLst>
-        </a:effectStyle>
-        <a:effectStyle>
-          <a:effectLst>
-            <a:outerShdw blurRad="40000" rotWithShape="0" dir="5400000" dist="23000">
-              <a:srgbClr val="000000">
-                <a:alpha val="35000"/>
-              </a:srgbClr>
-            </a:outerShdw>
-          </a:effectLst>
-          <a:scene3d>
-            <a:camera prst="orthographicFront">
-              <a:rot lat="0" lon="0" rev="0"/>
-            </a:camera>
-            <a:lightRig dir="t" rig="threePt">
-              <a:rot lat="0" lon="0" rev="1200000"/>
-            </a:lightRig>
-          </a:scene3d>
-          <a:sp3d>
-            <a:bevelT h="25400" w="63500"/>
-          </a:sp3d>
-        </a:effectStyle>
-      </a:effectStyleLst>
-      <a:bgFillStyleLst>
-        <a:solidFill>
-          <a:schemeClr val="phClr"/>
-        </a:solidFill>
-        <a:gradFill rotWithShape="1">
-          <a:gsLst>
-            <a:gs pos="0">
-              <a:schemeClr val="phClr">
-                <a:tint val="40000"/>
-                <a:satMod val="350000"/>
-              </a:schemeClr>
-            </a:gs>
-            <a:gs pos="40000">
-              <a:schemeClr val="phClr">
-                <a:tint val="45000"/>
-                <a:shade val="99000"/>
-                <a:satMod val="350000"/>
-              </a:schemeClr>
-            </a:gs>
-            <a:gs pos="100000">
-              <a:schemeClr val="phClr">
-                <a:shade val="20000"/>
-                <a:satMod val="255000"/>
-              </a:schemeClr>
-            </a:gs>
-          </a:gsLst>
-          <a:path path="circle">
-            <a:fillToRect b="180000" l="50000" r="50000" t="-80000"/>
-          </a:path>
-        </a:gradFill>
-        <a:gradFill rotWithShape="1">
-          <a:gsLst>
-            <a:gs pos="0">
-              <a:schemeClr val="phClr">
-                <a:tint val="80000"/>
-                <a:satMod val="300000"/>
-              </a:schemeClr>
-            </a:gs>
-            <a:gs pos="100000">
-              <a:schemeClr val="phClr">
-                <a:shade val="30000"/>
-                <a:satMod val="200000"/>
-              </a:schemeClr>
-            </a:gs>
-          </a:gsLst>
-          <a:path path="circle">
-            <a:fillToRect b="50000" l="50000" r="50000" t="50000"/>
-          </a:path>
-        </a:gradFill>
-      </a:bgFillStyleLst>
-    </a:fmtScheme>
-  </a:themeElements>
-</a:theme>
-</file>
-
-<file path=ppt/theme/theme2.xml><?xml version="1.0" encoding="utf-8"?>
 <a:theme xmlns:a="http://schemas.openxmlformats.org/drawingml/2006/main" xmlns:r="http://schemas.openxmlformats.org/officeDocument/2006/relationships" name="sketched">
   <a:themeElements>
     <a:clrScheme name="Custom 398">
@@ -33368,7 +33353,7 @@
 </a:theme>
 </file>
 
-<file path=ppt/theme/theme3.xml><?xml version="1.0" encoding="utf-8"?>
+<file path=ppt/theme/theme2.xml><?xml version="1.0" encoding="utf-8"?>
 <a:theme xmlns:a="http://schemas.openxmlformats.org/drawingml/2006/main" xmlns:r="http://schemas.openxmlformats.org/officeDocument/2006/relationships" name="Office Theme">
   <a:themeElements>
     <a:clrScheme name="Office">
@@ -33683,4 +33668,281 @@
     </a:lnDef>
   </a:objectDefaults>
 </a:theme>
+</file>
+
+<file path=ppt/theme/theme3.xml><?xml version="1.0" encoding="utf-8"?>
+<a:theme xmlns:a="http://schemas.openxmlformats.org/drawingml/2006/main" xmlns:r="http://schemas.openxmlformats.org/officeDocument/2006/relationships" name="Custom Theme">
+  <a:themeElements>
+    <a:clrScheme name="Default">
+      <a:dk1>
+        <a:srgbClr val="000000"/>
+      </a:dk1>
+      <a:lt1>
+        <a:srgbClr val="FFFFFF"/>
+      </a:lt1>
+      <a:dk2>
+        <a:srgbClr val="158158"/>
+      </a:dk2>
+      <a:lt2>
+        <a:srgbClr val="F3F3F3"/>
+      </a:lt2>
+      <a:accent1>
+        <a:srgbClr val="058DC7"/>
+      </a:accent1>
+      <a:accent2>
+        <a:srgbClr val="50B432"/>
+      </a:accent2>
+      <a:accent3>
+        <a:srgbClr val="ED561B"/>
+      </a:accent3>
+      <a:accent4>
+        <a:srgbClr val="EDEF00"/>
+      </a:accent4>
+      <a:accent5>
+        <a:srgbClr val="24CBE5"/>
+      </a:accent5>
+      <a:accent6>
+        <a:srgbClr val="64E572"/>
+      </a:accent6>
+      <a:hlink>
+        <a:srgbClr val="2200CC"/>
+      </a:hlink>
+      <a:folHlink>
+        <a:srgbClr val="551A8B"/>
+      </a:folHlink>
+    </a:clrScheme>
+    <a:fontScheme name="Office">
+      <a:majorFont>
+        <a:latin typeface="Arial"/>
+        <a:ea typeface=""/>
+        <a:cs typeface=""/>
+        <a:font script="Jpan" typeface="ＭＳ Ｐゴシック"/>
+        <a:font script="Hang" typeface="맑은 고딕"/>
+        <a:font script="Hans" typeface="宋体"/>
+        <a:font script="Hant" typeface="新細明體"/>
+        <a:font script="Arab" typeface="Times New Roman"/>
+        <a:font script="Hebr" typeface="Times New Roman"/>
+        <a:font script="Thai" typeface="Angsana New"/>
+        <a:font script="Ethi" typeface="Nyala"/>
+        <a:font script="Beng" typeface="Vrinda"/>
+        <a:font script="Gujr" typeface="Shruti"/>
+        <a:font script="Khmr" typeface="MoolBoran"/>
+        <a:font script="Knda" typeface="Tunga"/>
+        <a:font script="Guru" typeface="Raavi"/>
+        <a:font script="Cans" typeface="Euphemia"/>
+        <a:font script="Cher" typeface="Plantagenet Cherokee"/>
+        <a:font script="Yiii" typeface="Microsoft Yi Baiti"/>
+        <a:font script="Tibt" typeface="Microsoft Himalaya"/>
+        <a:font script="Thaa" typeface="MV Boli"/>
+        <a:font script="Deva" typeface="Mangal"/>
+        <a:font script="Telu" typeface="Gautami"/>
+        <a:font script="Taml" typeface="Latha"/>
+        <a:font script="Syrc" typeface="Estrangelo Edessa"/>
+        <a:font script="Orya" typeface="Kalinga"/>
+        <a:font script="Mlym" typeface="Kartika"/>
+        <a:font script="Laoo" typeface="DokChampa"/>
+        <a:font script="Sinh" typeface="Iskoola Pota"/>
+        <a:font script="Mong" typeface="Mongolian Baiti"/>
+        <a:font script="Viet" typeface="Times New Roman"/>
+        <a:font script="Uigh" typeface="Microsoft Uighur"/>
+      </a:majorFont>
+      <a:minorFont>
+        <a:latin typeface="Arial"/>
+        <a:ea typeface=""/>
+        <a:cs typeface=""/>
+        <a:font script="Jpan" typeface="ＭＳ Ｐゴシック"/>
+        <a:font script="Hang" typeface="맑은 고딕"/>
+        <a:font script="Hans" typeface="宋体"/>
+        <a:font script="Hant" typeface="新細明體"/>
+        <a:font script="Arab" typeface="Times New Roman"/>
+        <a:font script="Hebr" typeface="Times New Roman"/>
+        <a:font script="Thai" typeface="Angsana New"/>
+        <a:font script="Ethi" typeface="Nyala"/>
+        <a:font script="Beng" typeface="Vrinda"/>
+        <a:font script="Gujr" typeface="Shruti"/>
+        <a:font script="Khmr" typeface="MoolBoran"/>
+        <a:font script="Knda" typeface="Tunga"/>
+        <a:font script="Guru" typeface="Raavi"/>
+        <a:font script="Cans" typeface="Euphemia"/>
+        <a:font script="Cher" typeface="Plantagenet Cherokee"/>
+        <a:font script="Yiii" typeface="Microsoft Yi Baiti"/>
+        <a:font script="Tibt" typeface="Microsoft Himalaya"/>
+        <a:font script="Thaa" typeface="MV Boli"/>
+        <a:font script="Deva" typeface="Mangal"/>
+        <a:font script="Telu" typeface="Gautami"/>
+        <a:font script="Taml" typeface="Latha"/>
+        <a:font script="Syrc" typeface="Estrangelo Edessa"/>
+        <a:font script="Orya" typeface="Kalinga"/>
+        <a:font script="Mlym" typeface="Kartika"/>
+        <a:font script="Laoo" typeface="DokChampa"/>
+        <a:font script="Sinh" typeface="Iskoola Pota"/>
+        <a:font script="Mong" typeface="Mongolian Baiti"/>
+        <a:font script="Viet" typeface="Times New Roman"/>
+        <a:font script="Uigh" typeface="Microsoft Uighur"/>
+      </a:minorFont>
+    </a:fontScheme>
+    <a:fmtScheme name="Office">
+      <a:fillStyleLst>
+        <a:solidFill>
+          <a:schemeClr val="phClr"/>
+        </a:solidFill>
+        <a:gradFill rotWithShape="1">
+          <a:gsLst>
+            <a:gs pos="0">
+              <a:schemeClr val="phClr">
+                <a:tint val="50000"/>
+                <a:satMod val="300000"/>
+              </a:schemeClr>
+            </a:gs>
+            <a:gs pos="35000">
+              <a:schemeClr val="phClr">
+                <a:tint val="37000"/>
+                <a:satMod val="300000"/>
+              </a:schemeClr>
+            </a:gs>
+            <a:gs pos="100000">
+              <a:schemeClr val="phClr">
+                <a:tint val="15000"/>
+                <a:satMod val="350000"/>
+              </a:schemeClr>
+            </a:gs>
+          </a:gsLst>
+          <a:lin ang="16200000" scaled="1"/>
+        </a:gradFill>
+        <a:gradFill rotWithShape="1">
+          <a:gsLst>
+            <a:gs pos="0">
+              <a:schemeClr val="phClr">
+                <a:tint val="100000"/>
+                <a:shade val="100000"/>
+                <a:satMod val="130000"/>
+              </a:schemeClr>
+            </a:gs>
+            <a:gs pos="100000">
+              <a:schemeClr val="phClr">
+                <a:tint val="50000"/>
+                <a:shade val="100000"/>
+                <a:satMod val="350000"/>
+              </a:schemeClr>
+            </a:gs>
+          </a:gsLst>
+          <a:lin ang="16200000" scaled="0"/>
+        </a:gradFill>
+      </a:fillStyleLst>
+      <a:lnStyleLst>
+        <a:ln cap="flat" cmpd="sng" w="9525" algn="ctr">
+          <a:solidFill>
+            <a:schemeClr val="phClr">
+              <a:shade val="95000"/>
+              <a:satMod val="105000"/>
+            </a:schemeClr>
+          </a:solidFill>
+          <a:prstDash val="solid"/>
+        </a:ln>
+        <a:ln cap="flat" cmpd="sng" w="25400" algn="ctr">
+          <a:solidFill>
+            <a:schemeClr val="phClr"/>
+          </a:solidFill>
+          <a:prstDash val="solid"/>
+        </a:ln>
+        <a:ln cap="flat" cmpd="sng" w="38100" algn="ctr">
+          <a:solidFill>
+            <a:schemeClr val="phClr"/>
+          </a:solidFill>
+          <a:prstDash val="solid"/>
+        </a:ln>
+      </a:lnStyleLst>
+      <a:effectStyleLst>
+        <a:effectStyle>
+          <a:effectLst>
+            <a:outerShdw blurRad="40000" rotWithShape="0" dir="5400000" dist="20000">
+              <a:srgbClr val="000000">
+                <a:alpha val="38000"/>
+              </a:srgbClr>
+            </a:outerShdw>
+          </a:effectLst>
+        </a:effectStyle>
+        <a:effectStyle>
+          <a:effectLst>
+            <a:outerShdw blurRad="40000" rotWithShape="0" dir="5400000" dist="23000">
+              <a:srgbClr val="000000">
+                <a:alpha val="35000"/>
+              </a:srgbClr>
+            </a:outerShdw>
+          </a:effectLst>
+        </a:effectStyle>
+        <a:effectStyle>
+          <a:effectLst>
+            <a:outerShdw blurRad="40000" rotWithShape="0" dir="5400000" dist="23000">
+              <a:srgbClr val="000000">
+                <a:alpha val="35000"/>
+              </a:srgbClr>
+            </a:outerShdw>
+          </a:effectLst>
+          <a:scene3d>
+            <a:camera prst="orthographicFront">
+              <a:rot lat="0" lon="0" rev="0"/>
+            </a:camera>
+            <a:lightRig dir="t" rig="threePt">
+              <a:rot lat="0" lon="0" rev="1200000"/>
+            </a:lightRig>
+          </a:scene3d>
+          <a:sp3d>
+            <a:bevelT h="25400" w="63500"/>
+          </a:sp3d>
+        </a:effectStyle>
+      </a:effectStyleLst>
+      <a:bgFillStyleLst>
+        <a:solidFill>
+          <a:schemeClr val="phClr"/>
+        </a:solidFill>
+        <a:gradFill rotWithShape="1">
+          <a:gsLst>
+            <a:gs pos="0">
+              <a:schemeClr val="phClr">
+                <a:tint val="40000"/>
+                <a:satMod val="350000"/>
+              </a:schemeClr>
+            </a:gs>
+            <a:gs pos="40000">
+              <a:schemeClr val="phClr">
+                <a:tint val="45000"/>
+                <a:shade val="99000"/>
+                <a:satMod val="350000"/>
+              </a:schemeClr>
+            </a:gs>
+            <a:gs pos="100000">
+              <a:schemeClr val="phClr">
+                <a:shade val="20000"/>
+                <a:satMod val="255000"/>
+              </a:schemeClr>
+            </a:gs>
+          </a:gsLst>
+          <a:path path="circle">
+            <a:fillToRect b="180000" l="50000" r="50000" t="-80000"/>
+          </a:path>
+        </a:gradFill>
+        <a:gradFill rotWithShape="1">
+          <a:gsLst>
+            <a:gs pos="0">
+              <a:schemeClr val="phClr">
+                <a:tint val="80000"/>
+                <a:satMod val="300000"/>
+              </a:schemeClr>
+            </a:gs>
+            <a:gs pos="100000">
+              <a:schemeClr val="phClr">
+                <a:shade val="30000"/>
+                <a:satMod val="200000"/>
+              </a:schemeClr>
+            </a:gs>
+          </a:gsLst>
+          <a:path path="circle">
+            <a:fillToRect b="50000" l="50000" r="50000" t="50000"/>
+          </a:path>
+        </a:gradFill>
+      </a:bgFillStyleLst>
+    </a:fmtScheme>
+  </a:themeElements>
+</a:theme>
 </file>
</xml_diff>

<commit_message>
Added section on observer images.
</commit_message>
<xml_diff>
--- a/Meeting20150425/DeepskyLog 5.0.pptx
+++ b/Meeting20150425/DeepskyLog 5.0.pptx
@@ -28,6 +28,8 @@
     <p:sldId id="273" r:id="rId23"/>
     <p:sldId id="274" r:id="rId24"/>
     <p:sldId id="275" r:id="rId25"/>
+    <p:sldId id="276" r:id="rId26"/>
+    <p:sldId id="277" r:id="rId27"/>
   </p:sldIdLst>
   <p:sldSz cy="5143500" cx="9144000"/>
   <p:notesSz cx="6858000" cy="9144000"/>
@@ -1344,7 +1346,7 @@
   <p:cSld>
     <p:spTree>
       <p:nvGrpSpPr>
-        <p:cNvPr id="205" name="Shape 205"/>
+        <p:cNvPr id="204" name="Shape 204"/>
         <p:cNvGrpSpPr/>
         <p:nvPr/>
       </p:nvGrpSpPr>
@@ -1358,7 +1360,7 @@
       </p:grpSpPr>
       <p:sp>
         <p:nvSpPr>
-          <p:cNvPr id="206" name="Shape 206"/>
+          <p:cNvPr id="205" name="Shape 205"/>
           <p:cNvSpPr/>
           <p:nvPr>
             <p:ph idx="2" type="sldImg"/>
@@ -1402,7 +1404,7 @@
       </p:sp>
       <p:sp>
         <p:nvSpPr>
-          <p:cNvPr id="207" name="Shape 207"/>
+          <p:cNvPr id="206" name="Shape 206"/>
           <p:cNvSpPr txBox="1"/>
           <p:nvPr>
             <p:ph idx="1" type="body"/>
@@ -1449,7 +1451,7 @@
   <p:cSld>
     <p:spTree>
       <p:nvGrpSpPr>
-        <p:cNvPr id="211" name="Shape 211"/>
+        <p:cNvPr id="209" name="Shape 209"/>
         <p:cNvGrpSpPr/>
         <p:nvPr/>
       </p:nvGrpSpPr>
@@ -1463,7 +1465,7 @@
       </p:grpSpPr>
       <p:sp>
         <p:nvSpPr>
-          <p:cNvPr id="212" name="Shape 212"/>
+          <p:cNvPr id="210" name="Shape 210"/>
           <p:cNvSpPr/>
           <p:nvPr>
             <p:ph idx="2" type="sldImg"/>
@@ -1507,7 +1509,7 @@
       </p:sp>
       <p:sp>
         <p:nvSpPr>
-          <p:cNvPr id="213" name="Shape 213"/>
+          <p:cNvPr id="211" name="Shape 211"/>
           <p:cNvSpPr txBox="1"/>
           <p:nvPr>
             <p:ph idx="1" type="body"/>
@@ -1659,7 +1661,7 @@
   <p:cSld>
     <p:spTree>
       <p:nvGrpSpPr>
-        <p:cNvPr id="217" name="Shape 217"/>
+        <p:cNvPr id="215" name="Shape 215"/>
         <p:cNvGrpSpPr/>
         <p:nvPr/>
       </p:nvGrpSpPr>
@@ -1673,7 +1675,7 @@
       </p:grpSpPr>
       <p:sp>
         <p:nvSpPr>
-          <p:cNvPr id="218" name="Shape 218"/>
+          <p:cNvPr id="216" name="Shape 216"/>
           <p:cNvSpPr/>
           <p:nvPr>
             <p:ph idx="2" type="sldImg"/>
@@ -1717,7 +1719,217 @@
       </p:sp>
       <p:sp>
         <p:nvSpPr>
-          <p:cNvPr id="219" name="Shape 219"/>
+          <p:cNvPr id="217" name="Shape 217"/>
+          <p:cNvSpPr txBox="1"/>
+          <p:nvPr>
+            <p:ph idx="1" type="body"/>
+          </p:nvPr>
+        </p:nvSpPr>
+        <p:spPr>
+          <a:xfrm>
+            <a:off x="685800" y="4343400"/>
+            <a:ext cx="5486399" cy="4114800"/>
+          </a:xfrm>
+          <a:prstGeom prst="rect">
+            <a:avLst/>
+          </a:prstGeom>
+        </p:spPr>
+        <p:txBody>
+          <a:bodyPr anchorCtr="0" anchor="t" bIns="91425" lIns="91425" rIns="91425" tIns="91425">
+            <a:noAutofit/>
+          </a:bodyPr>
+          <a:lstStyle/>
+          <a:p>
+            <a:pPr>
+              <a:spcBef>
+                <a:spcPts val="0"/>
+              </a:spcBef>
+              <a:buNone/>
+            </a:pPr>
+            <a:r>
+              <a:t/>
+            </a:r>
+            <a:endParaRPr/>
+          </a:p>
+        </p:txBody>
+      </p:sp>
+    </p:spTree>
+  </p:cSld>
+  <p:clrMapOvr>
+    <a:masterClrMapping/>
+  </p:clrMapOvr>
+</p:notes>
+</file>
+
+<file path=ppt/notesSlides/notesSlide21.xml><?xml version="1.0" encoding="utf-8"?>
+<p:notes xmlns:a="http://schemas.openxmlformats.org/drawingml/2006/main" xmlns:r="http://schemas.openxmlformats.org/officeDocument/2006/relationships" xmlns:mc="http://schemas.openxmlformats.org/markup-compatibility/2006" xmlns:mv="urn:schemas-microsoft-com:mac:vml" xmlns:p="http://schemas.openxmlformats.org/presentationml/2006/main" xmlns:c="http://schemas.openxmlformats.org/drawingml/2006/chart" xmlns:dgm="http://schemas.openxmlformats.org/drawingml/2006/diagram" xmlns:o="urn:schemas-microsoft-com:office:office" xmlns:v="urn:schemas-microsoft-com:vml" xmlns:pvml="urn:schemas-microsoft-com:office:powerpoint" xmlns:com="http://schemas.openxmlformats.org/drawingml/2006/compatibility" xmlns:p14="http://schemas.microsoft.com/office/powerpoint/2010/main" showMasterPhAnim="0" showMasterSp="0">
+  <p:cSld>
+    <p:spTree>
+      <p:nvGrpSpPr>
+        <p:cNvPr id="221" name="Shape 221"/>
+        <p:cNvGrpSpPr/>
+        <p:nvPr/>
+      </p:nvGrpSpPr>
+      <p:grpSpPr>
+        <a:xfrm>
+          <a:off x="0" y="0"/>
+          <a:ext cx="0" cy="0"/>
+          <a:chOff x="0" y="0"/>
+          <a:chExt cx="0" cy="0"/>
+        </a:xfrm>
+      </p:grpSpPr>
+      <p:sp>
+        <p:nvSpPr>
+          <p:cNvPr id="222" name="Shape 222"/>
+          <p:cNvSpPr/>
+          <p:nvPr>
+            <p:ph idx="2" type="sldImg"/>
+          </p:nvPr>
+        </p:nvSpPr>
+        <p:spPr>
+          <a:xfrm>
+            <a:off x="381187" y="685800"/>
+            <a:ext cx="6096299" cy="3429000"/>
+          </a:xfrm>
+          <a:custGeom>
+            <a:pathLst>
+              <a:path extrusionOk="0" h="120000" w="120000">
+                <a:moveTo>
+                  <a:pt x="0" y="0"/>
+                </a:moveTo>
+                <a:lnTo>
+                  <a:pt x="120000" y="0"/>
+                </a:lnTo>
+                <a:lnTo>
+                  <a:pt x="120000" y="120000"/>
+                </a:lnTo>
+                <a:lnTo>
+                  <a:pt x="0" y="120000"/>
+                </a:lnTo>
+                <a:close/>
+              </a:path>
+            </a:pathLst>
+          </a:custGeom>
+          <a:noFill/>
+          <a:ln cap="flat" w="9525">
+            <a:solidFill>
+              <a:srgbClr val="000000"/>
+            </a:solidFill>
+            <a:prstDash val="solid"/>
+            <a:round/>
+            <a:headEnd len="med" w="med" type="none"/>
+            <a:tailEnd len="med" w="med" type="none"/>
+          </a:ln>
+        </p:spPr>
+      </p:sp>
+      <p:sp>
+        <p:nvSpPr>
+          <p:cNvPr id="223" name="Shape 223"/>
+          <p:cNvSpPr txBox="1"/>
+          <p:nvPr>
+            <p:ph idx="1" type="body"/>
+          </p:nvPr>
+        </p:nvSpPr>
+        <p:spPr>
+          <a:xfrm>
+            <a:off x="685800" y="4343400"/>
+            <a:ext cx="5486399" cy="4114800"/>
+          </a:xfrm>
+          <a:prstGeom prst="rect">
+            <a:avLst/>
+          </a:prstGeom>
+        </p:spPr>
+        <p:txBody>
+          <a:bodyPr anchorCtr="0" anchor="t" bIns="91425" lIns="91425" rIns="91425" tIns="91425">
+            <a:noAutofit/>
+          </a:bodyPr>
+          <a:lstStyle/>
+          <a:p>
+            <a:pPr>
+              <a:spcBef>
+                <a:spcPts val="0"/>
+              </a:spcBef>
+              <a:buNone/>
+            </a:pPr>
+            <a:r>
+              <a:t/>
+            </a:r>
+            <a:endParaRPr/>
+          </a:p>
+        </p:txBody>
+      </p:sp>
+    </p:spTree>
+  </p:cSld>
+  <p:clrMapOvr>
+    <a:masterClrMapping/>
+  </p:clrMapOvr>
+</p:notes>
+</file>
+
+<file path=ppt/notesSlides/notesSlide22.xml><?xml version="1.0" encoding="utf-8"?>
+<p:notes xmlns:a="http://schemas.openxmlformats.org/drawingml/2006/main" xmlns:r="http://schemas.openxmlformats.org/officeDocument/2006/relationships" xmlns:mc="http://schemas.openxmlformats.org/markup-compatibility/2006" xmlns:mv="urn:schemas-microsoft-com:mac:vml" xmlns:p="http://schemas.openxmlformats.org/presentationml/2006/main" xmlns:c="http://schemas.openxmlformats.org/drawingml/2006/chart" xmlns:dgm="http://schemas.openxmlformats.org/drawingml/2006/diagram" xmlns:o="urn:schemas-microsoft-com:office:office" xmlns:v="urn:schemas-microsoft-com:vml" xmlns:pvml="urn:schemas-microsoft-com:office:powerpoint" xmlns:com="http://schemas.openxmlformats.org/drawingml/2006/compatibility" xmlns:p14="http://schemas.microsoft.com/office/powerpoint/2010/main" showMasterPhAnim="0" showMasterSp="0">
+  <p:cSld>
+    <p:spTree>
+      <p:nvGrpSpPr>
+        <p:cNvPr id="227" name="Shape 227"/>
+        <p:cNvGrpSpPr/>
+        <p:nvPr/>
+      </p:nvGrpSpPr>
+      <p:grpSpPr>
+        <a:xfrm>
+          <a:off x="0" y="0"/>
+          <a:ext cx="0" cy="0"/>
+          <a:chOff x="0" y="0"/>
+          <a:chExt cx="0" cy="0"/>
+        </a:xfrm>
+      </p:grpSpPr>
+      <p:sp>
+        <p:nvSpPr>
+          <p:cNvPr id="228" name="Shape 228"/>
+          <p:cNvSpPr/>
+          <p:nvPr>
+            <p:ph idx="2" type="sldImg"/>
+          </p:nvPr>
+        </p:nvSpPr>
+        <p:spPr>
+          <a:xfrm>
+            <a:off x="381187" y="685800"/>
+            <a:ext cx="6096299" cy="3429000"/>
+          </a:xfrm>
+          <a:custGeom>
+            <a:pathLst>
+              <a:path extrusionOk="0" h="120000" w="120000">
+                <a:moveTo>
+                  <a:pt x="0" y="0"/>
+                </a:moveTo>
+                <a:lnTo>
+                  <a:pt x="120000" y="0"/>
+                </a:lnTo>
+                <a:lnTo>
+                  <a:pt x="120000" y="120000"/>
+                </a:lnTo>
+                <a:lnTo>
+                  <a:pt x="0" y="120000"/>
+                </a:lnTo>
+                <a:close/>
+              </a:path>
+            </a:pathLst>
+          </a:custGeom>
+          <a:noFill/>
+          <a:ln cap="flat" w="9525">
+            <a:solidFill>
+              <a:srgbClr val="000000"/>
+            </a:solidFill>
+            <a:prstDash val="solid"/>
+            <a:round/>
+            <a:headEnd len="med" w="med" type="none"/>
+            <a:tailEnd len="med" w="med" type="none"/>
+          </a:ln>
+        </p:spPr>
+      </p:sp>
+      <p:sp>
+        <p:nvSpPr>
+          <p:cNvPr id="229" name="Shape 229"/>
           <p:cNvSpPr txBox="1"/>
           <p:nvPr>
             <p:ph idx="1" type="body"/>
@@ -32117,6 +32329,23 @@
           </a:bodyPr>
           <a:lstStyle/>
           <a:p>
+            <a:pPr indent="-419100" lvl="0" marL="457200" rtl="0">
+              <a:spcBef>
+                <a:spcPts val="0"/>
+              </a:spcBef>
+              <a:buClr>
+                <a:schemeClr val="dk2"/>
+              </a:buClr>
+              <a:buSzPct val="100000"/>
+              <a:buFont typeface="Arial"/>
+              <a:buChar char="●"/>
+            </a:pPr>
+            <a:r>
+              <a:rPr lang="nl"/>
+              <a:t>In detail of observation.</a:t>
+            </a:r>
+          </a:p>
+          <a:p>
             <a:pPr indent="-419100" lvl="0" marL="457200">
               <a:spcBef>
                 <a:spcPts val="0"/>
@@ -32130,7 +32359,7 @@
             </a:pPr>
             <a:r>
               <a:rPr lang="nl"/>
-              <a:t>In detail of observation and in messages.</a:t>
+              <a:t>In messages.</a:t>
             </a:r>
           </a:p>
         </p:txBody>
@@ -32163,78 +32392,34 @@
           <a:chExt cx="0" cy="0"/>
         </a:xfrm>
       </p:grpSpPr>
-      <p:sp>
-        <p:nvSpPr>
+      <p:pic>
+        <p:nvPicPr>
           <p:cNvPr id="203" name="Shape 203"/>
-          <p:cNvSpPr txBox="1"/>
-          <p:nvPr>
-            <p:ph type="title"/>
-          </p:nvPr>
-        </p:nvSpPr>
+          <p:cNvPicPr preferRelativeResize="0"/>
+          <p:nvPr/>
+        </p:nvPicPr>
+        <p:blipFill>
+          <a:blip r:embed="rId3">
+            <a:alphaModFix/>
+          </a:blip>
+          <a:stretch>
+            <a:fillRect/>
+          </a:stretch>
+        </p:blipFill>
         <p:spPr>
           <a:xfrm>
-            <a:off x="457200" y="155628"/>
-            <a:ext cx="8229600" cy="1044599"/>
+            <a:off x="0" y="0"/>
+            <a:ext cx="9144000" cy="5143500"/>
           </a:xfrm>
           <a:prstGeom prst="rect">
             <a:avLst/>
           </a:prstGeom>
+          <a:noFill/>
+          <a:ln>
+            <a:noFill/>
+          </a:ln>
         </p:spPr>
-        <p:txBody>
-          <a:bodyPr anchorCtr="0" anchor="b" bIns="91425" lIns="91425" rIns="91425" tIns="91425">
-            <a:noAutofit/>
-          </a:bodyPr>
-          <a:lstStyle/>
-          <a:p>
-            <a:pPr>
-              <a:spcBef>
-                <a:spcPts val="0"/>
-              </a:spcBef>
-              <a:buNone/>
-            </a:pPr>
-            <a:r>
-              <a:rPr lang="nl"/>
-              <a:t>New Logo</a:t>
-            </a:r>
-          </a:p>
-        </p:txBody>
-      </p:sp>
-      <p:sp>
-        <p:nvSpPr>
-          <p:cNvPr id="204" name="Shape 204"/>
-          <p:cNvSpPr txBox="1"/>
-          <p:nvPr>
-            <p:ph idx="1" type="body"/>
-          </p:nvPr>
-        </p:nvSpPr>
-        <p:spPr>
-          <a:xfrm>
-            <a:off x="457200" y="1297780"/>
-            <a:ext cx="8229600" cy="3627900"/>
-          </a:xfrm>
-          <a:prstGeom prst="rect">
-            <a:avLst/>
-          </a:prstGeom>
-        </p:spPr>
-        <p:txBody>
-          <a:bodyPr anchorCtr="0" anchor="t" bIns="91425" lIns="91425" rIns="91425" tIns="91425">
-            <a:noAutofit/>
-          </a:bodyPr>
-          <a:lstStyle/>
-          <a:p>
-            <a:pPr>
-              <a:spcBef>
-                <a:spcPts val="0"/>
-              </a:spcBef>
-              <a:buNone/>
-            </a:pPr>
-            <a:r>
-              <a:t/>
-            </a:r>
-            <a:endParaRPr/>
-          </a:p>
-        </p:txBody>
-      </p:sp>
+      </p:pic>
     </p:spTree>
   </p:cSld>
   <p:clrMapOvr>
@@ -32251,7 +32436,7 @@
   <p:cSld>
     <p:spTree>
       <p:nvGrpSpPr>
-        <p:cNvPr id="208" name="Shape 208"/>
+        <p:cNvPr id="207" name="Shape 207"/>
         <p:cNvGrpSpPr/>
         <p:nvPr/>
       </p:nvGrpSpPr>
@@ -32263,78 +32448,34 @@
           <a:chExt cx="0" cy="0"/>
         </a:xfrm>
       </p:grpSpPr>
-      <p:sp>
-        <p:nvSpPr>
-          <p:cNvPr id="209" name="Shape 209"/>
-          <p:cNvSpPr txBox="1"/>
-          <p:nvPr>
-            <p:ph type="title"/>
-          </p:nvPr>
-        </p:nvSpPr>
+      <p:pic>
+        <p:nvPicPr>
+          <p:cNvPr id="208" name="Shape 208"/>
+          <p:cNvPicPr preferRelativeResize="0"/>
+          <p:nvPr/>
+        </p:nvPicPr>
+        <p:blipFill>
+          <a:blip r:embed="rId3">
+            <a:alphaModFix/>
+          </a:blip>
+          <a:stretch>
+            <a:fillRect/>
+          </a:stretch>
+        </p:blipFill>
         <p:spPr>
           <a:xfrm>
-            <a:off x="457200" y="155628"/>
-            <a:ext cx="8229600" cy="1044599"/>
+            <a:off x="0" y="0"/>
+            <a:ext cx="9144000" cy="5143500"/>
           </a:xfrm>
           <a:prstGeom prst="rect">
             <a:avLst/>
           </a:prstGeom>
+          <a:noFill/>
+          <a:ln>
+            <a:noFill/>
+          </a:ln>
         </p:spPr>
-        <p:txBody>
-          <a:bodyPr anchorCtr="0" anchor="b" bIns="91425" lIns="91425" rIns="91425" tIns="91425">
-            <a:noAutofit/>
-          </a:bodyPr>
-          <a:lstStyle/>
-          <a:p>
-            <a:pPr>
-              <a:spcBef>
-                <a:spcPts val="0"/>
-              </a:spcBef>
-              <a:buNone/>
-            </a:pPr>
-            <a:r>
-              <a:rPr lang="nl"/>
-              <a:t>New entry page</a:t>
-            </a:r>
-          </a:p>
-        </p:txBody>
-      </p:sp>
-      <p:sp>
-        <p:nvSpPr>
-          <p:cNvPr id="210" name="Shape 210"/>
-          <p:cNvSpPr txBox="1"/>
-          <p:nvPr>
-            <p:ph idx="1" type="body"/>
-          </p:nvPr>
-        </p:nvSpPr>
-        <p:spPr>
-          <a:xfrm>
-            <a:off x="457200" y="1297780"/>
-            <a:ext cx="8229600" cy="3627900"/>
-          </a:xfrm>
-          <a:prstGeom prst="rect">
-            <a:avLst/>
-          </a:prstGeom>
-        </p:spPr>
-        <p:txBody>
-          <a:bodyPr anchorCtr="0" anchor="t" bIns="91425" lIns="91425" rIns="91425" tIns="91425">
-            <a:noAutofit/>
-          </a:bodyPr>
-          <a:lstStyle/>
-          <a:p>
-            <a:pPr>
-              <a:spcBef>
-                <a:spcPts val="0"/>
-              </a:spcBef>
-              <a:buNone/>
-            </a:pPr>
-            <a:r>
-              <a:t/>
-            </a:r>
-            <a:endParaRPr/>
-          </a:p>
-        </p:txBody>
-      </p:sp>
+      </p:pic>
     </p:spTree>
   </p:cSld>
   <p:clrMapOvr>
@@ -32553,7 +32694,7 @@
   <p:cSld>
     <p:spTree>
       <p:nvGrpSpPr>
-        <p:cNvPr id="214" name="Shape 214"/>
+        <p:cNvPr id="212" name="Shape 212"/>
         <p:cNvGrpSpPr/>
         <p:nvPr/>
       </p:nvGrpSpPr>
@@ -32567,7 +32708,207 @@
       </p:grpSpPr>
       <p:sp>
         <p:nvSpPr>
-          <p:cNvPr id="215" name="Shape 215"/>
+          <p:cNvPr id="213" name="Shape 213"/>
+          <p:cNvSpPr txBox="1"/>
+          <p:nvPr>
+            <p:ph type="title"/>
+          </p:nvPr>
+        </p:nvSpPr>
+        <p:spPr>
+          <a:xfrm>
+            <a:off x="457200" y="155628"/>
+            <a:ext cx="8229600" cy="1044599"/>
+          </a:xfrm>
+          <a:prstGeom prst="rect">
+            <a:avLst/>
+          </a:prstGeom>
+        </p:spPr>
+        <p:txBody>
+          <a:bodyPr anchorCtr="0" anchor="b" bIns="91425" lIns="91425" rIns="91425" tIns="91425">
+            <a:noAutofit/>
+          </a:bodyPr>
+          <a:lstStyle/>
+          <a:p>
+            <a:pPr>
+              <a:spcBef>
+                <a:spcPts val="0"/>
+              </a:spcBef>
+              <a:buNone/>
+            </a:pPr>
+            <a:r>
+              <a:rPr lang="nl"/>
+              <a:t>New Logo</a:t>
+            </a:r>
+          </a:p>
+        </p:txBody>
+      </p:sp>
+      <p:sp>
+        <p:nvSpPr>
+          <p:cNvPr id="214" name="Shape 214"/>
+          <p:cNvSpPr txBox="1"/>
+          <p:nvPr>
+            <p:ph idx="1" type="body"/>
+          </p:nvPr>
+        </p:nvSpPr>
+        <p:spPr>
+          <a:xfrm>
+            <a:off x="457200" y="1297780"/>
+            <a:ext cx="8229600" cy="3627900"/>
+          </a:xfrm>
+          <a:prstGeom prst="rect">
+            <a:avLst/>
+          </a:prstGeom>
+        </p:spPr>
+        <p:txBody>
+          <a:bodyPr anchorCtr="0" anchor="t" bIns="91425" lIns="91425" rIns="91425" tIns="91425">
+            <a:noAutofit/>
+          </a:bodyPr>
+          <a:lstStyle/>
+          <a:p>
+            <a:pPr>
+              <a:spcBef>
+                <a:spcPts val="0"/>
+              </a:spcBef>
+              <a:buNone/>
+            </a:pPr>
+            <a:r>
+              <a:t/>
+            </a:r>
+            <a:endParaRPr/>
+          </a:p>
+        </p:txBody>
+      </p:sp>
+    </p:spTree>
+  </p:cSld>
+  <p:clrMapOvr>
+    <a:masterClrMapping/>
+  </p:clrMapOvr>
+  <p:transition spd="slow">
+    <p:cut/>
+  </p:transition>
+</p:sld>
+</file>
+
+<file path=ppt/slides/slide21.xml><?xml version="1.0" encoding="utf-8"?>
+<p:sld xmlns:a="http://schemas.openxmlformats.org/drawingml/2006/main" xmlns:r="http://schemas.openxmlformats.org/officeDocument/2006/relationships" xmlns:mc="http://schemas.openxmlformats.org/markup-compatibility/2006" xmlns:mv="urn:schemas-microsoft-com:mac:vml" xmlns:p="http://schemas.openxmlformats.org/presentationml/2006/main" xmlns:c="http://schemas.openxmlformats.org/drawingml/2006/chart" xmlns:dgm="http://schemas.openxmlformats.org/drawingml/2006/diagram" xmlns:o="urn:schemas-microsoft-com:office:office" xmlns:v="urn:schemas-microsoft-com:vml" xmlns:pvml="urn:schemas-microsoft-com:office:powerpoint" xmlns:com="http://schemas.openxmlformats.org/drawingml/2006/compatibility" xmlns:p14="http://schemas.microsoft.com/office/powerpoint/2010/main">
+  <p:cSld>
+    <p:spTree>
+      <p:nvGrpSpPr>
+        <p:cNvPr id="218" name="Shape 218"/>
+        <p:cNvGrpSpPr/>
+        <p:nvPr/>
+      </p:nvGrpSpPr>
+      <p:grpSpPr>
+        <a:xfrm>
+          <a:off x="0" y="0"/>
+          <a:ext cx="0" cy="0"/>
+          <a:chOff x="0" y="0"/>
+          <a:chExt cx="0" cy="0"/>
+        </a:xfrm>
+      </p:grpSpPr>
+      <p:sp>
+        <p:nvSpPr>
+          <p:cNvPr id="219" name="Shape 219"/>
+          <p:cNvSpPr txBox="1"/>
+          <p:nvPr>
+            <p:ph type="title"/>
+          </p:nvPr>
+        </p:nvSpPr>
+        <p:spPr>
+          <a:xfrm>
+            <a:off x="457200" y="155628"/>
+            <a:ext cx="8229600" cy="1044599"/>
+          </a:xfrm>
+          <a:prstGeom prst="rect">
+            <a:avLst/>
+          </a:prstGeom>
+        </p:spPr>
+        <p:txBody>
+          <a:bodyPr anchorCtr="0" anchor="b" bIns="91425" lIns="91425" rIns="91425" tIns="91425">
+            <a:noAutofit/>
+          </a:bodyPr>
+          <a:lstStyle/>
+          <a:p>
+            <a:pPr>
+              <a:spcBef>
+                <a:spcPts val="0"/>
+              </a:spcBef>
+              <a:buNone/>
+            </a:pPr>
+            <a:r>
+              <a:rPr lang="nl"/>
+              <a:t>New entry page</a:t>
+            </a:r>
+          </a:p>
+        </p:txBody>
+      </p:sp>
+      <p:sp>
+        <p:nvSpPr>
+          <p:cNvPr id="220" name="Shape 220"/>
+          <p:cNvSpPr txBox="1"/>
+          <p:nvPr>
+            <p:ph idx="1" type="body"/>
+          </p:nvPr>
+        </p:nvSpPr>
+        <p:spPr>
+          <a:xfrm>
+            <a:off x="457200" y="1297780"/>
+            <a:ext cx="8229600" cy="3627900"/>
+          </a:xfrm>
+          <a:prstGeom prst="rect">
+            <a:avLst/>
+          </a:prstGeom>
+        </p:spPr>
+        <p:txBody>
+          <a:bodyPr anchorCtr="0" anchor="t" bIns="91425" lIns="91425" rIns="91425" tIns="91425">
+            <a:noAutofit/>
+          </a:bodyPr>
+          <a:lstStyle/>
+          <a:p>
+            <a:pPr>
+              <a:spcBef>
+                <a:spcPts val="0"/>
+              </a:spcBef>
+              <a:buNone/>
+            </a:pPr>
+            <a:r>
+              <a:t/>
+            </a:r>
+            <a:endParaRPr/>
+          </a:p>
+        </p:txBody>
+      </p:sp>
+    </p:spTree>
+  </p:cSld>
+  <p:clrMapOvr>
+    <a:masterClrMapping/>
+  </p:clrMapOvr>
+  <p:transition spd="slow">
+    <p:cut/>
+  </p:transition>
+</p:sld>
+</file>
+
+<file path=ppt/slides/slide22.xml><?xml version="1.0" encoding="utf-8"?>
+<p:sld xmlns:a="http://schemas.openxmlformats.org/drawingml/2006/main" xmlns:r="http://schemas.openxmlformats.org/officeDocument/2006/relationships" xmlns:mc="http://schemas.openxmlformats.org/markup-compatibility/2006" xmlns:mv="urn:schemas-microsoft-com:mac:vml" xmlns:p="http://schemas.openxmlformats.org/presentationml/2006/main" xmlns:c="http://schemas.openxmlformats.org/drawingml/2006/chart" xmlns:dgm="http://schemas.openxmlformats.org/drawingml/2006/diagram" xmlns:o="urn:schemas-microsoft-com:office:office" xmlns:v="urn:schemas-microsoft-com:vml" xmlns:pvml="urn:schemas-microsoft-com:office:powerpoint" xmlns:com="http://schemas.openxmlformats.org/drawingml/2006/compatibility" xmlns:p14="http://schemas.microsoft.com/office/powerpoint/2010/main">
+  <p:cSld>
+    <p:spTree>
+      <p:nvGrpSpPr>
+        <p:cNvPr id="224" name="Shape 224"/>
+        <p:cNvGrpSpPr/>
+        <p:nvPr/>
+      </p:nvGrpSpPr>
+      <p:grpSpPr>
+        <a:xfrm>
+          <a:off x="0" y="0"/>
+          <a:ext cx="0" cy="0"/>
+          <a:chOff x="0" y="0"/>
+          <a:chExt cx="0" cy="0"/>
+        </a:xfrm>
+      </p:grpSpPr>
+      <p:sp>
+        <p:nvSpPr>
+          <p:cNvPr id="225" name="Shape 225"/>
           <p:cNvSpPr txBox="1"/>
           <p:nvPr>
             <p:ph type="title"/>
@@ -32603,7 +32944,7 @@
       </p:sp>
       <p:sp>
         <p:nvSpPr>
-          <p:cNvPr id="216" name="Shape 216"/>
+          <p:cNvPr id="226" name="Shape 226"/>
           <p:cNvSpPr txBox="1"/>
           <p:nvPr>
             <p:ph idx="1" type="body"/>
@@ -33077,283 +33418,6 @@
 </file>
 
 <file path=ppt/theme/theme1.xml><?xml version="1.0" encoding="utf-8"?>
-<a:theme xmlns:a="http://schemas.openxmlformats.org/drawingml/2006/main" xmlns:r="http://schemas.openxmlformats.org/officeDocument/2006/relationships" name="sketched">
-  <a:themeElements>
-    <a:clrScheme name="Custom 398">
-      <a:dk1>
-        <a:srgbClr val="000000"/>
-      </a:dk1>
-      <a:lt1>
-        <a:srgbClr val="FFFFFF"/>
-      </a:lt1>
-      <a:dk2>
-        <a:srgbClr val="51535D"/>
-      </a:dk2>
-      <a:lt2>
-        <a:srgbClr val="EDEDED"/>
-      </a:lt2>
-      <a:accent1>
-        <a:srgbClr val="676871"/>
-      </a:accent1>
-      <a:accent2>
-        <a:srgbClr val="988489"/>
-      </a:accent2>
-      <a:accent3>
-        <a:srgbClr val="6B7B67"/>
-      </a:accent3>
-      <a:accent4>
-        <a:srgbClr val="747B85"/>
-      </a:accent4>
-      <a:accent5>
-        <a:srgbClr val="A5A9AF"/>
-      </a:accent5>
-      <a:accent6>
-        <a:srgbClr val="85716D"/>
-      </a:accent6>
-      <a:hlink>
-        <a:srgbClr val="676871"/>
-      </a:hlink>
-      <a:folHlink>
-        <a:srgbClr val="3F414A"/>
-      </a:folHlink>
-    </a:clrScheme>
-    <a:fontScheme name="Office">
-      <a:majorFont>
-        <a:latin typeface="Arial"/>
-        <a:ea typeface=""/>
-        <a:cs typeface=""/>
-        <a:font script="Jpan" typeface="ＭＳ Ｐゴシック"/>
-        <a:font script="Hang" typeface="맑은 고딕"/>
-        <a:font script="Hans" typeface="宋体"/>
-        <a:font script="Hant" typeface="新細明體"/>
-        <a:font script="Arab" typeface="Times New Roman"/>
-        <a:font script="Hebr" typeface="Times New Roman"/>
-        <a:font script="Thai" typeface="Angsana New"/>
-        <a:font script="Ethi" typeface="Nyala"/>
-        <a:font script="Beng" typeface="Vrinda"/>
-        <a:font script="Gujr" typeface="Shruti"/>
-        <a:font script="Khmr" typeface="MoolBoran"/>
-        <a:font script="Knda" typeface="Tunga"/>
-        <a:font script="Guru" typeface="Raavi"/>
-        <a:font script="Cans" typeface="Euphemia"/>
-        <a:font script="Cher" typeface="Plantagenet Cherokee"/>
-        <a:font script="Yiii" typeface="Microsoft Yi Baiti"/>
-        <a:font script="Tibt" typeface="Microsoft Himalaya"/>
-        <a:font script="Thaa" typeface="MV Boli"/>
-        <a:font script="Deva" typeface="Mangal"/>
-        <a:font script="Telu" typeface="Gautami"/>
-        <a:font script="Taml" typeface="Latha"/>
-        <a:font script="Syrc" typeface="Estrangelo Edessa"/>
-        <a:font script="Orya" typeface="Kalinga"/>
-        <a:font script="Mlym" typeface="Kartika"/>
-        <a:font script="Laoo" typeface="DokChampa"/>
-        <a:font script="Sinh" typeface="Iskoola Pota"/>
-        <a:font script="Mong" typeface="Mongolian Baiti"/>
-        <a:font script="Viet" typeface="Times New Roman"/>
-        <a:font script="Uigh" typeface="Microsoft Uighur"/>
-      </a:majorFont>
-      <a:minorFont>
-        <a:latin typeface="Arial"/>
-        <a:ea typeface=""/>
-        <a:cs typeface=""/>
-        <a:font script="Jpan" typeface="ＭＳ Ｐゴシック"/>
-        <a:font script="Hang" typeface="맑은 고딕"/>
-        <a:font script="Hans" typeface="宋体"/>
-        <a:font script="Hant" typeface="新細明體"/>
-        <a:font script="Arab" typeface="Times New Roman"/>
-        <a:font script="Hebr" typeface="Times New Roman"/>
-        <a:font script="Thai" typeface="Angsana New"/>
-        <a:font script="Ethi" typeface="Nyala"/>
-        <a:font script="Beng" typeface="Vrinda"/>
-        <a:font script="Gujr" typeface="Shruti"/>
-        <a:font script="Khmr" typeface="MoolBoran"/>
-        <a:font script="Knda" typeface="Tunga"/>
-        <a:font script="Guru" typeface="Raavi"/>
-        <a:font script="Cans" typeface="Euphemia"/>
-        <a:font script="Cher" typeface="Plantagenet Cherokee"/>
-        <a:font script="Yiii" typeface="Microsoft Yi Baiti"/>
-        <a:font script="Tibt" typeface="Microsoft Himalaya"/>
-        <a:font script="Thaa" typeface="MV Boli"/>
-        <a:font script="Deva" typeface="Mangal"/>
-        <a:font script="Telu" typeface="Gautami"/>
-        <a:font script="Taml" typeface="Latha"/>
-        <a:font script="Syrc" typeface="Estrangelo Edessa"/>
-        <a:font script="Orya" typeface="Kalinga"/>
-        <a:font script="Mlym" typeface="Kartika"/>
-        <a:font script="Laoo" typeface="DokChampa"/>
-        <a:font script="Sinh" typeface="Iskoola Pota"/>
-        <a:font script="Mong" typeface="Mongolian Baiti"/>
-        <a:font script="Viet" typeface="Times New Roman"/>
-        <a:font script="Uigh" typeface="Microsoft Uighur"/>
-      </a:minorFont>
-    </a:fontScheme>
-    <a:fmtScheme name="Office">
-      <a:fillStyleLst>
-        <a:solidFill>
-          <a:schemeClr val="phClr"/>
-        </a:solidFill>
-        <a:gradFill rotWithShape="1">
-          <a:gsLst>
-            <a:gs pos="0">
-              <a:schemeClr val="phClr">
-                <a:tint val="50000"/>
-                <a:satMod val="300000"/>
-              </a:schemeClr>
-            </a:gs>
-            <a:gs pos="35000">
-              <a:schemeClr val="phClr">
-                <a:tint val="37000"/>
-                <a:satMod val="300000"/>
-              </a:schemeClr>
-            </a:gs>
-            <a:gs pos="100000">
-              <a:schemeClr val="phClr">
-                <a:tint val="15000"/>
-                <a:satMod val="350000"/>
-              </a:schemeClr>
-            </a:gs>
-          </a:gsLst>
-          <a:lin ang="16200000" scaled="1"/>
-        </a:gradFill>
-        <a:gradFill rotWithShape="1">
-          <a:gsLst>
-            <a:gs pos="0">
-              <a:schemeClr val="phClr">
-                <a:tint val="100000"/>
-                <a:shade val="100000"/>
-                <a:satMod val="130000"/>
-              </a:schemeClr>
-            </a:gs>
-            <a:gs pos="100000">
-              <a:schemeClr val="phClr">
-                <a:tint val="50000"/>
-                <a:shade val="100000"/>
-                <a:satMod val="350000"/>
-              </a:schemeClr>
-            </a:gs>
-          </a:gsLst>
-          <a:lin ang="16200000" scaled="0"/>
-        </a:gradFill>
-      </a:fillStyleLst>
-      <a:lnStyleLst>
-        <a:ln cap="flat" cmpd="sng" w="9525" algn="ctr">
-          <a:solidFill>
-            <a:schemeClr val="phClr">
-              <a:shade val="95000"/>
-              <a:satMod val="105000"/>
-            </a:schemeClr>
-          </a:solidFill>
-          <a:prstDash val="solid"/>
-        </a:ln>
-        <a:ln cap="flat" cmpd="sng" w="25400" algn="ctr">
-          <a:solidFill>
-            <a:schemeClr val="phClr"/>
-          </a:solidFill>
-          <a:prstDash val="solid"/>
-        </a:ln>
-        <a:ln cap="flat" cmpd="sng" w="38100" algn="ctr">
-          <a:solidFill>
-            <a:schemeClr val="phClr"/>
-          </a:solidFill>
-          <a:prstDash val="solid"/>
-        </a:ln>
-      </a:lnStyleLst>
-      <a:effectStyleLst>
-        <a:effectStyle>
-          <a:effectLst>
-            <a:outerShdw blurRad="40000" rotWithShape="0" dir="5400000" dist="20000">
-              <a:srgbClr val="000000">
-                <a:alpha val="38000"/>
-              </a:srgbClr>
-            </a:outerShdw>
-          </a:effectLst>
-        </a:effectStyle>
-        <a:effectStyle>
-          <a:effectLst>
-            <a:outerShdw blurRad="40000" rotWithShape="0" dir="5400000" dist="23000">
-              <a:srgbClr val="000000">
-                <a:alpha val="35000"/>
-              </a:srgbClr>
-            </a:outerShdw>
-          </a:effectLst>
-        </a:effectStyle>
-        <a:effectStyle>
-          <a:effectLst>
-            <a:outerShdw blurRad="40000" rotWithShape="0" dir="5400000" dist="23000">
-              <a:srgbClr val="000000">
-                <a:alpha val="35000"/>
-              </a:srgbClr>
-            </a:outerShdw>
-          </a:effectLst>
-          <a:scene3d>
-            <a:camera prst="orthographicFront">
-              <a:rot lat="0" lon="0" rev="0"/>
-            </a:camera>
-            <a:lightRig dir="t" rig="threePt">
-              <a:rot lat="0" lon="0" rev="1200000"/>
-            </a:lightRig>
-          </a:scene3d>
-          <a:sp3d>
-            <a:bevelT h="25400" w="63500"/>
-          </a:sp3d>
-        </a:effectStyle>
-      </a:effectStyleLst>
-      <a:bgFillStyleLst>
-        <a:solidFill>
-          <a:schemeClr val="phClr"/>
-        </a:solidFill>
-        <a:gradFill rotWithShape="1">
-          <a:gsLst>
-            <a:gs pos="0">
-              <a:schemeClr val="phClr">
-                <a:tint val="40000"/>
-                <a:satMod val="350000"/>
-              </a:schemeClr>
-            </a:gs>
-            <a:gs pos="40000">
-              <a:schemeClr val="phClr">
-                <a:tint val="45000"/>
-                <a:shade val="99000"/>
-                <a:satMod val="350000"/>
-              </a:schemeClr>
-            </a:gs>
-            <a:gs pos="100000">
-              <a:schemeClr val="phClr">
-                <a:shade val="20000"/>
-                <a:satMod val="255000"/>
-              </a:schemeClr>
-            </a:gs>
-          </a:gsLst>
-          <a:path path="circle">
-            <a:fillToRect b="180000" l="50000" r="50000" t="-80000"/>
-          </a:path>
-        </a:gradFill>
-        <a:gradFill rotWithShape="1">
-          <a:gsLst>
-            <a:gs pos="0">
-              <a:schemeClr val="phClr">
-                <a:tint val="80000"/>
-                <a:satMod val="300000"/>
-              </a:schemeClr>
-            </a:gs>
-            <a:gs pos="100000">
-              <a:schemeClr val="phClr">
-                <a:shade val="30000"/>
-                <a:satMod val="200000"/>
-              </a:schemeClr>
-            </a:gs>
-          </a:gsLst>
-          <a:path path="circle">
-            <a:fillToRect b="50000" l="50000" r="50000" t="50000"/>
-          </a:path>
-        </a:gradFill>
-      </a:bgFillStyleLst>
-    </a:fmtScheme>
-  </a:themeElements>
-</a:theme>
-</file>
-
-<file path=ppt/theme/theme2.xml><?xml version="1.0" encoding="utf-8"?>
 <a:theme xmlns:a="http://schemas.openxmlformats.org/drawingml/2006/main" xmlns:r="http://schemas.openxmlformats.org/officeDocument/2006/relationships" name="Office Theme">
   <a:themeElements>
     <a:clrScheme name="Office">
@@ -33670,6 +33734,283 @@
 </a:theme>
 </file>
 
+<file path=ppt/theme/theme2.xml><?xml version="1.0" encoding="utf-8"?>
+<a:theme xmlns:a="http://schemas.openxmlformats.org/drawingml/2006/main" xmlns:r="http://schemas.openxmlformats.org/officeDocument/2006/relationships" name="sketched">
+  <a:themeElements>
+    <a:clrScheme name="Custom 398">
+      <a:dk1>
+        <a:srgbClr val="000000"/>
+      </a:dk1>
+      <a:lt1>
+        <a:srgbClr val="FFFFFF"/>
+      </a:lt1>
+      <a:dk2>
+        <a:srgbClr val="51535D"/>
+      </a:dk2>
+      <a:lt2>
+        <a:srgbClr val="EDEDED"/>
+      </a:lt2>
+      <a:accent1>
+        <a:srgbClr val="676871"/>
+      </a:accent1>
+      <a:accent2>
+        <a:srgbClr val="988489"/>
+      </a:accent2>
+      <a:accent3>
+        <a:srgbClr val="6B7B67"/>
+      </a:accent3>
+      <a:accent4>
+        <a:srgbClr val="747B85"/>
+      </a:accent4>
+      <a:accent5>
+        <a:srgbClr val="A5A9AF"/>
+      </a:accent5>
+      <a:accent6>
+        <a:srgbClr val="85716D"/>
+      </a:accent6>
+      <a:hlink>
+        <a:srgbClr val="676871"/>
+      </a:hlink>
+      <a:folHlink>
+        <a:srgbClr val="3F414A"/>
+      </a:folHlink>
+    </a:clrScheme>
+    <a:fontScheme name="Office">
+      <a:majorFont>
+        <a:latin typeface="Arial"/>
+        <a:ea typeface=""/>
+        <a:cs typeface=""/>
+        <a:font script="Jpan" typeface="ＭＳ Ｐゴシック"/>
+        <a:font script="Hang" typeface="맑은 고딕"/>
+        <a:font script="Hans" typeface="宋体"/>
+        <a:font script="Hant" typeface="新細明體"/>
+        <a:font script="Arab" typeface="Times New Roman"/>
+        <a:font script="Hebr" typeface="Times New Roman"/>
+        <a:font script="Thai" typeface="Angsana New"/>
+        <a:font script="Ethi" typeface="Nyala"/>
+        <a:font script="Beng" typeface="Vrinda"/>
+        <a:font script="Gujr" typeface="Shruti"/>
+        <a:font script="Khmr" typeface="MoolBoran"/>
+        <a:font script="Knda" typeface="Tunga"/>
+        <a:font script="Guru" typeface="Raavi"/>
+        <a:font script="Cans" typeface="Euphemia"/>
+        <a:font script="Cher" typeface="Plantagenet Cherokee"/>
+        <a:font script="Yiii" typeface="Microsoft Yi Baiti"/>
+        <a:font script="Tibt" typeface="Microsoft Himalaya"/>
+        <a:font script="Thaa" typeface="MV Boli"/>
+        <a:font script="Deva" typeface="Mangal"/>
+        <a:font script="Telu" typeface="Gautami"/>
+        <a:font script="Taml" typeface="Latha"/>
+        <a:font script="Syrc" typeface="Estrangelo Edessa"/>
+        <a:font script="Orya" typeface="Kalinga"/>
+        <a:font script="Mlym" typeface="Kartika"/>
+        <a:font script="Laoo" typeface="DokChampa"/>
+        <a:font script="Sinh" typeface="Iskoola Pota"/>
+        <a:font script="Mong" typeface="Mongolian Baiti"/>
+        <a:font script="Viet" typeface="Times New Roman"/>
+        <a:font script="Uigh" typeface="Microsoft Uighur"/>
+      </a:majorFont>
+      <a:minorFont>
+        <a:latin typeface="Arial"/>
+        <a:ea typeface=""/>
+        <a:cs typeface=""/>
+        <a:font script="Jpan" typeface="ＭＳ Ｐゴシック"/>
+        <a:font script="Hang" typeface="맑은 고딕"/>
+        <a:font script="Hans" typeface="宋体"/>
+        <a:font script="Hant" typeface="新細明體"/>
+        <a:font script="Arab" typeface="Times New Roman"/>
+        <a:font script="Hebr" typeface="Times New Roman"/>
+        <a:font script="Thai" typeface="Angsana New"/>
+        <a:font script="Ethi" typeface="Nyala"/>
+        <a:font script="Beng" typeface="Vrinda"/>
+        <a:font script="Gujr" typeface="Shruti"/>
+        <a:font script="Khmr" typeface="MoolBoran"/>
+        <a:font script="Knda" typeface="Tunga"/>
+        <a:font script="Guru" typeface="Raavi"/>
+        <a:font script="Cans" typeface="Euphemia"/>
+        <a:font script="Cher" typeface="Plantagenet Cherokee"/>
+        <a:font script="Yiii" typeface="Microsoft Yi Baiti"/>
+        <a:font script="Tibt" typeface="Microsoft Himalaya"/>
+        <a:font script="Thaa" typeface="MV Boli"/>
+        <a:font script="Deva" typeface="Mangal"/>
+        <a:font script="Telu" typeface="Gautami"/>
+        <a:font script="Taml" typeface="Latha"/>
+        <a:font script="Syrc" typeface="Estrangelo Edessa"/>
+        <a:font script="Orya" typeface="Kalinga"/>
+        <a:font script="Mlym" typeface="Kartika"/>
+        <a:font script="Laoo" typeface="DokChampa"/>
+        <a:font script="Sinh" typeface="Iskoola Pota"/>
+        <a:font script="Mong" typeface="Mongolian Baiti"/>
+        <a:font script="Viet" typeface="Times New Roman"/>
+        <a:font script="Uigh" typeface="Microsoft Uighur"/>
+      </a:minorFont>
+    </a:fontScheme>
+    <a:fmtScheme name="Office">
+      <a:fillStyleLst>
+        <a:solidFill>
+          <a:schemeClr val="phClr"/>
+        </a:solidFill>
+        <a:gradFill rotWithShape="1">
+          <a:gsLst>
+            <a:gs pos="0">
+              <a:schemeClr val="phClr">
+                <a:tint val="50000"/>
+                <a:satMod val="300000"/>
+              </a:schemeClr>
+            </a:gs>
+            <a:gs pos="35000">
+              <a:schemeClr val="phClr">
+                <a:tint val="37000"/>
+                <a:satMod val="300000"/>
+              </a:schemeClr>
+            </a:gs>
+            <a:gs pos="100000">
+              <a:schemeClr val="phClr">
+                <a:tint val="15000"/>
+                <a:satMod val="350000"/>
+              </a:schemeClr>
+            </a:gs>
+          </a:gsLst>
+          <a:lin ang="16200000" scaled="1"/>
+        </a:gradFill>
+        <a:gradFill rotWithShape="1">
+          <a:gsLst>
+            <a:gs pos="0">
+              <a:schemeClr val="phClr">
+                <a:tint val="100000"/>
+                <a:shade val="100000"/>
+                <a:satMod val="130000"/>
+              </a:schemeClr>
+            </a:gs>
+            <a:gs pos="100000">
+              <a:schemeClr val="phClr">
+                <a:tint val="50000"/>
+                <a:shade val="100000"/>
+                <a:satMod val="350000"/>
+              </a:schemeClr>
+            </a:gs>
+          </a:gsLst>
+          <a:lin ang="16200000" scaled="0"/>
+        </a:gradFill>
+      </a:fillStyleLst>
+      <a:lnStyleLst>
+        <a:ln cap="flat" cmpd="sng" w="9525" algn="ctr">
+          <a:solidFill>
+            <a:schemeClr val="phClr">
+              <a:shade val="95000"/>
+              <a:satMod val="105000"/>
+            </a:schemeClr>
+          </a:solidFill>
+          <a:prstDash val="solid"/>
+        </a:ln>
+        <a:ln cap="flat" cmpd="sng" w="25400" algn="ctr">
+          <a:solidFill>
+            <a:schemeClr val="phClr"/>
+          </a:solidFill>
+          <a:prstDash val="solid"/>
+        </a:ln>
+        <a:ln cap="flat" cmpd="sng" w="38100" algn="ctr">
+          <a:solidFill>
+            <a:schemeClr val="phClr"/>
+          </a:solidFill>
+          <a:prstDash val="solid"/>
+        </a:ln>
+      </a:lnStyleLst>
+      <a:effectStyleLst>
+        <a:effectStyle>
+          <a:effectLst>
+            <a:outerShdw blurRad="40000" rotWithShape="0" dir="5400000" dist="20000">
+              <a:srgbClr val="000000">
+                <a:alpha val="38000"/>
+              </a:srgbClr>
+            </a:outerShdw>
+          </a:effectLst>
+        </a:effectStyle>
+        <a:effectStyle>
+          <a:effectLst>
+            <a:outerShdw blurRad="40000" rotWithShape="0" dir="5400000" dist="23000">
+              <a:srgbClr val="000000">
+                <a:alpha val="35000"/>
+              </a:srgbClr>
+            </a:outerShdw>
+          </a:effectLst>
+        </a:effectStyle>
+        <a:effectStyle>
+          <a:effectLst>
+            <a:outerShdw blurRad="40000" rotWithShape="0" dir="5400000" dist="23000">
+              <a:srgbClr val="000000">
+                <a:alpha val="35000"/>
+              </a:srgbClr>
+            </a:outerShdw>
+          </a:effectLst>
+          <a:scene3d>
+            <a:camera prst="orthographicFront">
+              <a:rot lat="0" lon="0" rev="0"/>
+            </a:camera>
+            <a:lightRig dir="t" rig="threePt">
+              <a:rot lat="0" lon="0" rev="1200000"/>
+            </a:lightRig>
+          </a:scene3d>
+          <a:sp3d>
+            <a:bevelT h="25400" w="63500"/>
+          </a:sp3d>
+        </a:effectStyle>
+      </a:effectStyleLst>
+      <a:bgFillStyleLst>
+        <a:solidFill>
+          <a:schemeClr val="phClr"/>
+        </a:solidFill>
+        <a:gradFill rotWithShape="1">
+          <a:gsLst>
+            <a:gs pos="0">
+              <a:schemeClr val="phClr">
+                <a:tint val="40000"/>
+                <a:satMod val="350000"/>
+              </a:schemeClr>
+            </a:gs>
+            <a:gs pos="40000">
+              <a:schemeClr val="phClr">
+                <a:tint val="45000"/>
+                <a:shade val="99000"/>
+                <a:satMod val="350000"/>
+              </a:schemeClr>
+            </a:gs>
+            <a:gs pos="100000">
+              <a:schemeClr val="phClr">
+                <a:shade val="20000"/>
+                <a:satMod val="255000"/>
+              </a:schemeClr>
+            </a:gs>
+          </a:gsLst>
+          <a:path path="circle">
+            <a:fillToRect b="180000" l="50000" r="50000" t="-80000"/>
+          </a:path>
+        </a:gradFill>
+        <a:gradFill rotWithShape="1">
+          <a:gsLst>
+            <a:gs pos="0">
+              <a:schemeClr val="phClr">
+                <a:tint val="80000"/>
+                <a:satMod val="300000"/>
+              </a:schemeClr>
+            </a:gs>
+            <a:gs pos="100000">
+              <a:schemeClr val="phClr">
+                <a:shade val="30000"/>
+                <a:satMod val="200000"/>
+              </a:schemeClr>
+            </a:gs>
+          </a:gsLst>
+          <a:path path="circle">
+            <a:fillToRect b="50000" l="50000" r="50000" t="50000"/>
+          </a:path>
+        </a:gradFill>
+      </a:bgFillStyleLst>
+    </a:fmtScheme>
+  </a:themeElements>
+</a:theme>
+</file>
+
 <file path=ppt/theme/theme3.xml><?xml version="1.0" encoding="utf-8"?>
 <a:theme xmlns:a="http://schemas.openxmlformats.org/drawingml/2006/main" xmlns:r="http://schemas.openxmlformats.org/officeDocument/2006/relationships" name="Custom Theme">
   <a:themeElements>

</xml_diff>

<commit_message>
Add remarks to finish presenation on DeepskyLog 5.0.
</commit_message>
<xml_diff>
--- a/Meeting20150425/DeepskyLog 5.0.pptx
+++ b/Meeting20150425/DeepskyLog 5.0.pptx
@@ -32765,16 +32765,21 @@
           </a:bodyPr>
           <a:lstStyle/>
           <a:p>
-            <a:pPr>
+            <a:pPr indent="-419100" lvl="0" marL="457200">
               <a:spcBef>
                 <a:spcPts val="0"/>
               </a:spcBef>
-              <a:buNone/>
+              <a:buClr>
+                <a:schemeClr val="dk2"/>
+              </a:buClr>
+              <a:buSzPct val="100000"/>
+              <a:buFont typeface="Arial"/>
+              <a:buChar char="●"/>
             </a:pPr>
             <a:r>
-              <a:t/>
+              <a:rPr lang="nl"/>
+              <a:t>Almost ready</a:t>
             </a:r>
-            <a:endParaRPr/>
           </a:p>
         </p:txBody>
       </p:sp>
@@ -32865,16 +32870,21 @@
           </a:bodyPr>
           <a:lstStyle/>
           <a:p>
-            <a:pPr>
+            <a:pPr indent="-419100" lvl="0" marL="457200">
               <a:spcBef>
                 <a:spcPts val="0"/>
               </a:spcBef>
-              <a:buNone/>
+              <a:buClr>
+                <a:schemeClr val="dk2"/>
+              </a:buClr>
+              <a:buSzPct val="100000"/>
+              <a:buFont typeface="Arial"/>
+              <a:buChar char="●"/>
             </a:pPr>
             <a:r>
-              <a:t/>
+              <a:rPr lang="nl"/>
+              <a:t>Needs new logo</a:t>
             </a:r>
-            <a:endParaRPr/>
           </a:p>
         </p:txBody>
       </p:sp>
@@ -32965,16 +32975,106 @@
           </a:bodyPr>
           <a:lstStyle/>
           <a:p>
-            <a:pPr>
+            <a:pPr indent="-419100" lvl="0" marL="457200" rtl="0">
               <a:spcBef>
                 <a:spcPts val="0"/>
               </a:spcBef>
-              <a:buNone/>
+              <a:buClr>
+                <a:schemeClr val="dk2"/>
+              </a:buClr>
+              <a:buSzPct val="100000"/>
+              <a:buFont typeface="Arial"/>
+              <a:buChar char="●"/>
             </a:pPr>
             <a:r>
-              <a:t/>
+              <a:rPr lang="nl"/>
+              <a:t>Still todo:</a:t>
             </a:r>
-            <a:endParaRPr/>
+          </a:p>
+          <a:p>
+            <a:pPr indent="-381000" lvl="1" marL="914400" rtl="0">
+              <a:spcBef>
+                <a:spcPts val="0"/>
+              </a:spcBef>
+              <a:buClr>
+                <a:schemeClr val="dk2"/>
+              </a:buClr>
+              <a:buSzPct val="80000"/>
+              <a:buFont typeface="Courier New"/>
+              <a:buChar char="o"/>
+            </a:pPr>
+            <a:r>
+              <a:rPr lang="nl"/>
+              <a:t>Add SQM / Limiting magnitude</a:t>
+            </a:r>
+          </a:p>
+          <a:p>
+            <a:pPr indent="-381000" lvl="1" marL="914400" rtl="0">
+              <a:spcBef>
+                <a:spcPts val="0"/>
+              </a:spcBef>
+              <a:buClr>
+                <a:schemeClr val="dk2"/>
+              </a:buClr>
+              <a:buSzPct val="80000"/>
+              <a:buFont typeface="Courier New"/>
+              <a:buChar char="o"/>
+            </a:pPr>
+            <a:r>
+              <a:rPr lang="nl"/>
+              <a:t>Adapt location</a:t>
+            </a:r>
+          </a:p>
+          <a:p>
+            <a:pPr indent="-381000" lvl="1" marL="914400" rtl="0">
+              <a:spcBef>
+                <a:spcPts val="0"/>
+              </a:spcBef>
+              <a:buClr>
+                <a:schemeClr val="dk2"/>
+              </a:buClr>
+              <a:buSzPct val="80000"/>
+              <a:buFont typeface="Courier New"/>
+              <a:buChar char="o"/>
+            </a:pPr>
+            <a:r>
+              <a:rPr lang="nl"/>
+              <a:t>Show locations on map, together with all other locations.</a:t>
+            </a:r>
+          </a:p>
+          <a:p>
+            <a:pPr indent="-381000" lvl="1" marL="914400" rtl="0">
+              <a:spcBef>
+                <a:spcPts val="0"/>
+              </a:spcBef>
+              <a:buClr>
+                <a:schemeClr val="dk2"/>
+              </a:buClr>
+              <a:buSzPct val="80000"/>
+              <a:buFont typeface="Courier New"/>
+              <a:buChar char="o"/>
+            </a:pPr>
+            <a:r>
+              <a:rPr lang="nl"/>
+              <a:t>Write script to adapt the old locations</a:t>
+            </a:r>
+          </a:p>
+          <a:p>
+            <a:pPr indent="-381000" lvl="1" marL="914400">
+              <a:spcBef>
+                <a:spcPts val="0"/>
+              </a:spcBef>
+              <a:buClr>
+                <a:schemeClr val="dk2"/>
+              </a:buClr>
+              <a:buSzPct val="80000"/>
+              <a:buFont typeface="Courier New"/>
+              <a:buChar char="o"/>
+            </a:pPr>
+            <a:r>
+              <a:rPr lang="nl"/>
+              <a:t>Import/export using OAL should use the elevation.</a:t>
+            </a:r>
           </a:p>
         </p:txBody>
       </p:sp>
@@ -33418,6 +33518,283 @@
 </file>
 
 <file path=ppt/theme/theme1.xml><?xml version="1.0" encoding="utf-8"?>
+<a:theme xmlns:a="http://schemas.openxmlformats.org/drawingml/2006/main" xmlns:r="http://schemas.openxmlformats.org/officeDocument/2006/relationships" name="sketched">
+  <a:themeElements>
+    <a:clrScheme name="Custom 398">
+      <a:dk1>
+        <a:srgbClr val="000000"/>
+      </a:dk1>
+      <a:lt1>
+        <a:srgbClr val="FFFFFF"/>
+      </a:lt1>
+      <a:dk2>
+        <a:srgbClr val="51535D"/>
+      </a:dk2>
+      <a:lt2>
+        <a:srgbClr val="EDEDED"/>
+      </a:lt2>
+      <a:accent1>
+        <a:srgbClr val="676871"/>
+      </a:accent1>
+      <a:accent2>
+        <a:srgbClr val="988489"/>
+      </a:accent2>
+      <a:accent3>
+        <a:srgbClr val="6B7B67"/>
+      </a:accent3>
+      <a:accent4>
+        <a:srgbClr val="747B85"/>
+      </a:accent4>
+      <a:accent5>
+        <a:srgbClr val="A5A9AF"/>
+      </a:accent5>
+      <a:accent6>
+        <a:srgbClr val="85716D"/>
+      </a:accent6>
+      <a:hlink>
+        <a:srgbClr val="676871"/>
+      </a:hlink>
+      <a:folHlink>
+        <a:srgbClr val="3F414A"/>
+      </a:folHlink>
+    </a:clrScheme>
+    <a:fontScheme name="Office">
+      <a:majorFont>
+        <a:latin typeface="Arial"/>
+        <a:ea typeface=""/>
+        <a:cs typeface=""/>
+        <a:font script="Jpan" typeface="ＭＳ Ｐゴシック"/>
+        <a:font script="Hang" typeface="맑은 고딕"/>
+        <a:font script="Hans" typeface="宋体"/>
+        <a:font script="Hant" typeface="新細明體"/>
+        <a:font script="Arab" typeface="Times New Roman"/>
+        <a:font script="Hebr" typeface="Times New Roman"/>
+        <a:font script="Thai" typeface="Angsana New"/>
+        <a:font script="Ethi" typeface="Nyala"/>
+        <a:font script="Beng" typeface="Vrinda"/>
+        <a:font script="Gujr" typeface="Shruti"/>
+        <a:font script="Khmr" typeface="MoolBoran"/>
+        <a:font script="Knda" typeface="Tunga"/>
+        <a:font script="Guru" typeface="Raavi"/>
+        <a:font script="Cans" typeface="Euphemia"/>
+        <a:font script="Cher" typeface="Plantagenet Cherokee"/>
+        <a:font script="Yiii" typeface="Microsoft Yi Baiti"/>
+        <a:font script="Tibt" typeface="Microsoft Himalaya"/>
+        <a:font script="Thaa" typeface="MV Boli"/>
+        <a:font script="Deva" typeface="Mangal"/>
+        <a:font script="Telu" typeface="Gautami"/>
+        <a:font script="Taml" typeface="Latha"/>
+        <a:font script="Syrc" typeface="Estrangelo Edessa"/>
+        <a:font script="Orya" typeface="Kalinga"/>
+        <a:font script="Mlym" typeface="Kartika"/>
+        <a:font script="Laoo" typeface="DokChampa"/>
+        <a:font script="Sinh" typeface="Iskoola Pota"/>
+        <a:font script="Mong" typeface="Mongolian Baiti"/>
+        <a:font script="Viet" typeface="Times New Roman"/>
+        <a:font script="Uigh" typeface="Microsoft Uighur"/>
+      </a:majorFont>
+      <a:minorFont>
+        <a:latin typeface="Arial"/>
+        <a:ea typeface=""/>
+        <a:cs typeface=""/>
+        <a:font script="Jpan" typeface="ＭＳ Ｐゴシック"/>
+        <a:font script="Hang" typeface="맑은 고딕"/>
+        <a:font script="Hans" typeface="宋体"/>
+        <a:font script="Hant" typeface="新細明體"/>
+        <a:font script="Arab" typeface="Times New Roman"/>
+        <a:font script="Hebr" typeface="Times New Roman"/>
+        <a:font script="Thai" typeface="Angsana New"/>
+        <a:font script="Ethi" typeface="Nyala"/>
+        <a:font script="Beng" typeface="Vrinda"/>
+        <a:font script="Gujr" typeface="Shruti"/>
+        <a:font script="Khmr" typeface="MoolBoran"/>
+        <a:font script="Knda" typeface="Tunga"/>
+        <a:font script="Guru" typeface="Raavi"/>
+        <a:font script="Cans" typeface="Euphemia"/>
+        <a:font script="Cher" typeface="Plantagenet Cherokee"/>
+        <a:font script="Yiii" typeface="Microsoft Yi Baiti"/>
+        <a:font script="Tibt" typeface="Microsoft Himalaya"/>
+        <a:font script="Thaa" typeface="MV Boli"/>
+        <a:font script="Deva" typeface="Mangal"/>
+        <a:font script="Telu" typeface="Gautami"/>
+        <a:font script="Taml" typeface="Latha"/>
+        <a:font script="Syrc" typeface="Estrangelo Edessa"/>
+        <a:font script="Orya" typeface="Kalinga"/>
+        <a:font script="Mlym" typeface="Kartika"/>
+        <a:font script="Laoo" typeface="DokChampa"/>
+        <a:font script="Sinh" typeface="Iskoola Pota"/>
+        <a:font script="Mong" typeface="Mongolian Baiti"/>
+        <a:font script="Viet" typeface="Times New Roman"/>
+        <a:font script="Uigh" typeface="Microsoft Uighur"/>
+      </a:minorFont>
+    </a:fontScheme>
+    <a:fmtScheme name="Office">
+      <a:fillStyleLst>
+        <a:solidFill>
+          <a:schemeClr val="phClr"/>
+        </a:solidFill>
+        <a:gradFill rotWithShape="1">
+          <a:gsLst>
+            <a:gs pos="0">
+              <a:schemeClr val="phClr">
+                <a:tint val="50000"/>
+                <a:satMod val="300000"/>
+              </a:schemeClr>
+            </a:gs>
+            <a:gs pos="35000">
+              <a:schemeClr val="phClr">
+                <a:tint val="37000"/>
+                <a:satMod val="300000"/>
+              </a:schemeClr>
+            </a:gs>
+            <a:gs pos="100000">
+              <a:schemeClr val="phClr">
+                <a:tint val="15000"/>
+                <a:satMod val="350000"/>
+              </a:schemeClr>
+            </a:gs>
+          </a:gsLst>
+          <a:lin ang="16200000" scaled="1"/>
+        </a:gradFill>
+        <a:gradFill rotWithShape="1">
+          <a:gsLst>
+            <a:gs pos="0">
+              <a:schemeClr val="phClr">
+                <a:tint val="100000"/>
+                <a:shade val="100000"/>
+                <a:satMod val="130000"/>
+              </a:schemeClr>
+            </a:gs>
+            <a:gs pos="100000">
+              <a:schemeClr val="phClr">
+                <a:tint val="50000"/>
+                <a:shade val="100000"/>
+                <a:satMod val="350000"/>
+              </a:schemeClr>
+            </a:gs>
+          </a:gsLst>
+          <a:lin ang="16200000" scaled="0"/>
+        </a:gradFill>
+      </a:fillStyleLst>
+      <a:lnStyleLst>
+        <a:ln cap="flat" cmpd="sng" w="9525" algn="ctr">
+          <a:solidFill>
+            <a:schemeClr val="phClr">
+              <a:shade val="95000"/>
+              <a:satMod val="105000"/>
+            </a:schemeClr>
+          </a:solidFill>
+          <a:prstDash val="solid"/>
+        </a:ln>
+        <a:ln cap="flat" cmpd="sng" w="25400" algn="ctr">
+          <a:solidFill>
+            <a:schemeClr val="phClr"/>
+          </a:solidFill>
+          <a:prstDash val="solid"/>
+        </a:ln>
+        <a:ln cap="flat" cmpd="sng" w="38100" algn="ctr">
+          <a:solidFill>
+            <a:schemeClr val="phClr"/>
+          </a:solidFill>
+          <a:prstDash val="solid"/>
+        </a:ln>
+      </a:lnStyleLst>
+      <a:effectStyleLst>
+        <a:effectStyle>
+          <a:effectLst>
+            <a:outerShdw blurRad="40000" rotWithShape="0" dir="5400000" dist="20000">
+              <a:srgbClr val="000000">
+                <a:alpha val="38000"/>
+              </a:srgbClr>
+            </a:outerShdw>
+          </a:effectLst>
+        </a:effectStyle>
+        <a:effectStyle>
+          <a:effectLst>
+            <a:outerShdw blurRad="40000" rotWithShape="0" dir="5400000" dist="23000">
+              <a:srgbClr val="000000">
+                <a:alpha val="35000"/>
+              </a:srgbClr>
+            </a:outerShdw>
+          </a:effectLst>
+        </a:effectStyle>
+        <a:effectStyle>
+          <a:effectLst>
+            <a:outerShdw blurRad="40000" rotWithShape="0" dir="5400000" dist="23000">
+              <a:srgbClr val="000000">
+                <a:alpha val="35000"/>
+              </a:srgbClr>
+            </a:outerShdw>
+          </a:effectLst>
+          <a:scene3d>
+            <a:camera prst="orthographicFront">
+              <a:rot lat="0" lon="0" rev="0"/>
+            </a:camera>
+            <a:lightRig dir="t" rig="threePt">
+              <a:rot lat="0" lon="0" rev="1200000"/>
+            </a:lightRig>
+          </a:scene3d>
+          <a:sp3d>
+            <a:bevelT h="25400" w="63500"/>
+          </a:sp3d>
+        </a:effectStyle>
+      </a:effectStyleLst>
+      <a:bgFillStyleLst>
+        <a:solidFill>
+          <a:schemeClr val="phClr"/>
+        </a:solidFill>
+        <a:gradFill rotWithShape="1">
+          <a:gsLst>
+            <a:gs pos="0">
+              <a:schemeClr val="phClr">
+                <a:tint val="40000"/>
+                <a:satMod val="350000"/>
+              </a:schemeClr>
+            </a:gs>
+            <a:gs pos="40000">
+              <a:schemeClr val="phClr">
+                <a:tint val="45000"/>
+                <a:shade val="99000"/>
+                <a:satMod val="350000"/>
+              </a:schemeClr>
+            </a:gs>
+            <a:gs pos="100000">
+              <a:schemeClr val="phClr">
+                <a:shade val="20000"/>
+                <a:satMod val="255000"/>
+              </a:schemeClr>
+            </a:gs>
+          </a:gsLst>
+          <a:path path="circle">
+            <a:fillToRect b="180000" l="50000" r="50000" t="-80000"/>
+          </a:path>
+        </a:gradFill>
+        <a:gradFill rotWithShape="1">
+          <a:gsLst>
+            <a:gs pos="0">
+              <a:schemeClr val="phClr">
+                <a:tint val="80000"/>
+                <a:satMod val="300000"/>
+              </a:schemeClr>
+            </a:gs>
+            <a:gs pos="100000">
+              <a:schemeClr val="phClr">
+                <a:shade val="30000"/>
+                <a:satMod val="200000"/>
+              </a:schemeClr>
+            </a:gs>
+          </a:gsLst>
+          <a:path path="circle">
+            <a:fillToRect b="50000" l="50000" r="50000" t="50000"/>
+          </a:path>
+        </a:gradFill>
+      </a:bgFillStyleLst>
+    </a:fmtScheme>
+  </a:themeElements>
+</a:theme>
+</file>
+
+<file path=ppt/theme/theme2.xml><?xml version="1.0" encoding="utf-8"?>
 <a:theme xmlns:a="http://schemas.openxmlformats.org/drawingml/2006/main" xmlns:r="http://schemas.openxmlformats.org/officeDocument/2006/relationships" name="Office Theme">
   <a:themeElements>
     <a:clrScheme name="Office">
@@ -33734,283 +34111,6 @@
 </a:theme>
 </file>
 
-<file path=ppt/theme/theme2.xml><?xml version="1.0" encoding="utf-8"?>
-<a:theme xmlns:a="http://schemas.openxmlformats.org/drawingml/2006/main" xmlns:r="http://schemas.openxmlformats.org/officeDocument/2006/relationships" name="sketched">
-  <a:themeElements>
-    <a:clrScheme name="Custom 398">
-      <a:dk1>
-        <a:srgbClr val="000000"/>
-      </a:dk1>
-      <a:lt1>
-        <a:srgbClr val="FFFFFF"/>
-      </a:lt1>
-      <a:dk2>
-        <a:srgbClr val="51535D"/>
-      </a:dk2>
-      <a:lt2>
-        <a:srgbClr val="EDEDED"/>
-      </a:lt2>
-      <a:accent1>
-        <a:srgbClr val="676871"/>
-      </a:accent1>
-      <a:accent2>
-        <a:srgbClr val="988489"/>
-      </a:accent2>
-      <a:accent3>
-        <a:srgbClr val="6B7B67"/>
-      </a:accent3>
-      <a:accent4>
-        <a:srgbClr val="747B85"/>
-      </a:accent4>
-      <a:accent5>
-        <a:srgbClr val="A5A9AF"/>
-      </a:accent5>
-      <a:accent6>
-        <a:srgbClr val="85716D"/>
-      </a:accent6>
-      <a:hlink>
-        <a:srgbClr val="676871"/>
-      </a:hlink>
-      <a:folHlink>
-        <a:srgbClr val="3F414A"/>
-      </a:folHlink>
-    </a:clrScheme>
-    <a:fontScheme name="Office">
-      <a:majorFont>
-        <a:latin typeface="Arial"/>
-        <a:ea typeface=""/>
-        <a:cs typeface=""/>
-        <a:font script="Jpan" typeface="ＭＳ Ｐゴシック"/>
-        <a:font script="Hang" typeface="맑은 고딕"/>
-        <a:font script="Hans" typeface="宋体"/>
-        <a:font script="Hant" typeface="新細明體"/>
-        <a:font script="Arab" typeface="Times New Roman"/>
-        <a:font script="Hebr" typeface="Times New Roman"/>
-        <a:font script="Thai" typeface="Angsana New"/>
-        <a:font script="Ethi" typeface="Nyala"/>
-        <a:font script="Beng" typeface="Vrinda"/>
-        <a:font script="Gujr" typeface="Shruti"/>
-        <a:font script="Khmr" typeface="MoolBoran"/>
-        <a:font script="Knda" typeface="Tunga"/>
-        <a:font script="Guru" typeface="Raavi"/>
-        <a:font script="Cans" typeface="Euphemia"/>
-        <a:font script="Cher" typeface="Plantagenet Cherokee"/>
-        <a:font script="Yiii" typeface="Microsoft Yi Baiti"/>
-        <a:font script="Tibt" typeface="Microsoft Himalaya"/>
-        <a:font script="Thaa" typeface="MV Boli"/>
-        <a:font script="Deva" typeface="Mangal"/>
-        <a:font script="Telu" typeface="Gautami"/>
-        <a:font script="Taml" typeface="Latha"/>
-        <a:font script="Syrc" typeface="Estrangelo Edessa"/>
-        <a:font script="Orya" typeface="Kalinga"/>
-        <a:font script="Mlym" typeface="Kartika"/>
-        <a:font script="Laoo" typeface="DokChampa"/>
-        <a:font script="Sinh" typeface="Iskoola Pota"/>
-        <a:font script="Mong" typeface="Mongolian Baiti"/>
-        <a:font script="Viet" typeface="Times New Roman"/>
-        <a:font script="Uigh" typeface="Microsoft Uighur"/>
-      </a:majorFont>
-      <a:minorFont>
-        <a:latin typeface="Arial"/>
-        <a:ea typeface=""/>
-        <a:cs typeface=""/>
-        <a:font script="Jpan" typeface="ＭＳ Ｐゴシック"/>
-        <a:font script="Hang" typeface="맑은 고딕"/>
-        <a:font script="Hans" typeface="宋体"/>
-        <a:font script="Hant" typeface="新細明體"/>
-        <a:font script="Arab" typeface="Times New Roman"/>
-        <a:font script="Hebr" typeface="Times New Roman"/>
-        <a:font script="Thai" typeface="Angsana New"/>
-        <a:font script="Ethi" typeface="Nyala"/>
-        <a:font script="Beng" typeface="Vrinda"/>
-        <a:font script="Gujr" typeface="Shruti"/>
-        <a:font script="Khmr" typeface="MoolBoran"/>
-        <a:font script="Knda" typeface="Tunga"/>
-        <a:font script="Guru" typeface="Raavi"/>
-        <a:font script="Cans" typeface="Euphemia"/>
-        <a:font script="Cher" typeface="Plantagenet Cherokee"/>
-        <a:font script="Yiii" typeface="Microsoft Yi Baiti"/>
-        <a:font script="Tibt" typeface="Microsoft Himalaya"/>
-        <a:font script="Thaa" typeface="MV Boli"/>
-        <a:font script="Deva" typeface="Mangal"/>
-        <a:font script="Telu" typeface="Gautami"/>
-        <a:font script="Taml" typeface="Latha"/>
-        <a:font script="Syrc" typeface="Estrangelo Edessa"/>
-        <a:font script="Orya" typeface="Kalinga"/>
-        <a:font script="Mlym" typeface="Kartika"/>
-        <a:font script="Laoo" typeface="DokChampa"/>
-        <a:font script="Sinh" typeface="Iskoola Pota"/>
-        <a:font script="Mong" typeface="Mongolian Baiti"/>
-        <a:font script="Viet" typeface="Times New Roman"/>
-        <a:font script="Uigh" typeface="Microsoft Uighur"/>
-      </a:minorFont>
-    </a:fontScheme>
-    <a:fmtScheme name="Office">
-      <a:fillStyleLst>
-        <a:solidFill>
-          <a:schemeClr val="phClr"/>
-        </a:solidFill>
-        <a:gradFill rotWithShape="1">
-          <a:gsLst>
-            <a:gs pos="0">
-              <a:schemeClr val="phClr">
-                <a:tint val="50000"/>
-                <a:satMod val="300000"/>
-              </a:schemeClr>
-            </a:gs>
-            <a:gs pos="35000">
-              <a:schemeClr val="phClr">
-                <a:tint val="37000"/>
-                <a:satMod val="300000"/>
-              </a:schemeClr>
-            </a:gs>
-            <a:gs pos="100000">
-              <a:schemeClr val="phClr">
-                <a:tint val="15000"/>
-                <a:satMod val="350000"/>
-              </a:schemeClr>
-            </a:gs>
-          </a:gsLst>
-          <a:lin ang="16200000" scaled="1"/>
-        </a:gradFill>
-        <a:gradFill rotWithShape="1">
-          <a:gsLst>
-            <a:gs pos="0">
-              <a:schemeClr val="phClr">
-                <a:tint val="100000"/>
-                <a:shade val="100000"/>
-                <a:satMod val="130000"/>
-              </a:schemeClr>
-            </a:gs>
-            <a:gs pos="100000">
-              <a:schemeClr val="phClr">
-                <a:tint val="50000"/>
-                <a:shade val="100000"/>
-                <a:satMod val="350000"/>
-              </a:schemeClr>
-            </a:gs>
-          </a:gsLst>
-          <a:lin ang="16200000" scaled="0"/>
-        </a:gradFill>
-      </a:fillStyleLst>
-      <a:lnStyleLst>
-        <a:ln cap="flat" cmpd="sng" w="9525" algn="ctr">
-          <a:solidFill>
-            <a:schemeClr val="phClr">
-              <a:shade val="95000"/>
-              <a:satMod val="105000"/>
-            </a:schemeClr>
-          </a:solidFill>
-          <a:prstDash val="solid"/>
-        </a:ln>
-        <a:ln cap="flat" cmpd="sng" w="25400" algn="ctr">
-          <a:solidFill>
-            <a:schemeClr val="phClr"/>
-          </a:solidFill>
-          <a:prstDash val="solid"/>
-        </a:ln>
-        <a:ln cap="flat" cmpd="sng" w="38100" algn="ctr">
-          <a:solidFill>
-            <a:schemeClr val="phClr"/>
-          </a:solidFill>
-          <a:prstDash val="solid"/>
-        </a:ln>
-      </a:lnStyleLst>
-      <a:effectStyleLst>
-        <a:effectStyle>
-          <a:effectLst>
-            <a:outerShdw blurRad="40000" rotWithShape="0" dir="5400000" dist="20000">
-              <a:srgbClr val="000000">
-                <a:alpha val="38000"/>
-              </a:srgbClr>
-            </a:outerShdw>
-          </a:effectLst>
-        </a:effectStyle>
-        <a:effectStyle>
-          <a:effectLst>
-            <a:outerShdw blurRad="40000" rotWithShape="0" dir="5400000" dist="23000">
-              <a:srgbClr val="000000">
-                <a:alpha val="35000"/>
-              </a:srgbClr>
-            </a:outerShdw>
-          </a:effectLst>
-        </a:effectStyle>
-        <a:effectStyle>
-          <a:effectLst>
-            <a:outerShdw blurRad="40000" rotWithShape="0" dir="5400000" dist="23000">
-              <a:srgbClr val="000000">
-                <a:alpha val="35000"/>
-              </a:srgbClr>
-            </a:outerShdw>
-          </a:effectLst>
-          <a:scene3d>
-            <a:camera prst="orthographicFront">
-              <a:rot lat="0" lon="0" rev="0"/>
-            </a:camera>
-            <a:lightRig dir="t" rig="threePt">
-              <a:rot lat="0" lon="0" rev="1200000"/>
-            </a:lightRig>
-          </a:scene3d>
-          <a:sp3d>
-            <a:bevelT h="25400" w="63500"/>
-          </a:sp3d>
-        </a:effectStyle>
-      </a:effectStyleLst>
-      <a:bgFillStyleLst>
-        <a:solidFill>
-          <a:schemeClr val="phClr"/>
-        </a:solidFill>
-        <a:gradFill rotWithShape="1">
-          <a:gsLst>
-            <a:gs pos="0">
-              <a:schemeClr val="phClr">
-                <a:tint val="40000"/>
-                <a:satMod val="350000"/>
-              </a:schemeClr>
-            </a:gs>
-            <a:gs pos="40000">
-              <a:schemeClr val="phClr">
-                <a:tint val="45000"/>
-                <a:shade val="99000"/>
-                <a:satMod val="350000"/>
-              </a:schemeClr>
-            </a:gs>
-            <a:gs pos="100000">
-              <a:schemeClr val="phClr">
-                <a:shade val="20000"/>
-                <a:satMod val="255000"/>
-              </a:schemeClr>
-            </a:gs>
-          </a:gsLst>
-          <a:path path="circle">
-            <a:fillToRect b="180000" l="50000" r="50000" t="-80000"/>
-          </a:path>
-        </a:gradFill>
-        <a:gradFill rotWithShape="1">
-          <a:gsLst>
-            <a:gs pos="0">
-              <a:schemeClr val="phClr">
-                <a:tint val="80000"/>
-                <a:satMod val="300000"/>
-              </a:schemeClr>
-            </a:gs>
-            <a:gs pos="100000">
-              <a:schemeClr val="phClr">
-                <a:shade val="30000"/>
-                <a:satMod val="200000"/>
-              </a:schemeClr>
-            </a:gs>
-          </a:gsLst>
-          <a:path path="circle">
-            <a:fillToRect b="50000" l="50000" r="50000" t="50000"/>
-          </a:path>
-        </a:gradFill>
-      </a:bgFillStyleLst>
-    </a:fmtScheme>
-  </a:themeElements>
-</a:theme>
-</file>
-
 <file path=ppt/theme/theme3.xml><?xml version="1.0" encoding="utf-8"?>
 <a:theme xmlns:a="http://schemas.openxmlformats.org/drawingml/2006/main" xmlns:r="http://schemas.openxmlformats.org/officeDocument/2006/relationships" name="Custom Theme">
   <a:themeElements>

</xml_diff>

<commit_message>
Added section on bootstrap-tour.
</commit_message>
<xml_diff>
--- a/Meeting20150425/DeepskyLog 5.0.pptx
+++ b/Meeting20150425/DeepskyLog 5.0.pptx
@@ -30,6 +30,11 @@
     <p:sldId id="275" r:id="rId25"/>
     <p:sldId id="276" r:id="rId26"/>
     <p:sldId id="277" r:id="rId27"/>
+    <p:sldId id="278" r:id="rId28"/>
+    <p:sldId id="279" r:id="rId29"/>
+    <p:sldId id="280" r:id="rId30"/>
+    <p:sldId id="281" r:id="rId31"/>
+    <p:sldId id="282" r:id="rId32"/>
   </p:sldIdLst>
   <p:sldSz cy="5143500" cx="9144000"/>
   <p:notesSz cx="6858000" cy="9144000"/>
@@ -611,7 +616,7 @@
   <p:cSld>
     <p:spTree>
       <p:nvGrpSpPr>
-        <p:cNvPr id="167" name="Shape 167"/>
+        <p:cNvPr id="166" name="Shape 166"/>
         <p:cNvGrpSpPr/>
         <p:nvPr/>
       </p:nvGrpSpPr>
@@ -625,7 +630,7 @@
       </p:grpSpPr>
       <p:sp>
         <p:nvSpPr>
-          <p:cNvPr id="168" name="Shape 168"/>
+          <p:cNvPr id="167" name="Shape 167"/>
           <p:cNvSpPr/>
           <p:nvPr>
             <p:ph idx="2" type="sldImg"/>
@@ -669,7 +674,7 @@
       </p:sp>
       <p:sp>
         <p:nvSpPr>
-          <p:cNvPr id="169" name="Shape 169"/>
+          <p:cNvPr id="168" name="Shape 168"/>
           <p:cNvSpPr txBox="1"/>
           <p:nvPr>
             <p:ph idx="1" type="body"/>
@@ -716,7 +721,7 @@
   <p:cSld>
     <p:spTree>
       <p:nvGrpSpPr>
-        <p:cNvPr id="172" name="Shape 172"/>
+        <p:cNvPr id="171" name="Shape 171"/>
         <p:cNvGrpSpPr/>
         <p:nvPr/>
       </p:nvGrpSpPr>
@@ -730,7 +735,7 @@
       </p:grpSpPr>
       <p:sp>
         <p:nvSpPr>
-          <p:cNvPr id="173" name="Shape 173"/>
+          <p:cNvPr id="172" name="Shape 172"/>
           <p:cNvSpPr/>
           <p:nvPr>
             <p:ph idx="2" type="sldImg"/>
@@ -774,7 +779,7 @@
       </p:sp>
       <p:sp>
         <p:nvSpPr>
-          <p:cNvPr id="174" name="Shape 174"/>
+          <p:cNvPr id="173" name="Shape 173"/>
           <p:cNvSpPr txBox="1"/>
           <p:nvPr>
             <p:ph idx="1" type="body"/>
@@ -821,7 +826,7 @@
   <p:cSld>
     <p:spTree>
       <p:nvGrpSpPr>
-        <p:cNvPr id="177" name="Shape 177"/>
+        <p:cNvPr id="176" name="Shape 176"/>
         <p:cNvGrpSpPr/>
         <p:nvPr/>
       </p:nvGrpSpPr>
@@ -835,7 +840,7 @@
       </p:grpSpPr>
       <p:sp>
         <p:nvSpPr>
-          <p:cNvPr id="178" name="Shape 178"/>
+          <p:cNvPr id="177" name="Shape 177"/>
           <p:cNvSpPr/>
           <p:nvPr>
             <p:ph idx="2" type="sldImg"/>
@@ -879,7 +884,7 @@
       </p:sp>
       <p:sp>
         <p:nvSpPr>
-          <p:cNvPr id="179" name="Shape 179"/>
+          <p:cNvPr id="178" name="Shape 178"/>
           <p:cNvSpPr txBox="1"/>
           <p:nvPr>
             <p:ph idx="1" type="body"/>
@@ -926,7 +931,7 @@
   <p:cSld>
     <p:spTree>
       <p:nvGrpSpPr>
-        <p:cNvPr id="183" name="Shape 183"/>
+        <p:cNvPr id="182" name="Shape 182"/>
         <p:cNvGrpSpPr/>
         <p:nvPr/>
       </p:nvGrpSpPr>
@@ -940,7 +945,7 @@
       </p:grpSpPr>
       <p:sp>
         <p:nvSpPr>
-          <p:cNvPr id="184" name="Shape 184"/>
+          <p:cNvPr id="183" name="Shape 183"/>
           <p:cNvSpPr/>
           <p:nvPr>
             <p:ph idx="2" type="sldImg"/>
@@ -984,7 +989,7 @@
       </p:sp>
       <p:sp>
         <p:nvSpPr>
-          <p:cNvPr id="185" name="Shape 185"/>
+          <p:cNvPr id="184" name="Shape 184"/>
           <p:cNvSpPr txBox="1"/>
           <p:nvPr>
             <p:ph idx="1" type="body"/>
@@ -1136,7 +1141,7 @@
   <p:cSld>
     <p:spTree>
       <p:nvGrpSpPr>
-        <p:cNvPr id="194" name="Shape 194"/>
+        <p:cNvPr id="193" name="Shape 193"/>
         <p:cNvGrpSpPr/>
         <p:nvPr/>
       </p:nvGrpSpPr>
@@ -1150,7 +1155,7 @@
       </p:grpSpPr>
       <p:sp>
         <p:nvSpPr>
-          <p:cNvPr id="195" name="Shape 195"/>
+          <p:cNvPr id="194" name="Shape 194"/>
           <p:cNvSpPr/>
           <p:nvPr>
             <p:ph idx="2" type="sldImg"/>
@@ -1194,7 +1199,7 @@
       </p:sp>
       <p:sp>
         <p:nvSpPr>
-          <p:cNvPr id="196" name="Shape 196"/>
+          <p:cNvPr id="195" name="Shape 195"/>
           <p:cNvSpPr txBox="1"/>
           <p:nvPr>
             <p:ph idx="1" type="body"/>
@@ -1241,7 +1246,7 @@
   <p:cSld>
     <p:spTree>
       <p:nvGrpSpPr>
-        <p:cNvPr id="200" name="Shape 200"/>
+        <p:cNvPr id="198" name="Shape 198"/>
         <p:cNvGrpSpPr/>
         <p:nvPr/>
       </p:nvGrpSpPr>
@@ -1255,7 +1260,7 @@
       </p:grpSpPr>
       <p:sp>
         <p:nvSpPr>
-          <p:cNvPr id="201" name="Shape 201"/>
+          <p:cNvPr id="199" name="Shape 199"/>
           <p:cNvSpPr/>
           <p:nvPr>
             <p:ph idx="2" type="sldImg"/>
@@ -1299,7 +1304,7 @@
       </p:sp>
       <p:sp>
         <p:nvSpPr>
-          <p:cNvPr id="202" name="Shape 202"/>
+          <p:cNvPr id="200" name="Shape 200"/>
           <p:cNvSpPr txBox="1"/>
           <p:nvPr>
             <p:ph idx="1" type="body"/>
@@ -1346,7 +1351,7 @@
   <p:cSld>
     <p:spTree>
       <p:nvGrpSpPr>
-        <p:cNvPr id="205" name="Shape 205"/>
+        <p:cNvPr id="204" name="Shape 204"/>
         <p:cNvGrpSpPr/>
         <p:nvPr/>
       </p:nvGrpSpPr>
@@ -1360,7 +1365,7 @@
       </p:grpSpPr>
       <p:sp>
         <p:nvSpPr>
-          <p:cNvPr id="206" name="Shape 206"/>
+          <p:cNvPr id="205" name="Shape 205"/>
           <p:cNvSpPr/>
           <p:nvPr>
             <p:ph idx="2" type="sldImg"/>
@@ -1404,7 +1409,7 @@
       </p:sp>
       <p:sp>
         <p:nvSpPr>
-          <p:cNvPr id="207" name="Shape 207"/>
+          <p:cNvPr id="206" name="Shape 206"/>
           <p:cNvSpPr txBox="1"/>
           <p:nvPr>
             <p:ph idx="1" type="body"/>
@@ -1451,7 +1456,7 @@
   <p:cSld>
     <p:spTree>
       <p:nvGrpSpPr>
-        <p:cNvPr id="210" name="Shape 210"/>
+        <p:cNvPr id="209" name="Shape 209"/>
         <p:cNvGrpSpPr/>
         <p:nvPr/>
       </p:nvGrpSpPr>
@@ -1465,7 +1470,7 @@
       </p:grpSpPr>
       <p:sp>
         <p:nvSpPr>
-          <p:cNvPr id="211" name="Shape 211"/>
+          <p:cNvPr id="210" name="Shape 210"/>
           <p:cNvSpPr/>
           <p:nvPr>
             <p:ph idx="2" type="sldImg"/>
@@ -1509,7 +1514,7 @@
       </p:sp>
       <p:sp>
         <p:nvSpPr>
-          <p:cNvPr id="212" name="Shape 212"/>
+          <p:cNvPr id="211" name="Shape 211"/>
           <p:cNvSpPr txBox="1"/>
           <p:nvPr>
             <p:ph idx="1" type="body"/>
@@ -1661,7 +1666,7 @@
   <p:cSld>
     <p:spTree>
       <p:nvGrpSpPr>
-        <p:cNvPr id="216" name="Shape 216"/>
+        <p:cNvPr id="215" name="Shape 215"/>
         <p:cNvGrpSpPr/>
         <p:nvPr/>
       </p:nvGrpSpPr>
@@ -1675,7 +1680,7 @@
       </p:grpSpPr>
       <p:sp>
         <p:nvSpPr>
-          <p:cNvPr id="217" name="Shape 217"/>
+          <p:cNvPr id="216" name="Shape 216"/>
           <p:cNvSpPr/>
           <p:nvPr>
             <p:ph idx="2" type="sldImg"/>
@@ -1719,7 +1724,7 @@
       </p:sp>
       <p:sp>
         <p:nvSpPr>
-          <p:cNvPr id="218" name="Shape 218"/>
+          <p:cNvPr id="217" name="Shape 217"/>
           <p:cNvSpPr txBox="1"/>
           <p:nvPr>
             <p:ph idx="1" type="body"/>
@@ -1766,7 +1771,7 @@
   <p:cSld>
     <p:spTree>
       <p:nvGrpSpPr>
-        <p:cNvPr id="222" name="Shape 222"/>
+        <p:cNvPr id="221" name="Shape 221"/>
         <p:cNvGrpSpPr/>
         <p:nvPr/>
       </p:nvGrpSpPr>
@@ -1780,7 +1785,7 @@
       </p:grpSpPr>
       <p:sp>
         <p:nvSpPr>
-          <p:cNvPr id="223" name="Shape 223"/>
+          <p:cNvPr id="222" name="Shape 222"/>
           <p:cNvSpPr/>
           <p:nvPr>
             <p:ph idx="2" type="sldImg"/>
@@ -1824,7 +1829,7 @@
       </p:sp>
       <p:sp>
         <p:nvSpPr>
-          <p:cNvPr id="224" name="Shape 224"/>
+          <p:cNvPr id="223" name="Shape 223"/>
           <p:cNvSpPr txBox="1"/>
           <p:nvPr>
             <p:ph idx="1" type="body"/>
@@ -1871,7 +1876,7 @@
   <p:cSld>
     <p:spTree>
       <p:nvGrpSpPr>
-        <p:cNvPr id="228" name="Shape 228"/>
+        <p:cNvPr id="226" name="Shape 226"/>
         <p:cNvGrpSpPr/>
         <p:nvPr/>
       </p:nvGrpSpPr>
@@ -1885,7 +1890,7 @@
       </p:grpSpPr>
       <p:sp>
         <p:nvSpPr>
-          <p:cNvPr id="229" name="Shape 229"/>
+          <p:cNvPr id="227" name="Shape 227"/>
           <p:cNvSpPr/>
           <p:nvPr>
             <p:ph idx="2" type="sldImg"/>
@@ -1929,7 +1934,532 @@
       </p:sp>
       <p:sp>
         <p:nvSpPr>
-          <p:cNvPr id="230" name="Shape 230"/>
+          <p:cNvPr id="228" name="Shape 228"/>
+          <p:cNvSpPr txBox="1"/>
+          <p:nvPr>
+            <p:ph idx="1" type="body"/>
+          </p:nvPr>
+        </p:nvSpPr>
+        <p:spPr>
+          <a:xfrm>
+            <a:off x="685800" y="4343400"/>
+            <a:ext cx="5486399" cy="4114800"/>
+          </a:xfrm>
+          <a:prstGeom prst="rect">
+            <a:avLst/>
+          </a:prstGeom>
+        </p:spPr>
+        <p:txBody>
+          <a:bodyPr anchorCtr="0" anchor="t" bIns="91425" lIns="91425" rIns="91425" tIns="91425">
+            <a:noAutofit/>
+          </a:bodyPr>
+          <a:lstStyle/>
+          <a:p>
+            <a:pPr>
+              <a:spcBef>
+                <a:spcPts val="0"/>
+              </a:spcBef>
+              <a:buNone/>
+            </a:pPr>
+            <a:r>
+              <a:t/>
+            </a:r>
+            <a:endParaRPr/>
+          </a:p>
+        </p:txBody>
+      </p:sp>
+    </p:spTree>
+  </p:cSld>
+  <p:clrMapOvr>
+    <a:masterClrMapping/>
+  </p:clrMapOvr>
+</p:notes>
+</file>
+
+<file path=ppt/notesSlides/notesSlide23.xml><?xml version="1.0" encoding="utf-8"?>
+<p:notes xmlns:a="http://schemas.openxmlformats.org/drawingml/2006/main" xmlns:r="http://schemas.openxmlformats.org/officeDocument/2006/relationships" xmlns:mc="http://schemas.openxmlformats.org/markup-compatibility/2006" xmlns:mv="urn:schemas-microsoft-com:mac:vml" xmlns:p="http://schemas.openxmlformats.org/presentationml/2006/main" xmlns:c="http://schemas.openxmlformats.org/drawingml/2006/chart" xmlns:dgm="http://schemas.openxmlformats.org/drawingml/2006/diagram" xmlns:o="urn:schemas-microsoft-com:office:office" xmlns:v="urn:schemas-microsoft-com:vml" xmlns:pvml="urn:schemas-microsoft-com:office:powerpoint" xmlns:com="http://schemas.openxmlformats.org/drawingml/2006/compatibility" xmlns:p14="http://schemas.microsoft.com/office/powerpoint/2010/main" showMasterPhAnim="0" showMasterSp="0">
+  <p:cSld>
+    <p:spTree>
+      <p:nvGrpSpPr>
+        <p:cNvPr id="231" name="Shape 231"/>
+        <p:cNvGrpSpPr/>
+        <p:nvPr/>
+      </p:nvGrpSpPr>
+      <p:grpSpPr>
+        <a:xfrm>
+          <a:off x="0" y="0"/>
+          <a:ext cx="0" cy="0"/>
+          <a:chOff x="0" y="0"/>
+          <a:chExt cx="0" cy="0"/>
+        </a:xfrm>
+      </p:grpSpPr>
+      <p:sp>
+        <p:nvSpPr>
+          <p:cNvPr id="232" name="Shape 232"/>
+          <p:cNvSpPr/>
+          <p:nvPr>
+            <p:ph idx="2" type="sldImg"/>
+          </p:nvPr>
+        </p:nvSpPr>
+        <p:spPr>
+          <a:xfrm>
+            <a:off x="381187" y="685800"/>
+            <a:ext cx="6096299" cy="3429000"/>
+          </a:xfrm>
+          <a:custGeom>
+            <a:pathLst>
+              <a:path extrusionOk="0" h="120000" w="120000">
+                <a:moveTo>
+                  <a:pt x="0" y="0"/>
+                </a:moveTo>
+                <a:lnTo>
+                  <a:pt x="120000" y="0"/>
+                </a:lnTo>
+                <a:lnTo>
+                  <a:pt x="120000" y="120000"/>
+                </a:lnTo>
+                <a:lnTo>
+                  <a:pt x="0" y="120000"/>
+                </a:lnTo>
+                <a:close/>
+              </a:path>
+            </a:pathLst>
+          </a:custGeom>
+          <a:noFill/>
+          <a:ln cap="flat" w="9525">
+            <a:solidFill>
+              <a:srgbClr val="000000"/>
+            </a:solidFill>
+            <a:prstDash val="solid"/>
+            <a:round/>
+            <a:headEnd len="med" w="med" type="none"/>
+            <a:tailEnd len="med" w="med" type="none"/>
+          </a:ln>
+        </p:spPr>
+      </p:sp>
+      <p:sp>
+        <p:nvSpPr>
+          <p:cNvPr id="233" name="Shape 233"/>
+          <p:cNvSpPr txBox="1"/>
+          <p:nvPr>
+            <p:ph idx="1" type="body"/>
+          </p:nvPr>
+        </p:nvSpPr>
+        <p:spPr>
+          <a:xfrm>
+            <a:off x="685800" y="4343400"/>
+            <a:ext cx="5486399" cy="4114800"/>
+          </a:xfrm>
+          <a:prstGeom prst="rect">
+            <a:avLst/>
+          </a:prstGeom>
+        </p:spPr>
+        <p:txBody>
+          <a:bodyPr anchorCtr="0" anchor="t" bIns="91425" lIns="91425" rIns="91425" tIns="91425">
+            <a:noAutofit/>
+          </a:bodyPr>
+          <a:lstStyle/>
+          <a:p>
+            <a:pPr>
+              <a:spcBef>
+                <a:spcPts val="0"/>
+              </a:spcBef>
+              <a:buNone/>
+            </a:pPr>
+            <a:r>
+              <a:t/>
+            </a:r>
+            <a:endParaRPr/>
+          </a:p>
+        </p:txBody>
+      </p:sp>
+    </p:spTree>
+  </p:cSld>
+  <p:clrMapOvr>
+    <a:masterClrMapping/>
+  </p:clrMapOvr>
+</p:notes>
+</file>
+
+<file path=ppt/notesSlides/notesSlide24.xml><?xml version="1.0" encoding="utf-8"?>
+<p:notes xmlns:a="http://schemas.openxmlformats.org/drawingml/2006/main" xmlns:r="http://schemas.openxmlformats.org/officeDocument/2006/relationships" xmlns:mc="http://schemas.openxmlformats.org/markup-compatibility/2006" xmlns:mv="urn:schemas-microsoft-com:mac:vml" xmlns:p="http://schemas.openxmlformats.org/presentationml/2006/main" xmlns:c="http://schemas.openxmlformats.org/drawingml/2006/chart" xmlns:dgm="http://schemas.openxmlformats.org/drawingml/2006/diagram" xmlns:o="urn:schemas-microsoft-com:office:office" xmlns:v="urn:schemas-microsoft-com:vml" xmlns:pvml="urn:schemas-microsoft-com:office:powerpoint" xmlns:com="http://schemas.openxmlformats.org/drawingml/2006/compatibility" xmlns:p14="http://schemas.microsoft.com/office/powerpoint/2010/main" showMasterPhAnim="0" showMasterSp="0">
+  <p:cSld>
+    <p:spTree>
+      <p:nvGrpSpPr>
+        <p:cNvPr id="237" name="Shape 237"/>
+        <p:cNvGrpSpPr/>
+        <p:nvPr/>
+      </p:nvGrpSpPr>
+      <p:grpSpPr>
+        <a:xfrm>
+          <a:off x="0" y="0"/>
+          <a:ext cx="0" cy="0"/>
+          <a:chOff x="0" y="0"/>
+          <a:chExt cx="0" cy="0"/>
+        </a:xfrm>
+      </p:grpSpPr>
+      <p:sp>
+        <p:nvSpPr>
+          <p:cNvPr id="238" name="Shape 238"/>
+          <p:cNvSpPr/>
+          <p:nvPr>
+            <p:ph idx="2" type="sldImg"/>
+          </p:nvPr>
+        </p:nvSpPr>
+        <p:spPr>
+          <a:xfrm>
+            <a:off x="381187" y="685800"/>
+            <a:ext cx="6096299" cy="3429000"/>
+          </a:xfrm>
+          <a:custGeom>
+            <a:pathLst>
+              <a:path extrusionOk="0" h="120000" w="120000">
+                <a:moveTo>
+                  <a:pt x="0" y="0"/>
+                </a:moveTo>
+                <a:lnTo>
+                  <a:pt x="120000" y="0"/>
+                </a:lnTo>
+                <a:lnTo>
+                  <a:pt x="120000" y="120000"/>
+                </a:lnTo>
+                <a:lnTo>
+                  <a:pt x="0" y="120000"/>
+                </a:lnTo>
+                <a:close/>
+              </a:path>
+            </a:pathLst>
+          </a:custGeom>
+          <a:noFill/>
+          <a:ln cap="flat" w="9525">
+            <a:solidFill>
+              <a:srgbClr val="000000"/>
+            </a:solidFill>
+            <a:prstDash val="solid"/>
+            <a:round/>
+            <a:headEnd len="med" w="med" type="none"/>
+            <a:tailEnd len="med" w="med" type="none"/>
+          </a:ln>
+        </p:spPr>
+      </p:sp>
+      <p:sp>
+        <p:nvSpPr>
+          <p:cNvPr id="239" name="Shape 239"/>
+          <p:cNvSpPr txBox="1"/>
+          <p:nvPr>
+            <p:ph idx="1" type="body"/>
+          </p:nvPr>
+        </p:nvSpPr>
+        <p:spPr>
+          <a:xfrm>
+            <a:off x="685800" y="4343400"/>
+            <a:ext cx="5486399" cy="4114800"/>
+          </a:xfrm>
+          <a:prstGeom prst="rect">
+            <a:avLst/>
+          </a:prstGeom>
+        </p:spPr>
+        <p:txBody>
+          <a:bodyPr anchorCtr="0" anchor="t" bIns="91425" lIns="91425" rIns="91425" tIns="91425">
+            <a:noAutofit/>
+          </a:bodyPr>
+          <a:lstStyle/>
+          <a:p>
+            <a:pPr>
+              <a:spcBef>
+                <a:spcPts val="0"/>
+              </a:spcBef>
+              <a:buNone/>
+            </a:pPr>
+            <a:r>
+              <a:t/>
+            </a:r>
+            <a:endParaRPr/>
+          </a:p>
+        </p:txBody>
+      </p:sp>
+    </p:spTree>
+  </p:cSld>
+  <p:clrMapOvr>
+    <a:masterClrMapping/>
+  </p:clrMapOvr>
+</p:notes>
+</file>
+
+<file path=ppt/notesSlides/notesSlide25.xml><?xml version="1.0" encoding="utf-8"?>
+<p:notes xmlns:a="http://schemas.openxmlformats.org/drawingml/2006/main" xmlns:r="http://schemas.openxmlformats.org/officeDocument/2006/relationships" xmlns:mc="http://schemas.openxmlformats.org/markup-compatibility/2006" xmlns:mv="urn:schemas-microsoft-com:mac:vml" xmlns:p="http://schemas.openxmlformats.org/presentationml/2006/main" xmlns:c="http://schemas.openxmlformats.org/drawingml/2006/chart" xmlns:dgm="http://schemas.openxmlformats.org/drawingml/2006/diagram" xmlns:o="urn:schemas-microsoft-com:office:office" xmlns:v="urn:schemas-microsoft-com:vml" xmlns:pvml="urn:schemas-microsoft-com:office:powerpoint" xmlns:com="http://schemas.openxmlformats.org/drawingml/2006/compatibility" xmlns:p14="http://schemas.microsoft.com/office/powerpoint/2010/main" showMasterPhAnim="0" showMasterSp="0">
+  <p:cSld>
+    <p:spTree>
+      <p:nvGrpSpPr>
+        <p:cNvPr id="243" name="Shape 243"/>
+        <p:cNvGrpSpPr/>
+        <p:nvPr/>
+      </p:nvGrpSpPr>
+      <p:grpSpPr>
+        <a:xfrm>
+          <a:off x="0" y="0"/>
+          <a:ext cx="0" cy="0"/>
+          <a:chOff x="0" y="0"/>
+          <a:chExt cx="0" cy="0"/>
+        </a:xfrm>
+      </p:grpSpPr>
+      <p:sp>
+        <p:nvSpPr>
+          <p:cNvPr id="244" name="Shape 244"/>
+          <p:cNvSpPr/>
+          <p:nvPr>
+            <p:ph idx="2" type="sldImg"/>
+          </p:nvPr>
+        </p:nvSpPr>
+        <p:spPr>
+          <a:xfrm>
+            <a:off x="381187" y="685800"/>
+            <a:ext cx="6096299" cy="3429000"/>
+          </a:xfrm>
+          <a:custGeom>
+            <a:pathLst>
+              <a:path extrusionOk="0" h="120000" w="120000">
+                <a:moveTo>
+                  <a:pt x="0" y="0"/>
+                </a:moveTo>
+                <a:lnTo>
+                  <a:pt x="120000" y="0"/>
+                </a:lnTo>
+                <a:lnTo>
+                  <a:pt x="120000" y="120000"/>
+                </a:lnTo>
+                <a:lnTo>
+                  <a:pt x="0" y="120000"/>
+                </a:lnTo>
+                <a:close/>
+              </a:path>
+            </a:pathLst>
+          </a:custGeom>
+          <a:noFill/>
+          <a:ln cap="flat" w="9525">
+            <a:solidFill>
+              <a:srgbClr val="000000"/>
+            </a:solidFill>
+            <a:prstDash val="solid"/>
+            <a:round/>
+            <a:headEnd len="med" w="med" type="none"/>
+            <a:tailEnd len="med" w="med" type="none"/>
+          </a:ln>
+        </p:spPr>
+      </p:sp>
+      <p:sp>
+        <p:nvSpPr>
+          <p:cNvPr id="245" name="Shape 245"/>
+          <p:cNvSpPr txBox="1"/>
+          <p:nvPr>
+            <p:ph idx="1" type="body"/>
+          </p:nvPr>
+        </p:nvSpPr>
+        <p:spPr>
+          <a:xfrm>
+            <a:off x="685800" y="4343400"/>
+            <a:ext cx="5486399" cy="4114800"/>
+          </a:xfrm>
+          <a:prstGeom prst="rect">
+            <a:avLst/>
+          </a:prstGeom>
+        </p:spPr>
+        <p:txBody>
+          <a:bodyPr anchorCtr="0" anchor="t" bIns="91425" lIns="91425" rIns="91425" tIns="91425">
+            <a:noAutofit/>
+          </a:bodyPr>
+          <a:lstStyle/>
+          <a:p>
+            <a:pPr>
+              <a:spcBef>
+                <a:spcPts val="0"/>
+              </a:spcBef>
+              <a:buNone/>
+            </a:pPr>
+            <a:r>
+              <a:t/>
+            </a:r>
+            <a:endParaRPr/>
+          </a:p>
+        </p:txBody>
+      </p:sp>
+    </p:spTree>
+  </p:cSld>
+  <p:clrMapOvr>
+    <a:masterClrMapping/>
+  </p:clrMapOvr>
+</p:notes>
+</file>
+
+<file path=ppt/notesSlides/notesSlide26.xml><?xml version="1.0" encoding="utf-8"?>
+<p:notes xmlns:a="http://schemas.openxmlformats.org/drawingml/2006/main" xmlns:r="http://schemas.openxmlformats.org/officeDocument/2006/relationships" xmlns:mc="http://schemas.openxmlformats.org/markup-compatibility/2006" xmlns:mv="urn:schemas-microsoft-com:mac:vml" xmlns:p="http://schemas.openxmlformats.org/presentationml/2006/main" xmlns:c="http://schemas.openxmlformats.org/drawingml/2006/chart" xmlns:dgm="http://schemas.openxmlformats.org/drawingml/2006/diagram" xmlns:o="urn:schemas-microsoft-com:office:office" xmlns:v="urn:schemas-microsoft-com:vml" xmlns:pvml="urn:schemas-microsoft-com:office:powerpoint" xmlns:com="http://schemas.openxmlformats.org/drawingml/2006/compatibility" xmlns:p14="http://schemas.microsoft.com/office/powerpoint/2010/main" showMasterPhAnim="0" showMasterSp="0">
+  <p:cSld>
+    <p:spTree>
+      <p:nvGrpSpPr>
+        <p:cNvPr id="249" name="Shape 249"/>
+        <p:cNvGrpSpPr/>
+        <p:nvPr/>
+      </p:nvGrpSpPr>
+      <p:grpSpPr>
+        <a:xfrm>
+          <a:off x="0" y="0"/>
+          <a:ext cx="0" cy="0"/>
+          <a:chOff x="0" y="0"/>
+          <a:chExt cx="0" cy="0"/>
+        </a:xfrm>
+      </p:grpSpPr>
+      <p:sp>
+        <p:nvSpPr>
+          <p:cNvPr id="250" name="Shape 250"/>
+          <p:cNvSpPr/>
+          <p:nvPr>
+            <p:ph idx="2" type="sldImg"/>
+          </p:nvPr>
+        </p:nvSpPr>
+        <p:spPr>
+          <a:xfrm>
+            <a:off x="381187" y="685800"/>
+            <a:ext cx="6096299" cy="3429000"/>
+          </a:xfrm>
+          <a:custGeom>
+            <a:pathLst>
+              <a:path extrusionOk="0" h="120000" w="120000">
+                <a:moveTo>
+                  <a:pt x="0" y="0"/>
+                </a:moveTo>
+                <a:lnTo>
+                  <a:pt x="120000" y="0"/>
+                </a:lnTo>
+                <a:lnTo>
+                  <a:pt x="120000" y="120000"/>
+                </a:lnTo>
+                <a:lnTo>
+                  <a:pt x="0" y="120000"/>
+                </a:lnTo>
+                <a:close/>
+              </a:path>
+            </a:pathLst>
+          </a:custGeom>
+          <a:noFill/>
+          <a:ln cap="flat" w="9525">
+            <a:solidFill>
+              <a:srgbClr val="000000"/>
+            </a:solidFill>
+            <a:prstDash val="solid"/>
+            <a:round/>
+            <a:headEnd len="med" w="med" type="none"/>
+            <a:tailEnd len="med" w="med" type="none"/>
+          </a:ln>
+        </p:spPr>
+      </p:sp>
+      <p:sp>
+        <p:nvSpPr>
+          <p:cNvPr id="251" name="Shape 251"/>
+          <p:cNvSpPr txBox="1"/>
+          <p:nvPr>
+            <p:ph idx="1" type="body"/>
+          </p:nvPr>
+        </p:nvSpPr>
+        <p:spPr>
+          <a:xfrm>
+            <a:off x="685800" y="4343400"/>
+            <a:ext cx="5486399" cy="4114800"/>
+          </a:xfrm>
+          <a:prstGeom prst="rect">
+            <a:avLst/>
+          </a:prstGeom>
+        </p:spPr>
+        <p:txBody>
+          <a:bodyPr anchorCtr="0" anchor="t" bIns="91425" lIns="91425" rIns="91425" tIns="91425">
+            <a:noAutofit/>
+          </a:bodyPr>
+          <a:lstStyle/>
+          <a:p>
+            <a:pPr>
+              <a:spcBef>
+                <a:spcPts val="0"/>
+              </a:spcBef>
+              <a:buNone/>
+            </a:pPr>
+            <a:r>
+              <a:t/>
+            </a:r>
+            <a:endParaRPr/>
+          </a:p>
+        </p:txBody>
+      </p:sp>
+    </p:spTree>
+  </p:cSld>
+  <p:clrMapOvr>
+    <a:masterClrMapping/>
+  </p:clrMapOvr>
+</p:notes>
+</file>
+
+<file path=ppt/notesSlides/notesSlide27.xml><?xml version="1.0" encoding="utf-8"?>
+<p:notes xmlns:a="http://schemas.openxmlformats.org/drawingml/2006/main" xmlns:r="http://schemas.openxmlformats.org/officeDocument/2006/relationships" xmlns:mc="http://schemas.openxmlformats.org/markup-compatibility/2006" xmlns:mv="urn:schemas-microsoft-com:mac:vml" xmlns:p="http://schemas.openxmlformats.org/presentationml/2006/main" xmlns:c="http://schemas.openxmlformats.org/drawingml/2006/chart" xmlns:dgm="http://schemas.openxmlformats.org/drawingml/2006/diagram" xmlns:o="urn:schemas-microsoft-com:office:office" xmlns:v="urn:schemas-microsoft-com:vml" xmlns:pvml="urn:schemas-microsoft-com:office:powerpoint" xmlns:com="http://schemas.openxmlformats.org/drawingml/2006/compatibility" xmlns:p14="http://schemas.microsoft.com/office/powerpoint/2010/main" showMasterPhAnim="0" showMasterSp="0">
+  <p:cSld>
+    <p:spTree>
+      <p:nvGrpSpPr>
+        <p:cNvPr id="255" name="Shape 255"/>
+        <p:cNvGrpSpPr/>
+        <p:nvPr/>
+      </p:nvGrpSpPr>
+      <p:grpSpPr>
+        <a:xfrm>
+          <a:off x="0" y="0"/>
+          <a:ext cx="0" cy="0"/>
+          <a:chOff x="0" y="0"/>
+          <a:chExt cx="0" cy="0"/>
+        </a:xfrm>
+      </p:grpSpPr>
+      <p:sp>
+        <p:nvSpPr>
+          <p:cNvPr id="256" name="Shape 256"/>
+          <p:cNvSpPr/>
+          <p:nvPr>
+            <p:ph idx="2" type="sldImg"/>
+          </p:nvPr>
+        </p:nvSpPr>
+        <p:spPr>
+          <a:xfrm>
+            <a:off x="381187" y="685800"/>
+            <a:ext cx="6096299" cy="3429000"/>
+          </a:xfrm>
+          <a:custGeom>
+            <a:pathLst>
+              <a:path extrusionOk="0" h="120000" w="120000">
+                <a:moveTo>
+                  <a:pt x="0" y="0"/>
+                </a:moveTo>
+                <a:lnTo>
+                  <a:pt x="120000" y="0"/>
+                </a:lnTo>
+                <a:lnTo>
+                  <a:pt x="120000" y="120000"/>
+                </a:lnTo>
+                <a:lnTo>
+                  <a:pt x="0" y="120000"/>
+                </a:lnTo>
+                <a:close/>
+              </a:path>
+            </a:pathLst>
+          </a:custGeom>
+          <a:noFill/>
+          <a:ln cap="flat" w="9525">
+            <a:solidFill>
+              <a:srgbClr val="000000"/>
+            </a:solidFill>
+            <a:prstDash val="solid"/>
+            <a:round/>
+            <a:headEnd len="med" w="med" type="none"/>
+            <a:tailEnd len="med" w="med" type="none"/>
+          </a:ln>
+        </p:spPr>
+      </p:sp>
+      <p:sp>
+        <p:nvSpPr>
+          <p:cNvPr id="257" name="Shape 257"/>
           <p:cNvSpPr txBox="1"/>
           <p:nvPr>
             <p:ph idx="1" type="body"/>
@@ -31718,9 +32248,574 @@
           <a:chExt cx="0" cy="0"/>
         </a:xfrm>
       </p:grpSpPr>
+      <p:pic>
+        <p:nvPicPr>
+          <p:cNvPr id="165" name="Shape 165"/>
+          <p:cNvPicPr preferRelativeResize="0"/>
+          <p:nvPr/>
+        </p:nvPicPr>
+        <p:blipFill>
+          <a:blip r:embed="rId3">
+            <a:alphaModFix/>
+          </a:blip>
+          <a:stretch>
+            <a:fillRect/>
+          </a:stretch>
+        </p:blipFill>
+        <p:spPr>
+          <a:xfrm>
+            <a:off x="0" y="0"/>
+            <a:ext cx="9144000" cy="5143500"/>
+          </a:xfrm>
+          <a:prstGeom prst="rect">
+            <a:avLst/>
+          </a:prstGeom>
+          <a:noFill/>
+          <a:ln>
+            <a:noFill/>
+          </a:ln>
+        </p:spPr>
+      </p:pic>
+    </p:spTree>
+  </p:cSld>
+  <p:clrMapOvr>
+    <a:masterClrMapping/>
+  </p:clrMapOvr>
+  <p:transition spd="slow">
+    <p:cut/>
+  </p:transition>
+</p:sld>
+</file>
+
+<file path=ppt/slides/slide12.xml><?xml version="1.0" encoding="utf-8"?>
+<p:sld xmlns:a="http://schemas.openxmlformats.org/drawingml/2006/main" xmlns:r="http://schemas.openxmlformats.org/officeDocument/2006/relationships" xmlns:mc="http://schemas.openxmlformats.org/markup-compatibility/2006" xmlns:mv="urn:schemas-microsoft-com:mac:vml" xmlns:p="http://schemas.openxmlformats.org/presentationml/2006/main" xmlns:c="http://schemas.openxmlformats.org/drawingml/2006/chart" xmlns:dgm="http://schemas.openxmlformats.org/drawingml/2006/diagram" xmlns:o="urn:schemas-microsoft-com:office:office" xmlns:v="urn:schemas-microsoft-com:vml" xmlns:pvml="urn:schemas-microsoft-com:office:powerpoint" xmlns:com="http://schemas.openxmlformats.org/drawingml/2006/compatibility" xmlns:p14="http://schemas.microsoft.com/office/powerpoint/2010/main">
+  <p:cSld>
+    <p:spTree>
+      <p:nvGrpSpPr>
+        <p:cNvPr id="169" name="Shape 169"/>
+        <p:cNvGrpSpPr/>
+        <p:nvPr/>
+      </p:nvGrpSpPr>
+      <p:grpSpPr>
+        <a:xfrm>
+          <a:off x="0" y="0"/>
+          <a:ext cx="0" cy="0"/>
+          <a:chOff x="0" y="0"/>
+          <a:chExt cx="0" cy="0"/>
+        </a:xfrm>
+      </p:grpSpPr>
+      <p:pic>
+        <p:nvPicPr>
+          <p:cNvPr id="170" name="Shape 170"/>
+          <p:cNvPicPr preferRelativeResize="0"/>
+          <p:nvPr/>
+        </p:nvPicPr>
+        <p:blipFill>
+          <a:blip r:embed="rId3">
+            <a:alphaModFix/>
+          </a:blip>
+          <a:stretch>
+            <a:fillRect/>
+          </a:stretch>
+        </p:blipFill>
+        <p:spPr>
+          <a:xfrm>
+            <a:off x="0" y="0"/>
+            <a:ext cx="9144000" cy="5143500"/>
+          </a:xfrm>
+          <a:prstGeom prst="rect">
+            <a:avLst/>
+          </a:prstGeom>
+          <a:noFill/>
+          <a:ln>
+            <a:noFill/>
+          </a:ln>
+        </p:spPr>
+      </p:pic>
+    </p:spTree>
+  </p:cSld>
+  <p:clrMapOvr>
+    <a:masterClrMapping/>
+  </p:clrMapOvr>
+  <p:transition spd="slow">
+    <p:cut/>
+  </p:transition>
+</p:sld>
+</file>
+
+<file path=ppt/slides/slide13.xml><?xml version="1.0" encoding="utf-8"?>
+<p:sld xmlns:a="http://schemas.openxmlformats.org/drawingml/2006/main" xmlns:r="http://schemas.openxmlformats.org/officeDocument/2006/relationships" xmlns:mc="http://schemas.openxmlformats.org/markup-compatibility/2006" xmlns:mv="urn:schemas-microsoft-com:mac:vml" xmlns:p="http://schemas.openxmlformats.org/presentationml/2006/main" xmlns:c="http://schemas.openxmlformats.org/drawingml/2006/chart" xmlns:dgm="http://schemas.openxmlformats.org/drawingml/2006/diagram" xmlns:o="urn:schemas-microsoft-com:office:office" xmlns:v="urn:schemas-microsoft-com:vml" xmlns:pvml="urn:schemas-microsoft-com:office:powerpoint" xmlns:com="http://schemas.openxmlformats.org/drawingml/2006/compatibility" xmlns:p14="http://schemas.microsoft.com/office/powerpoint/2010/main">
+  <p:cSld>
+    <p:spTree>
+      <p:nvGrpSpPr>
+        <p:cNvPr id="174" name="Shape 174"/>
+        <p:cNvGrpSpPr/>
+        <p:nvPr/>
+      </p:nvGrpSpPr>
+      <p:grpSpPr>
+        <a:xfrm>
+          <a:off x="0" y="0"/>
+          <a:ext cx="0" cy="0"/>
+          <a:chOff x="0" y="0"/>
+          <a:chExt cx="0" cy="0"/>
+        </a:xfrm>
+      </p:grpSpPr>
+      <p:pic>
+        <p:nvPicPr>
+          <p:cNvPr id="175" name="Shape 175"/>
+          <p:cNvPicPr preferRelativeResize="0"/>
+          <p:nvPr/>
+        </p:nvPicPr>
+        <p:blipFill>
+          <a:blip r:embed="rId3">
+            <a:alphaModFix/>
+          </a:blip>
+          <a:stretch>
+            <a:fillRect/>
+          </a:stretch>
+        </p:blipFill>
+        <p:spPr>
+          <a:xfrm>
+            <a:off x="0" y="0"/>
+            <a:ext cx="9144000" cy="5143500"/>
+          </a:xfrm>
+          <a:prstGeom prst="rect">
+            <a:avLst/>
+          </a:prstGeom>
+          <a:noFill/>
+          <a:ln>
+            <a:noFill/>
+          </a:ln>
+        </p:spPr>
+      </p:pic>
+    </p:spTree>
+  </p:cSld>
+  <p:clrMapOvr>
+    <a:masterClrMapping/>
+  </p:clrMapOvr>
+  <p:transition spd="slow">
+    <p:cut/>
+  </p:transition>
+</p:sld>
+</file>
+
+<file path=ppt/slides/slide14.xml><?xml version="1.0" encoding="utf-8"?>
+<p:sld xmlns:a="http://schemas.openxmlformats.org/drawingml/2006/main" xmlns:r="http://schemas.openxmlformats.org/officeDocument/2006/relationships" xmlns:mc="http://schemas.openxmlformats.org/markup-compatibility/2006" xmlns:mv="urn:schemas-microsoft-com:mac:vml" xmlns:p="http://schemas.openxmlformats.org/presentationml/2006/main" xmlns:c="http://schemas.openxmlformats.org/drawingml/2006/chart" xmlns:dgm="http://schemas.openxmlformats.org/drawingml/2006/diagram" xmlns:o="urn:schemas-microsoft-com:office:office" xmlns:v="urn:schemas-microsoft-com:vml" xmlns:pvml="urn:schemas-microsoft-com:office:powerpoint" xmlns:com="http://schemas.openxmlformats.org/drawingml/2006/compatibility" xmlns:p14="http://schemas.microsoft.com/office/powerpoint/2010/main">
+  <p:cSld>
+    <p:spTree>
+      <p:nvGrpSpPr>
+        <p:cNvPr id="179" name="Shape 179"/>
+        <p:cNvGrpSpPr/>
+        <p:nvPr/>
+      </p:nvGrpSpPr>
+      <p:grpSpPr>
+        <a:xfrm>
+          <a:off x="0" y="0"/>
+          <a:ext cx="0" cy="0"/>
+          <a:chOff x="0" y="0"/>
+          <a:chExt cx="0" cy="0"/>
+        </a:xfrm>
+      </p:grpSpPr>
       <p:sp>
         <p:nvSpPr>
-          <p:cNvPr id="165" name="Shape 165"/>
+          <p:cNvPr id="180" name="Shape 180"/>
+          <p:cNvSpPr txBox="1"/>
+          <p:nvPr>
+            <p:ph type="title"/>
+          </p:nvPr>
+        </p:nvSpPr>
+        <p:spPr>
+          <a:xfrm>
+            <a:off x="457200" y="155628"/>
+            <a:ext cx="8229600" cy="1044599"/>
+          </a:xfrm>
+          <a:prstGeom prst="rect">
+            <a:avLst/>
+          </a:prstGeom>
+        </p:spPr>
+        <p:txBody>
+          <a:bodyPr anchorCtr="0" anchor="b" bIns="91425" lIns="91425" rIns="91425" tIns="91425">
+            <a:noAutofit/>
+          </a:bodyPr>
+          <a:lstStyle/>
+          <a:p>
+            <a:pPr>
+              <a:spcBef>
+                <a:spcPts val="0"/>
+              </a:spcBef>
+              <a:buNone/>
+            </a:pPr>
+            <a:r>
+              <a:rPr lang="nl"/>
+              <a:t>External libraries</a:t>
+            </a:r>
+          </a:p>
+        </p:txBody>
+      </p:sp>
+      <p:graphicFrame>
+        <p:nvGraphicFramePr>
+          <p:cNvPr id="181" name="Shape 181"/>
+          <p:cNvGraphicFramePr/>
+          <p:nvPr/>
+        </p:nvGraphicFramePr>
+        <p:xfrm>
+          <a:off x="919650" y="1297775"/>
+          <a:ext cx="3000000" cy="3000000"/>
+        </p:xfrm>
+        <a:graphic>
+          <a:graphicData uri="http://schemas.openxmlformats.org/drawingml/2006/table">
+            <a:tbl>
+              <a:tblPr>
+                <a:noFill/>
+                <a:tableStyleId>{B85F75C8-9933-4E91-B2CA-D202477AD082}</a:tableStyleId>
+              </a:tblPr>
+              <a:tblGrid>
+                <a:gridCol w="3619500"/>
+                <a:gridCol w="3619500"/>
+              </a:tblGrid>
+              <a:tr h="381000">
+                <a:tc>
+                  <a:txBody>
+                    <a:bodyPr>
+                      <a:noAutofit/>
+                    </a:bodyPr>
+                    <a:lstStyle/>
+                    <a:p>
+                      <a:pPr>
+                        <a:spcBef>
+                          <a:spcPts val="0"/>
+                        </a:spcBef>
+                        <a:buNone/>
+                      </a:pPr>
+                      <a:r>
+                        <a:rPr lang="nl"/>
+                        <a:t>jQuery</a:t>
+                      </a:r>
+                    </a:p>
+                  </a:txBody>
+                  <a:tcPr marT="91425" marB="91425" marR="91425" marL="91425"/>
+                </a:tc>
+                <a:tc>
+                  <a:txBody>
+                    <a:bodyPr>
+                      <a:noAutofit/>
+                    </a:bodyPr>
+                    <a:lstStyle/>
+                    <a:p>
+                      <a:pPr>
+                        <a:spcBef>
+                          <a:spcPts val="0"/>
+                        </a:spcBef>
+                        <a:buNone/>
+                      </a:pPr>
+                      <a:r>
+                        <a:rPr lang="nl"/>
+                        <a:t>1.11.2</a:t>
+                      </a:r>
+                    </a:p>
+                  </a:txBody>
+                  <a:tcPr marT="91425" marB="91425" marR="91425" marL="91425"/>
+                </a:tc>
+              </a:tr>
+              <a:tr h="381000">
+                <a:tc>
+                  <a:txBody>
+                    <a:bodyPr>
+                      <a:noAutofit/>
+                    </a:bodyPr>
+                    <a:lstStyle/>
+                    <a:p>
+                      <a:pPr>
+                        <a:spcBef>
+                          <a:spcPts val="0"/>
+                        </a:spcBef>
+                        <a:buNone/>
+                      </a:pPr>
+                      <a:r>
+                        <a:rPr lang="nl"/>
+                        <a:t>jQuery-ui</a:t>
+                      </a:r>
+                    </a:p>
+                  </a:txBody>
+                  <a:tcPr marT="91425" marB="91425" marR="91425" marL="91425"/>
+                </a:tc>
+                <a:tc>
+                  <a:txBody>
+                    <a:bodyPr>
+                      <a:noAutofit/>
+                    </a:bodyPr>
+                    <a:lstStyle/>
+                    <a:p>
+                      <a:pPr>
+                        <a:spcBef>
+                          <a:spcPts val="0"/>
+                        </a:spcBef>
+                        <a:buNone/>
+                      </a:pPr>
+                      <a:r>
+                        <a:rPr lang="nl"/>
+                        <a:t>1.11.4</a:t>
+                      </a:r>
+                    </a:p>
+                  </a:txBody>
+                  <a:tcPr marT="91425" marB="91425" marR="91425" marL="91425"/>
+                </a:tc>
+              </a:tr>
+              <a:tr h="381000">
+                <a:tc>
+                  <a:txBody>
+                    <a:bodyPr>
+                      <a:noAutofit/>
+                    </a:bodyPr>
+                    <a:lstStyle/>
+                    <a:p>
+                      <a:pPr>
+                        <a:spcBef>
+                          <a:spcPts val="0"/>
+                        </a:spcBef>
+                        <a:buNone/>
+                      </a:pPr>
+                      <a:r>
+                        <a:rPr lang="nl"/>
+                        <a:t>Bootstrap</a:t>
+                      </a:r>
+                    </a:p>
+                  </a:txBody>
+                  <a:tcPr marT="91425" marB="91425" marR="91425" marL="91425"/>
+                </a:tc>
+                <a:tc>
+                  <a:txBody>
+                    <a:bodyPr>
+                      <a:noAutofit/>
+                    </a:bodyPr>
+                    <a:lstStyle/>
+                    <a:p>
+                      <a:pPr>
+                        <a:spcBef>
+                          <a:spcPts val="0"/>
+                        </a:spcBef>
+                        <a:buNone/>
+                      </a:pPr>
+                      <a:r>
+                        <a:rPr lang="nl"/>
+                        <a:t>3.3.2</a:t>
+                      </a:r>
+                    </a:p>
+                  </a:txBody>
+                  <a:tcPr marT="91425" marB="91425" marR="91425" marL="91425"/>
+                </a:tc>
+              </a:tr>
+              <a:tr h="381000">
+                <a:tc>
+                  <a:txBody>
+                    <a:bodyPr>
+                      <a:noAutofit/>
+                    </a:bodyPr>
+                    <a:lstStyle/>
+                    <a:p>
+                      <a:pPr>
+                        <a:spcBef>
+                          <a:spcPts val="0"/>
+                        </a:spcBef>
+                        <a:buNone/>
+                      </a:pPr>
+                      <a:r>
+                        <a:rPr lang="nl"/>
+                        <a:t>bootstrap-tour</a:t>
+                      </a:r>
+                    </a:p>
+                  </a:txBody>
+                  <a:tcPr marT="91425" marB="91425" marR="91425" marL="91425"/>
+                </a:tc>
+                <a:tc>
+                  <a:txBody>
+                    <a:bodyPr>
+                      <a:noAutofit/>
+                    </a:bodyPr>
+                    <a:lstStyle/>
+                    <a:p>
+                      <a:pPr>
+                        <a:spcBef>
+                          <a:spcPts val="0"/>
+                        </a:spcBef>
+                        <a:buNone/>
+                      </a:pPr>
+                      <a:r>
+                        <a:rPr lang="nl"/>
+                        <a:t>0.10.1</a:t>
+                      </a:r>
+                    </a:p>
+                  </a:txBody>
+                  <a:tcPr marT="91425" marB="91425" marR="91425" marL="91425"/>
+                </a:tc>
+              </a:tr>
+              <a:tr h="381000">
+                <a:tc>
+                  <a:txBody>
+                    <a:bodyPr>
+                      <a:noAutofit/>
+                    </a:bodyPr>
+                    <a:lstStyle/>
+                    <a:p>
+                      <a:pPr>
+                        <a:spcBef>
+                          <a:spcPts val="0"/>
+                        </a:spcBef>
+                        <a:buNone/>
+                      </a:pPr>
+                      <a:r>
+                        <a:rPr lang="nl"/>
+                        <a:t>tablesorter</a:t>
+                      </a:r>
+                    </a:p>
+                  </a:txBody>
+                  <a:tcPr marT="91425" marB="91425" marR="91425" marL="91425"/>
+                </a:tc>
+                <a:tc>
+                  <a:txBody>
+                    <a:bodyPr>
+                      <a:noAutofit/>
+                    </a:bodyPr>
+                    <a:lstStyle/>
+                    <a:p>
+                      <a:pPr>
+                        <a:spcBef>
+                          <a:spcPts val="0"/>
+                        </a:spcBef>
+                        <a:buNone/>
+                      </a:pPr>
+                      <a:r>
+                        <a:rPr lang="nl"/>
+                        <a:t>2.18.4</a:t>
+                      </a:r>
+                    </a:p>
+                  </a:txBody>
+                  <a:tcPr marT="91425" marB="91425" marR="91425" marL="91425"/>
+                </a:tc>
+              </a:tr>
+              <a:tr h="381000">
+                <a:tc>
+                  <a:txBody>
+                    <a:bodyPr>
+                      <a:noAutofit/>
+                    </a:bodyPr>
+                    <a:lstStyle/>
+                    <a:p>
+                      <a:pPr>
+                        <a:spcBef>
+                          <a:spcPts val="0"/>
+                        </a:spcBef>
+                        <a:buNone/>
+                      </a:pPr>
+                      <a:r>
+                        <a:rPr lang="nl"/>
+                        <a:t>lightbox</a:t>
+                      </a:r>
+                    </a:p>
+                  </a:txBody>
+                  <a:tcPr marT="91425" marB="91425" marR="91425" marL="91425"/>
+                </a:tc>
+                <a:tc>
+                  <a:txBody>
+                    <a:bodyPr>
+                      <a:noAutofit/>
+                    </a:bodyPr>
+                    <a:lstStyle/>
+                    <a:p>
+                      <a:pPr>
+                        <a:spcBef>
+                          <a:spcPts val="0"/>
+                        </a:spcBef>
+                        <a:buNone/>
+                      </a:pPr>
+                      <a:r>
+                        <a:rPr lang="nl"/>
+                        <a:t>2.7.1</a:t>
+                      </a:r>
+                    </a:p>
+                  </a:txBody>
+                  <a:tcPr marT="91425" marB="91425" marR="91425" marL="91425"/>
+                </a:tc>
+              </a:tr>
+              <a:tr h="381000">
+                <a:tc>
+                  <a:txBody>
+                    <a:bodyPr>
+                      <a:noAutofit/>
+                    </a:bodyPr>
+                    <a:lstStyle/>
+                    <a:p>
+                      <a:pPr rtl="0">
+                        <a:spcBef>
+                          <a:spcPts val="0"/>
+                        </a:spcBef>
+                        <a:buNone/>
+                      </a:pPr>
+                      <a:r>
+                        <a:rPr lang="nl"/>
+                        <a:t>Highcharts</a:t>
+                      </a:r>
+                    </a:p>
+                  </a:txBody>
+                  <a:tcPr marT="91425" marB="91425" marR="91425" marL="91425"/>
+                </a:tc>
+                <a:tc>
+                  <a:txBody>
+                    <a:bodyPr>
+                      <a:noAutofit/>
+                    </a:bodyPr>
+                    <a:lstStyle/>
+                    <a:p>
+                      <a:pPr rtl="0">
+                        <a:spcBef>
+                          <a:spcPts val="0"/>
+                        </a:spcBef>
+                        <a:buNone/>
+                      </a:pPr>
+                      <a:r>
+                        <a:rPr lang="nl"/>
+                        <a:t>4.0.4</a:t>
+                      </a:r>
+                    </a:p>
+                  </a:txBody>
+                  <a:tcPr marT="91425" marB="91425" marR="91425" marL="91425"/>
+                </a:tc>
+              </a:tr>
+            </a:tbl>
+          </a:graphicData>
+        </a:graphic>
+      </p:graphicFrame>
+    </p:spTree>
+  </p:cSld>
+  <p:clrMapOvr>
+    <a:masterClrMapping/>
+  </p:clrMapOvr>
+  <p:transition spd="slow">
+    <p:cut/>
+  </p:transition>
+</p:sld>
+</file>
+
+<file path=ppt/slides/slide15.xml><?xml version="1.0" encoding="utf-8"?>
+<p:sld xmlns:a="http://schemas.openxmlformats.org/drawingml/2006/main" xmlns:r="http://schemas.openxmlformats.org/officeDocument/2006/relationships" xmlns:mc="http://schemas.openxmlformats.org/markup-compatibility/2006" xmlns:mv="urn:schemas-microsoft-com:mac:vml" xmlns:p="http://schemas.openxmlformats.org/presentationml/2006/main" xmlns:c="http://schemas.openxmlformats.org/drawingml/2006/chart" xmlns:dgm="http://schemas.openxmlformats.org/drawingml/2006/diagram" xmlns:o="urn:schemas-microsoft-com:office:office" xmlns:v="urn:schemas-microsoft-com:vml" xmlns:pvml="urn:schemas-microsoft-com:office:powerpoint" xmlns:com="http://schemas.openxmlformats.org/drawingml/2006/compatibility" xmlns:p14="http://schemas.microsoft.com/office/powerpoint/2010/main">
+  <p:cSld>
+    <p:spTree>
+      <p:nvGrpSpPr>
+        <p:cNvPr id="185" name="Shape 185"/>
+        <p:cNvGrpSpPr/>
+        <p:nvPr/>
+      </p:nvGrpSpPr>
+      <p:grpSpPr>
+        <a:xfrm>
+          <a:off x="0" y="0"/>
+          <a:ext cx="0" cy="0"/>
+          <a:chOff x="0" y="0"/>
+          <a:chExt cx="0" cy="0"/>
+        </a:xfrm>
+      </p:grpSpPr>
+      <p:sp>
+        <p:nvSpPr>
+          <p:cNvPr id="186" name="Shape 186"/>
           <p:cNvSpPr txBox="1"/>
           <p:nvPr>
             <p:ph type="title"/>
@@ -31756,7 +32851,7 @@
       </p:sp>
       <p:sp>
         <p:nvSpPr>
-          <p:cNvPr id="166" name="Shape 166"/>
+          <p:cNvPr id="187" name="Shape 187"/>
           <p:cNvSpPr txBox="1"/>
           <p:nvPr>
             <p:ph idx="1" type="body"/>
@@ -31857,12 +32952,12 @@
 </p:sld>
 </file>
 
-<file path=ppt/slides/slide12.xml><?xml version="1.0" encoding="utf-8"?>
+<file path=ppt/slides/slide16.xml><?xml version="1.0" encoding="utf-8"?>
 <p:sld xmlns:a="http://schemas.openxmlformats.org/drawingml/2006/main" xmlns:r="http://schemas.openxmlformats.org/officeDocument/2006/relationships" xmlns:mc="http://schemas.openxmlformats.org/markup-compatibility/2006" xmlns:mv="urn:schemas-microsoft-com:mac:vml" xmlns:p="http://schemas.openxmlformats.org/presentationml/2006/main" xmlns:c="http://schemas.openxmlformats.org/drawingml/2006/chart" xmlns:dgm="http://schemas.openxmlformats.org/drawingml/2006/diagram" xmlns:o="urn:schemas-microsoft-com:office:office" xmlns:v="urn:schemas-microsoft-com:vml" xmlns:pvml="urn:schemas-microsoft-com:office:powerpoint" xmlns:com="http://schemas.openxmlformats.org/drawingml/2006/compatibility" xmlns:p14="http://schemas.microsoft.com/office/powerpoint/2010/main">
   <p:cSld>
     <p:spTree>
       <p:nvGrpSpPr>
-        <p:cNvPr id="170" name="Shape 170"/>
+        <p:cNvPr id="191" name="Shape 191"/>
         <p:cNvGrpSpPr/>
         <p:nvPr/>
       </p:nvGrpSpPr>
@@ -31876,7 +32971,7 @@
       </p:grpSpPr>
       <p:pic>
         <p:nvPicPr>
-          <p:cNvPr id="171" name="Shape 171"/>
+          <p:cNvPr id="192" name="Shape 192"/>
           <p:cNvPicPr preferRelativeResize="0"/>
           <p:nvPr/>
         </p:nvPicPr>
@@ -31913,12 +33008,12 @@
 </p:sld>
 </file>
 
-<file path=ppt/slides/slide13.xml><?xml version="1.0" encoding="utf-8"?>
+<file path=ppt/slides/slide17.xml><?xml version="1.0" encoding="utf-8"?>
 <p:sld xmlns:a="http://schemas.openxmlformats.org/drawingml/2006/main" xmlns:r="http://schemas.openxmlformats.org/officeDocument/2006/relationships" xmlns:mc="http://schemas.openxmlformats.org/markup-compatibility/2006" xmlns:mv="urn:schemas-microsoft-com:mac:vml" xmlns:p="http://schemas.openxmlformats.org/presentationml/2006/main" xmlns:c="http://schemas.openxmlformats.org/drawingml/2006/chart" xmlns:dgm="http://schemas.openxmlformats.org/drawingml/2006/diagram" xmlns:o="urn:schemas-microsoft-com:office:office" xmlns:v="urn:schemas-microsoft-com:vml" xmlns:pvml="urn:schemas-microsoft-com:office:powerpoint" xmlns:com="http://schemas.openxmlformats.org/drawingml/2006/compatibility" xmlns:p14="http://schemas.microsoft.com/office/powerpoint/2010/main">
   <p:cSld>
     <p:spTree>
       <p:nvGrpSpPr>
-        <p:cNvPr id="175" name="Shape 175"/>
+        <p:cNvPr id="196" name="Shape 196"/>
         <p:cNvGrpSpPr/>
         <p:nvPr/>
       </p:nvGrpSpPr>
@@ -31932,7 +33027,7 @@
       </p:grpSpPr>
       <p:pic>
         <p:nvPicPr>
-          <p:cNvPr id="176" name="Shape 176"/>
+          <p:cNvPr id="197" name="Shape 197"/>
           <p:cNvPicPr preferRelativeResize="0"/>
           <p:nvPr/>
         </p:nvPicPr>
@@ -31969,12 +33064,12 @@
 </p:sld>
 </file>
 
-<file path=ppt/slides/slide14.xml><?xml version="1.0" encoding="utf-8"?>
+<file path=ppt/slides/slide18.xml><?xml version="1.0" encoding="utf-8"?>
 <p:sld xmlns:a="http://schemas.openxmlformats.org/drawingml/2006/main" xmlns:r="http://schemas.openxmlformats.org/officeDocument/2006/relationships" xmlns:mc="http://schemas.openxmlformats.org/markup-compatibility/2006" xmlns:mv="urn:schemas-microsoft-com:mac:vml" xmlns:p="http://schemas.openxmlformats.org/presentationml/2006/main" xmlns:c="http://schemas.openxmlformats.org/drawingml/2006/chart" xmlns:dgm="http://schemas.openxmlformats.org/drawingml/2006/diagram" xmlns:o="urn:schemas-microsoft-com:office:office" xmlns:v="urn:schemas-microsoft-com:vml" xmlns:pvml="urn:schemas-microsoft-com:office:powerpoint" xmlns:com="http://schemas.openxmlformats.org/drawingml/2006/compatibility" xmlns:p14="http://schemas.microsoft.com/office/powerpoint/2010/main">
   <p:cSld>
     <p:spTree>
       <p:nvGrpSpPr>
-        <p:cNvPr id="180" name="Shape 180"/>
+        <p:cNvPr id="201" name="Shape 201"/>
         <p:cNvGrpSpPr/>
         <p:nvPr/>
       </p:nvGrpSpPr>
@@ -31988,7 +33083,7 @@
       </p:grpSpPr>
       <p:sp>
         <p:nvSpPr>
-          <p:cNvPr id="181" name="Shape 181"/>
+          <p:cNvPr id="202" name="Shape 202"/>
           <p:cNvSpPr txBox="1"/>
           <p:nvPr>
             <p:ph type="title"/>
@@ -32024,7 +33119,7 @@
       </p:sp>
       <p:sp>
         <p:nvSpPr>
-          <p:cNvPr id="182" name="Shape 182"/>
+          <p:cNvPr id="203" name="Shape 203"/>
           <p:cNvSpPr txBox="1"/>
           <p:nvPr>
             <p:ph idx="1" type="body"/>
@@ -32069,12 +33164,12 @@
 </p:sld>
 </file>
 
-<file path=ppt/slides/slide15.xml><?xml version="1.0" encoding="utf-8"?>
+<file path=ppt/slides/slide19.xml><?xml version="1.0" encoding="utf-8"?>
 <p:sld xmlns:a="http://schemas.openxmlformats.org/drawingml/2006/main" xmlns:r="http://schemas.openxmlformats.org/officeDocument/2006/relationships" xmlns:mc="http://schemas.openxmlformats.org/markup-compatibility/2006" xmlns:mv="urn:schemas-microsoft-com:mac:vml" xmlns:p="http://schemas.openxmlformats.org/presentationml/2006/main" xmlns:c="http://schemas.openxmlformats.org/drawingml/2006/chart" xmlns:dgm="http://schemas.openxmlformats.org/drawingml/2006/diagram" xmlns:o="urn:schemas-microsoft-com:office:office" xmlns:v="urn:schemas-microsoft-com:vml" xmlns:pvml="urn:schemas-microsoft-com:office:powerpoint" xmlns:com="http://schemas.openxmlformats.org/drawingml/2006/compatibility" xmlns:p14="http://schemas.microsoft.com/office/powerpoint/2010/main">
   <p:cSld>
     <p:spTree>
       <p:nvGrpSpPr>
-        <p:cNvPr id="186" name="Shape 186"/>
+        <p:cNvPr id="207" name="Shape 207"/>
         <p:cNvGrpSpPr/>
         <p:nvPr/>
       </p:nvGrpSpPr>
@@ -32088,397 +33183,7 @@
       </p:grpSpPr>
       <p:pic>
         <p:nvPicPr>
-          <p:cNvPr id="187" name="Shape 187"/>
-          <p:cNvPicPr preferRelativeResize="0"/>
-          <p:nvPr/>
-        </p:nvPicPr>
-        <p:blipFill>
-          <a:blip r:embed="rId3">
-            <a:alphaModFix/>
-          </a:blip>
-          <a:stretch>
-            <a:fillRect/>
-          </a:stretch>
-        </p:blipFill>
-        <p:spPr>
-          <a:xfrm>
-            <a:off x="0" y="0"/>
-            <a:ext cx="9144000" cy="5143500"/>
-          </a:xfrm>
-          <a:prstGeom prst="rect">
-            <a:avLst/>
-          </a:prstGeom>
-          <a:noFill/>
-          <a:ln>
-            <a:noFill/>
-          </a:ln>
-        </p:spPr>
-      </p:pic>
-    </p:spTree>
-  </p:cSld>
-  <p:clrMapOvr>
-    <a:masterClrMapping/>
-  </p:clrMapOvr>
-  <p:transition spd="slow">
-    <p:cut/>
-  </p:transition>
-</p:sld>
-</file>
-
-<file path=ppt/slides/slide16.xml><?xml version="1.0" encoding="utf-8"?>
-<p:sld xmlns:a="http://schemas.openxmlformats.org/drawingml/2006/main" xmlns:r="http://schemas.openxmlformats.org/officeDocument/2006/relationships" xmlns:mc="http://schemas.openxmlformats.org/markup-compatibility/2006" xmlns:mv="urn:schemas-microsoft-com:mac:vml" xmlns:p="http://schemas.openxmlformats.org/presentationml/2006/main" xmlns:c="http://schemas.openxmlformats.org/drawingml/2006/chart" xmlns:dgm="http://schemas.openxmlformats.org/drawingml/2006/diagram" xmlns:o="urn:schemas-microsoft-com:office:office" xmlns:v="urn:schemas-microsoft-com:vml" xmlns:pvml="urn:schemas-microsoft-com:office:powerpoint" xmlns:com="http://schemas.openxmlformats.org/drawingml/2006/compatibility" xmlns:p14="http://schemas.microsoft.com/office/powerpoint/2010/main">
-  <p:cSld>
-    <p:spTree>
-      <p:nvGrpSpPr>
-        <p:cNvPr id="191" name="Shape 191"/>
-        <p:cNvGrpSpPr/>
-        <p:nvPr/>
-      </p:nvGrpSpPr>
-      <p:grpSpPr>
-        <a:xfrm>
-          <a:off x="0" y="0"/>
-          <a:ext cx="0" cy="0"/>
-          <a:chOff x="0" y="0"/>
-          <a:chExt cx="0" cy="0"/>
-        </a:xfrm>
-      </p:grpSpPr>
-      <p:sp>
-        <p:nvSpPr>
-          <p:cNvPr id="192" name="Shape 192"/>
-          <p:cNvSpPr txBox="1"/>
-          <p:nvPr>
-            <p:ph type="title"/>
-          </p:nvPr>
-        </p:nvSpPr>
-        <p:spPr>
-          <a:xfrm>
-            <a:off x="457200" y="155628"/>
-            <a:ext cx="8229600" cy="1044599"/>
-          </a:xfrm>
-          <a:prstGeom prst="rect">
-            <a:avLst/>
-          </a:prstGeom>
-        </p:spPr>
-        <p:txBody>
-          <a:bodyPr anchorCtr="0" anchor="b" bIns="91425" lIns="91425" rIns="91425" tIns="91425">
-            <a:noAutofit/>
-          </a:bodyPr>
-          <a:lstStyle/>
-          <a:p>
-            <a:pPr>
-              <a:spcBef>
-                <a:spcPts val="0"/>
-              </a:spcBef>
-              <a:buNone/>
-            </a:pPr>
-            <a:r>
-              <a:rPr lang="nl"/>
-              <a:t>Database access</a:t>
-            </a:r>
-          </a:p>
-        </p:txBody>
-      </p:sp>
-      <p:sp>
-        <p:nvSpPr>
-          <p:cNvPr id="193" name="Shape 193"/>
-          <p:cNvSpPr txBox="1"/>
-          <p:nvPr>
-            <p:ph idx="1" type="body"/>
-          </p:nvPr>
-        </p:nvSpPr>
-        <p:spPr>
-          <a:xfrm>
-            <a:off x="457200" y="1297780"/>
-            <a:ext cx="8229600" cy="3627900"/>
-          </a:xfrm>
-          <a:prstGeom prst="rect">
-            <a:avLst/>
-          </a:prstGeom>
-        </p:spPr>
-        <p:txBody>
-          <a:bodyPr anchorCtr="0" anchor="t" bIns="91425" lIns="91425" rIns="91425" tIns="91425">
-            <a:noAutofit/>
-          </a:bodyPr>
-          <a:lstStyle/>
-          <a:p>
-            <a:pPr indent="-419100" lvl="0" marL="457200" rtl="0">
-              <a:spcBef>
-                <a:spcPts val="0"/>
-              </a:spcBef>
-              <a:buClr>
-                <a:schemeClr val="dk2"/>
-              </a:buClr>
-              <a:buSzPct val="100000"/>
-              <a:buFont typeface="Arial"/>
-              <a:buChar char="●"/>
-            </a:pPr>
-            <a:r>
-              <a:rPr lang="nl"/>
-              <a:t>Old mysql methods:</a:t>
-            </a:r>
-          </a:p>
-          <a:p>
-            <a:pPr indent="-381000" lvl="1" marL="914400" rtl="0">
-              <a:spcBef>
-                <a:spcPts val="0"/>
-              </a:spcBef>
-              <a:buClr>
-                <a:schemeClr val="dk2"/>
-              </a:buClr>
-              <a:buSzPct val="80000"/>
-              <a:buFont typeface="Courier New"/>
-              <a:buChar char="o"/>
-            </a:pPr>
-            <a:r>
-              <a:rPr lang="nl"/>
-              <a:t>deprecated since php 5.5.</a:t>
-            </a:r>
-          </a:p>
-          <a:p>
-            <a:pPr indent="-381000" lvl="1" marL="914400" rtl="0">
-              <a:spcBef>
-                <a:spcPts val="0"/>
-              </a:spcBef>
-              <a:buClr>
-                <a:schemeClr val="dk2"/>
-              </a:buClr>
-              <a:buSzPct val="80000"/>
-              <a:buFont typeface="Courier New"/>
-              <a:buChar char="o"/>
-            </a:pPr>
-            <a:r>
-              <a:rPr lang="nl"/>
-              <a:t>no longer developed since 2006</a:t>
-            </a:r>
-          </a:p>
-          <a:p>
-            <a:pPr indent="-419100" lvl="0" marL="457200">
-              <a:spcBef>
-                <a:spcPts val="0"/>
-              </a:spcBef>
-              <a:buClr>
-                <a:schemeClr val="dk2"/>
-              </a:buClr>
-              <a:buSzPct val="100000"/>
-              <a:buFont typeface="Arial"/>
-              <a:buChar char="●"/>
-            </a:pPr>
-            <a:r>
-              <a:rPr lang="nl"/>
-              <a:t>Migration to PDO_mysql</a:t>
-            </a:r>
-          </a:p>
-        </p:txBody>
-      </p:sp>
-    </p:spTree>
-  </p:cSld>
-  <p:clrMapOvr>
-    <a:masterClrMapping/>
-  </p:clrMapOvr>
-  <p:transition spd="slow">
-    <p:cut/>
-  </p:transition>
-</p:sld>
-</file>
-
-<file path=ppt/slides/slide17.xml><?xml version="1.0" encoding="utf-8"?>
-<p:sld xmlns:a="http://schemas.openxmlformats.org/drawingml/2006/main" xmlns:r="http://schemas.openxmlformats.org/officeDocument/2006/relationships" xmlns:mc="http://schemas.openxmlformats.org/markup-compatibility/2006" xmlns:mv="urn:schemas-microsoft-com:mac:vml" xmlns:p="http://schemas.openxmlformats.org/presentationml/2006/main" xmlns:c="http://schemas.openxmlformats.org/drawingml/2006/chart" xmlns:dgm="http://schemas.openxmlformats.org/drawingml/2006/diagram" xmlns:o="urn:schemas-microsoft-com:office:office" xmlns:v="urn:schemas-microsoft-com:vml" xmlns:pvml="urn:schemas-microsoft-com:office:powerpoint" xmlns:com="http://schemas.openxmlformats.org/drawingml/2006/compatibility" xmlns:p14="http://schemas.microsoft.com/office/powerpoint/2010/main">
-  <p:cSld>
-    <p:spTree>
-      <p:nvGrpSpPr>
-        <p:cNvPr id="197" name="Shape 197"/>
-        <p:cNvGrpSpPr/>
-        <p:nvPr/>
-      </p:nvGrpSpPr>
-      <p:grpSpPr>
-        <a:xfrm>
-          <a:off x="0" y="0"/>
-          <a:ext cx="0" cy="0"/>
-          <a:chOff x="0" y="0"/>
-          <a:chExt cx="0" cy="0"/>
-        </a:xfrm>
-      </p:grpSpPr>
-      <p:sp>
-        <p:nvSpPr>
-          <p:cNvPr id="198" name="Shape 198"/>
-          <p:cNvSpPr txBox="1"/>
-          <p:nvPr>
-            <p:ph type="title"/>
-          </p:nvPr>
-        </p:nvSpPr>
-        <p:spPr>
-          <a:xfrm>
-            <a:off x="457200" y="155628"/>
-            <a:ext cx="8229600" cy="1044599"/>
-          </a:xfrm>
-          <a:prstGeom prst="rect">
-            <a:avLst/>
-          </a:prstGeom>
-        </p:spPr>
-        <p:txBody>
-          <a:bodyPr anchorCtr="0" anchor="b" bIns="91425" lIns="91425" rIns="91425" tIns="91425">
-            <a:noAutofit/>
-          </a:bodyPr>
-          <a:lstStyle/>
-          <a:p>
-            <a:pPr>
-              <a:spcBef>
-                <a:spcPts val="0"/>
-              </a:spcBef>
-              <a:buNone/>
-            </a:pPr>
-            <a:r>
-              <a:rPr lang="nl"/>
-              <a:t>Picture of observers</a:t>
-            </a:r>
-          </a:p>
-        </p:txBody>
-      </p:sp>
-      <p:sp>
-        <p:nvSpPr>
-          <p:cNvPr id="199" name="Shape 199"/>
-          <p:cNvSpPr txBox="1"/>
-          <p:nvPr>
-            <p:ph idx="1" type="body"/>
-          </p:nvPr>
-        </p:nvSpPr>
-        <p:spPr>
-          <a:xfrm>
-            <a:off x="457200" y="1297780"/>
-            <a:ext cx="8229600" cy="3627900"/>
-          </a:xfrm>
-          <a:prstGeom prst="rect">
-            <a:avLst/>
-          </a:prstGeom>
-        </p:spPr>
-        <p:txBody>
-          <a:bodyPr anchorCtr="0" anchor="t" bIns="91425" lIns="91425" rIns="91425" tIns="91425">
-            <a:noAutofit/>
-          </a:bodyPr>
-          <a:lstStyle/>
-          <a:p>
-            <a:pPr indent="-419100" lvl="0" marL="457200" rtl="0">
-              <a:spcBef>
-                <a:spcPts val="0"/>
-              </a:spcBef>
-              <a:buClr>
-                <a:schemeClr val="dk2"/>
-              </a:buClr>
-              <a:buSzPct val="100000"/>
-              <a:buFont typeface="Arial"/>
-              <a:buChar char="●"/>
-            </a:pPr>
-            <a:r>
-              <a:rPr lang="nl"/>
-              <a:t>In detail of observation.</a:t>
-            </a:r>
-          </a:p>
-          <a:p>
-            <a:pPr indent="-419100" lvl="0" marL="457200">
-              <a:spcBef>
-                <a:spcPts val="0"/>
-              </a:spcBef>
-              <a:buClr>
-                <a:schemeClr val="dk2"/>
-              </a:buClr>
-              <a:buSzPct val="100000"/>
-              <a:buFont typeface="Arial"/>
-              <a:buChar char="●"/>
-            </a:pPr>
-            <a:r>
-              <a:rPr lang="nl"/>
-              <a:t>In messages.</a:t>
-            </a:r>
-          </a:p>
-        </p:txBody>
-      </p:sp>
-    </p:spTree>
-  </p:cSld>
-  <p:clrMapOvr>
-    <a:masterClrMapping/>
-  </p:clrMapOvr>
-  <p:transition spd="slow">
-    <p:cut/>
-  </p:transition>
-</p:sld>
-</file>
-
-<file path=ppt/slides/slide18.xml><?xml version="1.0" encoding="utf-8"?>
-<p:sld xmlns:a="http://schemas.openxmlformats.org/drawingml/2006/main" xmlns:r="http://schemas.openxmlformats.org/officeDocument/2006/relationships" xmlns:mc="http://schemas.openxmlformats.org/markup-compatibility/2006" xmlns:mv="urn:schemas-microsoft-com:mac:vml" xmlns:p="http://schemas.openxmlformats.org/presentationml/2006/main" xmlns:c="http://schemas.openxmlformats.org/drawingml/2006/chart" xmlns:dgm="http://schemas.openxmlformats.org/drawingml/2006/diagram" xmlns:o="urn:schemas-microsoft-com:office:office" xmlns:v="urn:schemas-microsoft-com:vml" xmlns:pvml="urn:schemas-microsoft-com:office:powerpoint" xmlns:com="http://schemas.openxmlformats.org/drawingml/2006/compatibility" xmlns:p14="http://schemas.microsoft.com/office/powerpoint/2010/main">
-  <p:cSld>
-    <p:spTree>
-      <p:nvGrpSpPr>
-        <p:cNvPr id="203" name="Shape 203"/>
-        <p:cNvGrpSpPr/>
-        <p:nvPr/>
-      </p:nvGrpSpPr>
-      <p:grpSpPr>
-        <a:xfrm>
-          <a:off x="0" y="0"/>
-          <a:ext cx="0" cy="0"/>
-          <a:chOff x="0" y="0"/>
-          <a:chExt cx="0" cy="0"/>
-        </a:xfrm>
-      </p:grpSpPr>
-      <p:pic>
-        <p:nvPicPr>
-          <p:cNvPr id="204" name="Shape 204"/>
-          <p:cNvPicPr preferRelativeResize="0"/>
-          <p:nvPr/>
-        </p:nvPicPr>
-        <p:blipFill>
-          <a:blip r:embed="rId3">
-            <a:alphaModFix/>
-          </a:blip>
-          <a:stretch>
-            <a:fillRect/>
-          </a:stretch>
-        </p:blipFill>
-        <p:spPr>
-          <a:xfrm>
-            <a:off x="0" y="0"/>
-            <a:ext cx="9144000" cy="5143500"/>
-          </a:xfrm>
-          <a:prstGeom prst="rect">
-            <a:avLst/>
-          </a:prstGeom>
-          <a:noFill/>
-          <a:ln>
-            <a:noFill/>
-          </a:ln>
-        </p:spPr>
-      </p:pic>
-    </p:spTree>
-  </p:cSld>
-  <p:clrMapOvr>
-    <a:masterClrMapping/>
-  </p:clrMapOvr>
-  <p:transition spd="slow">
-    <p:cut/>
-  </p:transition>
-</p:sld>
-</file>
-
-<file path=ppt/slides/slide19.xml><?xml version="1.0" encoding="utf-8"?>
-<p:sld xmlns:a="http://schemas.openxmlformats.org/drawingml/2006/main" xmlns:r="http://schemas.openxmlformats.org/officeDocument/2006/relationships" xmlns:mc="http://schemas.openxmlformats.org/markup-compatibility/2006" xmlns:mv="urn:schemas-microsoft-com:mac:vml" xmlns:p="http://schemas.openxmlformats.org/presentationml/2006/main" xmlns:c="http://schemas.openxmlformats.org/drawingml/2006/chart" xmlns:dgm="http://schemas.openxmlformats.org/drawingml/2006/diagram" xmlns:o="urn:schemas-microsoft-com:office:office" xmlns:v="urn:schemas-microsoft-com:vml" xmlns:pvml="urn:schemas-microsoft-com:office:powerpoint" xmlns:com="http://schemas.openxmlformats.org/drawingml/2006/compatibility" xmlns:p14="http://schemas.microsoft.com/office/powerpoint/2010/main">
-  <p:cSld>
-    <p:spTree>
-      <p:nvGrpSpPr>
-        <p:cNvPr id="208" name="Shape 208"/>
-        <p:cNvGrpSpPr/>
-        <p:nvPr/>
-      </p:nvGrpSpPr>
-      <p:grpSpPr>
-        <a:xfrm>
-          <a:off x="0" y="0"/>
-          <a:ext cx="0" cy="0"/>
-          <a:chOff x="0" y="0"/>
-          <a:chExt cx="0" cy="0"/>
-        </a:xfrm>
-      </p:grpSpPr>
-      <p:pic>
-        <p:nvPicPr>
-          <p:cNvPr id="209" name="Shape 209"/>
+          <p:cNvPr id="208" name="Shape 208"/>
           <p:cNvPicPr preferRelativeResize="0"/>
           <p:nvPr/>
         </p:nvPicPr>
@@ -32722,7 +33427,7 @@
   <p:cSld>
     <p:spTree>
       <p:nvGrpSpPr>
-        <p:cNvPr id="213" name="Shape 213"/>
+        <p:cNvPr id="212" name="Shape 212"/>
         <p:cNvGrpSpPr/>
         <p:nvPr/>
       </p:nvGrpSpPr>
@@ -32736,7 +33441,397 @@
       </p:grpSpPr>
       <p:sp>
         <p:nvSpPr>
+          <p:cNvPr id="213" name="Shape 213"/>
+          <p:cNvSpPr txBox="1"/>
+          <p:nvPr>
+            <p:ph type="title"/>
+          </p:nvPr>
+        </p:nvSpPr>
+        <p:spPr>
+          <a:xfrm>
+            <a:off x="457200" y="155628"/>
+            <a:ext cx="8229600" cy="1044599"/>
+          </a:xfrm>
+          <a:prstGeom prst="rect">
+            <a:avLst/>
+          </a:prstGeom>
+        </p:spPr>
+        <p:txBody>
+          <a:bodyPr anchorCtr="0" anchor="b" bIns="91425" lIns="91425" rIns="91425" tIns="91425">
+            <a:noAutofit/>
+          </a:bodyPr>
+          <a:lstStyle/>
+          <a:p>
+            <a:pPr>
+              <a:spcBef>
+                <a:spcPts val="0"/>
+              </a:spcBef>
+              <a:buNone/>
+            </a:pPr>
+            <a:r>
+              <a:rPr lang="nl"/>
+              <a:t>Database access</a:t>
+            </a:r>
+          </a:p>
+        </p:txBody>
+      </p:sp>
+      <p:sp>
+        <p:nvSpPr>
           <p:cNvPr id="214" name="Shape 214"/>
+          <p:cNvSpPr txBox="1"/>
+          <p:nvPr>
+            <p:ph idx="1" type="body"/>
+          </p:nvPr>
+        </p:nvSpPr>
+        <p:spPr>
+          <a:xfrm>
+            <a:off x="457200" y="1297780"/>
+            <a:ext cx="8229600" cy="3627900"/>
+          </a:xfrm>
+          <a:prstGeom prst="rect">
+            <a:avLst/>
+          </a:prstGeom>
+        </p:spPr>
+        <p:txBody>
+          <a:bodyPr anchorCtr="0" anchor="t" bIns="91425" lIns="91425" rIns="91425" tIns="91425">
+            <a:noAutofit/>
+          </a:bodyPr>
+          <a:lstStyle/>
+          <a:p>
+            <a:pPr indent="-419100" lvl="0" marL="457200" rtl="0">
+              <a:spcBef>
+                <a:spcPts val="0"/>
+              </a:spcBef>
+              <a:buClr>
+                <a:schemeClr val="dk2"/>
+              </a:buClr>
+              <a:buSzPct val="100000"/>
+              <a:buFont typeface="Arial"/>
+              <a:buChar char="●"/>
+            </a:pPr>
+            <a:r>
+              <a:rPr lang="nl"/>
+              <a:t>Old mysql methods:</a:t>
+            </a:r>
+          </a:p>
+          <a:p>
+            <a:pPr indent="-381000" lvl="1" marL="914400" rtl="0">
+              <a:spcBef>
+                <a:spcPts val="0"/>
+              </a:spcBef>
+              <a:buClr>
+                <a:schemeClr val="dk2"/>
+              </a:buClr>
+              <a:buSzPct val="80000"/>
+              <a:buFont typeface="Courier New"/>
+              <a:buChar char="o"/>
+            </a:pPr>
+            <a:r>
+              <a:rPr lang="nl"/>
+              <a:t>deprecated since php 5.5.</a:t>
+            </a:r>
+          </a:p>
+          <a:p>
+            <a:pPr indent="-381000" lvl="1" marL="914400" rtl="0">
+              <a:spcBef>
+                <a:spcPts val="0"/>
+              </a:spcBef>
+              <a:buClr>
+                <a:schemeClr val="dk2"/>
+              </a:buClr>
+              <a:buSzPct val="80000"/>
+              <a:buFont typeface="Courier New"/>
+              <a:buChar char="o"/>
+            </a:pPr>
+            <a:r>
+              <a:rPr lang="nl"/>
+              <a:t>no longer developed since 2006</a:t>
+            </a:r>
+          </a:p>
+          <a:p>
+            <a:pPr indent="-419100" lvl="0" marL="457200">
+              <a:spcBef>
+                <a:spcPts val="0"/>
+              </a:spcBef>
+              <a:buClr>
+                <a:schemeClr val="dk2"/>
+              </a:buClr>
+              <a:buSzPct val="100000"/>
+              <a:buFont typeface="Arial"/>
+              <a:buChar char="●"/>
+            </a:pPr>
+            <a:r>
+              <a:rPr lang="nl"/>
+              <a:t>Migration to PDO_mysql</a:t>
+            </a:r>
+          </a:p>
+        </p:txBody>
+      </p:sp>
+    </p:spTree>
+  </p:cSld>
+  <p:clrMapOvr>
+    <a:masterClrMapping/>
+  </p:clrMapOvr>
+  <p:transition spd="slow">
+    <p:cut/>
+  </p:transition>
+</p:sld>
+</file>
+
+<file path=ppt/slides/slide21.xml><?xml version="1.0" encoding="utf-8"?>
+<p:sld xmlns:a="http://schemas.openxmlformats.org/drawingml/2006/main" xmlns:r="http://schemas.openxmlformats.org/officeDocument/2006/relationships" xmlns:mc="http://schemas.openxmlformats.org/markup-compatibility/2006" xmlns:mv="urn:schemas-microsoft-com:mac:vml" xmlns:p="http://schemas.openxmlformats.org/presentationml/2006/main" xmlns:c="http://schemas.openxmlformats.org/drawingml/2006/chart" xmlns:dgm="http://schemas.openxmlformats.org/drawingml/2006/diagram" xmlns:o="urn:schemas-microsoft-com:office:office" xmlns:v="urn:schemas-microsoft-com:vml" xmlns:pvml="urn:schemas-microsoft-com:office:powerpoint" xmlns:com="http://schemas.openxmlformats.org/drawingml/2006/compatibility" xmlns:p14="http://schemas.microsoft.com/office/powerpoint/2010/main">
+  <p:cSld>
+    <p:spTree>
+      <p:nvGrpSpPr>
+        <p:cNvPr id="218" name="Shape 218"/>
+        <p:cNvGrpSpPr/>
+        <p:nvPr/>
+      </p:nvGrpSpPr>
+      <p:grpSpPr>
+        <a:xfrm>
+          <a:off x="0" y="0"/>
+          <a:ext cx="0" cy="0"/>
+          <a:chOff x="0" y="0"/>
+          <a:chExt cx="0" cy="0"/>
+        </a:xfrm>
+      </p:grpSpPr>
+      <p:sp>
+        <p:nvSpPr>
+          <p:cNvPr id="219" name="Shape 219"/>
+          <p:cNvSpPr txBox="1"/>
+          <p:nvPr>
+            <p:ph type="title"/>
+          </p:nvPr>
+        </p:nvSpPr>
+        <p:spPr>
+          <a:xfrm>
+            <a:off x="457200" y="155628"/>
+            <a:ext cx="8229600" cy="1044599"/>
+          </a:xfrm>
+          <a:prstGeom prst="rect">
+            <a:avLst/>
+          </a:prstGeom>
+        </p:spPr>
+        <p:txBody>
+          <a:bodyPr anchorCtr="0" anchor="b" bIns="91425" lIns="91425" rIns="91425" tIns="91425">
+            <a:noAutofit/>
+          </a:bodyPr>
+          <a:lstStyle/>
+          <a:p>
+            <a:pPr>
+              <a:spcBef>
+                <a:spcPts val="0"/>
+              </a:spcBef>
+              <a:buNone/>
+            </a:pPr>
+            <a:r>
+              <a:rPr lang="nl"/>
+              <a:t>Picture of observers</a:t>
+            </a:r>
+          </a:p>
+        </p:txBody>
+      </p:sp>
+      <p:sp>
+        <p:nvSpPr>
+          <p:cNvPr id="220" name="Shape 220"/>
+          <p:cNvSpPr txBox="1"/>
+          <p:nvPr>
+            <p:ph idx="1" type="body"/>
+          </p:nvPr>
+        </p:nvSpPr>
+        <p:spPr>
+          <a:xfrm>
+            <a:off x="457200" y="1297780"/>
+            <a:ext cx="8229600" cy="3627900"/>
+          </a:xfrm>
+          <a:prstGeom prst="rect">
+            <a:avLst/>
+          </a:prstGeom>
+        </p:spPr>
+        <p:txBody>
+          <a:bodyPr anchorCtr="0" anchor="t" bIns="91425" lIns="91425" rIns="91425" tIns="91425">
+            <a:noAutofit/>
+          </a:bodyPr>
+          <a:lstStyle/>
+          <a:p>
+            <a:pPr indent="-419100" lvl="0" marL="457200" rtl="0">
+              <a:spcBef>
+                <a:spcPts val="0"/>
+              </a:spcBef>
+              <a:buClr>
+                <a:schemeClr val="dk2"/>
+              </a:buClr>
+              <a:buSzPct val="100000"/>
+              <a:buFont typeface="Arial"/>
+              <a:buChar char="●"/>
+            </a:pPr>
+            <a:r>
+              <a:rPr lang="nl"/>
+              <a:t>In detail of observation.</a:t>
+            </a:r>
+          </a:p>
+          <a:p>
+            <a:pPr indent="-419100" lvl="0" marL="457200">
+              <a:spcBef>
+                <a:spcPts val="0"/>
+              </a:spcBef>
+              <a:buClr>
+                <a:schemeClr val="dk2"/>
+              </a:buClr>
+              <a:buSzPct val="100000"/>
+              <a:buFont typeface="Arial"/>
+              <a:buChar char="●"/>
+            </a:pPr>
+            <a:r>
+              <a:rPr lang="nl"/>
+              <a:t>In messages.</a:t>
+            </a:r>
+          </a:p>
+        </p:txBody>
+      </p:sp>
+    </p:spTree>
+  </p:cSld>
+  <p:clrMapOvr>
+    <a:masterClrMapping/>
+  </p:clrMapOvr>
+  <p:transition spd="slow">
+    <p:cut/>
+  </p:transition>
+</p:sld>
+</file>
+
+<file path=ppt/slides/slide22.xml><?xml version="1.0" encoding="utf-8"?>
+<p:sld xmlns:a="http://schemas.openxmlformats.org/drawingml/2006/main" xmlns:r="http://schemas.openxmlformats.org/officeDocument/2006/relationships" xmlns:mc="http://schemas.openxmlformats.org/markup-compatibility/2006" xmlns:mv="urn:schemas-microsoft-com:mac:vml" xmlns:p="http://schemas.openxmlformats.org/presentationml/2006/main" xmlns:c="http://schemas.openxmlformats.org/drawingml/2006/chart" xmlns:dgm="http://schemas.openxmlformats.org/drawingml/2006/diagram" xmlns:o="urn:schemas-microsoft-com:office:office" xmlns:v="urn:schemas-microsoft-com:vml" xmlns:pvml="urn:schemas-microsoft-com:office:powerpoint" xmlns:com="http://schemas.openxmlformats.org/drawingml/2006/compatibility" xmlns:p14="http://schemas.microsoft.com/office/powerpoint/2010/main">
+  <p:cSld>
+    <p:spTree>
+      <p:nvGrpSpPr>
+        <p:cNvPr id="224" name="Shape 224"/>
+        <p:cNvGrpSpPr/>
+        <p:nvPr/>
+      </p:nvGrpSpPr>
+      <p:grpSpPr>
+        <a:xfrm>
+          <a:off x="0" y="0"/>
+          <a:ext cx="0" cy="0"/>
+          <a:chOff x="0" y="0"/>
+          <a:chExt cx="0" cy="0"/>
+        </a:xfrm>
+      </p:grpSpPr>
+      <p:pic>
+        <p:nvPicPr>
+          <p:cNvPr id="225" name="Shape 225"/>
+          <p:cNvPicPr preferRelativeResize="0"/>
+          <p:nvPr/>
+        </p:nvPicPr>
+        <p:blipFill>
+          <a:blip r:embed="rId3">
+            <a:alphaModFix/>
+          </a:blip>
+          <a:stretch>
+            <a:fillRect/>
+          </a:stretch>
+        </p:blipFill>
+        <p:spPr>
+          <a:xfrm>
+            <a:off x="0" y="0"/>
+            <a:ext cx="9144000" cy="5143500"/>
+          </a:xfrm>
+          <a:prstGeom prst="rect">
+            <a:avLst/>
+          </a:prstGeom>
+          <a:noFill/>
+          <a:ln>
+            <a:noFill/>
+          </a:ln>
+        </p:spPr>
+      </p:pic>
+    </p:spTree>
+  </p:cSld>
+  <p:clrMapOvr>
+    <a:masterClrMapping/>
+  </p:clrMapOvr>
+  <p:transition spd="slow">
+    <p:cut/>
+  </p:transition>
+</p:sld>
+</file>
+
+<file path=ppt/slides/slide23.xml><?xml version="1.0" encoding="utf-8"?>
+<p:sld xmlns:a="http://schemas.openxmlformats.org/drawingml/2006/main" xmlns:r="http://schemas.openxmlformats.org/officeDocument/2006/relationships" xmlns:mc="http://schemas.openxmlformats.org/markup-compatibility/2006" xmlns:mv="urn:schemas-microsoft-com:mac:vml" xmlns:p="http://schemas.openxmlformats.org/presentationml/2006/main" xmlns:c="http://schemas.openxmlformats.org/drawingml/2006/chart" xmlns:dgm="http://schemas.openxmlformats.org/drawingml/2006/diagram" xmlns:o="urn:schemas-microsoft-com:office:office" xmlns:v="urn:schemas-microsoft-com:vml" xmlns:pvml="urn:schemas-microsoft-com:office:powerpoint" xmlns:com="http://schemas.openxmlformats.org/drawingml/2006/compatibility" xmlns:p14="http://schemas.microsoft.com/office/powerpoint/2010/main">
+  <p:cSld>
+    <p:spTree>
+      <p:nvGrpSpPr>
+        <p:cNvPr id="229" name="Shape 229"/>
+        <p:cNvGrpSpPr/>
+        <p:nvPr/>
+      </p:nvGrpSpPr>
+      <p:grpSpPr>
+        <a:xfrm>
+          <a:off x="0" y="0"/>
+          <a:ext cx="0" cy="0"/>
+          <a:chOff x="0" y="0"/>
+          <a:chExt cx="0" cy="0"/>
+        </a:xfrm>
+      </p:grpSpPr>
+      <p:pic>
+        <p:nvPicPr>
+          <p:cNvPr id="230" name="Shape 230"/>
+          <p:cNvPicPr preferRelativeResize="0"/>
+          <p:nvPr/>
+        </p:nvPicPr>
+        <p:blipFill>
+          <a:blip r:embed="rId3">
+            <a:alphaModFix/>
+          </a:blip>
+          <a:stretch>
+            <a:fillRect/>
+          </a:stretch>
+        </p:blipFill>
+        <p:spPr>
+          <a:xfrm>
+            <a:off x="0" y="0"/>
+            <a:ext cx="9144000" cy="5143500"/>
+          </a:xfrm>
+          <a:prstGeom prst="rect">
+            <a:avLst/>
+          </a:prstGeom>
+          <a:noFill/>
+          <a:ln>
+            <a:noFill/>
+          </a:ln>
+        </p:spPr>
+      </p:pic>
+    </p:spTree>
+  </p:cSld>
+  <p:clrMapOvr>
+    <a:masterClrMapping/>
+  </p:clrMapOvr>
+  <p:transition spd="slow">
+    <p:cut/>
+  </p:transition>
+</p:sld>
+</file>
+
+<file path=ppt/slides/slide24.xml><?xml version="1.0" encoding="utf-8"?>
+<p:sld xmlns:a="http://schemas.openxmlformats.org/drawingml/2006/main" xmlns:r="http://schemas.openxmlformats.org/officeDocument/2006/relationships" xmlns:mc="http://schemas.openxmlformats.org/markup-compatibility/2006" xmlns:mv="urn:schemas-microsoft-com:mac:vml" xmlns:p="http://schemas.openxmlformats.org/presentationml/2006/main" xmlns:c="http://schemas.openxmlformats.org/drawingml/2006/chart" xmlns:dgm="http://schemas.openxmlformats.org/drawingml/2006/diagram" xmlns:o="urn:schemas-microsoft-com:office:office" xmlns:v="urn:schemas-microsoft-com:vml" xmlns:pvml="urn:schemas-microsoft-com:office:powerpoint" xmlns:com="http://schemas.openxmlformats.org/drawingml/2006/compatibility" xmlns:p14="http://schemas.microsoft.com/office/powerpoint/2010/main">
+  <p:cSld>
+    <p:spTree>
+      <p:nvGrpSpPr>
+        <p:cNvPr id="234" name="Shape 234"/>
+        <p:cNvGrpSpPr/>
+        <p:nvPr/>
+      </p:nvGrpSpPr>
+      <p:grpSpPr>
+        <a:xfrm>
+          <a:off x="0" y="0"/>
+          <a:ext cx="0" cy="0"/>
+          <a:chOff x="0" y="0"/>
+          <a:chExt cx="0" cy="0"/>
+        </a:xfrm>
+      </p:grpSpPr>
+      <p:sp>
+        <p:nvSpPr>
+          <p:cNvPr id="235" name="Shape 235"/>
           <p:cNvSpPr txBox="1"/>
           <p:nvPr>
             <p:ph type="title"/>
@@ -32772,7 +33867,7 @@
       </p:sp>
       <p:sp>
         <p:nvSpPr>
-          <p:cNvPr id="215" name="Shape 215"/>
+          <p:cNvPr id="236" name="Shape 236"/>
           <p:cNvSpPr txBox="1"/>
           <p:nvPr>
             <p:ph idx="1" type="body"/>
@@ -32822,12 +33917,12 @@
 </p:sld>
 </file>
 
-<file path=ppt/slides/slide21.xml><?xml version="1.0" encoding="utf-8"?>
+<file path=ppt/slides/slide25.xml><?xml version="1.0" encoding="utf-8"?>
 <p:sld xmlns:a="http://schemas.openxmlformats.org/drawingml/2006/main" xmlns:r="http://schemas.openxmlformats.org/officeDocument/2006/relationships" xmlns:mc="http://schemas.openxmlformats.org/markup-compatibility/2006" xmlns:mv="urn:schemas-microsoft-com:mac:vml" xmlns:p="http://schemas.openxmlformats.org/presentationml/2006/main" xmlns:c="http://schemas.openxmlformats.org/drawingml/2006/chart" xmlns:dgm="http://schemas.openxmlformats.org/drawingml/2006/diagram" xmlns:o="urn:schemas-microsoft-com:office:office" xmlns:v="urn:schemas-microsoft-com:vml" xmlns:pvml="urn:schemas-microsoft-com:office:powerpoint" xmlns:com="http://schemas.openxmlformats.org/drawingml/2006/compatibility" xmlns:p14="http://schemas.microsoft.com/office/powerpoint/2010/main">
   <p:cSld>
     <p:spTree>
       <p:nvGrpSpPr>
-        <p:cNvPr id="219" name="Shape 219"/>
+        <p:cNvPr id="240" name="Shape 240"/>
         <p:cNvGrpSpPr/>
         <p:nvPr/>
       </p:nvGrpSpPr>
@@ -32841,7 +33936,7 @@
       </p:grpSpPr>
       <p:sp>
         <p:nvSpPr>
-          <p:cNvPr id="220" name="Shape 220"/>
+          <p:cNvPr id="241" name="Shape 241"/>
           <p:cNvSpPr txBox="1"/>
           <p:nvPr>
             <p:ph type="title"/>
@@ -32877,7 +33972,7 @@
       </p:sp>
       <p:sp>
         <p:nvSpPr>
-          <p:cNvPr id="221" name="Shape 221"/>
+          <p:cNvPr id="242" name="Shape 242"/>
           <p:cNvSpPr txBox="1"/>
           <p:nvPr>
             <p:ph idx="1" type="body"/>
@@ -32927,12 +34022,12 @@
 </p:sld>
 </file>
 
-<file path=ppt/slides/slide22.xml><?xml version="1.0" encoding="utf-8"?>
+<file path=ppt/slides/slide26.xml><?xml version="1.0" encoding="utf-8"?>
 <p:sld xmlns:a="http://schemas.openxmlformats.org/drawingml/2006/main" xmlns:r="http://schemas.openxmlformats.org/officeDocument/2006/relationships" xmlns:mc="http://schemas.openxmlformats.org/markup-compatibility/2006" xmlns:mv="urn:schemas-microsoft-com:mac:vml" xmlns:p="http://schemas.openxmlformats.org/presentationml/2006/main" xmlns:c="http://schemas.openxmlformats.org/drawingml/2006/chart" xmlns:dgm="http://schemas.openxmlformats.org/drawingml/2006/diagram" xmlns:o="urn:schemas-microsoft-com:office:office" xmlns:v="urn:schemas-microsoft-com:vml" xmlns:pvml="urn:schemas-microsoft-com:office:powerpoint" xmlns:com="http://schemas.openxmlformats.org/drawingml/2006/compatibility" xmlns:p14="http://schemas.microsoft.com/office/powerpoint/2010/main">
   <p:cSld>
     <p:spTree>
       <p:nvGrpSpPr>
-        <p:cNvPr id="225" name="Shape 225"/>
+        <p:cNvPr id="246" name="Shape 246"/>
         <p:cNvGrpSpPr/>
         <p:nvPr/>
       </p:nvGrpSpPr>
@@ -32946,7 +34041,7 @@
       </p:grpSpPr>
       <p:sp>
         <p:nvSpPr>
-          <p:cNvPr id="226" name="Shape 226"/>
+          <p:cNvPr id="247" name="Shape 247"/>
           <p:cNvSpPr txBox="1"/>
           <p:nvPr>
             <p:ph type="title"/>
@@ -32982,7 +34077,7 @@
       </p:sp>
       <p:sp>
         <p:nvSpPr>
-          <p:cNvPr id="227" name="Shape 227"/>
+          <p:cNvPr id="248" name="Shape 248"/>
           <p:cNvSpPr txBox="1"/>
           <p:nvPr>
             <p:ph idx="1" type="body"/>
@@ -33017,23 +34112,6 @@
             <a:r>
               <a:rPr lang="nl"/>
               <a:t>Still todo:</a:t>
-            </a:r>
-          </a:p>
-          <a:p>
-            <a:pPr indent="-381000" lvl="1" marL="914400" rtl="0">
-              <a:spcBef>
-                <a:spcPts val="0"/>
-              </a:spcBef>
-              <a:buClr>
-                <a:schemeClr val="dk2"/>
-              </a:buClr>
-              <a:buSzPct val="80000"/>
-              <a:buFont typeface="Courier New"/>
-              <a:buChar char="o"/>
-            </a:pPr>
-            <a:r>
-              <a:rPr lang="nl"/>
-              <a:t>Add SQM / Limiting magnitude</a:t>
             </a:r>
           </a:p>
           <a:p>
@@ -33102,6 +34180,106 @@
             <a:r>
               <a:rPr lang="nl"/>
               <a:t>Import/export using OAL should use the elevation.</a:t>
+            </a:r>
+          </a:p>
+        </p:txBody>
+      </p:sp>
+    </p:spTree>
+  </p:cSld>
+  <p:clrMapOvr>
+    <a:masterClrMapping/>
+  </p:clrMapOvr>
+  <p:transition spd="slow">
+    <p:cut/>
+  </p:transition>
+</p:sld>
+</file>
+
+<file path=ppt/slides/slide27.xml><?xml version="1.0" encoding="utf-8"?>
+<p:sld xmlns:a="http://schemas.openxmlformats.org/drawingml/2006/main" xmlns:r="http://schemas.openxmlformats.org/officeDocument/2006/relationships" xmlns:mc="http://schemas.openxmlformats.org/markup-compatibility/2006" xmlns:mv="urn:schemas-microsoft-com:mac:vml" xmlns:p="http://schemas.openxmlformats.org/presentationml/2006/main" xmlns:c="http://schemas.openxmlformats.org/drawingml/2006/chart" xmlns:dgm="http://schemas.openxmlformats.org/drawingml/2006/diagram" xmlns:o="urn:schemas-microsoft-com:office:office" xmlns:v="urn:schemas-microsoft-com:vml" xmlns:pvml="urn:schemas-microsoft-com:office:powerpoint" xmlns:com="http://schemas.openxmlformats.org/drawingml/2006/compatibility" xmlns:p14="http://schemas.microsoft.com/office/powerpoint/2010/main">
+  <p:cSld>
+    <p:spTree>
+      <p:nvGrpSpPr>
+        <p:cNvPr id="252" name="Shape 252"/>
+        <p:cNvGrpSpPr/>
+        <p:nvPr/>
+      </p:nvGrpSpPr>
+      <p:grpSpPr>
+        <a:xfrm>
+          <a:off x="0" y="0"/>
+          <a:ext cx="0" cy="0"/>
+          <a:chOff x="0" y="0"/>
+          <a:chExt cx="0" cy="0"/>
+        </a:xfrm>
+      </p:grpSpPr>
+      <p:sp>
+        <p:nvSpPr>
+          <p:cNvPr id="253" name="Shape 253"/>
+          <p:cNvSpPr txBox="1"/>
+          <p:nvPr>
+            <p:ph type="title"/>
+          </p:nvPr>
+        </p:nvSpPr>
+        <p:spPr>
+          <a:xfrm>
+            <a:off x="457200" y="155628"/>
+            <a:ext cx="8229600" cy="1044599"/>
+          </a:xfrm>
+          <a:prstGeom prst="rect">
+            <a:avLst/>
+          </a:prstGeom>
+        </p:spPr>
+        <p:txBody>
+          <a:bodyPr anchorCtr="0" anchor="b" bIns="91425" lIns="91425" rIns="91425" tIns="91425">
+            <a:noAutofit/>
+          </a:bodyPr>
+          <a:lstStyle/>
+          <a:p>
+            <a:pPr>
+              <a:spcBef>
+                <a:spcPts val="0"/>
+              </a:spcBef>
+              <a:buNone/>
+            </a:pPr>
+            <a:r>
+              <a:rPr lang="nl"/>
+              <a:t>Status deepskylog.se</a:t>
+            </a:r>
+          </a:p>
+        </p:txBody>
+      </p:sp>
+      <p:sp>
+        <p:nvSpPr>
+          <p:cNvPr id="254" name="Shape 254"/>
+          <p:cNvSpPr txBox="1"/>
+          <p:nvPr>
+            <p:ph idx="1" type="body"/>
+          </p:nvPr>
+        </p:nvSpPr>
+        <p:spPr>
+          <a:xfrm>
+            <a:off x="457200" y="1297780"/>
+            <a:ext cx="8229600" cy="3627900"/>
+          </a:xfrm>
+          <a:prstGeom prst="rect">
+            <a:avLst/>
+          </a:prstGeom>
+        </p:spPr>
+        <p:txBody>
+          <a:bodyPr anchorCtr="0" anchor="t" bIns="91425" lIns="91425" rIns="91425" tIns="91425">
+            <a:noAutofit/>
+          </a:bodyPr>
+          <a:lstStyle/>
+          <a:p>
+            <a:pPr>
+              <a:spcBef>
+                <a:spcPts val="0"/>
+              </a:spcBef>
+              <a:buNone/>
+            </a:pPr>
+            <a:r>
+              <a:rPr lang="nl"/>
+              <a:t>Mail sent on April 7, 2015</a:t>
             </a:r>
           </a:p>
         </p:txBody>

</xml_diff>

<commit_message>
Added screenshots for the new locations.
</commit_message>
<xml_diff>
--- a/Meeting20150425/DeepskyLog 5.0.pptx
+++ b/Meeting20150425/DeepskyLog 5.0.pptx
@@ -35,6 +35,9 @@
     <p:sldId id="280" r:id="rId30"/>
     <p:sldId id="281" r:id="rId31"/>
     <p:sldId id="282" r:id="rId32"/>
+    <p:sldId id="283" r:id="rId33"/>
+    <p:sldId id="284" r:id="rId34"/>
+    <p:sldId id="285" r:id="rId35"/>
   </p:sldIdLst>
   <p:sldSz cy="5143500" cx="9144000"/>
   <p:notesSz cx="6858000" cy="9144000"/>
@@ -2401,7 +2404,7 @@
   <p:cSld>
     <p:spTree>
       <p:nvGrpSpPr>
-        <p:cNvPr id="255" name="Shape 255"/>
+        <p:cNvPr id="254" name="Shape 254"/>
         <p:cNvGrpSpPr/>
         <p:nvPr/>
       </p:nvGrpSpPr>
@@ -2415,7 +2418,7 @@
       </p:grpSpPr>
       <p:sp>
         <p:nvSpPr>
-          <p:cNvPr id="256" name="Shape 256"/>
+          <p:cNvPr id="255" name="Shape 255"/>
           <p:cNvSpPr/>
           <p:nvPr>
             <p:ph idx="2" type="sldImg"/>
@@ -2459,7 +2462,217 @@
       </p:sp>
       <p:sp>
         <p:nvSpPr>
-          <p:cNvPr id="257" name="Shape 257"/>
+          <p:cNvPr id="256" name="Shape 256"/>
+          <p:cNvSpPr txBox="1"/>
+          <p:nvPr>
+            <p:ph idx="1" type="body"/>
+          </p:nvPr>
+        </p:nvSpPr>
+        <p:spPr>
+          <a:xfrm>
+            <a:off x="685800" y="4343400"/>
+            <a:ext cx="5486399" cy="4114800"/>
+          </a:xfrm>
+          <a:prstGeom prst="rect">
+            <a:avLst/>
+          </a:prstGeom>
+        </p:spPr>
+        <p:txBody>
+          <a:bodyPr anchorCtr="0" anchor="t" bIns="91425" lIns="91425" rIns="91425" tIns="91425">
+            <a:noAutofit/>
+          </a:bodyPr>
+          <a:lstStyle/>
+          <a:p>
+            <a:pPr>
+              <a:spcBef>
+                <a:spcPts val="0"/>
+              </a:spcBef>
+              <a:buNone/>
+            </a:pPr>
+            <a:r>
+              <a:t/>
+            </a:r>
+            <a:endParaRPr/>
+          </a:p>
+        </p:txBody>
+      </p:sp>
+    </p:spTree>
+  </p:cSld>
+  <p:clrMapOvr>
+    <a:masterClrMapping/>
+  </p:clrMapOvr>
+</p:notes>
+</file>
+
+<file path=ppt/notesSlides/notesSlide28.xml><?xml version="1.0" encoding="utf-8"?>
+<p:notes xmlns:a="http://schemas.openxmlformats.org/drawingml/2006/main" xmlns:r="http://schemas.openxmlformats.org/officeDocument/2006/relationships" xmlns:mc="http://schemas.openxmlformats.org/markup-compatibility/2006" xmlns:mv="urn:schemas-microsoft-com:mac:vml" xmlns:p="http://schemas.openxmlformats.org/presentationml/2006/main" xmlns:c="http://schemas.openxmlformats.org/drawingml/2006/chart" xmlns:dgm="http://schemas.openxmlformats.org/drawingml/2006/diagram" xmlns:o="urn:schemas-microsoft-com:office:office" xmlns:v="urn:schemas-microsoft-com:vml" xmlns:pvml="urn:schemas-microsoft-com:office:powerpoint" xmlns:com="http://schemas.openxmlformats.org/drawingml/2006/compatibility" xmlns:p14="http://schemas.microsoft.com/office/powerpoint/2010/main" showMasterPhAnim="0" showMasterSp="0">
+  <p:cSld>
+    <p:spTree>
+      <p:nvGrpSpPr>
+        <p:cNvPr id="259" name="Shape 259"/>
+        <p:cNvGrpSpPr/>
+        <p:nvPr/>
+      </p:nvGrpSpPr>
+      <p:grpSpPr>
+        <a:xfrm>
+          <a:off x="0" y="0"/>
+          <a:ext cx="0" cy="0"/>
+          <a:chOff x="0" y="0"/>
+          <a:chExt cx="0" cy="0"/>
+        </a:xfrm>
+      </p:grpSpPr>
+      <p:sp>
+        <p:nvSpPr>
+          <p:cNvPr id="260" name="Shape 260"/>
+          <p:cNvSpPr/>
+          <p:nvPr>
+            <p:ph idx="2" type="sldImg"/>
+          </p:nvPr>
+        </p:nvSpPr>
+        <p:spPr>
+          <a:xfrm>
+            <a:off x="381187" y="685800"/>
+            <a:ext cx="6096299" cy="3429000"/>
+          </a:xfrm>
+          <a:custGeom>
+            <a:pathLst>
+              <a:path extrusionOk="0" h="120000" w="120000">
+                <a:moveTo>
+                  <a:pt x="0" y="0"/>
+                </a:moveTo>
+                <a:lnTo>
+                  <a:pt x="120000" y="0"/>
+                </a:lnTo>
+                <a:lnTo>
+                  <a:pt x="120000" y="120000"/>
+                </a:lnTo>
+                <a:lnTo>
+                  <a:pt x="0" y="120000"/>
+                </a:lnTo>
+                <a:close/>
+              </a:path>
+            </a:pathLst>
+          </a:custGeom>
+          <a:noFill/>
+          <a:ln cap="flat" w="9525">
+            <a:solidFill>
+              <a:srgbClr val="000000"/>
+            </a:solidFill>
+            <a:prstDash val="solid"/>
+            <a:round/>
+            <a:headEnd len="med" w="med" type="none"/>
+            <a:tailEnd len="med" w="med" type="none"/>
+          </a:ln>
+        </p:spPr>
+      </p:sp>
+      <p:sp>
+        <p:nvSpPr>
+          <p:cNvPr id="261" name="Shape 261"/>
+          <p:cNvSpPr txBox="1"/>
+          <p:nvPr>
+            <p:ph idx="1" type="body"/>
+          </p:nvPr>
+        </p:nvSpPr>
+        <p:spPr>
+          <a:xfrm>
+            <a:off x="685800" y="4343400"/>
+            <a:ext cx="5486399" cy="4114800"/>
+          </a:xfrm>
+          <a:prstGeom prst="rect">
+            <a:avLst/>
+          </a:prstGeom>
+        </p:spPr>
+        <p:txBody>
+          <a:bodyPr anchorCtr="0" anchor="t" bIns="91425" lIns="91425" rIns="91425" tIns="91425">
+            <a:noAutofit/>
+          </a:bodyPr>
+          <a:lstStyle/>
+          <a:p>
+            <a:pPr>
+              <a:spcBef>
+                <a:spcPts val="0"/>
+              </a:spcBef>
+              <a:buNone/>
+            </a:pPr>
+            <a:r>
+              <a:t/>
+            </a:r>
+            <a:endParaRPr/>
+          </a:p>
+        </p:txBody>
+      </p:sp>
+    </p:spTree>
+  </p:cSld>
+  <p:clrMapOvr>
+    <a:masterClrMapping/>
+  </p:clrMapOvr>
+</p:notes>
+</file>
+
+<file path=ppt/notesSlides/notesSlide29.xml><?xml version="1.0" encoding="utf-8"?>
+<p:notes xmlns:a="http://schemas.openxmlformats.org/drawingml/2006/main" xmlns:r="http://schemas.openxmlformats.org/officeDocument/2006/relationships" xmlns:mc="http://schemas.openxmlformats.org/markup-compatibility/2006" xmlns:mv="urn:schemas-microsoft-com:mac:vml" xmlns:p="http://schemas.openxmlformats.org/presentationml/2006/main" xmlns:c="http://schemas.openxmlformats.org/drawingml/2006/chart" xmlns:dgm="http://schemas.openxmlformats.org/drawingml/2006/diagram" xmlns:o="urn:schemas-microsoft-com:office:office" xmlns:v="urn:schemas-microsoft-com:vml" xmlns:pvml="urn:schemas-microsoft-com:office:powerpoint" xmlns:com="http://schemas.openxmlformats.org/drawingml/2006/compatibility" xmlns:p14="http://schemas.microsoft.com/office/powerpoint/2010/main" showMasterPhAnim="0" showMasterSp="0">
+  <p:cSld>
+    <p:spTree>
+      <p:nvGrpSpPr>
+        <p:cNvPr id="264" name="Shape 264"/>
+        <p:cNvGrpSpPr/>
+        <p:nvPr/>
+      </p:nvGrpSpPr>
+      <p:grpSpPr>
+        <a:xfrm>
+          <a:off x="0" y="0"/>
+          <a:ext cx="0" cy="0"/>
+          <a:chOff x="0" y="0"/>
+          <a:chExt cx="0" cy="0"/>
+        </a:xfrm>
+      </p:grpSpPr>
+      <p:sp>
+        <p:nvSpPr>
+          <p:cNvPr id="265" name="Shape 265"/>
+          <p:cNvSpPr/>
+          <p:nvPr>
+            <p:ph idx="2" type="sldImg"/>
+          </p:nvPr>
+        </p:nvSpPr>
+        <p:spPr>
+          <a:xfrm>
+            <a:off x="381187" y="685800"/>
+            <a:ext cx="6096299" cy="3429000"/>
+          </a:xfrm>
+          <a:custGeom>
+            <a:pathLst>
+              <a:path extrusionOk="0" h="120000" w="120000">
+                <a:moveTo>
+                  <a:pt x="0" y="0"/>
+                </a:moveTo>
+                <a:lnTo>
+                  <a:pt x="120000" y="0"/>
+                </a:lnTo>
+                <a:lnTo>
+                  <a:pt x="120000" y="120000"/>
+                </a:lnTo>
+                <a:lnTo>
+                  <a:pt x="0" y="120000"/>
+                </a:lnTo>
+                <a:close/>
+              </a:path>
+            </a:pathLst>
+          </a:custGeom>
+          <a:noFill/>
+          <a:ln cap="flat" w="9525">
+            <a:solidFill>
+              <a:srgbClr val="000000"/>
+            </a:solidFill>
+            <a:prstDash val="solid"/>
+            <a:round/>
+            <a:headEnd len="med" w="med" type="none"/>
+            <a:tailEnd len="med" w="med" type="none"/>
+          </a:ln>
+        </p:spPr>
+      </p:sp>
+      <p:sp>
+        <p:nvSpPr>
+          <p:cNvPr id="266" name="Shape 266"/>
           <p:cNvSpPr txBox="1"/>
           <p:nvPr>
             <p:ph idx="1" type="body"/>
@@ -2565,6 +2778,111 @@
       <p:sp>
         <p:nvSpPr>
           <p:cNvPr id="127" name="Shape 127"/>
+          <p:cNvSpPr txBox="1"/>
+          <p:nvPr>
+            <p:ph idx="1" type="body"/>
+          </p:nvPr>
+        </p:nvSpPr>
+        <p:spPr>
+          <a:xfrm>
+            <a:off x="685800" y="4343400"/>
+            <a:ext cx="5486399" cy="4114800"/>
+          </a:xfrm>
+          <a:prstGeom prst="rect">
+            <a:avLst/>
+          </a:prstGeom>
+        </p:spPr>
+        <p:txBody>
+          <a:bodyPr anchorCtr="0" anchor="t" bIns="91425" lIns="91425" rIns="91425" tIns="91425">
+            <a:noAutofit/>
+          </a:bodyPr>
+          <a:lstStyle/>
+          <a:p>
+            <a:pPr>
+              <a:spcBef>
+                <a:spcPts val="0"/>
+              </a:spcBef>
+              <a:buNone/>
+            </a:pPr>
+            <a:r>
+              <a:t/>
+            </a:r>
+            <a:endParaRPr/>
+          </a:p>
+        </p:txBody>
+      </p:sp>
+    </p:spTree>
+  </p:cSld>
+  <p:clrMapOvr>
+    <a:masterClrMapping/>
+  </p:clrMapOvr>
+</p:notes>
+</file>
+
+<file path=ppt/notesSlides/notesSlide30.xml><?xml version="1.0" encoding="utf-8"?>
+<p:notes xmlns:a="http://schemas.openxmlformats.org/drawingml/2006/main" xmlns:r="http://schemas.openxmlformats.org/officeDocument/2006/relationships" xmlns:mc="http://schemas.openxmlformats.org/markup-compatibility/2006" xmlns:mv="urn:schemas-microsoft-com:mac:vml" xmlns:p="http://schemas.openxmlformats.org/presentationml/2006/main" xmlns:c="http://schemas.openxmlformats.org/drawingml/2006/chart" xmlns:dgm="http://schemas.openxmlformats.org/drawingml/2006/diagram" xmlns:o="urn:schemas-microsoft-com:office:office" xmlns:v="urn:schemas-microsoft-com:vml" xmlns:pvml="urn:schemas-microsoft-com:office:powerpoint" xmlns:com="http://schemas.openxmlformats.org/drawingml/2006/compatibility" xmlns:p14="http://schemas.microsoft.com/office/powerpoint/2010/main" showMasterPhAnim="0" showMasterSp="0">
+  <p:cSld>
+    <p:spTree>
+      <p:nvGrpSpPr>
+        <p:cNvPr id="270" name="Shape 270"/>
+        <p:cNvGrpSpPr/>
+        <p:nvPr/>
+      </p:nvGrpSpPr>
+      <p:grpSpPr>
+        <a:xfrm>
+          <a:off x="0" y="0"/>
+          <a:ext cx="0" cy="0"/>
+          <a:chOff x="0" y="0"/>
+          <a:chExt cx="0" cy="0"/>
+        </a:xfrm>
+      </p:grpSpPr>
+      <p:sp>
+        <p:nvSpPr>
+          <p:cNvPr id="271" name="Shape 271"/>
+          <p:cNvSpPr/>
+          <p:nvPr>
+            <p:ph idx="2" type="sldImg"/>
+          </p:nvPr>
+        </p:nvSpPr>
+        <p:spPr>
+          <a:xfrm>
+            <a:off x="381187" y="685800"/>
+            <a:ext cx="6096299" cy="3429000"/>
+          </a:xfrm>
+          <a:custGeom>
+            <a:pathLst>
+              <a:path extrusionOk="0" h="120000" w="120000">
+                <a:moveTo>
+                  <a:pt x="0" y="0"/>
+                </a:moveTo>
+                <a:lnTo>
+                  <a:pt x="120000" y="0"/>
+                </a:lnTo>
+                <a:lnTo>
+                  <a:pt x="120000" y="120000"/>
+                </a:lnTo>
+                <a:lnTo>
+                  <a:pt x="0" y="120000"/>
+                </a:lnTo>
+                <a:close/>
+              </a:path>
+            </a:pathLst>
+          </a:custGeom>
+          <a:noFill/>
+          <a:ln cap="flat" w="9525">
+            <a:solidFill>
+              <a:srgbClr val="000000"/>
+            </a:solidFill>
+            <a:prstDash val="solid"/>
+            <a:round/>
+            <a:headEnd len="med" w="med" type="none"/>
+            <a:tailEnd len="med" w="med" type="none"/>
+          </a:ln>
+        </p:spPr>
+      </p:sp>
+      <p:sp>
+        <p:nvSpPr>
+          <p:cNvPr id="272" name="Shape 272"/>
           <p:cNvSpPr txBox="1"/>
           <p:nvPr>
             <p:ph idx="1" type="body"/>
@@ -32467,7 +32785,7 @@
             <a:tbl>
               <a:tblPr>
                 <a:noFill/>
-                <a:tableStyleId>{B85F75C8-9933-4E91-B2CA-D202477AD082}</a:tableStyleId>
+                <a:tableStyleId>{D073184B-0272-4025-9761-24777A9546C3}</a:tableStyleId>
               </a:tblPr>
               <a:tblGrid>
                 <a:gridCol w="3619500"/>
@@ -34212,78 +34530,146 @@
           <a:chExt cx="0" cy="0"/>
         </a:xfrm>
       </p:grpSpPr>
-      <p:sp>
-        <p:nvSpPr>
+      <p:pic>
+        <p:nvPicPr>
           <p:cNvPr id="253" name="Shape 253"/>
-          <p:cNvSpPr txBox="1"/>
-          <p:nvPr>
-            <p:ph type="title"/>
-          </p:nvPr>
-        </p:nvSpPr>
+          <p:cNvPicPr preferRelativeResize="0"/>
+          <p:nvPr/>
+        </p:nvPicPr>
+        <p:blipFill>
+          <a:blip r:embed="rId3">
+            <a:alphaModFix/>
+          </a:blip>
+          <a:stretch>
+            <a:fillRect/>
+          </a:stretch>
+        </p:blipFill>
         <p:spPr>
           <a:xfrm>
-            <a:off x="457200" y="155628"/>
-            <a:ext cx="8229600" cy="1044599"/>
+            <a:off x="0" y="0"/>
+            <a:ext cx="9144000" cy="5143500"/>
           </a:xfrm>
           <a:prstGeom prst="rect">
             <a:avLst/>
           </a:prstGeom>
+          <a:noFill/>
+          <a:ln>
+            <a:noFill/>
+          </a:ln>
         </p:spPr>
-        <p:txBody>
-          <a:bodyPr anchorCtr="0" anchor="b" bIns="91425" lIns="91425" rIns="91425" tIns="91425">
-            <a:noAutofit/>
-          </a:bodyPr>
-          <a:lstStyle/>
-          <a:p>
-            <a:pPr>
-              <a:spcBef>
-                <a:spcPts val="0"/>
-              </a:spcBef>
-              <a:buNone/>
-            </a:pPr>
-            <a:r>
-              <a:rPr lang="nl"/>
-              <a:t>Status deepskylog.se</a:t>
-            </a:r>
-          </a:p>
-        </p:txBody>
-      </p:sp>
-      <p:sp>
-        <p:nvSpPr>
-          <p:cNvPr id="254" name="Shape 254"/>
-          <p:cNvSpPr txBox="1"/>
-          <p:nvPr>
-            <p:ph idx="1" type="body"/>
-          </p:nvPr>
-        </p:nvSpPr>
+      </p:pic>
+    </p:spTree>
+  </p:cSld>
+  <p:clrMapOvr>
+    <a:masterClrMapping/>
+  </p:clrMapOvr>
+  <p:transition spd="slow">
+    <p:cut/>
+  </p:transition>
+</p:sld>
+</file>
+
+<file path=ppt/slides/slide28.xml><?xml version="1.0" encoding="utf-8"?>
+<p:sld xmlns:a="http://schemas.openxmlformats.org/drawingml/2006/main" xmlns:r="http://schemas.openxmlformats.org/officeDocument/2006/relationships" xmlns:mc="http://schemas.openxmlformats.org/markup-compatibility/2006" xmlns:mv="urn:schemas-microsoft-com:mac:vml" xmlns:p="http://schemas.openxmlformats.org/presentationml/2006/main" xmlns:c="http://schemas.openxmlformats.org/drawingml/2006/chart" xmlns:dgm="http://schemas.openxmlformats.org/drawingml/2006/diagram" xmlns:o="urn:schemas-microsoft-com:office:office" xmlns:v="urn:schemas-microsoft-com:vml" xmlns:pvml="urn:schemas-microsoft-com:office:powerpoint" xmlns:com="http://schemas.openxmlformats.org/drawingml/2006/compatibility" xmlns:p14="http://schemas.microsoft.com/office/powerpoint/2010/main">
+  <p:cSld>
+    <p:spTree>
+      <p:nvGrpSpPr>
+        <p:cNvPr id="257" name="Shape 257"/>
+        <p:cNvGrpSpPr/>
+        <p:nvPr/>
+      </p:nvGrpSpPr>
+      <p:grpSpPr>
+        <a:xfrm>
+          <a:off x="0" y="0"/>
+          <a:ext cx="0" cy="0"/>
+          <a:chOff x="0" y="0"/>
+          <a:chExt cx="0" cy="0"/>
+        </a:xfrm>
+      </p:grpSpPr>
+      <p:pic>
+        <p:nvPicPr>
+          <p:cNvPr id="258" name="Shape 258"/>
+          <p:cNvPicPr preferRelativeResize="0"/>
+          <p:nvPr/>
+        </p:nvPicPr>
+        <p:blipFill>
+          <a:blip r:embed="rId3">
+            <a:alphaModFix/>
+          </a:blip>
+          <a:stretch>
+            <a:fillRect/>
+          </a:stretch>
+        </p:blipFill>
         <p:spPr>
           <a:xfrm>
-            <a:off x="457200" y="1297780"/>
-            <a:ext cx="8229600" cy="3627900"/>
+            <a:off x="0" y="0"/>
+            <a:ext cx="9144000" cy="5143500"/>
           </a:xfrm>
           <a:prstGeom prst="rect">
             <a:avLst/>
           </a:prstGeom>
+          <a:noFill/>
+          <a:ln>
+            <a:noFill/>
+          </a:ln>
         </p:spPr>
-        <p:txBody>
-          <a:bodyPr anchorCtr="0" anchor="t" bIns="91425" lIns="91425" rIns="91425" tIns="91425">
-            <a:noAutofit/>
-          </a:bodyPr>
-          <a:lstStyle/>
-          <a:p>
-            <a:pPr>
-              <a:spcBef>
-                <a:spcPts val="0"/>
-              </a:spcBef>
-              <a:buNone/>
-            </a:pPr>
-            <a:r>
-              <a:rPr lang="nl"/>
-              <a:t>Mail sent on April 7, 2015</a:t>
-            </a:r>
-          </a:p>
-        </p:txBody>
-      </p:sp>
+      </p:pic>
+    </p:spTree>
+  </p:cSld>
+  <p:clrMapOvr>
+    <a:masterClrMapping/>
+  </p:clrMapOvr>
+  <p:transition spd="slow">
+    <p:cut/>
+  </p:transition>
+</p:sld>
+</file>
+
+<file path=ppt/slides/slide29.xml><?xml version="1.0" encoding="utf-8"?>
+<p:sld xmlns:a="http://schemas.openxmlformats.org/drawingml/2006/main" xmlns:r="http://schemas.openxmlformats.org/officeDocument/2006/relationships" xmlns:mc="http://schemas.openxmlformats.org/markup-compatibility/2006" xmlns:mv="urn:schemas-microsoft-com:mac:vml" xmlns:p="http://schemas.openxmlformats.org/presentationml/2006/main" xmlns:c="http://schemas.openxmlformats.org/drawingml/2006/chart" xmlns:dgm="http://schemas.openxmlformats.org/drawingml/2006/diagram" xmlns:o="urn:schemas-microsoft-com:office:office" xmlns:v="urn:schemas-microsoft-com:vml" xmlns:pvml="urn:schemas-microsoft-com:office:powerpoint" xmlns:com="http://schemas.openxmlformats.org/drawingml/2006/compatibility" xmlns:p14="http://schemas.microsoft.com/office/powerpoint/2010/main">
+  <p:cSld>
+    <p:spTree>
+      <p:nvGrpSpPr>
+        <p:cNvPr id="262" name="Shape 262"/>
+        <p:cNvGrpSpPr/>
+        <p:nvPr/>
+      </p:nvGrpSpPr>
+      <p:grpSpPr>
+        <a:xfrm>
+          <a:off x="0" y="0"/>
+          <a:ext cx="0" cy="0"/>
+          <a:chOff x="0" y="0"/>
+          <a:chExt cx="0" cy="0"/>
+        </a:xfrm>
+      </p:grpSpPr>
+      <p:pic>
+        <p:nvPicPr>
+          <p:cNvPr id="263" name="Shape 263"/>
+          <p:cNvPicPr preferRelativeResize="0"/>
+          <p:nvPr/>
+        </p:nvPicPr>
+        <p:blipFill>
+          <a:blip r:embed="rId3">
+            <a:alphaModFix/>
+          </a:blip>
+          <a:stretch>
+            <a:fillRect/>
+          </a:stretch>
+        </p:blipFill>
+        <p:spPr>
+          <a:xfrm>
+            <a:off x="0" y="0"/>
+            <a:ext cx="9144000" cy="5143500"/>
+          </a:xfrm>
+          <a:prstGeom prst="rect">
+            <a:avLst/>
+          </a:prstGeom>
+          <a:noFill/>
+          <a:ln>
+            <a:noFill/>
+          </a:ln>
+        </p:spPr>
+      </p:pic>
     </p:spTree>
   </p:cSld>
   <p:clrMapOvr>
@@ -34340,6 +34726,106 @@
           </a:ln>
         </p:spPr>
       </p:pic>
+    </p:spTree>
+  </p:cSld>
+  <p:clrMapOvr>
+    <a:masterClrMapping/>
+  </p:clrMapOvr>
+  <p:transition spd="slow">
+    <p:cut/>
+  </p:transition>
+</p:sld>
+</file>
+
+<file path=ppt/slides/slide30.xml><?xml version="1.0" encoding="utf-8"?>
+<p:sld xmlns:a="http://schemas.openxmlformats.org/drawingml/2006/main" xmlns:r="http://schemas.openxmlformats.org/officeDocument/2006/relationships" xmlns:mc="http://schemas.openxmlformats.org/markup-compatibility/2006" xmlns:mv="urn:schemas-microsoft-com:mac:vml" xmlns:p="http://schemas.openxmlformats.org/presentationml/2006/main" xmlns:c="http://schemas.openxmlformats.org/drawingml/2006/chart" xmlns:dgm="http://schemas.openxmlformats.org/drawingml/2006/diagram" xmlns:o="urn:schemas-microsoft-com:office:office" xmlns:v="urn:schemas-microsoft-com:vml" xmlns:pvml="urn:schemas-microsoft-com:office:powerpoint" xmlns:com="http://schemas.openxmlformats.org/drawingml/2006/compatibility" xmlns:p14="http://schemas.microsoft.com/office/powerpoint/2010/main">
+  <p:cSld>
+    <p:spTree>
+      <p:nvGrpSpPr>
+        <p:cNvPr id="267" name="Shape 267"/>
+        <p:cNvGrpSpPr/>
+        <p:nvPr/>
+      </p:nvGrpSpPr>
+      <p:grpSpPr>
+        <a:xfrm>
+          <a:off x="0" y="0"/>
+          <a:ext cx="0" cy="0"/>
+          <a:chOff x="0" y="0"/>
+          <a:chExt cx="0" cy="0"/>
+        </a:xfrm>
+      </p:grpSpPr>
+      <p:sp>
+        <p:nvSpPr>
+          <p:cNvPr id="268" name="Shape 268"/>
+          <p:cNvSpPr txBox="1"/>
+          <p:nvPr>
+            <p:ph type="title"/>
+          </p:nvPr>
+        </p:nvSpPr>
+        <p:spPr>
+          <a:xfrm>
+            <a:off x="457200" y="155628"/>
+            <a:ext cx="8229600" cy="1044599"/>
+          </a:xfrm>
+          <a:prstGeom prst="rect">
+            <a:avLst/>
+          </a:prstGeom>
+        </p:spPr>
+        <p:txBody>
+          <a:bodyPr anchorCtr="0" anchor="b" bIns="91425" lIns="91425" rIns="91425" tIns="91425">
+            <a:noAutofit/>
+          </a:bodyPr>
+          <a:lstStyle/>
+          <a:p>
+            <a:pPr>
+              <a:spcBef>
+                <a:spcPts val="0"/>
+              </a:spcBef>
+              <a:buNone/>
+            </a:pPr>
+            <a:r>
+              <a:rPr lang="nl"/>
+              <a:t>Status deepskylog.se</a:t>
+            </a:r>
+          </a:p>
+        </p:txBody>
+      </p:sp>
+      <p:sp>
+        <p:nvSpPr>
+          <p:cNvPr id="269" name="Shape 269"/>
+          <p:cNvSpPr txBox="1"/>
+          <p:nvPr>
+            <p:ph idx="1" type="body"/>
+          </p:nvPr>
+        </p:nvSpPr>
+        <p:spPr>
+          <a:xfrm>
+            <a:off x="457200" y="1297780"/>
+            <a:ext cx="8229600" cy="3627900"/>
+          </a:xfrm>
+          <a:prstGeom prst="rect">
+            <a:avLst/>
+          </a:prstGeom>
+        </p:spPr>
+        <p:txBody>
+          <a:bodyPr anchorCtr="0" anchor="t" bIns="91425" lIns="91425" rIns="91425" tIns="91425">
+            <a:noAutofit/>
+          </a:bodyPr>
+          <a:lstStyle/>
+          <a:p>
+            <a:pPr>
+              <a:spcBef>
+                <a:spcPts val="0"/>
+              </a:spcBef>
+              <a:buNone/>
+            </a:pPr>
+            <a:r>
+              <a:rPr lang="nl"/>
+              <a:t>Mail sent on April 7, 2015</a:t>
+            </a:r>
+          </a:p>
+        </p:txBody>
+      </p:sp>
     </p:spTree>
   </p:cSld>
   <p:clrMapOvr>
@@ -34724,9 +35210,9 @@
 </file>
 
 <file path=ppt/theme/theme1.xml><?xml version="1.0" encoding="utf-8"?>
-<a:theme xmlns:a="http://schemas.openxmlformats.org/drawingml/2006/main" xmlns:r="http://schemas.openxmlformats.org/officeDocument/2006/relationships" name="Custom Theme">
+<a:theme xmlns:a="http://schemas.openxmlformats.org/drawingml/2006/main" xmlns:r="http://schemas.openxmlformats.org/officeDocument/2006/relationships" name="sketched">
   <a:themeElements>
-    <a:clrScheme name="Default">
+    <a:clrScheme name="Custom 398">
       <a:dk1>
         <a:srgbClr val="000000"/>
       </a:dk1>
@@ -34734,34 +35220,34 @@
         <a:srgbClr val="FFFFFF"/>
       </a:lt1>
       <a:dk2>
-        <a:srgbClr val="158158"/>
+        <a:srgbClr val="51535D"/>
       </a:dk2>
       <a:lt2>
-        <a:srgbClr val="F3F3F3"/>
+        <a:srgbClr val="EDEDED"/>
       </a:lt2>
       <a:accent1>
-        <a:srgbClr val="058DC7"/>
+        <a:srgbClr val="676871"/>
       </a:accent1>
       <a:accent2>
-        <a:srgbClr val="50B432"/>
+        <a:srgbClr val="988489"/>
       </a:accent2>
       <a:accent3>
-        <a:srgbClr val="ED561B"/>
+        <a:srgbClr val="6B7B67"/>
       </a:accent3>
       <a:accent4>
-        <a:srgbClr val="EDEF00"/>
+        <a:srgbClr val="747B85"/>
       </a:accent4>
       <a:accent5>
-        <a:srgbClr val="24CBE5"/>
+        <a:srgbClr val="A5A9AF"/>
       </a:accent5>
       <a:accent6>
-        <a:srgbClr val="64E572"/>
+        <a:srgbClr val="85716D"/>
       </a:accent6>
       <a:hlink>
-        <a:srgbClr val="2200CC"/>
+        <a:srgbClr val="676871"/>
       </a:hlink>
       <a:folHlink>
-        <a:srgbClr val="551A8B"/>
+        <a:srgbClr val="3F414A"/>
       </a:folHlink>
     </a:clrScheme>
     <a:fontScheme name="Office">
@@ -35001,9 +35487,9 @@
 </file>
 
 <file path=ppt/theme/theme2.xml><?xml version="1.0" encoding="utf-8"?>
-<a:theme xmlns:a="http://schemas.openxmlformats.org/drawingml/2006/main" xmlns:r="http://schemas.openxmlformats.org/officeDocument/2006/relationships" name="sketched">
+<a:theme xmlns:a="http://schemas.openxmlformats.org/drawingml/2006/main" xmlns:r="http://schemas.openxmlformats.org/officeDocument/2006/relationships" name="Custom Theme">
   <a:themeElements>
-    <a:clrScheme name="Custom 398">
+    <a:clrScheme name="Default">
       <a:dk1>
         <a:srgbClr val="000000"/>
       </a:dk1>
@@ -35011,34 +35497,34 @@
         <a:srgbClr val="FFFFFF"/>
       </a:lt1>
       <a:dk2>
-        <a:srgbClr val="51535D"/>
+        <a:srgbClr val="158158"/>
       </a:dk2>
       <a:lt2>
-        <a:srgbClr val="EDEDED"/>
+        <a:srgbClr val="F3F3F3"/>
       </a:lt2>
       <a:accent1>
-        <a:srgbClr val="676871"/>
+        <a:srgbClr val="058DC7"/>
       </a:accent1>
       <a:accent2>
-        <a:srgbClr val="988489"/>
+        <a:srgbClr val="50B432"/>
       </a:accent2>
       <a:accent3>
-        <a:srgbClr val="6B7B67"/>
+        <a:srgbClr val="ED561B"/>
       </a:accent3>
       <a:accent4>
-        <a:srgbClr val="747B85"/>
+        <a:srgbClr val="EDEF00"/>
       </a:accent4>
       <a:accent5>
-        <a:srgbClr val="A5A9AF"/>
+        <a:srgbClr val="24CBE5"/>
       </a:accent5>
       <a:accent6>
-        <a:srgbClr val="85716D"/>
+        <a:srgbClr val="64E572"/>
       </a:accent6>
       <a:hlink>
-        <a:srgbClr val="676871"/>
+        <a:srgbClr val="2200CC"/>
       </a:hlink>
       <a:folHlink>
-        <a:srgbClr val="3F414A"/>
+        <a:srgbClr val="551A8B"/>
       </a:folHlink>
     </a:clrScheme>
     <a:fontScheme name="Office">

</xml_diff>

<commit_message>
Add status of deepskylog.se
</commit_message>
<xml_diff>
--- a/Meeting20150425/DeepskyLog 5.0.pptx
+++ b/Meeting20150425/DeepskyLog 5.0.pptx
@@ -32785,7 +32785,7 @@
             <a:tbl>
               <a:tblPr>
                 <a:noFill/>
-                <a:tableStyleId>{D073184B-0272-4025-9761-24777A9546C3}</a:tableStyleId>
+                <a:tableStyleId>{453255A3-5403-44EF-972D-61E3DF6B69A3}</a:tableStyleId>
               </a:tblPr>
               <a:tblGrid>
                 <a:gridCol w="3619500"/>
@@ -34813,15 +34813,54 @@
           </a:bodyPr>
           <a:lstStyle/>
           <a:p>
-            <a:pPr>
+            <a:pPr indent="-419100" lvl="0" marL="457200" rtl="0">
               <a:spcBef>
                 <a:spcPts val="0"/>
               </a:spcBef>
-              <a:buNone/>
+              <a:buClr>
+                <a:schemeClr val="dk2"/>
+              </a:buClr>
+              <a:buSzPct val="100000"/>
+              <a:buFont typeface="Arial"/>
+              <a:buChar char="●"/>
             </a:pPr>
             <a:r>
               <a:rPr lang="nl"/>
-              <a:t>Mail sent on April 7, 2015</a:t>
+              <a:t>Person who would help with translation does not respond.</a:t>
+            </a:r>
+          </a:p>
+          <a:p>
+            <a:pPr indent="-419100" lvl="0" marL="457200" rtl="0">
+              <a:spcBef>
+                <a:spcPts val="0"/>
+              </a:spcBef>
+              <a:buClr>
+                <a:schemeClr val="dk2"/>
+              </a:buClr>
+              <a:buSzPct val="100000"/>
+              <a:buFont typeface="Arial"/>
+              <a:buChar char="●"/>
+            </a:pPr>
+            <a:r>
+              <a:rPr lang="nl"/>
+              <a:t>Contact person in Sweden will try to find someone else from the SAAF.</a:t>
+            </a:r>
+          </a:p>
+          <a:p>
+            <a:pPr indent="-419100" lvl="0" marL="457200">
+              <a:spcBef>
+                <a:spcPts val="0"/>
+              </a:spcBef>
+              <a:buClr>
+                <a:schemeClr val="dk2"/>
+              </a:buClr>
+              <a:buSzPct val="100000"/>
+              <a:buFont typeface="Arial"/>
+              <a:buChar char="●"/>
+            </a:pPr>
+            <a:r>
+              <a:rPr lang="nl"/>
+              <a:t>Most persons in Sweden speak English very well.</a:t>
             </a:r>
           </a:p>
         </p:txBody>
@@ -35210,560 +35249,6 @@
 </file>
 
 <file path=ppt/theme/theme1.xml><?xml version="1.0" encoding="utf-8"?>
-<a:theme xmlns:a="http://schemas.openxmlformats.org/drawingml/2006/main" xmlns:r="http://schemas.openxmlformats.org/officeDocument/2006/relationships" name="sketched">
-  <a:themeElements>
-    <a:clrScheme name="Custom 398">
-      <a:dk1>
-        <a:srgbClr val="000000"/>
-      </a:dk1>
-      <a:lt1>
-        <a:srgbClr val="FFFFFF"/>
-      </a:lt1>
-      <a:dk2>
-        <a:srgbClr val="51535D"/>
-      </a:dk2>
-      <a:lt2>
-        <a:srgbClr val="EDEDED"/>
-      </a:lt2>
-      <a:accent1>
-        <a:srgbClr val="676871"/>
-      </a:accent1>
-      <a:accent2>
-        <a:srgbClr val="988489"/>
-      </a:accent2>
-      <a:accent3>
-        <a:srgbClr val="6B7B67"/>
-      </a:accent3>
-      <a:accent4>
-        <a:srgbClr val="747B85"/>
-      </a:accent4>
-      <a:accent5>
-        <a:srgbClr val="A5A9AF"/>
-      </a:accent5>
-      <a:accent6>
-        <a:srgbClr val="85716D"/>
-      </a:accent6>
-      <a:hlink>
-        <a:srgbClr val="676871"/>
-      </a:hlink>
-      <a:folHlink>
-        <a:srgbClr val="3F414A"/>
-      </a:folHlink>
-    </a:clrScheme>
-    <a:fontScheme name="Office">
-      <a:majorFont>
-        <a:latin typeface="Arial"/>
-        <a:ea typeface=""/>
-        <a:cs typeface=""/>
-        <a:font script="Jpan" typeface="ＭＳ Ｐゴシック"/>
-        <a:font script="Hang" typeface="맑은 고딕"/>
-        <a:font script="Hans" typeface="宋体"/>
-        <a:font script="Hant" typeface="新細明體"/>
-        <a:font script="Arab" typeface="Times New Roman"/>
-        <a:font script="Hebr" typeface="Times New Roman"/>
-        <a:font script="Thai" typeface="Angsana New"/>
-        <a:font script="Ethi" typeface="Nyala"/>
-        <a:font script="Beng" typeface="Vrinda"/>
-        <a:font script="Gujr" typeface="Shruti"/>
-        <a:font script="Khmr" typeface="MoolBoran"/>
-        <a:font script="Knda" typeface="Tunga"/>
-        <a:font script="Guru" typeface="Raavi"/>
-        <a:font script="Cans" typeface="Euphemia"/>
-        <a:font script="Cher" typeface="Plantagenet Cherokee"/>
-        <a:font script="Yiii" typeface="Microsoft Yi Baiti"/>
-        <a:font script="Tibt" typeface="Microsoft Himalaya"/>
-        <a:font script="Thaa" typeface="MV Boli"/>
-        <a:font script="Deva" typeface="Mangal"/>
-        <a:font script="Telu" typeface="Gautami"/>
-        <a:font script="Taml" typeface="Latha"/>
-        <a:font script="Syrc" typeface="Estrangelo Edessa"/>
-        <a:font script="Orya" typeface="Kalinga"/>
-        <a:font script="Mlym" typeface="Kartika"/>
-        <a:font script="Laoo" typeface="DokChampa"/>
-        <a:font script="Sinh" typeface="Iskoola Pota"/>
-        <a:font script="Mong" typeface="Mongolian Baiti"/>
-        <a:font script="Viet" typeface="Times New Roman"/>
-        <a:font script="Uigh" typeface="Microsoft Uighur"/>
-      </a:majorFont>
-      <a:minorFont>
-        <a:latin typeface="Arial"/>
-        <a:ea typeface=""/>
-        <a:cs typeface=""/>
-        <a:font script="Jpan" typeface="ＭＳ Ｐゴシック"/>
-        <a:font script="Hang" typeface="맑은 고딕"/>
-        <a:font script="Hans" typeface="宋体"/>
-        <a:font script="Hant" typeface="新細明體"/>
-        <a:font script="Arab" typeface="Times New Roman"/>
-        <a:font script="Hebr" typeface="Times New Roman"/>
-        <a:font script="Thai" typeface="Angsana New"/>
-        <a:font script="Ethi" typeface="Nyala"/>
-        <a:font script="Beng" typeface="Vrinda"/>
-        <a:font script="Gujr" typeface="Shruti"/>
-        <a:font script="Khmr" typeface="MoolBoran"/>
-        <a:font script="Knda" typeface="Tunga"/>
-        <a:font script="Guru" typeface="Raavi"/>
-        <a:font script="Cans" typeface="Euphemia"/>
-        <a:font script="Cher" typeface="Plantagenet Cherokee"/>
-        <a:font script="Yiii" typeface="Microsoft Yi Baiti"/>
-        <a:font script="Tibt" typeface="Microsoft Himalaya"/>
-        <a:font script="Thaa" typeface="MV Boli"/>
-        <a:font script="Deva" typeface="Mangal"/>
-        <a:font script="Telu" typeface="Gautami"/>
-        <a:font script="Taml" typeface="Latha"/>
-        <a:font script="Syrc" typeface="Estrangelo Edessa"/>
-        <a:font script="Orya" typeface="Kalinga"/>
-        <a:font script="Mlym" typeface="Kartika"/>
-        <a:font script="Laoo" typeface="DokChampa"/>
-        <a:font script="Sinh" typeface="Iskoola Pota"/>
-        <a:font script="Mong" typeface="Mongolian Baiti"/>
-        <a:font script="Viet" typeface="Times New Roman"/>
-        <a:font script="Uigh" typeface="Microsoft Uighur"/>
-      </a:minorFont>
-    </a:fontScheme>
-    <a:fmtScheme name="Office">
-      <a:fillStyleLst>
-        <a:solidFill>
-          <a:schemeClr val="phClr"/>
-        </a:solidFill>
-        <a:gradFill rotWithShape="1">
-          <a:gsLst>
-            <a:gs pos="0">
-              <a:schemeClr val="phClr">
-                <a:tint val="50000"/>
-                <a:satMod val="300000"/>
-              </a:schemeClr>
-            </a:gs>
-            <a:gs pos="35000">
-              <a:schemeClr val="phClr">
-                <a:tint val="37000"/>
-                <a:satMod val="300000"/>
-              </a:schemeClr>
-            </a:gs>
-            <a:gs pos="100000">
-              <a:schemeClr val="phClr">
-                <a:tint val="15000"/>
-                <a:satMod val="350000"/>
-              </a:schemeClr>
-            </a:gs>
-          </a:gsLst>
-          <a:lin ang="16200000" scaled="1"/>
-        </a:gradFill>
-        <a:gradFill rotWithShape="1">
-          <a:gsLst>
-            <a:gs pos="0">
-              <a:schemeClr val="phClr">
-                <a:tint val="100000"/>
-                <a:shade val="100000"/>
-                <a:satMod val="130000"/>
-              </a:schemeClr>
-            </a:gs>
-            <a:gs pos="100000">
-              <a:schemeClr val="phClr">
-                <a:tint val="50000"/>
-                <a:shade val="100000"/>
-                <a:satMod val="350000"/>
-              </a:schemeClr>
-            </a:gs>
-          </a:gsLst>
-          <a:lin ang="16200000" scaled="0"/>
-        </a:gradFill>
-      </a:fillStyleLst>
-      <a:lnStyleLst>
-        <a:ln cap="flat" cmpd="sng" w="9525" algn="ctr">
-          <a:solidFill>
-            <a:schemeClr val="phClr">
-              <a:shade val="95000"/>
-              <a:satMod val="105000"/>
-            </a:schemeClr>
-          </a:solidFill>
-          <a:prstDash val="solid"/>
-        </a:ln>
-        <a:ln cap="flat" cmpd="sng" w="25400" algn="ctr">
-          <a:solidFill>
-            <a:schemeClr val="phClr"/>
-          </a:solidFill>
-          <a:prstDash val="solid"/>
-        </a:ln>
-        <a:ln cap="flat" cmpd="sng" w="38100" algn="ctr">
-          <a:solidFill>
-            <a:schemeClr val="phClr"/>
-          </a:solidFill>
-          <a:prstDash val="solid"/>
-        </a:ln>
-      </a:lnStyleLst>
-      <a:effectStyleLst>
-        <a:effectStyle>
-          <a:effectLst>
-            <a:outerShdw blurRad="40000" rotWithShape="0" dir="5400000" dist="20000">
-              <a:srgbClr val="000000">
-                <a:alpha val="38000"/>
-              </a:srgbClr>
-            </a:outerShdw>
-          </a:effectLst>
-        </a:effectStyle>
-        <a:effectStyle>
-          <a:effectLst>
-            <a:outerShdw blurRad="40000" rotWithShape="0" dir="5400000" dist="23000">
-              <a:srgbClr val="000000">
-                <a:alpha val="35000"/>
-              </a:srgbClr>
-            </a:outerShdw>
-          </a:effectLst>
-        </a:effectStyle>
-        <a:effectStyle>
-          <a:effectLst>
-            <a:outerShdw blurRad="40000" rotWithShape="0" dir="5400000" dist="23000">
-              <a:srgbClr val="000000">
-                <a:alpha val="35000"/>
-              </a:srgbClr>
-            </a:outerShdw>
-          </a:effectLst>
-          <a:scene3d>
-            <a:camera prst="orthographicFront">
-              <a:rot lat="0" lon="0" rev="0"/>
-            </a:camera>
-            <a:lightRig dir="t" rig="threePt">
-              <a:rot lat="0" lon="0" rev="1200000"/>
-            </a:lightRig>
-          </a:scene3d>
-          <a:sp3d>
-            <a:bevelT h="25400" w="63500"/>
-          </a:sp3d>
-        </a:effectStyle>
-      </a:effectStyleLst>
-      <a:bgFillStyleLst>
-        <a:solidFill>
-          <a:schemeClr val="phClr"/>
-        </a:solidFill>
-        <a:gradFill rotWithShape="1">
-          <a:gsLst>
-            <a:gs pos="0">
-              <a:schemeClr val="phClr">
-                <a:tint val="40000"/>
-                <a:satMod val="350000"/>
-              </a:schemeClr>
-            </a:gs>
-            <a:gs pos="40000">
-              <a:schemeClr val="phClr">
-                <a:tint val="45000"/>
-                <a:shade val="99000"/>
-                <a:satMod val="350000"/>
-              </a:schemeClr>
-            </a:gs>
-            <a:gs pos="100000">
-              <a:schemeClr val="phClr">
-                <a:shade val="20000"/>
-                <a:satMod val="255000"/>
-              </a:schemeClr>
-            </a:gs>
-          </a:gsLst>
-          <a:path path="circle">
-            <a:fillToRect b="180000" l="50000" r="50000" t="-80000"/>
-          </a:path>
-        </a:gradFill>
-        <a:gradFill rotWithShape="1">
-          <a:gsLst>
-            <a:gs pos="0">
-              <a:schemeClr val="phClr">
-                <a:tint val="80000"/>
-                <a:satMod val="300000"/>
-              </a:schemeClr>
-            </a:gs>
-            <a:gs pos="100000">
-              <a:schemeClr val="phClr">
-                <a:shade val="30000"/>
-                <a:satMod val="200000"/>
-              </a:schemeClr>
-            </a:gs>
-          </a:gsLst>
-          <a:path path="circle">
-            <a:fillToRect b="50000" l="50000" r="50000" t="50000"/>
-          </a:path>
-        </a:gradFill>
-      </a:bgFillStyleLst>
-    </a:fmtScheme>
-  </a:themeElements>
-</a:theme>
-</file>
-
-<file path=ppt/theme/theme2.xml><?xml version="1.0" encoding="utf-8"?>
-<a:theme xmlns:a="http://schemas.openxmlformats.org/drawingml/2006/main" xmlns:r="http://schemas.openxmlformats.org/officeDocument/2006/relationships" name="Custom Theme">
-  <a:themeElements>
-    <a:clrScheme name="Default">
-      <a:dk1>
-        <a:srgbClr val="000000"/>
-      </a:dk1>
-      <a:lt1>
-        <a:srgbClr val="FFFFFF"/>
-      </a:lt1>
-      <a:dk2>
-        <a:srgbClr val="158158"/>
-      </a:dk2>
-      <a:lt2>
-        <a:srgbClr val="F3F3F3"/>
-      </a:lt2>
-      <a:accent1>
-        <a:srgbClr val="058DC7"/>
-      </a:accent1>
-      <a:accent2>
-        <a:srgbClr val="50B432"/>
-      </a:accent2>
-      <a:accent3>
-        <a:srgbClr val="ED561B"/>
-      </a:accent3>
-      <a:accent4>
-        <a:srgbClr val="EDEF00"/>
-      </a:accent4>
-      <a:accent5>
-        <a:srgbClr val="24CBE5"/>
-      </a:accent5>
-      <a:accent6>
-        <a:srgbClr val="64E572"/>
-      </a:accent6>
-      <a:hlink>
-        <a:srgbClr val="2200CC"/>
-      </a:hlink>
-      <a:folHlink>
-        <a:srgbClr val="551A8B"/>
-      </a:folHlink>
-    </a:clrScheme>
-    <a:fontScheme name="Office">
-      <a:majorFont>
-        <a:latin typeface="Arial"/>
-        <a:ea typeface=""/>
-        <a:cs typeface=""/>
-        <a:font script="Jpan" typeface="ＭＳ Ｐゴシック"/>
-        <a:font script="Hang" typeface="맑은 고딕"/>
-        <a:font script="Hans" typeface="宋体"/>
-        <a:font script="Hant" typeface="新細明體"/>
-        <a:font script="Arab" typeface="Times New Roman"/>
-        <a:font script="Hebr" typeface="Times New Roman"/>
-        <a:font script="Thai" typeface="Angsana New"/>
-        <a:font script="Ethi" typeface="Nyala"/>
-        <a:font script="Beng" typeface="Vrinda"/>
-        <a:font script="Gujr" typeface="Shruti"/>
-        <a:font script="Khmr" typeface="MoolBoran"/>
-        <a:font script="Knda" typeface="Tunga"/>
-        <a:font script="Guru" typeface="Raavi"/>
-        <a:font script="Cans" typeface="Euphemia"/>
-        <a:font script="Cher" typeface="Plantagenet Cherokee"/>
-        <a:font script="Yiii" typeface="Microsoft Yi Baiti"/>
-        <a:font script="Tibt" typeface="Microsoft Himalaya"/>
-        <a:font script="Thaa" typeface="MV Boli"/>
-        <a:font script="Deva" typeface="Mangal"/>
-        <a:font script="Telu" typeface="Gautami"/>
-        <a:font script="Taml" typeface="Latha"/>
-        <a:font script="Syrc" typeface="Estrangelo Edessa"/>
-        <a:font script="Orya" typeface="Kalinga"/>
-        <a:font script="Mlym" typeface="Kartika"/>
-        <a:font script="Laoo" typeface="DokChampa"/>
-        <a:font script="Sinh" typeface="Iskoola Pota"/>
-        <a:font script="Mong" typeface="Mongolian Baiti"/>
-        <a:font script="Viet" typeface="Times New Roman"/>
-        <a:font script="Uigh" typeface="Microsoft Uighur"/>
-      </a:majorFont>
-      <a:minorFont>
-        <a:latin typeface="Arial"/>
-        <a:ea typeface=""/>
-        <a:cs typeface=""/>
-        <a:font script="Jpan" typeface="ＭＳ Ｐゴシック"/>
-        <a:font script="Hang" typeface="맑은 고딕"/>
-        <a:font script="Hans" typeface="宋体"/>
-        <a:font script="Hant" typeface="新細明體"/>
-        <a:font script="Arab" typeface="Times New Roman"/>
-        <a:font script="Hebr" typeface="Times New Roman"/>
-        <a:font script="Thai" typeface="Angsana New"/>
-        <a:font script="Ethi" typeface="Nyala"/>
-        <a:font script="Beng" typeface="Vrinda"/>
-        <a:font script="Gujr" typeface="Shruti"/>
-        <a:font script="Khmr" typeface="MoolBoran"/>
-        <a:font script="Knda" typeface="Tunga"/>
-        <a:font script="Guru" typeface="Raavi"/>
-        <a:font script="Cans" typeface="Euphemia"/>
-        <a:font script="Cher" typeface="Plantagenet Cherokee"/>
-        <a:font script="Yiii" typeface="Microsoft Yi Baiti"/>
-        <a:font script="Tibt" typeface="Microsoft Himalaya"/>
-        <a:font script="Thaa" typeface="MV Boli"/>
-        <a:font script="Deva" typeface="Mangal"/>
-        <a:font script="Telu" typeface="Gautami"/>
-        <a:font script="Taml" typeface="Latha"/>
-        <a:font script="Syrc" typeface="Estrangelo Edessa"/>
-        <a:font script="Orya" typeface="Kalinga"/>
-        <a:font script="Mlym" typeface="Kartika"/>
-        <a:font script="Laoo" typeface="DokChampa"/>
-        <a:font script="Sinh" typeface="Iskoola Pota"/>
-        <a:font script="Mong" typeface="Mongolian Baiti"/>
-        <a:font script="Viet" typeface="Times New Roman"/>
-        <a:font script="Uigh" typeface="Microsoft Uighur"/>
-      </a:minorFont>
-    </a:fontScheme>
-    <a:fmtScheme name="Office">
-      <a:fillStyleLst>
-        <a:solidFill>
-          <a:schemeClr val="phClr"/>
-        </a:solidFill>
-        <a:gradFill rotWithShape="1">
-          <a:gsLst>
-            <a:gs pos="0">
-              <a:schemeClr val="phClr">
-                <a:tint val="50000"/>
-                <a:satMod val="300000"/>
-              </a:schemeClr>
-            </a:gs>
-            <a:gs pos="35000">
-              <a:schemeClr val="phClr">
-                <a:tint val="37000"/>
-                <a:satMod val="300000"/>
-              </a:schemeClr>
-            </a:gs>
-            <a:gs pos="100000">
-              <a:schemeClr val="phClr">
-                <a:tint val="15000"/>
-                <a:satMod val="350000"/>
-              </a:schemeClr>
-            </a:gs>
-          </a:gsLst>
-          <a:lin ang="16200000" scaled="1"/>
-        </a:gradFill>
-        <a:gradFill rotWithShape="1">
-          <a:gsLst>
-            <a:gs pos="0">
-              <a:schemeClr val="phClr">
-                <a:tint val="100000"/>
-                <a:shade val="100000"/>
-                <a:satMod val="130000"/>
-              </a:schemeClr>
-            </a:gs>
-            <a:gs pos="100000">
-              <a:schemeClr val="phClr">
-                <a:tint val="50000"/>
-                <a:shade val="100000"/>
-                <a:satMod val="350000"/>
-              </a:schemeClr>
-            </a:gs>
-          </a:gsLst>
-          <a:lin ang="16200000" scaled="0"/>
-        </a:gradFill>
-      </a:fillStyleLst>
-      <a:lnStyleLst>
-        <a:ln cap="flat" cmpd="sng" w="9525" algn="ctr">
-          <a:solidFill>
-            <a:schemeClr val="phClr">
-              <a:shade val="95000"/>
-              <a:satMod val="105000"/>
-            </a:schemeClr>
-          </a:solidFill>
-          <a:prstDash val="solid"/>
-        </a:ln>
-        <a:ln cap="flat" cmpd="sng" w="25400" algn="ctr">
-          <a:solidFill>
-            <a:schemeClr val="phClr"/>
-          </a:solidFill>
-          <a:prstDash val="solid"/>
-        </a:ln>
-        <a:ln cap="flat" cmpd="sng" w="38100" algn="ctr">
-          <a:solidFill>
-            <a:schemeClr val="phClr"/>
-          </a:solidFill>
-          <a:prstDash val="solid"/>
-        </a:ln>
-      </a:lnStyleLst>
-      <a:effectStyleLst>
-        <a:effectStyle>
-          <a:effectLst>
-            <a:outerShdw blurRad="40000" rotWithShape="0" dir="5400000" dist="20000">
-              <a:srgbClr val="000000">
-                <a:alpha val="38000"/>
-              </a:srgbClr>
-            </a:outerShdw>
-          </a:effectLst>
-        </a:effectStyle>
-        <a:effectStyle>
-          <a:effectLst>
-            <a:outerShdw blurRad="40000" rotWithShape="0" dir="5400000" dist="23000">
-              <a:srgbClr val="000000">
-                <a:alpha val="35000"/>
-              </a:srgbClr>
-            </a:outerShdw>
-          </a:effectLst>
-        </a:effectStyle>
-        <a:effectStyle>
-          <a:effectLst>
-            <a:outerShdw blurRad="40000" rotWithShape="0" dir="5400000" dist="23000">
-              <a:srgbClr val="000000">
-                <a:alpha val="35000"/>
-              </a:srgbClr>
-            </a:outerShdw>
-          </a:effectLst>
-          <a:scene3d>
-            <a:camera prst="orthographicFront">
-              <a:rot lat="0" lon="0" rev="0"/>
-            </a:camera>
-            <a:lightRig dir="t" rig="threePt">
-              <a:rot lat="0" lon="0" rev="1200000"/>
-            </a:lightRig>
-          </a:scene3d>
-          <a:sp3d>
-            <a:bevelT h="25400" w="63500"/>
-          </a:sp3d>
-        </a:effectStyle>
-      </a:effectStyleLst>
-      <a:bgFillStyleLst>
-        <a:solidFill>
-          <a:schemeClr val="phClr"/>
-        </a:solidFill>
-        <a:gradFill rotWithShape="1">
-          <a:gsLst>
-            <a:gs pos="0">
-              <a:schemeClr val="phClr">
-                <a:tint val="40000"/>
-                <a:satMod val="350000"/>
-              </a:schemeClr>
-            </a:gs>
-            <a:gs pos="40000">
-              <a:schemeClr val="phClr">
-                <a:tint val="45000"/>
-                <a:shade val="99000"/>
-                <a:satMod val="350000"/>
-              </a:schemeClr>
-            </a:gs>
-            <a:gs pos="100000">
-              <a:schemeClr val="phClr">
-                <a:shade val="20000"/>
-                <a:satMod val="255000"/>
-              </a:schemeClr>
-            </a:gs>
-          </a:gsLst>
-          <a:path path="circle">
-            <a:fillToRect b="180000" l="50000" r="50000" t="-80000"/>
-          </a:path>
-        </a:gradFill>
-        <a:gradFill rotWithShape="1">
-          <a:gsLst>
-            <a:gs pos="0">
-              <a:schemeClr val="phClr">
-                <a:tint val="80000"/>
-                <a:satMod val="300000"/>
-              </a:schemeClr>
-            </a:gs>
-            <a:gs pos="100000">
-              <a:schemeClr val="phClr">
-                <a:shade val="30000"/>
-                <a:satMod val="200000"/>
-              </a:schemeClr>
-            </a:gs>
-          </a:gsLst>
-          <a:path path="circle">
-            <a:fillToRect b="50000" l="50000" r="50000" t="50000"/>
-          </a:path>
-        </a:gradFill>
-      </a:bgFillStyleLst>
-    </a:fmtScheme>
-  </a:themeElements>
-</a:theme>
-</file>
-
-<file path=ppt/theme/theme3.xml><?xml version="1.0" encoding="utf-8"?>
 <a:theme xmlns:a="http://schemas.openxmlformats.org/drawingml/2006/main" xmlns:r="http://schemas.openxmlformats.org/officeDocument/2006/relationships" name="Office Theme">
   <a:themeElements>
     <a:clrScheme name="Office">
@@ -36078,4 +35563,558 @@
     </a:lnDef>
   </a:objectDefaults>
 </a:theme>
+</file>
+
+<file path=ppt/theme/theme2.xml><?xml version="1.0" encoding="utf-8"?>
+<a:theme xmlns:a="http://schemas.openxmlformats.org/drawingml/2006/main" xmlns:r="http://schemas.openxmlformats.org/officeDocument/2006/relationships" name="sketched">
+  <a:themeElements>
+    <a:clrScheme name="Custom 398">
+      <a:dk1>
+        <a:srgbClr val="000000"/>
+      </a:dk1>
+      <a:lt1>
+        <a:srgbClr val="FFFFFF"/>
+      </a:lt1>
+      <a:dk2>
+        <a:srgbClr val="51535D"/>
+      </a:dk2>
+      <a:lt2>
+        <a:srgbClr val="EDEDED"/>
+      </a:lt2>
+      <a:accent1>
+        <a:srgbClr val="676871"/>
+      </a:accent1>
+      <a:accent2>
+        <a:srgbClr val="988489"/>
+      </a:accent2>
+      <a:accent3>
+        <a:srgbClr val="6B7B67"/>
+      </a:accent3>
+      <a:accent4>
+        <a:srgbClr val="747B85"/>
+      </a:accent4>
+      <a:accent5>
+        <a:srgbClr val="A5A9AF"/>
+      </a:accent5>
+      <a:accent6>
+        <a:srgbClr val="85716D"/>
+      </a:accent6>
+      <a:hlink>
+        <a:srgbClr val="676871"/>
+      </a:hlink>
+      <a:folHlink>
+        <a:srgbClr val="3F414A"/>
+      </a:folHlink>
+    </a:clrScheme>
+    <a:fontScheme name="Office">
+      <a:majorFont>
+        <a:latin typeface="Arial"/>
+        <a:ea typeface=""/>
+        <a:cs typeface=""/>
+        <a:font script="Jpan" typeface="ＭＳ Ｐゴシック"/>
+        <a:font script="Hang" typeface="맑은 고딕"/>
+        <a:font script="Hans" typeface="宋体"/>
+        <a:font script="Hant" typeface="新細明體"/>
+        <a:font script="Arab" typeface="Times New Roman"/>
+        <a:font script="Hebr" typeface="Times New Roman"/>
+        <a:font script="Thai" typeface="Angsana New"/>
+        <a:font script="Ethi" typeface="Nyala"/>
+        <a:font script="Beng" typeface="Vrinda"/>
+        <a:font script="Gujr" typeface="Shruti"/>
+        <a:font script="Khmr" typeface="MoolBoran"/>
+        <a:font script="Knda" typeface="Tunga"/>
+        <a:font script="Guru" typeface="Raavi"/>
+        <a:font script="Cans" typeface="Euphemia"/>
+        <a:font script="Cher" typeface="Plantagenet Cherokee"/>
+        <a:font script="Yiii" typeface="Microsoft Yi Baiti"/>
+        <a:font script="Tibt" typeface="Microsoft Himalaya"/>
+        <a:font script="Thaa" typeface="MV Boli"/>
+        <a:font script="Deva" typeface="Mangal"/>
+        <a:font script="Telu" typeface="Gautami"/>
+        <a:font script="Taml" typeface="Latha"/>
+        <a:font script="Syrc" typeface="Estrangelo Edessa"/>
+        <a:font script="Orya" typeface="Kalinga"/>
+        <a:font script="Mlym" typeface="Kartika"/>
+        <a:font script="Laoo" typeface="DokChampa"/>
+        <a:font script="Sinh" typeface="Iskoola Pota"/>
+        <a:font script="Mong" typeface="Mongolian Baiti"/>
+        <a:font script="Viet" typeface="Times New Roman"/>
+        <a:font script="Uigh" typeface="Microsoft Uighur"/>
+      </a:majorFont>
+      <a:minorFont>
+        <a:latin typeface="Arial"/>
+        <a:ea typeface=""/>
+        <a:cs typeface=""/>
+        <a:font script="Jpan" typeface="ＭＳ Ｐゴシック"/>
+        <a:font script="Hang" typeface="맑은 고딕"/>
+        <a:font script="Hans" typeface="宋体"/>
+        <a:font script="Hant" typeface="新細明體"/>
+        <a:font script="Arab" typeface="Times New Roman"/>
+        <a:font script="Hebr" typeface="Times New Roman"/>
+        <a:font script="Thai" typeface="Angsana New"/>
+        <a:font script="Ethi" typeface="Nyala"/>
+        <a:font script="Beng" typeface="Vrinda"/>
+        <a:font script="Gujr" typeface="Shruti"/>
+        <a:font script="Khmr" typeface="MoolBoran"/>
+        <a:font script="Knda" typeface="Tunga"/>
+        <a:font script="Guru" typeface="Raavi"/>
+        <a:font script="Cans" typeface="Euphemia"/>
+        <a:font script="Cher" typeface="Plantagenet Cherokee"/>
+        <a:font script="Yiii" typeface="Microsoft Yi Baiti"/>
+        <a:font script="Tibt" typeface="Microsoft Himalaya"/>
+        <a:font script="Thaa" typeface="MV Boli"/>
+        <a:font script="Deva" typeface="Mangal"/>
+        <a:font script="Telu" typeface="Gautami"/>
+        <a:font script="Taml" typeface="Latha"/>
+        <a:font script="Syrc" typeface="Estrangelo Edessa"/>
+        <a:font script="Orya" typeface="Kalinga"/>
+        <a:font script="Mlym" typeface="Kartika"/>
+        <a:font script="Laoo" typeface="DokChampa"/>
+        <a:font script="Sinh" typeface="Iskoola Pota"/>
+        <a:font script="Mong" typeface="Mongolian Baiti"/>
+        <a:font script="Viet" typeface="Times New Roman"/>
+        <a:font script="Uigh" typeface="Microsoft Uighur"/>
+      </a:minorFont>
+    </a:fontScheme>
+    <a:fmtScheme name="Office">
+      <a:fillStyleLst>
+        <a:solidFill>
+          <a:schemeClr val="phClr"/>
+        </a:solidFill>
+        <a:gradFill rotWithShape="1">
+          <a:gsLst>
+            <a:gs pos="0">
+              <a:schemeClr val="phClr">
+                <a:tint val="50000"/>
+                <a:satMod val="300000"/>
+              </a:schemeClr>
+            </a:gs>
+            <a:gs pos="35000">
+              <a:schemeClr val="phClr">
+                <a:tint val="37000"/>
+                <a:satMod val="300000"/>
+              </a:schemeClr>
+            </a:gs>
+            <a:gs pos="100000">
+              <a:schemeClr val="phClr">
+                <a:tint val="15000"/>
+                <a:satMod val="350000"/>
+              </a:schemeClr>
+            </a:gs>
+          </a:gsLst>
+          <a:lin ang="16200000" scaled="1"/>
+        </a:gradFill>
+        <a:gradFill rotWithShape="1">
+          <a:gsLst>
+            <a:gs pos="0">
+              <a:schemeClr val="phClr">
+                <a:tint val="100000"/>
+                <a:shade val="100000"/>
+                <a:satMod val="130000"/>
+              </a:schemeClr>
+            </a:gs>
+            <a:gs pos="100000">
+              <a:schemeClr val="phClr">
+                <a:tint val="50000"/>
+                <a:shade val="100000"/>
+                <a:satMod val="350000"/>
+              </a:schemeClr>
+            </a:gs>
+          </a:gsLst>
+          <a:lin ang="16200000" scaled="0"/>
+        </a:gradFill>
+      </a:fillStyleLst>
+      <a:lnStyleLst>
+        <a:ln cap="flat" cmpd="sng" w="9525" algn="ctr">
+          <a:solidFill>
+            <a:schemeClr val="phClr">
+              <a:shade val="95000"/>
+              <a:satMod val="105000"/>
+            </a:schemeClr>
+          </a:solidFill>
+          <a:prstDash val="solid"/>
+        </a:ln>
+        <a:ln cap="flat" cmpd="sng" w="25400" algn="ctr">
+          <a:solidFill>
+            <a:schemeClr val="phClr"/>
+          </a:solidFill>
+          <a:prstDash val="solid"/>
+        </a:ln>
+        <a:ln cap="flat" cmpd="sng" w="38100" algn="ctr">
+          <a:solidFill>
+            <a:schemeClr val="phClr"/>
+          </a:solidFill>
+          <a:prstDash val="solid"/>
+        </a:ln>
+      </a:lnStyleLst>
+      <a:effectStyleLst>
+        <a:effectStyle>
+          <a:effectLst>
+            <a:outerShdw blurRad="40000" rotWithShape="0" dir="5400000" dist="20000">
+              <a:srgbClr val="000000">
+                <a:alpha val="38000"/>
+              </a:srgbClr>
+            </a:outerShdw>
+          </a:effectLst>
+        </a:effectStyle>
+        <a:effectStyle>
+          <a:effectLst>
+            <a:outerShdw blurRad="40000" rotWithShape="0" dir="5400000" dist="23000">
+              <a:srgbClr val="000000">
+                <a:alpha val="35000"/>
+              </a:srgbClr>
+            </a:outerShdw>
+          </a:effectLst>
+        </a:effectStyle>
+        <a:effectStyle>
+          <a:effectLst>
+            <a:outerShdw blurRad="40000" rotWithShape="0" dir="5400000" dist="23000">
+              <a:srgbClr val="000000">
+                <a:alpha val="35000"/>
+              </a:srgbClr>
+            </a:outerShdw>
+          </a:effectLst>
+          <a:scene3d>
+            <a:camera prst="orthographicFront">
+              <a:rot lat="0" lon="0" rev="0"/>
+            </a:camera>
+            <a:lightRig dir="t" rig="threePt">
+              <a:rot lat="0" lon="0" rev="1200000"/>
+            </a:lightRig>
+          </a:scene3d>
+          <a:sp3d>
+            <a:bevelT h="25400" w="63500"/>
+          </a:sp3d>
+        </a:effectStyle>
+      </a:effectStyleLst>
+      <a:bgFillStyleLst>
+        <a:solidFill>
+          <a:schemeClr val="phClr"/>
+        </a:solidFill>
+        <a:gradFill rotWithShape="1">
+          <a:gsLst>
+            <a:gs pos="0">
+              <a:schemeClr val="phClr">
+                <a:tint val="40000"/>
+                <a:satMod val="350000"/>
+              </a:schemeClr>
+            </a:gs>
+            <a:gs pos="40000">
+              <a:schemeClr val="phClr">
+                <a:tint val="45000"/>
+                <a:shade val="99000"/>
+                <a:satMod val="350000"/>
+              </a:schemeClr>
+            </a:gs>
+            <a:gs pos="100000">
+              <a:schemeClr val="phClr">
+                <a:shade val="20000"/>
+                <a:satMod val="255000"/>
+              </a:schemeClr>
+            </a:gs>
+          </a:gsLst>
+          <a:path path="circle">
+            <a:fillToRect b="180000" l="50000" r="50000" t="-80000"/>
+          </a:path>
+        </a:gradFill>
+        <a:gradFill rotWithShape="1">
+          <a:gsLst>
+            <a:gs pos="0">
+              <a:schemeClr val="phClr">
+                <a:tint val="80000"/>
+                <a:satMod val="300000"/>
+              </a:schemeClr>
+            </a:gs>
+            <a:gs pos="100000">
+              <a:schemeClr val="phClr">
+                <a:shade val="30000"/>
+                <a:satMod val="200000"/>
+              </a:schemeClr>
+            </a:gs>
+          </a:gsLst>
+          <a:path path="circle">
+            <a:fillToRect b="50000" l="50000" r="50000" t="50000"/>
+          </a:path>
+        </a:gradFill>
+      </a:bgFillStyleLst>
+    </a:fmtScheme>
+  </a:themeElements>
+</a:theme>
+</file>
+
+<file path=ppt/theme/theme3.xml><?xml version="1.0" encoding="utf-8"?>
+<a:theme xmlns:a="http://schemas.openxmlformats.org/drawingml/2006/main" xmlns:r="http://schemas.openxmlformats.org/officeDocument/2006/relationships" name="Custom Theme">
+  <a:themeElements>
+    <a:clrScheme name="Default">
+      <a:dk1>
+        <a:srgbClr val="000000"/>
+      </a:dk1>
+      <a:lt1>
+        <a:srgbClr val="FFFFFF"/>
+      </a:lt1>
+      <a:dk2>
+        <a:srgbClr val="158158"/>
+      </a:dk2>
+      <a:lt2>
+        <a:srgbClr val="F3F3F3"/>
+      </a:lt2>
+      <a:accent1>
+        <a:srgbClr val="058DC7"/>
+      </a:accent1>
+      <a:accent2>
+        <a:srgbClr val="50B432"/>
+      </a:accent2>
+      <a:accent3>
+        <a:srgbClr val="ED561B"/>
+      </a:accent3>
+      <a:accent4>
+        <a:srgbClr val="EDEF00"/>
+      </a:accent4>
+      <a:accent5>
+        <a:srgbClr val="24CBE5"/>
+      </a:accent5>
+      <a:accent6>
+        <a:srgbClr val="64E572"/>
+      </a:accent6>
+      <a:hlink>
+        <a:srgbClr val="2200CC"/>
+      </a:hlink>
+      <a:folHlink>
+        <a:srgbClr val="551A8B"/>
+      </a:folHlink>
+    </a:clrScheme>
+    <a:fontScheme name="Office">
+      <a:majorFont>
+        <a:latin typeface="Arial"/>
+        <a:ea typeface=""/>
+        <a:cs typeface=""/>
+        <a:font script="Jpan" typeface="ＭＳ Ｐゴシック"/>
+        <a:font script="Hang" typeface="맑은 고딕"/>
+        <a:font script="Hans" typeface="宋体"/>
+        <a:font script="Hant" typeface="新細明體"/>
+        <a:font script="Arab" typeface="Times New Roman"/>
+        <a:font script="Hebr" typeface="Times New Roman"/>
+        <a:font script="Thai" typeface="Angsana New"/>
+        <a:font script="Ethi" typeface="Nyala"/>
+        <a:font script="Beng" typeface="Vrinda"/>
+        <a:font script="Gujr" typeface="Shruti"/>
+        <a:font script="Khmr" typeface="MoolBoran"/>
+        <a:font script="Knda" typeface="Tunga"/>
+        <a:font script="Guru" typeface="Raavi"/>
+        <a:font script="Cans" typeface="Euphemia"/>
+        <a:font script="Cher" typeface="Plantagenet Cherokee"/>
+        <a:font script="Yiii" typeface="Microsoft Yi Baiti"/>
+        <a:font script="Tibt" typeface="Microsoft Himalaya"/>
+        <a:font script="Thaa" typeface="MV Boli"/>
+        <a:font script="Deva" typeface="Mangal"/>
+        <a:font script="Telu" typeface="Gautami"/>
+        <a:font script="Taml" typeface="Latha"/>
+        <a:font script="Syrc" typeface="Estrangelo Edessa"/>
+        <a:font script="Orya" typeface="Kalinga"/>
+        <a:font script="Mlym" typeface="Kartika"/>
+        <a:font script="Laoo" typeface="DokChampa"/>
+        <a:font script="Sinh" typeface="Iskoola Pota"/>
+        <a:font script="Mong" typeface="Mongolian Baiti"/>
+        <a:font script="Viet" typeface="Times New Roman"/>
+        <a:font script="Uigh" typeface="Microsoft Uighur"/>
+      </a:majorFont>
+      <a:minorFont>
+        <a:latin typeface="Arial"/>
+        <a:ea typeface=""/>
+        <a:cs typeface=""/>
+        <a:font script="Jpan" typeface="ＭＳ Ｐゴシック"/>
+        <a:font script="Hang" typeface="맑은 고딕"/>
+        <a:font script="Hans" typeface="宋体"/>
+        <a:font script="Hant" typeface="新細明體"/>
+        <a:font script="Arab" typeface="Times New Roman"/>
+        <a:font script="Hebr" typeface="Times New Roman"/>
+        <a:font script="Thai" typeface="Angsana New"/>
+        <a:font script="Ethi" typeface="Nyala"/>
+        <a:font script="Beng" typeface="Vrinda"/>
+        <a:font script="Gujr" typeface="Shruti"/>
+        <a:font script="Khmr" typeface="MoolBoran"/>
+        <a:font script="Knda" typeface="Tunga"/>
+        <a:font script="Guru" typeface="Raavi"/>
+        <a:font script="Cans" typeface="Euphemia"/>
+        <a:font script="Cher" typeface="Plantagenet Cherokee"/>
+        <a:font script="Yiii" typeface="Microsoft Yi Baiti"/>
+        <a:font script="Tibt" typeface="Microsoft Himalaya"/>
+        <a:font script="Thaa" typeface="MV Boli"/>
+        <a:font script="Deva" typeface="Mangal"/>
+        <a:font script="Telu" typeface="Gautami"/>
+        <a:font script="Taml" typeface="Latha"/>
+        <a:font script="Syrc" typeface="Estrangelo Edessa"/>
+        <a:font script="Orya" typeface="Kalinga"/>
+        <a:font script="Mlym" typeface="Kartika"/>
+        <a:font script="Laoo" typeface="DokChampa"/>
+        <a:font script="Sinh" typeface="Iskoola Pota"/>
+        <a:font script="Mong" typeface="Mongolian Baiti"/>
+        <a:font script="Viet" typeface="Times New Roman"/>
+        <a:font script="Uigh" typeface="Microsoft Uighur"/>
+      </a:minorFont>
+    </a:fontScheme>
+    <a:fmtScheme name="Office">
+      <a:fillStyleLst>
+        <a:solidFill>
+          <a:schemeClr val="phClr"/>
+        </a:solidFill>
+        <a:gradFill rotWithShape="1">
+          <a:gsLst>
+            <a:gs pos="0">
+              <a:schemeClr val="phClr">
+                <a:tint val="50000"/>
+                <a:satMod val="300000"/>
+              </a:schemeClr>
+            </a:gs>
+            <a:gs pos="35000">
+              <a:schemeClr val="phClr">
+                <a:tint val="37000"/>
+                <a:satMod val="300000"/>
+              </a:schemeClr>
+            </a:gs>
+            <a:gs pos="100000">
+              <a:schemeClr val="phClr">
+                <a:tint val="15000"/>
+                <a:satMod val="350000"/>
+              </a:schemeClr>
+            </a:gs>
+          </a:gsLst>
+          <a:lin ang="16200000" scaled="1"/>
+        </a:gradFill>
+        <a:gradFill rotWithShape="1">
+          <a:gsLst>
+            <a:gs pos="0">
+              <a:schemeClr val="phClr">
+                <a:tint val="100000"/>
+                <a:shade val="100000"/>
+                <a:satMod val="130000"/>
+              </a:schemeClr>
+            </a:gs>
+            <a:gs pos="100000">
+              <a:schemeClr val="phClr">
+                <a:tint val="50000"/>
+                <a:shade val="100000"/>
+                <a:satMod val="350000"/>
+              </a:schemeClr>
+            </a:gs>
+          </a:gsLst>
+          <a:lin ang="16200000" scaled="0"/>
+        </a:gradFill>
+      </a:fillStyleLst>
+      <a:lnStyleLst>
+        <a:ln cap="flat" cmpd="sng" w="9525" algn="ctr">
+          <a:solidFill>
+            <a:schemeClr val="phClr">
+              <a:shade val="95000"/>
+              <a:satMod val="105000"/>
+            </a:schemeClr>
+          </a:solidFill>
+          <a:prstDash val="solid"/>
+        </a:ln>
+        <a:ln cap="flat" cmpd="sng" w="25400" algn="ctr">
+          <a:solidFill>
+            <a:schemeClr val="phClr"/>
+          </a:solidFill>
+          <a:prstDash val="solid"/>
+        </a:ln>
+        <a:ln cap="flat" cmpd="sng" w="38100" algn="ctr">
+          <a:solidFill>
+            <a:schemeClr val="phClr"/>
+          </a:solidFill>
+          <a:prstDash val="solid"/>
+        </a:ln>
+      </a:lnStyleLst>
+      <a:effectStyleLst>
+        <a:effectStyle>
+          <a:effectLst>
+            <a:outerShdw blurRad="40000" rotWithShape="0" dir="5400000" dist="20000">
+              <a:srgbClr val="000000">
+                <a:alpha val="38000"/>
+              </a:srgbClr>
+            </a:outerShdw>
+          </a:effectLst>
+        </a:effectStyle>
+        <a:effectStyle>
+          <a:effectLst>
+            <a:outerShdw blurRad="40000" rotWithShape="0" dir="5400000" dist="23000">
+              <a:srgbClr val="000000">
+                <a:alpha val="35000"/>
+              </a:srgbClr>
+            </a:outerShdw>
+          </a:effectLst>
+        </a:effectStyle>
+        <a:effectStyle>
+          <a:effectLst>
+            <a:outerShdw blurRad="40000" rotWithShape="0" dir="5400000" dist="23000">
+              <a:srgbClr val="000000">
+                <a:alpha val="35000"/>
+              </a:srgbClr>
+            </a:outerShdw>
+          </a:effectLst>
+          <a:scene3d>
+            <a:camera prst="orthographicFront">
+              <a:rot lat="0" lon="0" rev="0"/>
+            </a:camera>
+            <a:lightRig dir="t" rig="threePt">
+              <a:rot lat="0" lon="0" rev="1200000"/>
+            </a:lightRig>
+          </a:scene3d>
+          <a:sp3d>
+            <a:bevelT h="25400" w="63500"/>
+          </a:sp3d>
+        </a:effectStyle>
+      </a:effectStyleLst>
+      <a:bgFillStyleLst>
+        <a:solidFill>
+          <a:schemeClr val="phClr"/>
+        </a:solidFill>
+        <a:gradFill rotWithShape="1">
+          <a:gsLst>
+            <a:gs pos="0">
+              <a:schemeClr val="phClr">
+                <a:tint val="40000"/>
+                <a:satMod val="350000"/>
+              </a:schemeClr>
+            </a:gs>
+            <a:gs pos="40000">
+              <a:schemeClr val="phClr">
+                <a:tint val="45000"/>
+                <a:shade val="99000"/>
+                <a:satMod val="350000"/>
+              </a:schemeClr>
+            </a:gs>
+            <a:gs pos="100000">
+              <a:schemeClr val="phClr">
+                <a:shade val="20000"/>
+                <a:satMod val="255000"/>
+              </a:schemeClr>
+            </a:gs>
+          </a:gsLst>
+          <a:path path="circle">
+            <a:fillToRect b="180000" l="50000" r="50000" t="-80000"/>
+          </a:path>
+        </a:gradFill>
+        <a:gradFill rotWithShape="1">
+          <a:gsLst>
+            <a:gs pos="0">
+              <a:schemeClr val="phClr">
+                <a:tint val="80000"/>
+                <a:satMod val="300000"/>
+              </a:schemeClr>
+            </a:gs>
+            <a:gs pos="100000">
+              <a:schemeClr val="phClr">
+                <a:shade val="30000"/>
+                <a:satMod val="200000"/>
+              </a:schemeClr>
+            </a:gs>
+          </a:gsLst>
+          <a:path path="circle">
+            <a:fillToRect b="50000" l="50000" r="50000" t="50000"/>
+          </a:path>
+        </a:gradFill>
+      </a:bgFillStyleLst>
+    </a:fmtScheme>
+  </a:themeElements>
+</a:theme>
 </file>
</xml_diff>